<commit_message>
Anpassungen Code und Präsi
</commit_message>
<xml_diff>
--- a/Präsentation/Support Vector Machines.pptx
+++ b/Präsentation/Support Vector Machines.pptx
@@ -266,7 +266,7 @@
               <a:pPr>
                 <a:defRPr/>
               </a:pPr>
-              <a:t>22.06.2024</a:t>
+              <a:t>25.06.2024</a:t>
             </a:fld>
             <a:endParaRPr lang="de-DE"/>
           </a:p>
@@ -2559,7 +2559,25 @@
                 </a:solidFill>
                 <a:latin typeface="Arial" charset="0"/>
               </a:rPr>
-              <a:t>Thema | Name | Fachbereich/Lehrstuhl</a:t>
+              <a:t>Support Vector </a:t>
+            </a:r>
+            <a:r>
+              <a:rPr lang="de-DE" altLang="de-DE" sz="900" dirty="0" err="1">
+                <a:solidFill>
+                  <a:srgbClr val="00407A"/>
+                </a:solidFill>
+                <a:latin typeface="Arial" charset="0"/>
+              </a:rPr>
+              <a:t>Machine</a:t>
+            </a:r>
+            <a:r>
+              <a:rPr lang="de-DE" altLang="de-DE" sz="900" dirty="0">
+                <a:solidFill>
+                  <a:srgbClr val="00407A"/>
+                </a:solidFill>
+                <a:latin typeface="Arial" charset="0"/>
+              </a:rPr>
+              <a:t> | Andersch, Münz</a:t>
             </a:r>
           </a:p>
         </p:txBody>
@@ -3911,8 +3929,13 @@
           <a:p>
             <a:r>
               <a:rPr lang="de-DE" dirty="0"/>
-              <a:t>Simulationsstudie</a:t>
-            </a:r>
+              <a:t>Simulation </a:t>
+            </a:r>
+            <a:r>
+              <a:rPr lang="de-DE" dirty="0" err="1"/>
+              <a:t>study</a:t>
+            </a:r>
+            <a:endParaRPr lang="de-DE" dirty="0"/>
           </a:p>
         </p:txBody>
       </p:sp>
@@ -3939,11 +3962,11 @@
           <a:p>
             <a:r>
               <a:rPr lang="de-DE" sz="2000" dirty="0"/>
-              <a:t>Maßzahlen (</a:t>
+              <a:t>Measurement </a:t>
             </a:r>
             <a:r>
               <a:rPr lang="de-DE" sz="2000" dirty="0" err="1"/>
-              <a:t>prediciton</a:t>
+              <a:t>of</a:t>
             </a:r>
             <a:r>
               <a:rPr lang="de-DE" sz="2000" dirty="0"/>
@@ -3955,16 +3978,31 @@
             </a:r>
             <a:r>
               <a:rPr lang="de-DE" sz="2000" dirty="0"/>
-              <a:t>, ROC </a:t>
-            </a:r>
-            <a:r>
-              <a:rPr lang="de-DE" sz="2000" dirty="0" err="1"/>
-              <a:t>curves</a:t>
-            </a:r>
-            <a:r>
-              <a:rPr lang="de-DE" sz="2000" dirty="0"/>
-              <a:t>)</a:t>
-            </a:r>
+              <a:t>:</a:t>
+            </a:r>
+          </a:p>
+          <a:p>
+            <a:pPr lvl="1"/>
+            <a:r>
+              <a:rPr lang="en-GB" sz="1800" dirty="0"/>
+              <a:t>Misclassification</a:t>
+            </a:r>
+            <a:r>
+              <a:rPr lang="de-DE" sz="1800" dirty="0"/>
+              <a:t> rate</a:t>
+            </a:r>
+          </a:p>
+          <a:p>
+            <a:pPr lvl="1"/>
+            <a:r>
+              <a:rPr lang="de-DE" sz="1800" dirty="0"/>
+              <a:t>ROC </a:t>
+            </a:r>
+            <a:r>
+              <a:rPr lang="de-DE" sz="1800" dirty="0" err="1"/>
+              <a:t>curve</a:t>
+            </a:r>
+            <a:endParaRPr lang="de-DE" sz="1800" dirty="0"/>
           </a:p>
         </p:txBody>
       </p:sp>
@@ -4337,6 +4375,20 @@
               <a:t>margin</a:t>
             </a:r>
           </a:p>
+          <a:p>
+            <a:r>
+              <a:rPr lang="en-GB" sz="2000" dirty="0"/>
+              <a:t>Only the </a:t>
+            </a:r>
+            <a:r>
+              <a:rPr lang="en-GB" sz="2000" b="1" dirty="0"/>
+              <a:t>support vectors </a:t>
+            </a:r>
+            <a:r>
+              <a:rPr lang="en-GB" sz="2000" dirty="0"/>
+              <a:t>(datapoints closest to hyperplane) have direct influence on the position of the hyperplane</a:t>
+            </a:r>
+          </a:p>
         </p:txBody>
       </p:sp>
     </p:spTree>
@@ -4699,8 +4751,8 @@
           </a:p>
         </p:txBody>
       </p:sp>
-      <mc:AlternateContent xmlns:mc="http://schemas.openxmlformats.org/markup-compatibility/2006">
-        <mc:Choice xmlns:a14="http://schemas.microsoft.com/office/drawing/2010/main" Requires="a14">
+      <mc:AlternateContent xmlns:mc="http://schemas.openxmlformats.org/markup-compatibility/2006" xmlns:a14="http://schemas.microsoft.com/office/drawing/2010/main">
+        <mc:Choice Requires="a14">
           <p:sp>
             <p:nvSpPr>
               <p:cNvPr id="3" name="Inhaltsplatzhalter 2">
@@ -5162,14 +5214,7 @@
                         <a:latin typeface="Cambria Math" panose="02040503050406030204" pitchFamily="18" charset="0"/>
                         <a:ea typeface="Cambria Math" panose="02040503050406030204" pitchFamily="18" charset="0"/>
                       </a:rPr>
-                      <m:t>&lt;</m:t>
-                    </m:r>
-                    <m:r>
-                      <a:rPr lang="de-DE" sz="1800" b="0" i="1" smtClean="0">
-                        <a:latin typeface="Cambria Math" panose="02040503050406030204" pitchFamily="18" charset="0"/>
-                        <a:ea typeface="Cambria Math" panose="02040503050406030204" pitchFamily="18" charset="0"/>
-                      </a:rPr>
-                      <m:t>0 </m:t>
+                      <m:t>&lt;0 </m:t>
                     </m:r>
                     <m:r>
                       <a:rPr lang="de-DE" sz="1800" b="0" i="1" smtClean="0">
@@ -5283,7 +5328,7 @@
             </p:txBody>
           </p:sp>
         </mc:Choice>
-        <mc:Fallback>
+        <mc:Fallback xmlns="">
           <p:sp>
             <p:nvSpPr>
               <p:cNvPr id="3" name="Inhaltsplatzhalter 2">
@@ -5467,8 +5512,8 @@
           </a:p>
         </p:txBody>
       </p:sp>
-      <mc:AlternateContent xmlns:mc="http://schemas.openxmlformats.org/markup-compatibility/2006">
-        <mc:Choice xmlns:a14="http://schemas.microsoft.com/office/drawing/2010/main" Requires="a14">
+      <mc:AlternateContent xmlns:mc="http://schemas.openxmlformats.org/markup-compatibility/2006" xmlns:a14="http://schemas.microsoft.com/office/drawing/2010/main">
+        <mc:Choice Requires="a14">
           <p:sp>
             <p:nvSpPr>
               <p:cNvPr id="3" name="Inhaltsplatzhalter 2">
@@ -6052,7 +6097,7 @@
             </p:txBody>
           </p:sp>
         </mc:Choice>
-        <mc:Fallback>
+        <mc:Fallback xmlns="">
           <p:sp>
             <p:nvSpPr>
               <p:cNvPr id="3" name="Inhaltsplatzhalter 2">
@@ -6110,7 +6155,7 @@
         </p:nvSpPr>
         <p:spPr>
           <a:xfrm>
-            <a:off x="6300192" y="1707654"/>
+            <a:off x="6212485" y="1497528"/>
             <a:ext cx="2520280" cy="2376264"/>
           </a:xfrm>
           <a:prstGeom prst="rect">

</xml_diff>

<commit_message>
decision boundary and margin width
</commit_message>
<xml_diff>
--- a/Präsentation/Support Vector Machines.pptx
+++ b/Präsentation/Support Vector Machines.pptx
@@ -5,7 +5,7 @@
     <p:sldMasterId id="2147483648" r:id="rId1"/>
   </p:sldMasterIdLst>
   <p:notesMasterIdLst>
-    <p:notesMasterId r:id="rId15"/>
+    <p:notesMasterId r:id="rId17"/>
   </p:notesMasterIdLst>
   <p:sldIdLst>
     <p:sldId id="256" r:id="rId2"/>
@@ -14,13 +14,15 @@
     <p:sldId id="259" r:id="rId5"/>
     <p:sldId id="260" r:id="rId6"/>
     <p:sldId id="268" r:id="rId7"/>
-    <p:sldId id="264" r:id="rId8"/>
-    <p:sldId id="265" r:id="rId9"/>
-    <p:sldId id="266" r:id="rId10"/>
-    <p:sldId id="261" r:id="rId11"/>
-    <p:sldId id="267" r:id="rId12"/>
-    <p:sldId id="262" r:id="rId13"/>
-    <p:sldId id="263" r:id="rId14"/>
+    <p:sldId id="269" r:id="rId8"/>
+    <p:sldId id="270" r:id="rId9"/>
+    <p:sldId id="264" r:id="rId10"/>
+    <p:sldId id="265" r:id="rId11"/>
+    <p:sldId id="266" r:id="rId12"/>
+    <p:sldId id="261" r:id="rId13"/>
+    <p:sldId id="267" r:id="rId14"/>
+    <p:sldId id="262" r:id="rId15"/>
+    <p:sldId id="263" r:id="rId16"/>
   </p:sldIdLst>
   <p:sldSz cx="9144000" cy="5143500" type="screen16x9"/>
   <p:notesSz cx="6797675" cy="9926638"/>
@@ -160,7 +162,7 @@
 <file path=ppt/revisionInfo.xml><?xml version="1.0" encoding="utf-8"?>
 <p1510:revInfo xmlns:a="http://schemas.openxmlformats.org/drawingml/2006/main" xmlns:r="http://schemas.openxmlformats.org/officeDocument/2006/relationships" xmlns:p1510="http://schemas.microsoft.com/office/powerpoint/2015/10/main">
   <p1510:revLst>
-    <p1510:client id="{AB1E0CFC-1C57-4A1E-92D1-DAC8DD9182A6}" v="239" dt="2024-06-26T16:36:57.783"/>
+    <p1510:client id="{AB1E0CFC-1C57-4A1E-92D1-DAC8DD9182A6}" v="587" dt="2024-06-26T21:53:28.526"/>
   </p1510:revLst>
 </p1510:revInfo>
 </file>
@@ -170,12 +172,12 @@
   <pc:docChgLst>
     <pc:chgData name="Franz Andersch" userId="88b46490-1a31-494c-af6b-e252cc2a642d" providerId="ADAL" clId="{AB1E0CFC-1C57-4A1E-92D1-DAC8DD9182A6}"/>
     <pc:docChg chg="custSel addSld modSld">
-      <pc:chgData name="Franz Andersch" userId="88b46490-1a31-494c-af6b-e252cc2a642d" providerId="ADAL" clId="{AB1E0CFC-1C57-4A1E-92D1-DAC8DD9182A6}" dt="2024-06-26T16:36:57.783" v="562" actId="962"/>
+      <pc:chgData name="Franz Andersch" userId="88b46490-1a31-494c-af6b-e252cc2a642d" providerId="ADAL" clId="{AB1E0CFC-1C57-4A1E-92D1-DAC8DD9182A6}" dt="2024-06-26T21:53:57.941" v="1169" actId="1076"/>
       <pc:docMkLst>
         <pc:docMk/>
       </pc:docMkLst>
-      <pc:sldChg chg="delSp modSp add mod">
-        <pc:chgData name="Franz Andersch" userId="88b46490-1a31-494c-af6b-e252cc2a642d" providerId="ADAL" clId="{AB1E0CFC-1C57-4A1E-92D1-DAC8DD9182A6}" dt="2024-06-26T16:36:57.783" v="562" actId="962"/>
+      <pc:sldChg chg="addSp delSp modSp add mod">
+        <pc:chgData name="Franz Andersch" userId="88b46490-1a31-494c-af6b-e252cc2a642d" providerId="ADAL" clId="{AB1E0CFC-1C57-4A1E-92D1-DAC8DD9182A6}" dt="2024-06-26T21:01:42.627" v="853" actId="1076"/>
         <pc:sldMkLst>
           <pc:docMk/>
           <pc:sldMk cId="1770530705" sldId="268"/>
@@ -196,6 +198,30 @@
             <ac:spMk id="3" creationId="{B6EBCD5F-A998-E34B-B609-7A4D246D72F7}"/>
           </ac:spMkLst>
         </pc:spChg>
+        <pc:spChg chg="del">
+          <ac:chgData name="Franz Andersch" userId="88b46490-1a31-494c-af6b-e252cc2a642d" providerId="ADAL" clId="{AB1E0CFC-1C57-4A1E-92D1-DAC8DD9182A6}" dt="2024-06-26T21:01:04.249" v="845" actId="21"/>
+          <ac:spMkLst>
+            <pc:docMk/>
+            <pc:sldMk cId="1770530705" sldId="268"/>
+            <ac:spMk id="4" creationId="{B21BA278-5AA0-7413-5DB3-4EB47B444F21}"/>
+          </ac:spMkLst>
+        </pc:spChg>
+        <pc:graphicFrameChg chg="add del mod">
+          <ac:chgData name="Franz Andersch" userId="88b46490-1a31-494c-af6b-e252cc2a642d" providerId="ADAL" clId="{AB1E0CFC-1C57-4A1E-92D1-DAC8DD9182A6}" dt="2024-06-26T20:59:09.966" v="838" actId="21"/>
+          <ac:graphicFrameMkLst>
+            <pc:docMk/>
+            <pc:sldMk cId="1770530705" sldId="268"/>
+            <ac:graphicFrameMk id="23" creationId="{837D24E5-423D-FEBD-6ADF-C50B8EBF4DD6}"/>
+          </ac:graphicFrameMkLst>
+        </pc:graphicFrameChg>
+        <pc:picChg chg="del mod ord replST">
+          <ac:chgData name="Franz Andersch" userId="88b46490-1a31-494c-af6b-e252cc2a642d" providerId="ADAL" clId="{AB1E0CFC-1C57-4A1E-92D1-DAC8DD9182A6}" dt="2024-06-26T20:35:29.220" v="620" actId="478"/>
+          <ac:picMkLst>
+            <pc:docMk/>
+            <pc:sldMk cId="1770530705" sldId="268"/>
+            <ac:picMk id="5" creationId="{71DD7DA8-7ACF-36CF-6662-075701A4ADC4}"/>
+          </ac:picMkLst>
+        </pc:picChg>
         <pc:picChg chg="del mod replST">
           <ac:chgData name="Franz Andersch" userId="88b46490-1a31-494c-af6b-e252cc2a642d" providerId="ADAL" clId="{AB1E0CFC-1C57-4A1E-92D1-DAC8DD9182A6}" dt="2024-06-26T16:32:18.398" v="411" actId="478"/>
           <ac:picMkLst>
@@ -204,12 +230,28 @@
             <ac:picMk id="6" creationId="{5337D150-038F-425C-D279-EE8871C6FD95}"/>
           </ac:picMkLst>
         </pc:picChg>
+        <pc:picChg chg="del mod ord replST">
+          <ac:chgData name="Franz Andersch" userId="88b46490-1a31-494c-af6b-e252cc2a642d" providerId="ADAL" clId="{AB1E0CFC-1C57-4A1E-92D1-DAC8DD9182A6}" dt="2024-06-26T20:36:44.764" v="650" actId="478"/>
+          <ac:picMkLst>
+            <pc:docMk/>
+            <pc:sldMk cId="1770530705" sldId="268"/>
+            <ac:picMk id="7" creationId="{743894CD-D354-D946-F35F-94961A3044E9}"/>
+          </ac:picMkLst>
+        </pc:picChg>
         <pc:picChg chg="del mod replST">
           <ac:chgData name="Franz Andersch" userId="88b46490-1a31-494c-af6b-e252cc2a642d" providerId="ADAL" clId="{AB1E0CFC-1C57-4A1E-92D1-DAC8DD9182A6}" dt="2024-06-26T16:32:16.571" v="410" actId="478"/>
           <ac:picMkLst>
             <pc:docMk/>
             <pc:sldMk cId="1770530705" sldId="268"/>
             <ac:picMk id="8" creationId="{3EC44C0A-AF07-144C-E1F0-89B85CF056EE}"/>
+          </ac:picMkLst>
+        </pc:picChg>
+        <pc:picChg chg="del mod ord replST">
+          <ac:chgData name="Franz Andersch" userId="88b46490-1a31-494c-af6b-e252cc2a642d" providerId="ADAL" clId="{AB1E0CFC-1C57-4A1E-92D1-DAC8DD9182A6}" dt="2024-06-26T20:38:37.695" v="680" actId="478"/>
+          <ac:picMkLst>
+            <pc:docMk/>
+            <pc:sldMk cId="1770530705" sldId="268"/>
+            <ac:picMk id="9" creationId="{B042BCEF-88B1-3C43-5D0B-599D70965A0E}"/>
           </ac:picMkLst>
         </pc:picChg>
         <pc:picChg chg="del mod replST">
@@ -221,11 +263,27 @@
           </ac:picMkLst>
         </pc:picChg>
         <pc:picChg chg="del mod ord replST">
+          <ac:chgData name="Franz Andersch" userId="88b46490-1a31-494c-af6b-e252cc2a642d" providerId="ADAL" clId="{AB1E0CFC-1C57-4A1E-92D1-DAC8DD9182A6}" dt="2024-06-26T20:41:38.193" v="710" actId="478"/>
+          <ac:picMkLst>
+            <pc:docMk/>
+            <pc:sldMk cId="1770530705" sldId="268"/>
+            <ac:picMk id="11" creationId="{98308DEF-CEE9-1264-EC97-C4197FFAF209}"/>
+          </ac:picMkLst>
+        </pc:picChg>
+        <pc:picChg chg="del mod ord replST">
           <ac:chgData name="Franz Andersch" userId="88b46490-1a31-494c-af6b-e252cc2a642d" providerId="ADAL" clId="{AB1E0CFC-1C57-4A1E-92D1-DAC8DD9182A6}" dt="2024-06-26T16:32:50.676" v="440" actId="478"/>
           <ac:picMkLst>
             <pc:docMk/>
             <pc:sldMk cId="1770530705" sldId="268"/>
             <ac:picMk id="12" creationId="{AB771422-A4D6-89B7-AC86-E1CA2D90E621}"/>
+          </ac:picMkLst>
+        </pc:picChg>
+        <pc:picChg chg="del mod ord replST">
+          <ac:chgData name="Franz Andersch" userId="88b46490-1a31-494c-af6b-e252cc2a642d" providerId="ADAL" clId="{AB1E0CFC-1C57-4A1E-92D1-DAC8DD9182A6}" dt="2024-06-26T20:53:43.473" v="740" actId="478"/>
+          <ac:picMkLst>
+            <pc:docMk/>
+            <pc:sldMk cId="1770530705" sldId="268"/>
+            <ac:picMk id="13" creationId="{DD32B326-2A3D-4CCD-DAE3-F0B52DF716C8}"/>
           </ac:picMkLst>
         </pc:picChg>
         <pc:picChg chg="del mod ord replST">
@@ -237,11 +295,27 @@
           </ac:picMkLst>
         </pc:picChg>
         <pc:picChg chg="del mod ord replST">
+          <ac:chgData name="Franz Andersch" userId="88b46490-1a31-494c-af6b-e252cc2a642d" providerId="ADAL" clId="{AB1E0CFC-1C57-4A1E-92D1-DAC8DD9182A6}" dt="2024-06-26T20:56:14.079" v="770" actId="478"/>
+          <ac:picMkLst>
+            <pc:docMk/>
+            <pc:sldMk cId="1770530705" sldId="268"/>
+            <ac:picMk id="15" creationId="{3CC1C1E9-7974-1950-533D-A230FD37BFC2}"/>
+          </ac:picMkLst>
+        </pc:picChg>
+        <pc:picChg chg="del mod ord replST">
           <ac:chgData name="Franz Andersch" userId="88b46490-1a31-494c-af6b-e252cc2a642d" providerId="ADAL" clId="{AB1E0CFC-1C57-4A1E-92D1-DAC8DD9182A6}" dt="2024-06-26T16:35:44.401" v="500" actId="478"/>
           <ac:picMkLst>
             <pc:docMk/>
             <pc:sldMk cId="1770530705" sldId="268"/>
             <ac:picMk id="16" creationId="{B3EF5CF1-F7C1-FFD1-228A-925BAA3E08D4}"/>
+          </ac:picMkLst>
+        </pc:picChg>
+        <pc:picChg chg="del mod ord replST">
+          <ac:chgData name="Franz Andersch" userId="88b46490-1a31-494c-af6b-e252cc2a642d" providerId="ADAL" clId="{AB1E0CFC-1C57-4A1E-92D1-DAC8DD9182A6}" dt="2024-06-26T20:56:58.195" v="803" actId="478"/>
+          <ac:picMkLst>
+            <pc:docMk/>
+            <pc:sldMk cId="1770530705" sldId="268"/>
+            <ac:picMk id="17" creationId="{D6704968-7646-AECE-C9A0-A925F197A0DF}"/>
           </ac:picMkLst>
         </pc:picChg>
         <pc:picChg chg="del mod ord replST">
@@ -253,6 +327,14 @@
           </ac:picMkLst>
         </pc:picChg>
         <pc:picChg chg="del mod ord replST">
+          <ac:chgData name="Franz Andersch" userId="88b46490-1a31-494c-af6b-e252cc2a642d" providerId="ADAL" clId="{AB1E0CFC-1C57-4A1E-92D1-DAC8DD9182A6}" dt="2024-06-26T20:57:30.063" v="834" actId="478"/>
+          <ac:picMkLst>
+            <pc:docMk/>
+            <pc:sldMk cId="1770530705" sldId="268"/>
+            <ac:picMk id="19" creationId="{5CC1B080-BE75-E40B-7AA8-BDB3FF1097AA}"/>
+          </ac:picMkLst>
+        </pc:picChg>
+        <pc:picChg chg="del mod ord replST">
           <ac:chgData name="Franz Andersch" userId="88b46490-1a31-494c-af6b-e252cc2a642d" providerId="ADAL" clId="{AB1E0CFC-1C57-4A1E-92D1-DAC8DD9182A6}" dt="2024-06-26T16:36:57.782" v="560" actId="478"/>
           <ac:picMkLst>
             <pc:docMk/>
@@ -261,11 +343,153 @@
           </ac:picMkLst>
         </pc:picChg>
         <pc:picChg chg="mod ord replST">
-          <ac:chgData name="Franz Andersch" userId="88b46490-1a31-494c-af6b-e252cc2a642d" providerId="ADAL" clId="{AB1E0CFC-1C57-4A1E-92D1-DAC8DD9182A6}" dt="2024-06-26T16:36:57.783" v="562" actId="962"/>
+          <ac:chgData name="Franz Andersch" userId="88b46490-1a31-494c-af6b-e252cc2a642d" providerId="ADAL" clId="{AB1E0CFC-1C57-4A1E-92D1-DAC8DD9182A6}" dt="2024-06-26T20:57:30.064" v="836" actId="962"/>
+          <ac:picMkLst>
+            <pc:docMk/>
+            <pc:sldMk cId="1770530705" sldId="268"/>
+            <ac:picMk id="21" creationId="{10DE1F70-7341-0DAC-810B-5172FAB61B45}"/>
+          </ac:picMkLst>
+        </pc:picChg>
+        <pc:picChg chg="del mod ord replST">
+          <ac:chgData name="Franz Andersch" userId="88b46490-1a31-494c-af6b-e252cc2a642d" providerId="ADAL" clId="{AB1E0CFC-1C57-4A1E-92D1-DAC8DD9182A6}" dt="2024-06-26T20:33:39.932" v="590" actId="478"/>
           <ac:picMkLst>
             <pc:docMk/>
             <pc:sldMk cId="1770530705" sldId="268"/>
             <ac:picMk id="22" creationId="{8A78ECD0-CD60-19AA-FA99-DBC348F893B1}"/>
+          </ac:picMkLst>
+        </pc:picChg>
+        <pc:picChg chg="add mod">
+          <ac:chgData name="Franz Andersch" userId="88b46490-1a31-494c-af6b-e252cc2a642d" providerId="ADAL" clId="{AB1E0CFC-1C57-4A1E-92D1-DAC8DD9182A6}" dt="2024-06-26T21:01:42.627" v="853" actId="1076"/>
+          <ac:picMkLst>
+            <pc:docMk/>
+            <pc:sldMk cId="1770530705" sldId="268"/>
+            <ac:picMk id="25" creationId="{BD75108F-A408-4336-CAB4-7135AB37F88E}"/>
+          </ac:picMkLst>
+        </pc:picChg>
+      </pc:sldChg>
+      <pc:sldChg chg="delSp modSp add mod">
+        <pc:chgData name="Franz Andersch" userId="88b46490-1a31-494c-af6b-e252cc2a642d" providerId="ADAL" clId="{AB1E0CFC-1C57-4A1E-92D1-DAC8DD9182A6}" dt="2024-06-26T21:28:26.369" v="1068" actId="962"/>
+        <pc:sldMkLst>
+          <pc:docMk/>
+          <pc:sldMk cId="3990756690" sldId="269"/>
+        </pc:sldMkLst>
+        <pc:picChg chg="del mod ord replST">
+          <ac:chgData name="Franz Andersch" userId="88b46490-1a31-494c-af6b-e252cc2a642d" providerId="ADAL" clId="{AB1E0CFC-1C57-4A1E-92D1-DAC8DD9182A6}" dt="2024-06-26T21:18:23.554" v="914" actId="478"/>
+          <ac:picMkLst>
+            <pc:docMk/>
+            <pc:sldMk cId="3990756690" sldId="269"/>
+            <ac:picMk id="4" creationId="{3E8FA5A0-2B34-E857-4D07-AF8029BFA920}"/>
+          </ac:picMkLst>
+        </pc:picChg>
+        <pc:picChg chg="del mod ord replST">
+          <ac:chgData name="Franz Andersch" userId="88b46490-1a31-494c-af6b-e252cc2a642d" providerId="ADAL" clId="{AB1E0CFC-1C57-4A1E-92D1-DAC8DD9182A6}" dt="2024-06-26T21:18:54.085" v="945" actId="478"/>
+          <ac:picMkLst>
+            <pc:docMk/>
+            <pc:sldMk cId="3990756690" sldId="269"/>
+            <ac:picMk id="6" creationId="{5DA9B7EF-E1CA-0F8A-4E2D-31EADA93DE47}"/>
+          </ac:picMkLst>
+        </pc:picChg>
+        <pc:picChg chg="del mod ord replST">
+          <ac:chgData name="Franz Andersch" userId="88b46490-1a31-494c-af6b-e252cc2a642d" providerId="ADAL" clId="{AB1E0CFC-1C57-4A1E-92D1-DAC8DD9182A6}" dt="2024-06-26T21:19:43.365" v="976" actId="478"/>
+          <ac:picMkLst>
+            <pc:docMk/>
+            <pc:sldMk cId="3990756690" sldId="269"/>
+            <ac:picMk id="8" creationId="{6181C954-9124-11B3-1205-E51FAA287D09}"/>
+          </ac:picMkLst>
+        </pc:picChg>
+        <pc:picChg chg="del mod ord replST">
+          <ac:chgData name="Franz Andersch" userId="88b46490-1a31-494c-af6b-e252cc2a642d" providerId="ADAL" clId="{AB1E0CFC-1C57-4A1E-92D1-DAC8DD9182A6}" dt="2024-06-26T21:22:03.254" v="1006" actId="478"/>
+          <ac:picMkLst>
+            <pc:docMk/>
+            <pc:sldMk cId="3990756690" sldId="269"/>
+            <ac:picMk id="10" creationId="{77E89367-D286-984E-0997-B5331458E73A}"/>
+          </ac:picMkLst>
+        </pc:picChg>
+        <pc:picChg chg="del mod ord replST">
+          <ac:chgData name="Franz Andersch" userId="88b46490-1a31-494c-af6b-e252cc2a642d" providerId="ADAL" clId="{AB1E0CFC-1C57-4A1E-92D1-DAC8DD9182A6}" dt="2024-06-26T21:22:41.494" v="1036" actId="478"/>
+          <ac:picMkLst>
+            <pc:docMk/>
+            <pc:sldMk cId="3990756690" sldId="269"/>
+            <ac:picMk id="12" creationId="{E17B3E6E-AB07-81D9-5ECE-4516A7A26B83}"/>
+          </ac:picMkLst>
+        </pc:picChg>
+        <pc:picChg chg="del mod ord replST">
+          <ac:chgData name="Franz Andersch" userId="88b46490-1a31-494c-af6b-e252cc2a642d" providerId="ADAL" clId="{AB1E0CFC-1C57-4A1E-92D1-DAC8DD9182A6}" dt="2024-06-26T21:28:26.368" v="1066" actId="478"/>
+          <ac:picMkLst>
+            <pc:docMk/>
+            <pc:sldMk cId="3990756690" sldId="269"/>
+            <ac:picMk id="14" creationId="{9119099D-376E-9137-81ED-9097DDD0B32D}"/>
+          </ac:picMkLst>
+        </pc:picChg>
+        <pc:picChg chg="mod ord replST">
+          <ac:chgData name="Franz Andersch" userId="88b46490-1a31-494c-af6b-e252cc2a642d" providerId="ADAL" clId="{AB1E0CFC-1C57-4A1E-92D1-DAC8DD9182A6}" dt="2024-06-26T21:28:26.369" v="1068" actId="962"/>
+          <ac:picMkLst>
+            <pc:docMk/>
+            <pc:sldMk cId="3990756690" sldId="269"/>
+            <ac:picMk id="16" creationId="{8BE09948-9C0A-950C-5DF1-E3EEA29ECF17}"/>
+          </ac:picMkLst>
+        </pc:picChg>
+        <pc:picChg chg="del mod">
+          <ac:chgData name="Franz Andersch" userId="88b46490-1a31-494c-af6b-e252cc2a642d" providerId="ADAL" clId="{AB1E0CFC-1C57-4A1E-92D1-DAC8DD9182A6}" dt="2024-06-26T21:18:00.531" v="883" actId="478"/>
+          <ac:picMkLst>
+            <pc:docMk/>
+            <pc:sldMk cId="3990756690" sldId="269"/>
+            <ac:picMk id="21" creationId="{10DE1F70-7341-0DAC-810B-5172FAB61B45}"/>
+          </ac:picMkLst>
+        </pc:picChg>
+        <pc:picChg chg="del">
+          <ac:chgData name="Franz Andersch" userId="88b46490-1a31-494c-af6b-e252cc2a642d" providerId="ADAL" clId="{AB1E0CFC-1C57-4A1E-92D1-DAC8DD9182A6}" dt="2024-06-26T21:19:04.322" v="948" actId="478"/>
+          <ac:picMkLst>
+            <pc:docMk/>
+            <pc:sldMk cId="3990756690" sldId="269"/>
+            <ac:picMk id="25" creationId="{BD75108F-A408-4336-CAB4-7135AB37F88E}"/>
+          </ac:picMkLst>
+        </pc:picChg>
+      </pc:sldChg>
+      <pc:sldChg chg="addSp delSp modSp add mod">
+        <pc:chgData name="Franz Andersch" userId="88b46490-1a31-494c-af6b-e252cc2a642d" providerId="ADAL" clId="{AB1E0CFC-1C57-4A1E-92D1-DAC8DD9182A6}" dt="2024-06-26T21:53:57.941" v="1169" actId="1076"/>
+        <pc:sldMkLst>
+          <pc:docMk/>
+          <pc:sldMk cId="2902806685" sldId="270"/>
+        </pc:sldMkLst>
+        <pc:picChg chg="del mod ord replST">
+          <ac:chgData name="Franz Andersch" userId="88b46490-1a31-494c-af6b-e252cc2a642d" providerId="ADAL" clId="{AB1E0CFC-1C57-4A1E-92D1-DAC8DD9182A6}" dt="2024-06-26T21:41:37.626" v="1127" actId="478"/>
+          <ac:picMkLst>
+            <pc:docMk/>
+            <pc:sldMk cId="2902806685" sldId="270"/>
+            <ac:picMk id="4" creationId="{BBBCAF7F-5A13-A9FD-6AAB-84F84CE836B2}"/>
+          </ac:picMkLst>
+        </pc:picChg>
+        <pc:picChg chg="del mod ord replST">
+          <ac:chgData name="Franz Andersch" userId="88b46490-1a31-494c-af6b-e252cc2a642d" providerId="ADAL" clId="{AB1E0CFC-1C57-4A1E-92D1-DAC8DD9182A6}" dt="2024-06-26T21:51:36.767" v="1157" actId="478"/>
+          <ac:picMkLst>
+            <pc:docMk/>
+            <pc:sldMk cId="2902806685" sldId="270"/>
+            <ac:picMk id="6" creationId="{ABE1810E-F664-CB44-3A9C-AEBDFD707AB7}"/>
+          </ac:picMkLst>
+        </pc:picChg>
+        <pc:picChg chg="mod ord replST">
+          <ac:chgData name="Franz Andersch" userId="88b46490-1a31-494c-af6b-e252cc2a642d" providerId="ADAL" clId="{AB1E0CFC-1C57-4A1E-92D1-DAC8DD9182A6}" dt="2024-06-26T21:51:36.768" v="1159" actId="962"/>
+          <ac:picMkLst>
+            <pc:docMk/>
+            <pc:sldMk cId="2902806685" sldId="270"/>
+            <ac:picMk id="8" creationId="{49020F9B-9C95-8638-AF48-3DD5DF3A6140}"/>
+          </ac:picMkLst>
+        </pc:picChg>
+        <pc:picChg chg="add mod">
+          <ac:chgData name="Franz Andersch" userId="88b46490-1a31-494c-af6b-e252cc2a642d" providerId="ADAL" clId="{AB1E0CFC-1C57-4A1E-92D1-DAC8DD9182A6}" dt="2024-06-26T21:53:57.941" v="1169" actId="1076"/>
+          <ac:picMkLst>
+            <pc:docMk/>
+            <pc:sldMk cId="2902806685" sldId="270"/>
+            <ac:picMk id="10" creationId="{61AB07FF-8D31-3186-850F-DC65A7D0D908}"/>
+          </ac:picMkLst>
+        </pc:picChg>
+        <pc:picChg chg="del mod">
+          <ac:chgData name="Franz Andersch" userId="88b46490-1a31-494c-af6b-e252cc2a642d" providerId="ADAL" clId="{AB1E0CFC-1C57-4A1E-92D1-DAC8DD9182A6}" dt="2024-06-26T21:41:11.960" v="1097" actId="478"/>
+          <ac:picMkLst>
+            <pc:docMk/>
+            <pc:sldMk cId="2902806685" sldId="270"/>
+            <ac:picMk id="16" creationId="{8BE09948-9C0A-950C-5DF1-E3EEA29ECF17}"/>
           </ac:picMkLst>
         </pc:picChg>
       </pc:sldChg>
@@ -3819,7 +4043,7 @@
           <p:cNvPr id="2" name="Titel 1">
             <a:extLst>
               <a:ext uri="{FF2B5EF4-FFF2-40B4-BE49-F238E27FC236}">
-                <a16:creationId xmlns:a16="http://schemas.microsoft.com/office/drawing/2014/main" id="{9C274E31-D4F7-6C4A-D81C-1BC18A1044AE}"/>
+                <a16:creationId xmlns:a16="http://schemas.microsoft.com/office/drawing/2014/main" id="{388F7BA3-B785-BDE2-BAC6-74C1F53E9285}"/>
               </a:ext>
             </a:extLst>
           </p:cNvPr>
@@ -3836,9 +4060,42 @@
           <a:lstStyle/>
           <a:p>
             <a:r>
+              <a:rPr lang="de-DE" dirty="0" err="1"/>
+              <a:t>How</a:t>
+            </a:r>
+            <a:r>
               <a:rPr lang="de-DE" dirty="0"/>
-              <a:t>Dataset: ALLBUS</a:t>
-            </a:r>
+              <a:t> </a:t>
+            </a:r>
+            <a:r>
+              <a:rPr lang="de-DE" dirty="0" err="1"/>
+              <a:t>it</a:t>
+            </a:r>
+            <a:r>
+              <a:rPr lang="de-DE" dirty="0"/>
+              <a:t> </a:t>
+            </a:r>
+            <a:r>
+              <a:rPr lang="de-DE" dirty="0" err="1"/>
+              <a:t>works</a:t>
+            </a:r>
+            <a:r>
+              <a:rPr lang="de-DE" dirty="0"/>
+              <a:t>: Support </a:t>
+            </a:r>
+            <a:r>
+              <a:rPr lang="de-DE" dirty="0" err="1"/>
+              <a:t>vector</a:t>
+            </a:r>
+            <a:r>
+              <a:rPr lang="de-DE" dirty="0"/>
+              <a:t> </a:t>
+            </a:r>
+            <a:r>
+              <a:rPr lang="de-DE" dirty="0" err="1"/>
+              <a:t>classifier</a:t>
+            </a:r>
+            <a:endParaRPr lang="de-DE" dirty="0"/>
           </a:p>
         </p:txBody>
       </p:sp>
@@ -3847,7 +4104,7 @@
           <p:cNvPr id="3" name="Inhaltsplatzhalter 2">
             <a:extLst>
               <a:ext uri="{FF2B5EF4-FFF2-40B4-BE49-F238E27FC236}">
-                <a16:creationId xmlns:a16="http://schemas.microsoft.com/office/drawing/2014/main" id="{A6EE175B-F110-2231-4746-FB0A5137CFF3}"/>
+                <a16:creationId xmlns:a16="http://schemas.microsoft.com/office/drawing/2014/main" id="{B6EBCD5F-A998-E34B-B609-7A4D246D72F7}"/>
               </a:ext>
             </a:extLst>
           </p:cNvPr>
@@ -3858,206 +4115,19 @@
             <p:ph idx="1"/>
           </p:nvPr>
         </p:nvSpPr>
-        <p:spPr>
-          <a:xfrm>
-            <a:off x="395536" y="1353344"/>
-            <a:ext cx="7344816" cy="3162622"/>
-          </a:xfrm>
-        </p:spPr>
+        <p:spPr/>
         <p:txBody>
           <a:bodyPr/>
           <a:lstStyle/>
           <a:p>
-            <a:r>
-              <a:rPr lang="de-DE" sz="2000" dirty="0"/>
-              <a:t>„General </a:t>
-            </a:r>
-            <a:r>
-              <a:rPr lang="de-DE" sz="2000" dirty="0" err="1"/>
-              <a:t>population</a:t>
-            </a:r>
-            <a:r>
-              <a:rPr lang="de-DE" sz="2000" dirty="0"/>
-              <a:t> </a:t>
-            </a:r>
-            <a:r>
-              <a:rPr lang="de-DE" sz="2000" dirty="0" err="1"/>
-              <a:t>survey</a:t>
-            </a:r>
-            <a:r>
-              <a:rPr lang="de-DE" sz="2000" dirty="0"/>
-              <a:t> </a:t>
-            </a:r>
-            <a:r>
-              <a:rPr lang="de-DE" sz="2000" dirty="0" err="1"/>
-              <a:t>of</a:t>
-            </a:r>
-            <a:r>
-              <a:rPr lang="de-DE" sz="2000" dirty="0"/>
-              <a:t> </a:t>
-            </a:r>
-            <a:r>
-              <a:rPr lang="de-DE" sz="2000" dirty="0" err="1"/>
-              <a:t>the</a:t>
-            </a:r>
-            <a:r>
-              <a:rPr lang="de-DE" sz="2000" dirty="0"/>
-              <a:t> social </a:t>
-            </a:r>
-            <a:r>
-              <a:rPr lang="de-DE" sz="2000" dirty="0" err="1"/>
-              <a:t>sciences</a:t>
-            </a:r>
-            <a:r>
-              <a:rPr lang="de-DE" sz="2000" dirty="0"/>
-              <a:t>“ 	  </a:t>
-            </a:r>
-            <a:r>
-              <a:rPr lang="de-DE" sz="1000" dirty="0"/>
-              <a:t>(Allgemeine Bevölkerungsumfrage der Sozialwissenschaften)</a:t>
-            </a:r>
-          </a:p>
-          <a:p>
-            <a:r>
-              <a:rPr lang="de-DE" sz="2000" b="1" dirty="0"/>
-              <a:t>Response Variable</a:t>
-            </a:r>
-            <a:r>
-              <a:rPr lang="de-DE" sz="2000" dirty="0"/>
-              <a:t>:</a:t>
-            </a:r>
-          </a:p>
-          <a:p>
-            <a:pPr lvl="1"/>
-            <a:r>
-              <a:rPr lang="de-DE" sz="1800" dirty="0"/>
-              <a:t>„Federal </a:t>
-            </a:r>
-            <a:r>
-              <a:rPr lang="de-DE" sz="1800" dirty="0" err="1"/>
-              <a:t>state</a:t>
-            </a:r>
-            <a:r>
-              <a:rPr lang="de-DE" sz="1800" dirty="0"/>
-              <a:t> </a:t>
-            </a:r>
-            <a:r>
-              <a:rPr lang="de-DE" sz="1800" dirty="0" err="1"/>
-              <a:t>where</a:t>
-            </a:r>
-            <a:r>
-              <a:rPr lang="de-DE" sz="1800" dirty="0"/>
-              <a:t> </a:t>
-            </a:r>
-            <a:r>
-              <a:rPr lang="de-DE" sz="1800" dirty="0" err="1"/>
-              <a:t>interviewee</a:t>
-            </a:r>
-            <a:r>
-              <a:rPr lang="de-DE" sz="1800" dirty="0"/>
-              <a:t> </a:t>
-            </a:r>
-            <a:r>
-              <a:rPr lang="de-DE" sz="1800" dirty="0" err="1"/>
-              <a:t>lived</a:t>
-            </a:r>
-            <a:r>
-              <a:rPr lang="de-DE" sz="1800" dirty="0"/>
-              <a:t> in </a:t>
-            </a:r>
-            <a:r>
-              <a:rPr lang="de-DE" sz="1800" dirty="0" err="1"/>
-              <a:t>youth</a:t>
-            </a:r>
-            <a:r>
-              <a:rPr lang="de-DE" sz="1800" dirty="0"/>
-              <a:t>“</a:t>
-            </a:r>
-          </a:p>
-          <a:p>
-            <a:pPr lvl="1"/>
-            <a:r>
-              <a:rPr lang="de-DE" sz="1800" dirty="0" err="1">
-                <a:sym typeface="Wingdings" panose="05000000000000000000" pitchFamily="2" charset="2"/>
-              </a:rPr>
-              <a:t>coded</a:t>
-            </a:r>
-            <a:r>
-              <a:rPr lang="de-DE" sz="1800" dirty="0">
-                <a:sym typeface="Wingdings" panose="05000000000000000000" pitchFamily="2" charset="2"/>
-              </a:rPr>
-              <a:t> </a:t>
-            </a:r>
-            <a:r>
-              <a:rPr lang="de-DE" sz="1800" dirty="0" err="1">
-                <a:sym typeface="Wingdings" panose="05000000000000000000" pitchFamily="2" charset="2"/>
-              </a:rPr>
-              <a:t>to</a:t>
-            </a:r>
-            <a:r>
-              <a:rPr lang="de-DE" sz="1800" dirty="0">
-                <a:sym typeface="Wingdings" panose="05000000000000000000" pitchFamily="2" charset="2"/>
-              </a:rPr>
-              <a:t> „Youth in East/West Germany“</a:t>
-            </a:r>
-            <a:endParaRPr lang="de-DE" sz="1800" dirty="0"/>
-          </a:p>
-          <a:p>
-            <a:r>
-              <a:rPr lang="de-DE" sz="2000" b="1" dirty="0" err="1"/>
-              <a:t>Predictor</a:t>
-            </a:r>
-            <a:r>
-              <a:rPr lang="de-DE" sz="2000" b="1" dirty="0"/>
-              <a:t> Variables</a:t>
-            </a:r>
-            <a:r>
-              <a:rPr lang="de-DE" sz="2000" dirty="0"/>
-              <a:t>:</a:t>
-            </a:r>
-          </a:p>
-          <a:p>
-            <a:pPr lvl="1"/>
-            <a:r>
-              <a:rPr lang="de-DE" sz="1800" dirty="0"/>
-              <a:t>121 variables </a:t>
-            </a:r>
-            <a:r>
-              <a:rPr lang="de-DE" sz="1800" dirty="0" err="1"/>
-              <a:t>concerning</a:t>
-            </a:r>
-            <a:r>
-              <a:rPr lang="de-DE" sz="1800" dirty="0"/>
-              <a:t> </a:t>
-            </a:r>
-            <a:r>
-              <a:rPr lang="de-DE" sz="1800" dirty="0" err="1"/>
-              <a:t>attitudes</a:t>
-            </a:r>
-            <a:r>
-              <a:rPr lang="de-DE" sz="1800" dirty="0"/>
-              <a:t>, </a:t>
-            </a:r>
-            <a:r>
-              <a:rPr lang="de-DE" sz="1800" dirty="0" err="1"/>
-              <a:t>behavior</a:t>
-            </a:r>
-            <a:r>
-              <a:rPr lang="de-DE" sz="1800" dirty="0"/>
-              <a:t> and social </a:t>
-            </a:r>
-            <a:r>
-              <a:rPr lang="de-DE" sz="1800" dirty="0" err="1"/>
-              <a:t>change</a:t>
-            </a:r>
-            <a:endParaRPr lang="de-DE" sz="1800" dirty="0"/>
+            <a:endParaRPr lang="de-DE" sz="2000" dirty="0"/>
           </a:p>
         </p:txBody>
       </p:sp>
     </p:spTree>
     <p:extLst>
       <p:ext uri="{BB962C8B-B14F-4D97-AF65-F5344CB8AC3E}">
-        <p14:creationId xmlns:p14="http://schemas.microsoft.com/office/powerpoint/2010/main" val="2732348097"/>
+        <p14:creationId xmlns:p14="http://schemas.microsoft.com/office/powerpoint/2010/main" val="2939723199"/>
       </p:ext>
     </p:extLst>
   </p:cSld>
@@ -4068,6 +4138,122 @@
 </file>
 
 <file path=ppt/slides/slide11.xml><?xml version="1.0" encoding="utf-8"?>
+<p:sld xmlns:a="http://schemas.openxmlformats.org/drawingml/2006/main" xmlns:r="http://schemas.openxmlformats.org/officeDocument/2006/relationships" xmlns:p="http://schemas.openxmlformats.org/presentationml/2006/main">
+  <p:cSld>
+    <p:spTree>
+      <p:nvGrpSpPr>
+        <p:cNvPr id="1" name=""/>
+        <p:cNvGrpSpPr/>
+        <p:nvPr/>
+      </p:nvGrpSpPr>
+      <p:grpSpPr>
+        <a:xfrm>
+          <a:off x="0" y="0"/>
+          <a:ext cx="0" cy="0"/>
+          <a:chOff x="0" y="0"/>
+          <a:chExt cx="0" cy="0"/>
+        </a:xfrm>
+      </p:grpSpPr>
+      <p:sp>
+        <p:nvSpPr>
+          <p:cNvPr id="2" name="Titel 1">
+            <a:extLst>
+              <a:ext uri="{FF2B5EF4-FFF2-40B4-BE49-F238E27FC236}">
+                <a16:creationId xmlns:a16="http://schemas.microsoft.com/office/drawing/2014/main" id="{388F7BA3-B785-BDE2-BAC6-74C1F53E9285}"/>
+              </a:ext>
+            </a:extLst>
+          </p:cNvPr>
+          <p:cNvSpPr>
+            <a:spLocks noGrp="1"/>
+          </p:cNvSpPr>
+          <p:nvPr>
+            <p:ph type="title"/>
+          </p:nvPr>
+        </p:nvSpPr>
+        <p:spPr/>
+        <p:txBody>
+          <a:bodyPr/>
+          <a:lstStyle/>
+          <a:p>
+            <a:r>
+              <a:rPr lang="de-DE" dirty="0" err="1"/>
+              <a:t>How</a:t>
+            </a:r>
+            <a:r>
+              <a:rPr lang="de-DE" dirty="0"/>
+              <a:t> </a:t>
+            </a:r>
+            <a:r>
+              <a:rPr lang="de-DE" dirty="0" err="1"/>
+              <a:t>it</a:t>
+            </a:r>
+            <a:r>
+              <a:rPr lang="de-DE" dirty="0"/>
+              <a:t> </a:t>
+            </a:r>
+            <a:r>
+              <a:rPr lang="de-DE" dirty="0" err="1"/>
+              <a:t>works</a:t>
+            </a:r>
+            <a:r>
+              <a:rPr lang="de-DE" dirty="0"/>
+              <a:t>: Support </a:t>
+            </a:r>
+            <a:r>
+              <a:rPr lang="de-DE" dirty="0" err="1"/>
+              <a:t>vector</a:t>
+            </a:r>
+            <a:r>
+              <a:rPr lang="de-DE" dirty="0"/>
+              <a:t> </a:t>
+            </a:r>
+            <a:r>
+              <a:rPr lang="de-DE" dirty="0" err="1"/>
+              <a:t>machine</a:t>
+            </a:r>
+            <a:endParaRPr lang="de-DE" dirty="0"/>
+          </a:p>
+        </p:txBody>
+      </p:sp>
+      <p:sp>
+        <p:nvSpPr>
+          <p:cNvPr id="3" name="Inhaltsplatzhalter 2">
+            <a:extLst>
+              <a:ext uri="{FF2B5EF4-FFF2-40B4-BE49-F238E27FC236}">
+                <a16:creationId xmlns:a16="http://schemas.microsoft.com/office/drawing/2014/main" id="{B6EBCD5F-A998-E34B-B609-7A4D246D72F7}"/>
+              </a:ext>
+            </a:extLst>
+          </p:cNvPr>
+          <p:cNvSpPr>
+            <a:spLocks noGrp="1"/>
+          </p:cNvSpPr>
+          <p:nvPr>
+            <p:ph idx="1"/>
+          </p:nvPr>
+        </p:nvSpPr>
+        <p:spPr/>
+        <p:txBody>
+          <a:bodyPr/>
+          <a:lstStyle/>
+          <a:p>
+            <a:endParaRPr lang="de-DE" sz="2000" dirty="0"/>
+          </a:p>
+        </p:txBody>
+      </p:sp>
+    </p:spTree>
+    <p:extLst>
+      <p:ext uri="{BB962C8B-B14F-4D97-AF65-F5344CB8AC3E}">
+        <p14:creationId xmlns:p14="http://schemas.microsoft.com/office/powerpoint/2010/main" val="3746182716"/>
+      </p:ext>
+    </p:extLst>
+  </p:cSld>
+  <p:clrMapOvr>
+    <a:masterClrMapping/>
+  </p:clrMapOvr>
+</p:sld>
+</file>
+
+<file path=ppt/slides/slide12.xml><?xml version="1.0" encoding="utf-8"?>
 <p:sld xmlns:a="http://schemas.openxmlformats.org/drawingml/2006/main" xmlns:r="http://schemas.openxmlformats.org/officeDocument/2006/relationships" xmlns:p="http://schemas.openxmlformats.org/presentationml/2006/main">
   <p:cSld>
     <p:spTree>
@@ -4139,6 +4325,276 @@
           <a:lstStyle/>
           <a:p>
             <a:r>
+              <a:rPr lang="de-DE" sz="2000" dirty="0"/>
+              <a:t>„General </a:t>
+            </a:r>
+            <a:r>
+              <a:rPr lang="de-DE" sz="2000" dirty="0" err="1"/>
+              <a:t>population</a:t>
+            </a:r>
+            <a:r>
+              <a:rPr lang="de-DE" sz="2000" dirty="0"/>
+              <a:t> </a:t>
+            </a:r>
+            <a:r>
+              <a:rPr lang="de-DE" sz="2000" dirty="0" err="1"/>
+              <a:t>survey</a:t>
+            </a:r>
+            <a:r>
+              <a:rPr lang="de-DE" sz="2000" dirty="0"/>
+              <a:t> </a:t>
+            </a:r>
+            <a:r>
+              <a:rPr lang="de-DE" sz="2000" dirty="0" err="1"/>
+              <a:t>of</a:t>
+            </a:r>
+            <a:r>
+              <a:rPr lang="de-DE" sz="2000" dirty="0"/>
+              <a:t> </a:t>
+            </a:r>
+            <a:r>
+              <a:rPr lang="de-DE" sz="2000" dirty="0" err="1"/>
+              <a:t>the</a:t>
+            </a:r>
+            <a:r>
+              <a:rPr lang="de-DE" sz="2000" dirty="0"/>
+              <a:t> social </a:t>
+            </a:r>
+            <a:r>
+              <a:rPr lang="de-DE" sz="2000" dirty="0" err="1"/>
+              <a:t>sciences</a:t>
+            </a:r>
+            <a:r>
+              <a:rPr lang="de-DE" sz="2000" dirty="0"/>
+              <a:t>“ 	  </a:t>
+            </a:r>
+            <a:r>
+              <a:rPr lang="de-DE" sz="1000" dirty="0"/>
+              <a:t>(Allgemeine Bevölkerungsumfrage der Sozialwissenschaften)</a:t>
+            </a:r>
+          </a:p>
+          <a:p>
+            <a:r>
+              <a:rPr lang="de-DE" sz="2000" b="1" dirty="0"/>
+              <a:t>Response Variable</a:t>
+            </a:r>
+            <a:r>
+              <a:rPr lang="de-DE" sz="2000" dirty="0"/>
+              <a:t>:</a:t>
+            </a:r>
+          </a:p>
+          <a:p>
+            <a:pPr lvl="1"/>
+            <a:r>
+              <a:rPr lang="de-DE" sz="1800" dirty="0"/>
+              <a:t>„Federal </a:t>
+            </a:r>
+            <a:r>
+              <a:rPr lang="de-DE" sz="1800" dirty="0" err="1"/>
+              <a:t>state</a:t>
+            </a:r>
+            <a:r>
+              <a:rPr lang="de-DE" sz="1800" dirty="0"/>
+              <a:t> </a:t>
+            </a:r>
+            <a:r>
+              <a:rPr lang="de-DE" sz="1800" dirty="0" err="1"/>
+              <a:t>where</a:t>
+            </a:r>
+            <a:r>
+              <a:rPr lang="de-DE" sz="1800" dirty="0"/>
+              <a:t> </a:t>
+            </a:r>
+            <a:r>
+              <a:rPr lang="de-DE" sz="1800" dirty="0" err="1"/>
+              <a:t>interviewee</a:t>
+            </a:r>
+            <a:r>
+              <a:rPr lang="de-DE" sz="1800" dirty="0"/>
+              <a:t> </a:t>
+            </a:r>
+            <a:r>
+              <a:rPr lang="de-DE" sz="1800" dirty="0" err="1"/>
+              <a:t>lived</a:t>
+            </a:r>
+            <a:r>
+              <a:rPr lang="de-DE" sz="1800" dirty="0"/>
+              <a:t> in </a:t>
+            </a:r>
+            <a:r>
+              <a:rPr lang="de-DE" sz="1800" dirty="0" err="1"/>
+              <a:t>youth</a:t>
+            </a:r>
+            <a:r>
+              <a:rPr lang="de-DE" sz="1800" dirty="0"/>
+              <a:t>“</a:t>
+            </a:r>
+          </a:p>
+          <a:p>
+            <a:pPr lvl="1"/>
+            <a:r>
+              <a:rPr lang="de-DE" sz="1800" dirty="0" err="1">
+                <a:sym typeface="Wingdings" panose="05000000000000000000" pitchFamily="2" charset="2"/>
+              </a:rPr>
+              <a:t>coded</a:t>
+            </a:r>
+            <a:r>
+              <a:rPr lang="de-DE" sz="1800" dirty="0">
+                <a:sym typeface="Wingdings" panose="05000000000000000000" pitchFamily="2" charset="2"/>
+              </a:rPr>
+              <a:t> </a:t>
+            </a:r>
+            <a:r>
+              <a:rPr lang="de-DE" sz="1800" dirty="0" err="1">
+                <a:sym typeface="Wingdings" panose="05000000000000000000" pitchFamily="2" charset="2"/>
+              </a:rPr>
+              <a:t>to</a:t>
+            </a:r>
+            <a:r>
+              <a:rPr lang="de-DE" sz="1800" dirty="0">
+                <a:sym typeface="Wingdings" panose="05000000000000000000" pitchFamily="2" charset="2"/>
+              </a:rPr>
+              <a:t> „Youth in East/West Germany“</a:t>
+            </a:r>
+            <a:endParaRPr lang="de-DE" sz="1800" dirty="0"/>
+          </a:p>
+          <a:p>
+            <a:r>
+              <a:rPr lang="de-DE" sz="2000" b="1" dirty="0" err="1"/>
+              <a:t>Predictor</a:t>
+            </a:r>
+            <a:r>
+              <a:rPr lang="de-DE" sz="2000" b="1" dirty="0"/>
+              <a:t> Variables</a:t>
+            </a:r>
+            <a:r>
+              <a:rPr lang="de-DE" sz="2000" dirty="0"/>
+              <a:t>:</a:t>
+            </a:r>
+          </a:p>
+          <a:p>
+            <a:pPr lvl="1"/>
+            <a:r>
+              <a:rPr lang="de-DE" sz="1800" dirty="0"/>
+              <a:t>121 variables </a:t>
+            </a:r>
+            <a:r>
+              <a:rPr lang="de-DE" sz="1800" dirty="0" err="1"/>
+              <a:t>concerning</a:t>
+            </a:r>
+            <a:r>
+              <a:rPr lang="de-DE" sz="1800" dirty="0"/>
+              <a:t> </a:t>
+            </a:r>
+            <a:r>
+              <a:rPr lang="de-DE" sz="1800" dirty="0" err="1"/>
+              <a:t>attitudes</a:t>
+            </a:r>
+            <a:r>
+              <a:rPr lang="de-DE" sz="1800" dirty="0"/>
+              <a:t>, </a:t>
+            </a:r>
+            <a:r>
+              <a:rPr lang="de-DE" sz="1800" dirty="0" err="1"/>
+              <a:t>behavior</a:t>
+            </a:r>
+            <a:r>
+              <a:rPr lang="de-DE" sz="1800" dirty="0"/>
+              <a:t> and social </a:t>
+            </a:r>
+            <a:r>
+              <a:rPr lang="de-DE" sz="1800" dirty="0" err="1"/>
+              <a:t>change</a:t>
+            </a:r>
+            <a:endParaRPr lang="de-DE" sz="1800" dirty="0"/>
+          </a:p>
+        </p:txBody>
+      </p:sp>
+    </p:spTree>
+    <p:extLst>
+      <p:ext uri="{BB962C8B-B14F-4D97-AF65-F5344CB8AC3E}">
+        <p14:creationId xmlns:p14="http://schemas.microsoft.com/office/powerpoint/2010/main" val="2732348097"/>
+      </p:ext>
+    </p:extLst>
+  </p:cSld>
+  <p:clrMapOvr>
+    <a:masterClrMapping/>
+  </p:clrMapOvr>
+</p:sld>
+</file>
+
+<file path=ppt/slides/slide13.xml><?xml version="1.0" encoding="utf-8"?>
+<p:sld xmlns:a="http://schemas.openxmlformats.org/drawingml/2006/main" xmlns:r="http://schemas.openxmlformats.org/officeDocument/2006/relationships" xmlns:p="http://schemas.openxmlformats.org/presentationml/2006/main">
+  <p:cSld>
+    <p:spTree>
+      <p:nvGrpSpPr>
+        <p:cNvPr id="1" name=""/>
+        <p:cNvGrpSpPr/>
+        <p:nvPr/>
+      </p:nvGrpSpPr>
+      <p:grpSpPr>
+        <a:xfrm>
+          <a:off x="0" y="0"/>
+          <a:ext cx="0" cy="0"/>
+          <a:chOff x="0" y="0"/>
+          <a:chExt cx="0" cy="0"/>
+        </a:xfrm>
+      </p:grpSpPr>
+      <p:sp>
+        <p:nvSpPr>
+          <p:cNvPr id="2" name="Titel 1">
+            <a:extLst>
+              <a:ext uri="{FF2B5EF4-FFF2-40B4-BE49-F238E27FC236}">
+                <a16:creationId xmlns:a16="http://schemas.microsoft.com/office/drawing/2014/main" id="{9C274E31-D4F7-6C4A-D81C-1BC18A1044AE}"/>
+              </a:ext>
+            </a:extLst>
+          </p:cNvPr>
+          <p:cNvSpPr>
+            <a:spLocks noGrp="1"/>
+          </p:cNvSpPr>
+          <p:nvPr>
+            <p:ph type="title"/>
+          </p:nvPr>
+        </p:nvSpPr>
+        <p:spPr/>
+        <p:txBody>
+          <a:bodyPr/>
+          <a:lstStyle/>
+          <a:p>
+            <a:r>
+              <a:rPr lang="de-DE" dirty="0"/>
+              <a:t>Dataset: ALLBUS</a:t>
+            </a:r>
+          </a:p>
+        </p:txBody>
+      </p:sp>
+      <p:sp>
+        <p:nvSpPr>
+          <p:cNvPr id="3" name="Inhaltsplatzhalter 2">
+            <a:extLst>
+              <a:ext uri="{FF2B5EF4-FFF2-40B4-BE49-F238E27FC236}">
+                <a16:creationId xmlns:a16="http://schemas.microsoft.com/office/drawing/2014/main" id="{A6EE175B-F110-2231-4746-FB0A5137CFF3}"/>
+              </a:ext>
+            </a:extLst>
+          </p:cNvPr>
+          <p:cNvSpPr>
+            <a:spLocks noGrp="1"/>
+          </p:cNvSpPr>
+          <p:nvPr>
+            <p:ph idx="1"/>
+          </p:nvPr>
+        </p:nvSpPr>
+        <p:spPr>
+          <a:xfrm>
+            <a:off x="395536" y="1353344"/>
+            <a:ext cx="7344816" cy="3162622"/>
+          </a:xfrm>
+        </p:spPr>
+        <p:txBody>
+          <a:bodyPr/>
+          <a:lstStyle/>
+          <a:p>
+            <a:r>
               <a:rPr lang="de-DE" sz="2000" b="1" dirty="0"/>
               <a:t>Data </a:t>
             </a:r>
@@ -4277,7 +4733,7 @@
 </p:sld>
 </file>
 
-<file path=ppt/slides/slide12.xml><?xml version="1.0" encoding="utf-8"?>
+<file path=ppt/slides/slide14.xml><?xml version="1.0" encoding="utf-8"?>
 <p:sld xmlns:a="http://schemas.openxmlformats.org/drawingml/2006/main" xmlns:r="http://schemas.openxmlformats.org/officeDocument/2006/relationships" xmlns:p="http://schemas.openxmlformats.org/presentationml/2006/main">
   <p:cSld>
     <p:spTree>
@@ -4407,7 +4863,7 @@
 </p:sld>
 </file>
 
-<file path=ppt/slides/slide13.xml><?xml version="1.0" encoding="utf-8"?>
+<file path=ppt/slides/slide15.xml><?xml version="1.0" encoding="utf-8"?>
 <p:sld xmlns:a="http://schemas.openxmlformats.org/drawingml/2006/main" xmlns:r="http://schemas.openxmlformats.org/officeDocument/2006/relationships" xmlns:p="http://schemas.openxmlformats.org/presentationml/2006/main">
   <p:cSld>
     <p:spTree>
@@ -5900,61 +6356,12 @@
           </a:p>
         </p:txBody>
       </p:sp>
-      <p:sp>
-        <p:nvSpPr>
-          <p:cNvPr id="4" name="Rechteck 3">
+      <p:pic>
+        <p:nvPicPr>
+          <p:cNvPr id="21" name="Grafik 20" descr="\documentclass[20pt]{article}&#10;\usepackage{amsmath,amsfonts,amssymb,xcolor, mathtools}&#10;\pagestyle{empty}&#10;\usepackage[T1]{fontenc}&#10;\usepackage{fontspec}&#10;\setsansfont{Arial}&#10;\renewcommand\familydefault{\sfdefault}&#10;\begin{document}&#10;\begin{itemize}&#10;\item \textcolor{green}{$\beta$}$\rightarrow$ a k-dimensional vector\newline perpendicular to the decision boundary&#10;\item all points $x$ for which holds $\frac{\textcolor{green}{\beta}}{||\textcolor{green}{\beta}||}\cdot x=\textcolor{magenta}{c}$\newline lie on the hyperplain &#10;\item through some rearrangement we get \newline&#10;$\beta \cdot x +\beta_0=0$&#10;&#10;\end{itemize}&#10;&#10;\end{document}" title="IguanaTex Picture Display">
             <a:extLst>
               <a:ext uri="{FF2B5EF4-FFF2-40B4-BE49-F238E27FC236}">
-                <a16:creationId xmlns:a16="http://schemas.microsoft.com/office/drawing/2014/main" id="{B21BA278-5AA0-7413-5DB3-4EB47B444F21}"/>
-              </a:ext>
-            </a:extLst>
-          </p:cNvPr>
-          <p:cNvSpPr/>
-          <p:nvPr/>
-        </p:nvSpPr>
-        <p:spPr>
-          <a:xfrm>
-            <a:off x="5436096" y="1563638"/>
-            <a:ext cx="2952328" cy="2454339"/>
-          </a:xfrm>
-          <a:prstGeom prst="rect">
-            <a:avLst/>
-          </a:prstGeom>
-        </p:spPr>
-        <p:style>
-          <a:lnRef idx="2">
-            <a:schemeClr val="accent1">
-              <a:shade val="15000"/>
-            </a:schemeClr>
-          </a:lnRef>
-          <a:fillRef idx="1">
-            <a:schemeClr val="accent1"/>
-          </a:fillRef>
-          <a:effectRef idx="0">
-            <a:schemeClr val="accent1"/>
-          </a:effectRef>
-          <a:fontRef idx="minor">
-            <a:schemeClr val="lt1"/>
-          </a:fontRef>
-        </p:style>
-        <p:txBody>
-          <a:bodyPr rtlCol="0" anchor="ctr"/>
-          <a:lstStyle/>
-          <a:p>
-            <a:pPr algn="ctr"/>
-            <a:r>
-              <a:rPr lang="de-DE" dirty="0"/>
-              <a:t>Grafik</a:t>
-            </a:r>
-          </a:p>
-        </p:txBody>
-      </p:sp>
-      <p:pic>
-        <p:nvPicPr>
-          <p:cNvPr id="22" name="Grafik 21" descr="\documentclass{article}&#10;\usepackage{amsmath,amsfonts,amssymb,xcolor, mathtools}&#10;\pagestyle{empty}&#10;\begin{document}&#10;\begin{itemize}&#10;\item \textcolor{green}{$\beta$}$\rightarrow$ a k-dimensional vector\newline perpendicular to the decision boundary&#10;\item all points $x$ for which holds $\frac{\textcolor{green}{\beta}}{||\textcolor{green}{\beta}||}\cdot x=\textcolor{magenta}{c}$\newline lie on the hyperplain &#10;\item through some rearangement we get \newline&#10;$\beta \cdot x +\beta_0=0$&#10;&#10;\end{itemize}&#10;&#10;\end{document}" title="IguanaTex Picture Display">
-            <a:extLst>
-              <a:ext uri="{FF2B5EF4-FFF2-40B4-BE49-F238E27FC236}">
-                <a16:creationId xmlns:a16="http://schemas.microsoft.com/office/drawing/2014/main" id="{8A78ECD0-CD60-19AA-FA99-DBC348F893B1}"/>
+                <a16:creationId xmlns:a16="http://schemas.microsoft.com/office/drawing/2014/main" id="{10DE1F70-7341-0DAC-810B-5172FAB61B45}"/>
               </a:ext>
             </a:extLst>
           </p:cNvPr>
@@ -5981,12 +6388,56 @@
         </p:blipFill>
         <p:spPr>
           <a:xfrm>
-            <a:off x="613948" y="1419621"/>
-            <a:ext cx="4109626" cy="1973037"/>
+            <a:off x="720858" y="1707654"/>
+            <a:ext cx="4090686" cy="1995528"/>
           </a:xfrm>
           <a:prstGeom prst="rect">
             <a:avLst/>
           </a:prstGeom>
+        </p:spPr>
+      </p:pic>
+      <p:pic>
+        <p:nvPicPr>
+          <p:cNvPr id="25" name="Grafik 24" descr="Ein Bild, das Reihe, Diagramm, Steigung, parallel enthält.&#10;&#10;Automatisch generierte Beschreibung">
+            <a:extLst>
+              <a:ext uri="{FF2B5EF4-FFF2-40B4-BE49-F238E27FC236}">
+                <a16:creationId xmlns:a16="http://schemas.microsoft.com/office/drawing/2014/main" id="{BD75108F-A408-4336-CAB4-7135AB37F88E}"/>
+              </a:ext>
+            </a:extLst>
+          </p:cNvPr>
+          <p:cNvPicPr>
+            <a:picLocks noChangeAspect="1"/>
+          </p:cNvPicPr>
+          <p:nvPr/>
+        </p:nvPicPr>
+        <p:blipFill>
+          <a:blip r:embed="rId4">
+            <a:extLst>
+              <a:ext uri="{28A0092B-C50C-407E-A947-70E740481C1C}">
+                <a14:useLocalDpi xmlns:a14="http://schemas.microsoft.com/office/drawing/2010/main" val="0"/>
+              </a:ext>
+            </a:extLst>
+          </a:blip>
+          <a:stretch>
+            <a:fillRect/>
+          </a:stretch>
+        </p:blipFill>
+        <p:spPr>
+          <a:xfrm>
+            <a:off x="5364088" y="1227058"/>
+            <a:ext cx="3177023" cy="2956719"/>
+          </a:xfrm>
+          <a:prstGeom prst="rect">
+            <a:avLst/>
+          </a:prstGeom>
+          <a:ln w="3175">
+            <a:solidFill>
+              <a:schemeClr val="tx1">
+                <a:lumMod val="95000"/>
+                <a:lumOff val="5000"/>
+              </a:schemeClr>
+            </a:solidFill>
+          </a:ln>
         </p:spPr>
       </p:pic>
     </p:spTree>
@@ -6003,6 +6454,312 @@
 </file>
 
 <file path=ppt/slides/slide7.xml><?xml version="1.0" encoding="utf-8"?>
+<p:sld xmlns:a="http://schemas.openxmlformats.org/drawingml/2006/main" xmlns:r="http://schemas.openxmlformats.org/officeDocument/2006/relationships" xmlns:p="http://schemas.openxmlformats.org/presentationml/2006/main">
+  <p:cSld>
+    <p:spTree>
+      <p:nvGrpSpPr>
+        <p:cNvPr id="1" name=""/>
+        <p:cNvGrpSpPr/>
+        <p:nvPr/>
+      </p:nvGrpSpPr>
+      <p:grpSpPr>
+        <a:xfrm>
+          <a:off x="0" y="0"/>
+          <a:ext cx="0" cy="0"/>
+          <a:chOff x="0" y="0"/>
+          <a:chExt cx="0" cy="0"/>
+        </a:xfrm>
+      </p:grpSpPr>
+      <p:sp>
+        <p:nvSpPr>
+          <p:cNvPr id="2" name="Titel 1">
+            <a:extLst>
+              <a:ext uri="{FF2B5EF4-FFF2-40B4-BE49-F238E27FC236}">
+                <a16:creationId xmlns:a16="http://schemas.microsoft.com/office/drawing/2014/main" id="{388F7BA3-B785-BDE2-BAC6-74C1F53E9285}"/>
+              </a:ext>
+            </a:extLst>
+          </p:cNvPr>
+          <p:cNvSpPr>
+            <a:spLocks noGrp="1"/>
+          </p:cNvSpPr>
+          <p:nvPr>
+            <p:ph type="title"/>
+          </p:nvPr>
+        </p:nvSpPr>
+        <p:spPr/>
+        <p:txBody>
+          <a:bodyPr/>
+          <a:lstStyle/>
+          <a:p>
+            <a:r>
+              <a:rPr lang="de-DE" dirty="0" err="1"/>
+              <a:t>How</a:t>
+            </a:r>
+            <a:r>
+              <a:rPr lang="de-DE" dirty="0"/>
+              <a:t> </a:t>
+            </a:r>
+            <a:r>
+              <a:rPr lang="de-DE" dirty="0" err="1"/>
+              <a:t>it</a:t>
+            </a:r>
+            <a:r>
+              <a:rPr lang="de-DE" dirty="0"/>
+              <a:t> </a:t>
+            </a:r>
+            <a:r>
+              <a:rPr lang="de-DE" dirty="0" err="1"/>
+              <a:t>works</a:t>
+            </a:r>
+            <a:r>
+              <a:rPr lang="de-DE" dirty="0"/>
+              <a:t>: Setting </a:t>
+            </a:r>
+            <a:r>
+              <a:rPr lang="de-DE" dirty="0" err="1"/>
+              <a:t>up</a:t>
+            </a:r>
+            <a:r>
+              <a:rPr lang="de-DE" dirty="0"/>
+              <a:t> </a:t>
+            </a:r>
+            <a:r>
+              <a:rPr lang="de-DE" dirty="0" err="1"/>
+              <a:t>Constraints</a:t>
+            </a:r>
+            <a:endParaRPr lang="de-DE" dirty="0"/>
+          </a:p>
+        </p:txBody>
+      </p:sp>
+      <p:pic>
+        <p:nvPicPr>
+          <p:cNvPr id="16" name="Grafik 15" descr="\documentclass[20pt]{article}&#10;\usepackage{amsmath,amsfonts,amssymb,xcolor, mathtools}&#10;\pagestyle{empty}&#10;\usepackage[T1]{fontenc}&#10;\usepackage{fontspec}&#10;\setsansfont{Arial}&#10;\renewcommand\familydefault{\sfdefault}&#10;\begin{document}&#10;\begin{itemize}&#10;\item the two gutters around the boundary \newline are defined by $\beta \cdot x+\beta_0=k$ and \newline$ \beta \cdot x+\beta_0=-k$&#10;\item seperate postitive from negative samples&#10;\item distance between the gutters\newline$\rightarrow$ width that is to be maximized&#10;\end{itemize}&#10;&#10;\end{document}" title="IguanaTex Picture Display">
+            <a:extLst>
+              <a:ext uri="{FF2B5EF4-FFF2-40B4-BE49-F238E27FC236}">
+                <a16:creationId xmlns:a16="http://schemas.microsoft.com/office/drawing/2014/main" id="{8BE09948-9C0A-950C-5DF1-E3EEA29ECF17}"/>
+              </a:ext>
+            </a:extLst>
+          </p:cNvPr>
+          <p:cNvPicPr>
+            <a:picLocks noChangeAspect="1"/>
+          </p:cNvPicPr>
+          <p:nvPr>
+            <p:custDataLst>
+              <p:tags r:id="rId1"/>
+            </p:custDataLst>
+          </p:nvPr>
+        </p:nvPicPr>
+        <p:blipFill>
+          <a:blip r:embed="rId3">
+            <a:extLst>
+              <a:ext uri="{28A0092B-C50C-407E-A947-70E740481C1C}">
+                <a14:useLocalDpi xmlns:a14="http://schemas.microsoft.com/office/drawing/2010/main" val="0"/>
+              </a:ext>
+            </a:extLst>
+          </a:blip>
+          <a:stretch>
+            <a:fillRect/>
+          </a:stretch>
+        </p:blipFill>
+        <p:spPr>
+          <a:xfrm>
+            <a:off x="720858" y="1707654"/>
+            <a:ext cx="4305030" cy="1931906"/>
+          </a:xfrm>
+          <a:prstGeom prst="rect">
+            <a:avLst/>
+          </a:prstGeom>
+        </p:spPr>
+      </p:pic>
+    </p:spTree>
+    <p:extLst>
+      <p:ext uri="{BB962C8B-B14F-4D97-AF65-F5344CB8AC3E}">
+        <p14:creationId xmlns:p14="http://schemas.microsoft.com/office/powerpoint/2010/main" val="3990756690"/>
+      </p:ext>
+    </p:extLst>
+  </p:cSld>
+  <p:clrMapOvr>
+    <a:masterClrMapping/>
+  </p:clrMapOvr>
+</p:sld>
+</file>
+
+<file path=ppt/slides/slide8.xml><?xml version="1.0" encoding="utf-8"?>
+<p:sld xmlns:a="http://schemas.openxmlformats.org/drawingml/2006/main" xmlns:r="http://schemas.openxmlformats.org/officeDocument/2006/relationships" xmlns:p="http://schemas.openxmlformats.org/presentationml/2006/main">
+  <p:cSld>
+    <p:spTree>
+      <p:nvGrpSpPr>
+        <p:cNvPr id="1" name=""/>
+        <p:cNvGrpSpPr/>
+        <p:nvPr/>
+      </p:nvGrpSpPr>
+      <p:grpSpPr>
+        <a:xfrm>
+          <a:off x="0" y="0"/>
+          <a:ext cx="0" cy="0"/>
+          <a:chOff x="0" y="0"/>
+          <a:chExt cx="0" cy="0"/>
+        </a:xfrm>
+      </p:grpSpPr>
+      <p:sp>
+        <p:nvSpPr>
+          <p:cNvPr id="2" name="Titel 1">
+            <a:extLst>
+              <a:ext uri="{FF2B5EF4-FFF2-40B4-BE49-F238E27FC236}">
+                <a16:creationId xmlns:a16="http://schemas.microsoft.com/office/drawing/2014/main" id="{388F7BA3-B785-BDE2-BAC6-74C1F53E9285}"/>
+              </a:ext>
+            </a:extLst>
+          </p:cNvPr>
+          <p:cNvSpPr>
+            <a:spLocks noGrp="1"/>
+          </p:cNvSpPr>
+          <p:nvPr>
+            <p:ph type="title"/>
+          </p:nvPr>
+        </p:nvSpPr>
+        <p:spPr/>
+        <p:txBody>
+          <a:bodyPr/>
+          <a:lstStyle/>
+          <a:p>
+            <a:r>
+              <a:rPr lang="de-DE" dirty="0" err="1"/>
+              <a:t>How</a:t>
+            </a:r>
+            <a:r>
+              <a:rPr lang="de-DE" dirty="0"/>
+              <a:t> </a:t>
+            </a:r>
+            <a:r>
+              <a:rPr lang="de-DE" dirty="0" err="1"/>
+              <a:t>it</a:t>
+            </a:r>
+            <a:r>
+              <a:rPr lang="de-DE" dirty="0"/>
+              <a:t> </a:t>
+            </a:r>
+            <a:r>
+              <a:rPr lang="de-DE" dirty="0" err="1"/>
+              <a:t>works</a:t>
+            </a:r>
+            <a:r>
+              <a:rPr lang="de-DE" dirty="0"/>
+              <a:t>: Setting </a:t>
+            </a:r>
+            <a:r>
+              <a:rPr lang="de-DE" dirty="0" err="1"/>
+              <a:t>up</a:t>
+            </a:r>
+            <a:r>
+              <a:rPr lang="de-DE" dirty="0"/>
+              <a:t> </a:t>
+            </a:r>
+            <a:r>
+              <a:rPr lang="de-DE" dirty="0" err="1"/>
+              <a:t>Constraints</a:t>
+            </a:r>
+            <a:endParaRPr lang="de-DE" dirty="0"/>
+          </a:p>
+        </p:txBody>
+      </p:sp>
+      <p:pic>
+        <p:nvPicPr>
+          <p:cNvPr id="8" name="Grafik 7" descr="\documentclass[20pt]{article}&#10;\usepackage{amsmath,amsfonts,amssymb,xcolor, mathtools}&#10;\pagestyle{empty}&#10;\usepackage[T1]{fontenc}&#10;\usepackage{fontspec}&#10;\setsansfont{Arial}&#10;\renewcommand\familydefault{\sfdefault}&#10;\begin{document}&#10;\begin{itemize}&#10;\item to measure the \textcolor{magenta}{width} of the margin  \newline&#10;$(x^+ -x^-)$ is Projected on the unit \newline&#10;vector of $\beta$ &#10;\item $M=(x^+ -x^-)\cdot \frac{\beta}{||\beta||}$&#10;&#10;\end{itemize}&#10;&#10;\end{document}" title="IguanaTex Picture Display">
+            <a:extLst>
+              <a:ext uri="{FF2B5EF4-FFF2-40B4-BE49-F238E27FC236}">
+                <a16:creationId xmlns:a16="http://schemas.microsoft.com/office/drawing/2014/main" id="{49020F9B-9C95-8638-AF48-3DD5DF3A6140}"/>
+              </a:ext>
+            </a:extLst>
+          </p:cNvPr>
+          <p:cNvPicPr>
+            <a:picLocks noChangeAspect="1"/>
+          </p:cNvPicPr>
+          <p:nvPr>
+            <p:custDataLst>
+              <p:tags r:id="rId1"/>
+            </p:custDataLst>
+          </p:nvPr>
+        </p:nvPicPr>
+        <p:blipFill>
+          <a:blip r:embed="rId3">
+            <a:extLst>
+              <a:ext uri="{28A0092B-C50C-407E-A947-70E740481C1C}">
+                <a14:useLocalDpi xmlns:a14="http://schemas.microsoft.com/office/drawing/2010/main" val="0"/>
+              </a:ext>
+            </a:extLst>
+          </a:blip>
+          <a:stretch>
+            <a:fillRect/>
+          </a:stretch>
+        </p:blipFill>
+        <p:spPr>
+          <a:xfrm>
+            <a:off x="720858" y="1707657"/>
+            <a:ext cx="3667010" cy="1315609"/>
+          </a:xfrm>
+          <a:prstGeom prst="rect">
+            <a:avLst/>
+          </a:prstGeom>
+        </p:spPr>
+      </p:pic>
+      <p:pic>
+        <p:nvPicPr>
+          <p:cNvPr id="10" name="Grafik 9" descr="Ein Bild, das Reihe, Diagramm, Steigung, parallel enthält.&#10;&#10;Automatisch generierte Beschreibung">
+            <a:extLst>
+              <a:ext uri="{FF2B5EF4-FFF2-40B4-BE49-F238E27FC236}">
+                <a16:creationId xmlns:a16="http://schemas.microsoft.com/office/drawing/2014/main" id="{61AB07FF-8D31-3186-850F-DC65A7D0D908}"/>
+              </a:ext>
+            </a:extLst>
+          </p:cNvPr>
+          <p:cNvPicPr>
+            <a:picLocks noChangeAspect="1"/>
+          </p:cNvPicPr>
+          <p:nvPr/>
+        </p:nvPicPr>
+        <p:blipFill>
+          <a:blip r:embed="rId4">
+            <a:extLst>
+              <a:ext uri="{28A0092B-C50C-407E-A947-70E740481C1C}">
+                <a14:useLocalDpi xmlns:a14="http://schemas.microsoft.com/office/drawing/2010/main" val="0"/>
+              </a:ext>
+            </a:extLst>
+          </a:blip>
+          <a:stretch>
+            <a:fillRect/>
+          </a:stretch>
+        </p:blipFill>
+        <p:spPr>
+          <a:xfrm>
+            <a:off x="5220072" y="1259034"/>
+            <a:ext cx="2821051" cy="2625431"/>
+          </a:xfrm>
+          <a:prstGeom prst="rect">
+            <a:avLst/>
+          </a:prstGeom>
+          <a:ln w="3175">
+            <a:solidFill>
+              <a:schemeClr val="tx1">
+                <a:lumMod val="95000"/>
+                <a:lumOff val="5000"/>
+              </a:schemeClr>
+            </a:solidFill>
+          </a:ln>
+        </p:spPr>
+      </p:pic>
+    </p:spTree>
+    <p:extLst>
+      <p:ext uri="{BB962C8B-B14F-4D97-AF65-F5344CB8AC3E}">
+        <p14:creationId xmlns:p14="http://schemas.microsoft.com/office/powerpoint/2010/main" val="2902806685"/>
+      </p:ext>
+    </p:extLst>
+  </p:cSld>
+  <p:clrMapOvr>
+    <a:masterClrMapping/>
+  </p:clrMapOvr>
+</p:sld>
+</file>
+
+<file path=ppt/slides/slide9.xml><?xml version="1.0" encoding="utf-8"?>
 <p:sld xmlns:a="http://schemas.openxmlformats.org/drawingml/2006/main" xmlns:r="http://schemas.openxmlformats.org/officeDocument/2006/relationships" xmlns:p="http://schemas.openxmlformats.org/presentationml/2006/main">
   <p:cSld>
     <p:spTree>
@@ -6771,250 +7528,58 @@
 </p:sld>
 </file>
 
-<file path=ppt/slides/slide8.xml><?xml version="1.0" encoding="utf-8"?>
-<p:sld xmlns:a="http://schemas.openxmlformats.org/drawingml/2006/main" xmlns:r="http://schemas.openxmlformats.org/officeDocument/2006/relationships" xmlns:p="http://schemas.openxmlformats.org/presentationml/2006/main">
-  <p:cSld>
-    <p:spTree>
-      <p:nvGrpSpPr>
-        <p:cNvPr id="1" name=""/>
-        <p:cNvGrpSpPr/>
-        <p:nvPr/>
-      </p:nvGrpSpPr>
-      <p:grpSpPr>
-        <a:xfrm>
-          <a:off x="0" y="0"/>
-          <a:ext cx="0" cy="0"/>
-          <a:chOff x="0" y="0"/>
-          <a:chExt cx="0" cy="0"/>
-        </a:xfrm>
-      </p:grpSpPr>
-      <p:sp>
-        <p:nvSpPr>
-          <p:cNvPr id="2" name="Titel 1">
-            <a:extLst>
-              <a:ext uri="{FF2B5EF4-FFF2-40B4-BE49-F238E27FC236}">
-                <a16:creationId xmlns:a16="http://schemas.microsoft.com/office/drawing/2014/main" id="{388F7BA3-B785-BDE2-BAC6-74C1F53E9285}"/>
-              </a:ext>
-            </a:extLst>
-          </p:cNvPr>
-          <p:cNvSpPr>
-            <a:spLocks noGrp="1"/>
-          </p:cNvSpPr>
-          <p:nvPr>
-            <p:ph type="title"/>
-          </p:nvPr>
-        </p:nvSpPr>
-        <p:spPr/>
-        <p:txBody>
-          <a:bodyPr/>
-          <a:lstStyle/>
-          <a:p>
-            <a:r>
-              <a:rPr lang="de-DE" dirty="0" err="1"/>
-              <a:t>How</a:t>
-            </a:r>
-            <a:r>
-              <a:rPr lang="de-DE" dirty="0"/>
-              <a:t> </a:t>
-            </a:r>
-            <a:r>
-              <a:rPr lang="de-DE" dirty="0" err="1"/>
-              <a:t>it</a:t>
-            </a:r>
-            <a:r>
-              <a:rPr lang="de-DE" dirty="0"/>
-              <a:t> </a:t>
-            </a:r>
-            <a:r>
-              <a:rPr lang="de-DE" dirty="0" err="1"/>
-              <a:t>works</a:t>
-            </a:r>
-            <a:r>
-              <a:rPr lang="de-DE" dirty="0"/>
-              <a:t>: Support </a:t>
-            </a:r>
-            <a:r>
-              <a:rPr lang="de-DE" dirty="0" err="1"/>
-              <a:t>vector</a:t>
-            </a:r>
-            <a:r>
-              <a:rPr lang="de-DE" dirty="0"/>
-              <a:t> </a:t>
-            </a:r>
-            <a:r>
-              <a:rPr lang="de-DE" dirty="0" err="1"/>
-              <a:t>classifier</a:t>
-            </a:r>
-            <a:endParaRPr lang="de-DE" dirty="0"/>
-          </a:p>
-        </p:txBody>
-      </p:sp>
-      <p:sp>
-        <p:nvSpPr>
-          <p:cNvPr id="3" name="Inhaltsplatzhalter 2">
-            <a:extLst>
-              <a:ext uri="{FF2B5EF4-FFF2-40B4-BE49-F238E27FC236}">
-                <a16:creationId xmlns:a16="http://schemas.microsoft.com/office/drawing/2014/main" id="{B6EBCD5F-A998-E34B-B609-7A4D246D72F7}"/>
-              </a:ext>
-            </a:extLst>
-          </p:cNvPr>
-          <p:cNvSpPr>
-            <a:spLocks noGrp="1"/>
-          </p:cNvSpPr>
-          <p:nvPr>
-            <p:ph idx="1"/>
-          </p:nvPr>
-        </p:nvSpPr>
-        <p:spPr/>
-        <p:txBody>
-          <a:bodyPr/>
-          <a:lstStyle/>
-          <a:p>
-            <a:endParaRPr lang="de-DE" sz="2000" dirty="0"/>
-          </a:p>
-        </p:txBody>
-      </p:sp>
-    </p:spTree>
-    <p:extLst>
-      <p:ext uri="{BB962C8B-B14F-4D97-AF65-F5344CB8AC3E}">
-        <p14:creationId xmlns:p14="http://schemas.microsoft.com/office/powerpoint/2010/main" val="2939723199"/>
-      </p:ext>
-    </p:extLst>
-  </p:cSld>
-  <p:clrMapOvr>
-    <a:masterClrMapping/>
-  </p:clrMapOvr>
-</p:sld>
-</file>
-
-<file path=ppt/slides/slide9.xml><?xml version="1.0" encoding="utf-8"?>
-<p:sld xmlns:a="http://schemas.openxmlformats.org/drawingml/2006/main" xmlns:r="http://schemas.openxmlformats.org/officeDocument/2006/relationships" xmlns:p="http://schemas.openxmlformats.org/presentationml/2006/main">
-  <p:cSld>
-    <p:spTree>
-      <p:nvGrpSpPr>
-        <p:cNvPr id="1" name=""/>
-        <p:cNvGrpSpPr/>
-        <p:nvPr/>
-      </p:nvGrpSpPr>
-      <p:grpSpPr>
-        <a:xfrm>
-          <a:off x="0" y="0"/>
-          <a:ext cx="0" cy="0"/>
-          <a:chOff x="0" y="0"/>
-          <a:chExt cx="0" cy="0"/>
-        </a:xfrm>
-      </p:grpSpPr>
-      <p:sp>
-        <p:nvSpPr>
-          <p:cNvPr id="2" name="Titel 1">
-            <a:extLst>
-              <a:ext uri="{FF2B5EF4-FFF2-40B4-BE49-F238E27FC236}">
-                <a16:creationId xmlns:a16="http://schemas.microsoft.com/office/drawing/2014/main" id="{388F7BA3-B785-BDE2-BAC6-74C1F53E9285}"/>
-              </a:ext>
-            </a:extLst>
-          </p:cNvPr>
-          <p:cNvSpPr>
-            <a:spLocks noGrp="1"/>
-          </p:cNvSpPr>
-          <p:nvPr>
-            <p:ph type="title"/>
-          </p:nvPr>
-        </p:nvSpPr>
-        <p:spPr/>
-        <p:txBody>
-          <a:bodyPr/>
-          <a:lstStyle/>
-          <a:p>
-            <a:r>
-              <a:rPr lang="de-DE" dirty="0" err="1"/>
-              <a:t>How</a:t>
-            </a:r>
-            <a:r>
-              <a:rPr lang="de-DE" dirty="0"/>
-              <a:t> </a:t>
-            </a:r>
-            <a:r>
-              <a:rPr lang="de-DE" dirty="0" err="1"/>
-              <a:t>it</a:t>
-            </a:r>
-            <a:r>
-              <a:rPr lang="de-DE" dirty="0"/>
-              <a:t> </a:t>
-            </a:r>
-            <a:r>
-              <a:rPr lang="de-DE" dirty="0" err="1"/>
-              <a:t>works</a:t>
-            </a:r>
-            <a:r>
-              <a:rPr lang="de-DE" dirty="0"/>
-              <a:t>: Support </a:t>
-            </a:r>
-            <a:r>
-              <a:rPr lang="de-DE" dirty="0" err="1"/>
-              <a:t>vector</a:t>
-            </a:r>
-            <a:r>
-              <a:rPr lang="de-DE" dirty="0"/>
-              <a:t> </a:t>
-            </a:r>
-            <a:r>
-              <a:rPr lang="de-DE" dirty="0" err="1"/>
-              <a:t>machine</a:t>
-            </a:r>
-            <a:endParaRPr lang="de-DE" dirty="0"/>
-          </a:p>
-        </p:txBody>
-      </p:sp>
-      <p:sp>
-        <p:nvSpPr>
-          <p:cNvPr id="3" name="Inhaltsplatzhalter 2">
-            <a:extLst>
-              <a:ext uri="{FF2B5EF4-FFF2-40B4-BE49-F238E27FC236}">
-                <a16:creationId xmlns:a16="http://schemas.microsoft.com/office/drawing/2014/main" id="{B6EBCD5F-A998-E34B-B609-7A4D246D72F7}"/>
-              </a:ext>
-            </a:extLst>
-          </p:cNvPr>
-          <p:cNvSpPr>
-            <a:spLocks noGrp="1"/>
-          </p:cNvSpPr>
-          <p:nvPr>
-            <p:ph idx="1"/>
-          </p:nvPr>
-        </p:nvSpPr>
-        <p:spPr/>
-        <p:txBody>
-          <a:bodyPr/>
-          <a:lstStyle/>
-          <a:p>
-            <a:endParaRPr lang="de-DE" sz="2000" dirty="0"/>
-          </a:p>
-        </p:txBody>
-      </p:sp>
-    </p:spTree>
-    <p:extLst>
-      <p:ext uri="{BB962C8B-B14F-4D97-AF65-F5344CB8AC3E}">
-        <p14:creationId xmlns:p14="http://schemas.microsoft.com/office/powerpoint/2010/main" val="3746182716"/>
-      </p:ext>
-    </p:extLst>
-  </p:cSld>
-  <p:clrMapOvr>
-    <a:masterClrMapping/>
-  </p:clrMapOvr>
-</p:sld>
-</file>
-
 <file path=ppt/tags/tag1.xml><?xml version="1.0" encoding="utf-8"?>
 <p:tagLst xmlns:a="http://schemas.openxmlformats.org/drawingml/2006/main" xmlns:r="http://schemas.openxmlformats.org/officeDocument/2006/relationships" xmlns:p="http://schemas.openxmlformats.org/presentationml/2006/main">
   <p:tag name="OUTPUTDPI" val="1200"/>
-  <p:tag name="ORIGINALHEIGHT" val="1072,366"/>
-  <p:tag name="ORIGINALWIDTH" val="2260,967"/>
+  <p:tag name="ORIGINALHEIGHT" val="1079,401"/>
+  <p:tag name="ORIGINALWIDTH" val="2247,314"/>
   <p:tag name="OUTPUTTYPE" val="PNG"/>
   <p:tag name="IGUANATEXVERSION" val="161"/>
-  <p:tag name="LATEXADDIN" val="\documentclass{article}&#10;\usepackage{amsmath,amsfonts,amssymb,xcolor, mathtools}&#10;\pagestyle{empty}&#10;\begin{document}&#10;\begin{itemize}&#10;\item \textcolor{green}{$\beta$}$\rightarrow$ a k-dimensional vector\newline perpendicular to the decision boundary&#10;\item all points $x$ for which holds $\frac{\textcolor{green}{\beta}}{||\textcolor{green}{\beta}||}\cdot x=\textcolor{magenta}{c}$\newline lie on the hyperplain &#10;\item through some rearangement we get \newline&#10;$\beta \cdot x +\beta_0=0$&#10;&#10;\end{itemize}&#10;&#10;\end{document}"/>
+  <p:tag name="LATEXADDIN" val="\documentclass[20pt]{article}&#10;\usepackage{amsmath,amsfonts,amssymb,xcolor, mathtools}&#10;\pagestyle{empty}&#10;\usepackage[T1]{fontenc}&#10;\usepackage{fontspec}&#10;\setsansfont{Arial}&#10;\renewcommand\familydefault{\sfdefault}&#10;\begin{document}&#10;\begin{itemize}&#10;\item \textcolor{green}{$\beta$}$\rightarrow$ a k-dimensional vector\newline perpendicular to the decision boundary&#10;\item all points $x$ for which holds $\frac{\textcolor{green}{\beta}}{||\textcolor{green}{\beta}||}\cdot x=\textcolor{magenta}{c}$\newline lie on the hyperplain &#10;\item through some rearrangement we get \newline&#10;$\beta \cdot x +\beta_0=0$&#10;&#10;\end{itemize}&#10;&#10;\end{document}"/>
   <p:tag name="IGUANATEXSIZE" val="18"/>
-  <p:tag name="IGUANATEXCURSOR" val="464"/>
+  <p:tag name="IGUANATEXCURSOR" val="545"/>
   <p:tag name="TRANSPARENCY" val="Wahr"/>
-  <p:tag name="LATEXENGINEID" val="0"/>
+  <p:tag name="LATEXENGINEID" val="2"/>
+  <p:tag name="TEMPFOLDER" val="E:\Dokumente\temp\"/>
+  <p:tag name="LATEXFORMHEIGHT" val="320"/>
+  <p:tag name="LATEXFORMWIDTH" val="385"/>
+  <p:tag name="LATEXFORMWRAP" val="Wahr"/>
+  <p:tag name="BITMAPVECTOR" val="0"/>
+</p:tagLst>
+</file>
+
+<file path=ppt/tags/tag2.xml><?xml version="1.0" encoding="utf-8"?>
+<p:tagLst xmlns:a="http://schemas.openxmlformats.org/drawingml/2006/main" xmlns:r="http://schemas.openxmlformats.org/officeDocument/2006/relationships" xmlns:p="http://schemas.openxmlformats.org/presentationml/2006/main">
+  <p:tag name="OUTPUTDPI" val="1200"/>
+  <p:tag name="ORIGINALHEIGHT" val="1039,645"/>
+  <p:tag name="ORIGINALWIDTH" val="2361,329"/>
+  <p:tag name="OUTPUTTYPE" val="PNG"/>
+  <p:tag name="IGUANATEXVERSION" val="161"/>
+  <p:tag name="LATEXADDIN" val="\documentclass[20pt]{article}&#10;\usepackage{amsmath,amsfonts,amssymb,xcolor, mathtools}&#10;\pagestyle{empty}&#10;\usepackage[T1]{fontenc}&#10;\usepackage{fontspec}&#10;\setsansfont{Arial}&#10;\renewcommand\familydefault{\sfdefault}&#10;\begin{document}&#10;\begin{itemize}&#10;\item the two gutters around the boundary \newline are defined by $\beta \cdot x+\beta_0=k$ and \newline$ \beta \cdot x+\beta_0=-k$&#10;\item seperate postitive from negative samples&#10;\item distance between the gutters\newline$\rightarrow$ width that is to be maximized&#10;\end{itemize}&#10;&#10;\end{document}"/>
+  <p:tag name="IGUANATEXSIZE" val="18"/>
+  <p:tag name="IGUANATEXCURSOR" val="508"/>
+  <p:tag name="TRANSPARENCY" val="Wahr"/>
+  <p:tag name="LATEXENGINEID" val="2"/>
+  <p:tag name="TEMPFOLDER" val="E:\Dokumente\temp\"/>
+  <p:tag name="LATEXFORMHEIGHT" val="320"/>
+  <p:tag name="LATEXFORMWIDTH" val="385"/>
+  <p:tag name="LATEXFORMWRAP" val="Wahr"/>
+  <p:tag name="BITMAPVECTOR" val="0"/>
+</p:tagLst>
+</file>
+
+<file path=ppt/tags/tag3.xml><?xml version="1.0" encoding="utf-8"?>
+<p:tagLst xmlns:a="http://schemas.openxmlformats.org/drawingml/2006/main" xmlns:r="http://schemas.openxmlformats.org/officeDocument/2006/relationships" xmlns:p="http://schemas.openxmlformats.org/presentationml/2006/main">
+  <p:tag name="OUTPUTDPI" val="1200"/>
+  <p:tag name="ORIGINALHEIGHT" val="705,8485"/>
+  <p:tag name="ORIGINALWIDTH" val="2011,031"/>
+  <p:tag name="OUTPUTTYPE" val="PNG"/>
+  <p:tag name="IGUANATEXVERSION" val="161"/>
+  <p:tag name="LATEXADDIN" val="\documentclass[20pt]{article}&#10;\usepackage{amsmath,amsfonts,amssymb,xcolor, mathtools}&#10;\pagestyle{empty}&#10;\usepackage[T1]{fontenc}&#10;\usepackage{fontspec}&#10;\setsansfont{Arial}&#10;\renewcommand\familydefault{\sfdefault}&#10;\begin{document}&#10;\begin{itemize}&#10;\item to measure the \textcolor{magenta}{width} of the margin  \newline&#10;$(x^+ -x^-)$ is Projected on the unit \newline&#10;vector of $\beta$ &#10;\item $M=(x^+ -x^-)\cdot \frac{\beta}{||\beta||}$&#10;&#10;\end{itemize}&#10;&#10;\end{document}"/>
+  <p:tag name="IGUANATEXSIZE" val="18"/>
+  <p:tag name="IGUANATEXCURSOR" val="291"/>
+  <p:tag name="TRANSPARENCY" val="Wahr"/>
+  <p:tag name="LATEXENGINEID" val="2"/>
   <p:tag name="TEMPFOLDER" val="E:\Dokumente\temp\"/>
   <p:tag name="LATEXFORMHEIGHT" val="320"/>
   <p:tag name="LATEXFORMWIDTH" val="385"/>

</xml_diff>

<commit_message>
decision rule soft margin
</commit_message>
<xml_diff>
--- a/Präsentation/Support Vector Machines.pptx
+++ b/Präsentation/Support Vector Machines.pptx
@@ -5,7 +5,7 @@
     <p:sldMasterId id="2147483648" r:id="rId1"/>
   </p:sldMasterIdLst>
   <p:notesMasterIdLst>
-    <p:notesMasterId r:id="rId24"/>
+    <p:notesMasterId r:id="rId25"/>
   </p:notesMasterIdLst>
   <p:sldIdLst>
     <p:sldId id="256" r:id="rId2"/>
@@ -23,13 +23,14 @@
     <p:sldId id="276" r:id="rId14"/>
     <p:sldId id="277" r:id="rId15"/>
     <p:sldId id="278" r:id="rId16"/>
-    <p:sldId id="264" r:id="rId17"/>
-    <p:sldId id="265" r:id="rId18"/>
-    <p:sldId id="266" r:id="rId19"/>
-    <p:sldId id="261" r:id="rId20"/>
-    <p:sldId id="267" r:id="rId21"/>
-    <p:sldId id="262" r:id="rId22"/>
-    <p:sldId id="263" r:id="rId23"/>
+    <p:sldId id="279" r:id="rId17"/>
+    <p:sldId id="264" r:id="rId18"/>
+    <p:sldId id="265" r:id="rId19"/>
+    <p:sldId id="266" r:id="rId20"/>
+    <p:sldId id="261" r:id="rId21"/>
+    <p:sldId id="267" r:id="rId22"/>
+    <p:sldId id="262" r:id="rId23"/>
+    <p:sldId id="263" r:id="rId24"/>
   </p:sldIdLst>
   <p:sldSz cx="9144000" cy="5143500" type="screen16x9"/>
   <p:notesSz cx="6797675" cy="9926638"/>
@@ -169,7 +170,7 @@
 <file path=ppt/revisionInfo.xml><?xml version="1.0" encoding="utf-8"?>
 <p1510:revInfo xmlns:a="http://schemas.openxmlformats.org/drawingml/2006/main" xmlns:r="http://schemas.openxmlformats.org/officeDocument/2006/relationships" xmlns:p1510="http://schemas.microsoft.com/office/powerpoint/2015/10/main">
   <p1510:revLst>
-    <p1510:client id="{AB1E0CFC-1C57-4A1E-92D1-DAC8DD9182A6}" v="2007" dt="2024-06-28T12:17:41.198"/>
+    <p1510:client id="{AB1E0CFC-1C57-4A1E-92D1-DAC8DD9182A6}" v="2115" dt="2024-06-28T12:58:11.420"/>
   </p1510:revLst>
 </p1510:revInfo>
 </file>
@@ -179,7 +180,7 @@
   <pc:docChgLst>
     <pc:chgData name="Franz Andersch" userId="88b46490-1a31-494c-af6b-e252cc2a642d" providerId="ADAL" clId="{AB1E0CFC-1C57-4A1E-92D1-DAC8DD9182A6}"/>
     <pc:docChg chg="undo redo custSel addSld delSld modSld sldOrd">
-      <pc:chgData name="Franz Andersch" userId="88b46490-1a31-494c-af6b-e252cc2a642d" providerId="ADAL" clId="{AB1E0CFC-1C57-4A1E-92D1-DAC8DD9182A6}" dt="2024-06-28T12:17:41.197" v="3759" actId="962"/>
+      <pc:chgData name="Franz Andersch" userId="88b46490-1a31-494c-af6b-e252cc2a642d" providerId="ADAL" clId="{AB1E0CFC-1C57-4A1E-92D1-DAC8DD9182A6}" dt="2024-06-28T12:58:11.419" v="3941" actId="962"/>
       <pc:docMkLst>
         <pc:docMk/>
       </pc:docMkLst>
@@ -1245,12 +1246,20 @@
         </pc:picChg>
       </pc:sldChg>
       <pc:sldChg chg="delSp modSp add mod">
-        <pc:chgData name="Franz Andersch" userId="88b46490-1a31-494c-af6b-e252cc2a642d" providerId="ADAL" clId="{AB1E0CFC-1C57-4A1E-92D1-DAC8DD9182A6}" dt="2024-06-28T12:17:41.197" v="3759" actId="962"/>
+        <pc:chgData name="Franz Andersch" userId="88b46490-1a31-494c-af6b-e252cc2a642d" providerId="ADAL" clId="{AB1E0CFC-1C57-4A1E-92D1-DAC8DD9182A6}" dt="2024-06-28T12:42:22.845" v="3820" actId="1076"/>
         <pc:sldMkLst>
           <pc:docMk/>
           <pc:sldMk cId="3845371581" sldId="278"/>
         </pc:sldMkLst>
         <pc:picChg chg="del mod ord replST">
+          <ac:chgData name="Franz Andersch" userId="88b46490-1a31-494c-af6b-e252cc2a642d" providerId="ADAL" clId="{AB1E0CFC-1C57-4A1E-92D1-DAC8DD9182A6}" dt="2024-06-28T12:42:20.196" v="3817" actId="478"/>
+          <ac:picMkLst>
+            <pc:docMk/>
+            <pc:sldMk cId="3845371581" sldId="278"/>
+            <ac:picMk id="4" creationId="{9E9A3866-0B4C-5BC9-FA0A-90D7633B5044}"/>
+          </ac:picMkLst>
+        </pc:picChg>
+        <pc:picChg chg="del mod ord replST">
           <ac:chgData name="Franz Andersch" userId="88b46490-1a31-494c-af6b-e252cc2a642d" providerId="ADAL" clId="{AB1E0CFC-1C57-4A1E-92D1-DAC8DD9182A6}" dt="2024-06-28T11:09:38.550" v="3577" actId="478"/>
           <ac:picMkLst>
             <pc:docMk/>
@@ -1266,6 +1275,14 @@
             <ac:picMk id="6" creationId="{EA242FE5-B273-2FF9-C1B1-7B8E08A1CE92}"/>
           </ac:picMkLst>
         </pc:picChg>
+        <pc:picChg chg="mod ord replST">
+          <ac:chgData name="Franz Andersch" userId="88b46490-1a31-494c-af6b-e252cc2a642d" providerId="ADAL" clId="{AB1E0CFC-1C57-4A1E-92D1-DAC8DD9182A6}" dt="2024-06-28T12:42:22.845" v="3820" actId="1076"/>
+          <ac:picMkLst>
+            <pc:docMk/>
+            <pc:sldMk cId="3845371581" sldId="278"/>
+            <ac:picMk id="6" creationId="{F557EF5B-A3FE-833B-A1A2-46C8E870CB92}"/>
+          </ac:picMkLst>
+        </pc:picChg>
         <pc:picChg chg="del mod ord replST">
           <ac:chgData name="Franz Andersch" userId="88b46490-1a31-494c-af6b-e252cc2a642d" providerId="ADAL" clId="{AB1E0CFC-1C57-4A1E-92D1-DAC8DD9182A6}" dt="2024-06-28T11:12:45.147" v="3637" actId="478"/>
           <ac:picMkLst>
@@ -1306,8 +1323,8 @@
             <ac:picMk id="16" creationId="{458A4573-40AE-7739-A79D-74F4BF03A662}"/>
           </ac:picMkLst>
         </pc:picChg>
-        <pc:picChg chg="mod ord replST">
-          <ac:chgData name="Franz Andersch" userId="88b46490-1a31-494c-af6b-e252cc2a642d" providerId="ADAL" clId="{AB1E0CFC-1C57-4A1E-92D1-DAC8DD9182A6}" dt="2024-06-28T12:17:41.197" v="3759" actId="962"/>
+        <pc:picChg chg="del mod ord replST">
+          <ac:chgData name="Franz Andersch" userId="88b46490-1a31-494c-af6b-e252cc2a642d" providerId="ADAL" clId="{AB1E0CFC-1C57-4A1E-92D1-DAC8DD9182A6}" dt="2024-06-28T12:37:26.830" v="3787" actId="478"/>
           <ac:picMkLst>
             <pc:docMk/>
             <pc:sldMk cId="3845371581" sldId="278"/>
@@ -1320,6 +1337,53 @@
             <pc:docMk/>
             <pc:sldMk cId="3845371581" sldId="278"/>
             <ac:picMk id="27" creationId="{B0BBD2F6-635F-076B-ABB1-ACD6F9A3DC50}"/>
+          </ac:picMkLst>
+        </pc:picChg>
+      </pc:sldChg>
+      <pc:sldChg chg="delSp modSp add mod">
+        <pc:chgData name="Franz Andersch" userId="88b46490-1a31-494c-af6b-e252cc2a642d" providerId="ADAL" clId="{AB1E0CFC-1C57-4A1E-92D1-DAC8DD9182A6}" dt="2024-06-28T12:58:11.419" v="3941" actId="962"/>
+        <pc:sldMkLst>
+          <pc:docMk/>
+          <pc:sldMk cId="1632948460" sldId="279"/>
+        </pc:sldMkLst>
+        <pc:picChg chg="del mod ord replST">
+          <ac:chgData name="Franz Andersch" userId="88b46490-1a31-494c-af6b-e252cc2a642d" providerId="ADAL" clId="{AB1E0CFC-1C57-4A1E-92D1-DAC8DD9182A6}" dt="2024-06-28T12:54:39.377" v="3879" actId="478"/>
+          <ac:picMkLst>
+            <pc:docMk/>
+            <pc:sldMk cId="1632948460" sldId="279"/>
+            <ac:picMk id="4" creationId="{C34C1E8C-5CA7-EC29-7A98-E9326EEFBF79}"/>
+          </ac:picMkLst>
+        </pc:picChg>
+        <pc:picChg chg="del mod">
+          <ac:chgData name="Franz Andersch" userId="88b46490-1a31-494c-af6b-e252cc2a642d" providerId="ADAL" clId="{AB1E0CFC-1C57-4A1E-92D1-DAC8DD9182A6}" dt="2024-06-28T12:53:09.684" v="3849" actId="478"/>
+          <ac:picMkLst>
+            <pc:docMk/>
+            <pc:sldMk cId="1632948460" sldId="279"/>
+            <ac:picMk id="6" creationId="{F557EF5B-A3FE-833B-A1A2-46C8E870CB92}"/>
+          </ac:picMkLst>
+        </pc:picChg>
+        <pc:picChg chg="del mod ord replST">
+          <ac:chgData name="Franz Andersch" userId="88b46490-1a31-494c-af6b-e252cc2a642d" providerId="ADAL" clId="{AB1E0CFC-1C57-4A1E-92D1-DAC8DD9182A6}" dt="2024-06-28T12:55:43.445" v="3909" actId="478"/>
+          <ac:picMkLst>
+            <pc:docMk/>
+            <pc:sldMk cId="1632948460" sldId="279"/>
+            <ac:picMk id="7" creationId="{2AE368E8-3A6B-8A16-DC94-45FF23F6F3D2}"/>
+          </ac:picMkLst>
+        </pc:picChg>
+        <pc:picChg chg="del mod ord replST">
+          <ac:chgData name="Franz Andersch" userId="88b46490-1a31-494c-af6b-e252cc2a642d" providerId="ADAL" clId="{AB1E0CFC-1C57-4A1E-92D1-DAC8DD9182A6}" dt="2024-06-28T12:58:11.418" v="3939" actId="478"/>
+          <ac:picMkLst>
+            <pc:docMk/>
+            <pc:sldMk cId="1632948460" sldId="279"/>
+            <ac:picMk id="9" creationId="{39DD348E-5B7A-9545-0AB4-A346C4FD5A05}"/>
+          </ac:picMkLst>
+        </pc:picChg>
+        <pc:picChg chg="mod ord replST">
+          <ac:chgData name="Franz Andersch" userId="88b46490-1a31-494c-af6b-e252cc2a642d" providerId="ADAL" clId="{AB1E0CFC-1C57-4A1E-92D1-DAC8DD9182A6}" dt="2024-06-28T12:58:11.419" v="3941" actId="962"/>
+          <ac:picMkLst>
+            <pc:docMk/>
+            <pc:sldMk cId="1632948460" sldId="279"/>
+            <ac:picMk id="11" creationId="{49C7F333-D0CF-7EE6-8A8C-382573DE70D5}"/>
           </ac:picMkLst>
         </pc:picChg>
       </pc:sldChg>
@@ -5555,10 +5619,10 @@
       </p:sp>
       <p:pic>
         <p:nvPicPr>
-          <p:cNvPr id="18" name="Grafik 17" descr="\documentclass[20pt]{article}&#10;\usepackage{amsmath,amsfonts,amssymb,xcolor, mathtools}&#10;\pagestyle{empty}&#10;\usepackage[T1]{fontenc}&#10;\usepackage{fontspec}&#10;\setsansfont{Arial}&#10;\renewcommand\familydefault{\sfdefault}&#10;\begin{document}&#10;\begin{itemize}&#10;\item new Lagrangian to solve\vspace{0.2cm}\newline&#10;$\mathcal{L}(\beta,\beta_0,\alpha,\varepsilon,\lambda)=\frac{1}{2}\beta\cdot \beta + C \sum_{i=1}^{n}\varepsilon_i-\underbrace{\sum \alpha_i[y_i(\beta \cdot \overline{x_i}+\beta_0)-1+\varepsilon_i]}_{\text{ensures }y_i(\beta \cdot \overline{x}_i-\beta_0)&gt;1- \varepsilon_i}-\underbrace{\sum \lambda_i \varepsilon_i }_{\substack{\text{ensures}\\ \varepsilon_i \ge 0}}$&#10;&#10;\end{itemize}&#10;\end{document}" title="IguanaTex Picture Display">
+          <p:cNvPr id="6" name="Grafik 5" descr="\documentclass[20pt]{article}&#10;\usepackage{amsmath,amsfonts,amssymb,xcolor, mathtools}&#10;\pagestyle{empty}&#10;\usepackage[T1]{fontenc}&#10;\usepackage{fontspec}&#10;\setsansfont{Arial}&#10;\renewcommand\familydefault{\sfdefault}&#10;\begin{document}&#10;\begin{itemize}&#10;\item new Lagrangian to solve\vspace{0.2cm}\newline&#10;$\mathcal{L}(\beta,\beta_0,\alpha,\varepsilon,\lambda)=\frac{1}{2}\beta\cdot \beta + C \sum_{i=1}^{n}\varepsilon_i-\underbrace{\sum \alpha_i[y_i(\beta \cdot \overline{x_i}+\beta_0)-1+\varepsilon_i]}_{\text{ensures }y_i(\beta \cdot \overline{x}_i-\beta_0)&gt;1- \varepsilon_i}-\underbrace{\sum \lambda_i \varepsilon_i }_{\substack{\text{ensures}\\ \varepsilon_i \ge 0}}$&#10;\item derive with respect to $\beta$  and set to zero\newline&#10;$\frac{\partial \mathcal{L}}{\partial \beta}=\beta-\sum \alpha_i y_i \overline{x_i}\overset{!}{=}0 \Rightarrow \beta=\sum \alpha_i y_i \overline{x_i} $&#10;\item derive with respect to $\beta_0$ and set to zero&#10;\newline $\frac{\partial \mathcal{L}}{\partial \beta_0}=\sum \alpha_i y_i \overline{x_i}\overset{!}{=}0$&#10;\item derive with respect to $\varepsilon_i$\newline&#10;$\frac{\partial \mathcal{L}}{\partial \varepsilon_i}=C-\alpha_i-\lambda_i\overset{!}{=}0\Leftrightarrow \lambda_i=C-\alpha_i$&#10;\end{itemize}&#10;\end{document}" title="IguanaTex Picture Display">
             <a:extLst>
               <a:ext uri="{FF2B5EF4-FFF2-40B4-BE49-F238E27FC236}">
-                <a16:creationId xmlns:a16="http://schemas.microsoft.com/office/drawing/2014/main" id="{F59955FD-371E-4EAB-98FF-7C6496D5C5D7}"/>
+                <a16:creationId xmlns:a16="http://schemas.microsoft.com/office/drawing/2014/main" id="{F557EF5B-A3FE-833B-A1A2-46C8E870CB92}"/>
               </a:ext>
             </a:extLst>
           </p:cNvPr>
@@ -5585,8 +5649,8 @@
         </p:blipFill>
         <p:spPr>
           <a:xfrm>
-            <a:off x="539558" y="1143268"/>
-            <a:ext cx="7819763" cy="1240453"/>
+            <a:off x="539552" y="843558"/>
+            <a:ext cx="7822866" cy="3797646"/>
           </a:xfrm>
           <a:prstGeom prst="rect">
             <a:avLst/>
@@ -5607,6 +5671,124 @@
 </file>
 
 <file path=ppt/slides/slide16.xml><?xml version="1.0" encoding="utf-8"?>
+<p:sld xmlns:a="http://schemas.openxmlformats.org/drawingml/2006/main" xmlns:r="http://schemas.openxmlformats.org/officeDocument/2006/relationships" xmlns:p="http://schemas.openxmlformats.org/presentationml/2006/main">
+  <p:cSld>
+    <p:spTree>
+      <p:nvGrpSpPr>
+        <p:cNvPr id="1" name=""/>
+        <p:cNvGrpSpPr/>
+        <p:nvPr/>
+      </p:nvGrpSpPr>
+      <p:grpSpPr>
+        <a:xfrm>
+          <a:off x="0" y="0"/>
+          <a:ext cx="0" cy="0"/>
+          <a:chOff x="0" y="0"/>
+          <a:chExt cx="0" cy="0"/>
+        </a:xfrm>
+      </p:grpSpPr>
+      <p:sp>
+        <p:nvSpPr>
+          <p:cNvPr id="2" name="Titel 1">
+            <a:extLst>
+              <a:ext uri="{FF2B5EF4-FFF2-40B4-BE49-F238E27FC236}">
+                <a16:creationId xmlns:a16="http://schemas.microsoft.com/office/drawing/2014/main" id="{388F7BA3-B785-BDE2-BAC6-74C1F53E9285}"/>
+              </a:ext>
+            </a:extLst>
+          </p:cNvPr>
+          <p:cNvSpPr>
+            <a:spLocks noGrp="1"/>
+          </p:cNvSpPr>
+          <p:nvPr>
+            <p:ph type="title"/>
+          </p:nvPr>
+        </p:nvSpPr>
+        <p:spPr/>
+        <p:txBody>
+          <a:bodyPr/>
+          <a:lstStyle/>
+          <a:p>
+            <a:r>
+              <a:rPr lang="de-DE" dirty="0" err="1"/>
+              <a:t>How</a:t>
+            </a:r>
+            <a:r>
+              <a:rPr lang="de-DE" dirty="0"/>
+              <a:t> </a:t>
+            </a:r>
+            <a:r>
+              <a:rPr lang="de-DE" dirty="0" err="1"/>
+              <a:t>it</a:t>
+            </a:r>
+            <a:r>
+              <a:rPr lang="de-DE" dirty="0"/>
+              <a:t> </a:t>
+            </a:r>
+            <a:r>
+              <a:rPr lang="de-DE" dirty="0" err="1"/>
+              <a:t>works</a:t>
+            </a:r>
+            <a:r>
+              <a:rPr lang="de-DE" dirty="0"/>
+              <a:t>: Soft Margin</a:t>
+            </a:r>
+          </a:p>
+        </p:txBody>
+      </p:sp>
+      <p:pic>
+        <p:nvPicPr>
+          <p:cNvPr id="11" name="Grafik 10" descr="\documentclass[20pt]{article}&#10;\usepackage{amsmath,amsfonts,amssymb,xcolor, mathtools}&#10;\pagestyle{empty}&#10;\usepackage[T1]{fontenc}&#10;\usepackage{fontspec}&#10;\setsansfont{Arial}&#10;\renewcommand\familydefault{\sfdefault}&#10;\begin{document}&#10;\begin{itemize}&#10;\item imputing the solutions in the original lagrangian and rearranging yields again \newline&#10;$$min(\mathcal{L})=-\frac{1}{2}\sum \sum \alpha_i \alpha_j y_i y_j \overline{x}_i \cdot \overline{x}_j+\sum \alpha_i$$ &#10;but under constraint $0\le \alpha_i \le C$&#10;\item can again be efficiently solved through quadratic programming optimization&#10;\item the decision function works the same way as with the hard margin classifier&#10;\end{itemize}&#10;\end{document}" title="IguanaTex Picture Display">
+            <a:extLst>
+              <a:ext uri="{FF2B5EF4-FFF2-40B4-BE49-F238E27FC236}">
+                <a16:creationId xmlns:a16="http://schemas.microsoft.com/office/drawing/2014/main" id="{49C7F333-D0CF-7EE6-8A8C-382573DE70D5}"/>
+              </a:ext>
+            </a:extLst>
+          </p:cNvPr>
+          <p:cNvPicPr>
+            <a:picLocks noChangeAspect="1"/>
+          </p:cNvPicPr>
+          <p:nvPr>
+            <p:custDataLst>
+              <p:tags r:id="rId1"/>
+            </p:custDataLst>
+          </p:nvPr>
+        </p:nvPicPr>
+        <p:blipFill>
+          <a:blip r:embed="rId3">
+            <a:extLst>
+              <a:ext uri="{28A0092B-C50C-407E-A947-70E740481C1C}">
+                <a14:useLocalDpi xmlns:a14="http://schemas.microsoft.com/office/drawing/2010/main" val="0"/>
+              </a:ext>
+            </a:extLst>
+          </a:blip>
+          <a:stretch>
+            <a:fillRect/>
+          </a:stretch>
+        </p:blipFill>
+        <p:spPr>
+          <a:xfrm>
+            <a:off x="539552" y="843558"/>
+            <a:ext cx="7507230" cy="3180947"/>
+          </a:xfrm>
+          <a:prstGeom prst="rect">
+            <a:avLst/>
+          </a:prstGeom>
+        </p:spPr>
+      </p:pic>
+    </p:spTree>
+    <p:extLst>
+      <p:ext uri="{BB962C8B-B14F-4D97-AF65-F5344CB8AC3E}">
+        <p14:creationId xmlns:p14="http://schemas.microsoft.com/office/powerpoint/2010/main" val="1632948460"/>
+      </p:ext>
+    </p:extLst>
+  </p:cSld>
+  <p:clrMapOvr>
+    <a:masterClrMapping/>
+  </p:clrMapOvr>
+</p:sld>
+</file>
+
+<file path=ppt/slides/slide17.xml><?xml version="1.0" encoding="utf-8"?>
 <p:sld xmlns:a="http://schemas.openxmlformats.org/drawingml/2006/main" xmlns:r="http://schemas.openxmlformats.org/officeDocument/2006/relationships" xmlns:p="http://schemas.openxmlformats.org/presentationml/2006/main">
   <p:cSld>
     <p:spTree>
@@ -6375,122 +6557,6 @@
 </p:sld>
 </file>
 
-<file path=ppt/slides/slide17.xml><?xml version="1.0" encoding="utf-8"?>
-<p:sld xmlns:a="http://schemas.openxmlformats.org/drawingml/2006/main" xmlns:r="http://schemas.openxmlformats.org/officeDocument/2006/relationships" xmlns:p="http://schemas.openxmlformats.org/presentationml/2006/main">
-  <p:cSld>
-    <p:spTree>
-      <p:nvGrpSpPr>
-        <p:cNvPr id="1" name=""/>
-        <p:cNvGrpSpPr/>
-        <p:nvPr/>
-      </p:nvGrpSpPr>
-      <p:grpSpPr>
-        <a:xfrm>
-          <a:off x="0" y="0"/>
-          <a:ext cx="0" cy="0"/>
-          <a:chOff x="0" y="0"/>
-          <a:chExt cx="0" cy="0"/>
-        </a:xfrm>
-      </p:grpSpPr>
-      <p:sp>
-        <p:nvSpPr>
-          <p:cNvPr id="2" name="Titel 1">
-            <a:extLst>
-              <a:ext uri="{FF2B5EF4-FFF2-40B4-BE49-F238E27FC236}">
-                <a16:creationId xmlns:a16="http://schemas.microsoft.com/office/drawing/2014/main" id="{388F7BA3-B785-BDE2-BAC6-74C1F53E9285}"/>
-              </a:ext>
-            </a:extLst>
-          </p:cNvPr>
-          <p:cNvSpPr>
-            <a:spLocks noGrp="1"/>
-          </p:cNvSpPr>
-          <p:nvPr>
-            <p:ph type="title"/>
-          </p:nvPr>
-        </p:nvSpPr>
-        <p:spPr/>
-        <p:txBody>
-          <a:bodyPr/>
-          <a:lstStyle/>
-          <a:p>
-            <a:r>
-              <a:rPr lang="de-DE" dirty="0" err="1"/>
-              <a:t>How</a:t>
-            </a:r>
-            <a:r>
-              <a:rPr lang="de-DE" dirty="0"/>
-              <a:t> </a:t>
-            </a:r>
-            <a:r>
-              <a:rPr lang="de-DE" dirty="0" err="1"/>
-              <a:t>it</a:t>
-            </a:r>
-            <a:r>
-              <a:rPr lang="de-DE" dirty="0"/>
-              <a:t> </a:t>
-            </a:r>
-            <a:r>
-              <a:rPr lang="de-DE" dirty="0" err="1"/>
-              <a:t>works</a:t>
-            </a:r>
-            <a:r>
-              <a:rPr lang="de-DE" dirty="0"/>
-              <a:t>: Support </a:t>
-            </a:r>
-            <a:r>
-              <a:rPr lang="de-DE" dirty="0" err="1"/>
-              <a:t>vector</a:t>
-            </a:r>
-            <a:r>
-              <a:rPr lang="de-DE" dirty="0"/>
-              <a:t> </a:t>
-            </a:r>
-            <a:r>
-              <a:rPr lang="de-DE" dirty="0" err="1"/>
-              <a:t>classifier</a:t>
-            </a:r>
-            <a:endParaRPr lang="de-DE" dirty="0"/>
-          </a:p>
-        </p:txBody>
-      </p:sp>
-      <p:sp>
-        <p:nvSpPr>
-          <p:cNvPr id="3" name="Inhaltsplatzhalter 2">
-            <a:extLst>
-              <a:ext uri="{FF2B5EF4-FFF2-40B4-BE49-F238E27FC236}">
-                <a16:creationId xmlns:a16="http://schemas.microsoft.com/office/drawing/2014/main" id="{B6EBCD5F-A998-E34B-B609-7A4D246D72F7}"/>
-              </a:ext>
-            </a:extLst>
-          </p:cNvPr>
-          <p:cNvSpPr>
-            <a:spLocks noGrp="1"/>
-          </p:cNvSpPr>
-          <p:nvPr>
-            <p:ph idx="1"/>
-          </p:nvPr>
-        </p:nvSpPr>
-        <p:spPr/>
-        <p:txBody>
-          <a:bodyPr/>
-          <a:lstStyle/>
-          <a:p>
-            <a:endParaRPr lang="de-DE" sz="2000" dirty="0"/>
-          </a:p>
-        </p:txBody>
-      </p:sp>
-    </p:spTree>
-    <p:extLst>
-      <p:ext uri="{BB962C8B-B14F-4D97-AF65-F5344CB8AC3E}">
-        <p14:creationId xmlns:p14="http://schemas.microsoft.com/office/powerpoint/2010/main" val="2939723199"/>
-      </p:ext>
-    </p:extLst>
-  </p:cSld>
-  <p:clrMapOvr>
-    <a:masterClrMapping/>
-  </p:clrMapOvr>
-</p:sld>
-</file>
-
 <file path=ppt/slides/slide18.xml><?xml version="1.0" encoding="utf-8"?>
 <p:sld xmlns:a="http://schemas.openxmlformats.org/drawingml/2006/main" xmlns:r="http://schemas.openxmlformats.org/officeDocument/2006/relationships" xmlns:p="http://schemas.openxmlformats.org/presentationml/2006/main">
   <p:cSld>
@@ -6563,7 +6629,7 @@
             </a:r>
             <a:r>
               <a:rPr lang="de-DE" dirty="0" err="1"/>
-              <a:t>machine</a:t>
+              <a:t>classifier</a:t>
             </a:r>
             <a:endParaRPr lang="de-DE" dirty="0"/>
           </a:p>
@@ -6597,7 +6663,7 @@
     </p:spTree>
     <p:extLst>
       <p:ext uri="{BB962C8B-B14F-4D97-AF65-F5344CB8AC3E}">
-        <p14:creationId xmlns:p14="http://schemas.microsoft.com/office/powerpoint/2010/main" val="3746182716"/>
+        <p14:creationId xmlns:p14="http://schemas.microsoft.com/office/powerpoint/2010/main" val="2939723199"/>
       </p:ext>
     </p:extLst>
   </p:cSld>
@@ -6629,7 +6695,7 @@
           <p:cNvPr id="2" name="Titel 1">
             <a:extLst>
               <a:ext uri="{FF2B5EF4-FFF2-40B4-BE49-F238E27FC236}">
-                <a16:creationId xmlns:a16="http://schemas.microsoft.com/office/drawing/2014/main" id="{9C274E31-D4F7-6C4A-D81C-1BC18A1044AE}"/>
+                <a16:creationId xmlns:a16="http://schemas.microsoft.com/office/drawing/2014/main" id="{388F7BA3-B785-BDE2-BAC6-74C1F53E9285}"/>
               </a:ext>
             </a:extLst>
           </p:cNvPr>
@@ -6646,9 +6712,42 @@
           <a:lstStyle/>
           <a:p>
             <a:r>
+              <a:rPr lang="de-DE" dirty="0" err="1"/>
+              <a:t>How</a:t>
+            </a:r>
+            <a:r>
               <a:rPr lang="de-DE" dirty="0"/>
-              <a:t>Dataset: ALLBUS</a:t>
-            </a:r>
+              <a:t> </a:t>
+            </a:r>
+            <a:r>
+              <a:rPr lang="de-DE" dirty="0" err="1"/>
+              <a:t>it</a:t>
+            </a:r>
+            <a:r>
+              <a:rPr lang="de-DE" dirty="0"/>
+              <a:t> </a:t>
+            </a:r>
+            <a:r>
+              <a:rPr lang="de-DE" dirty="0" err="1"/>
+              <a:t>works</a:t>
+            </a:r>
+            <a:r>
+              <a:rPr lang="de-DE" dirty="0"/>
+              <a:t>: Support </a:t>
+            </a:r>
+            <a:r>
+              <a:rPr lang="de-DE" dirty="0" err="1"/>
+              <a:t>vector</a:t>
+            </a:r>
+            <a:r>
+              <a:rPr lang="de-DE" dirty="0"/>
+              <a:t> </a:t>
+            </a:r>
+            <a:r>
+              <a:rPr lang="de-DE" dirty="0" err="1"/>
+              <a:t>machine</a:t>
+            </a:r>
+            <a:endParaRPr lang="de-DE" dirty="0"/>
           </a:p>
         </p:txBody>
       </p:sp>
@@ -6657,7 +6756,7 @@
           <p:cNvPr id="3" name="Inhaltsplatzhalter 2">
             <a:extLst>
               <a:ext uri="{FF2B5EF4-FFF2-40B4-BE49-F238E27FC236}">
-                <a16:creationId xmlns:a16="http://schemas.microsoft.com/office/drawing/2014/main" id="{A6EE175B-F110-2231-4746-FB0A5137CFF3}"/>
+                <a16:creationId xmlns:a16="http://schemas.microsoft.com/office/drawing/2014/main" id="{B6EBCD5F-A998-E34B-B609-7A4D246D72F7}"/>
               </a:ext>
             </a:extLst>
           </p:cNvPr>
@@ -6668,206 +6767,19 @@
             <p:ph idx="1"/>
           </p:nvPr>
         </p:nvSpPr>
-        <p:spPr>
-          <a:xfrm>
-            <a:off x="395536" y="1353344"/>
-            <a:ext cx="7344816" cy="3162622"/>
-          </a:xfrm>
-        </p:spPr>
+        <p:spPr/>
         <p:txBody>
           <a:bodyPr/>
           <a:lstStyle/>
           <a:p>
-            <a:r>
-              <a:rPr lang="de-DE" sz="2000" dirty="0"/>
-              <a:t>„General </a:t>
-            </a:r>
-            <a:r>
-              <a:rPr lang="de-DE" sz="2000" dirty="0" err="1"/>
-              <a:t>population</a:t>
-            </a:r>
-            <a:r>
-              <a:rPr lang="de-DE" sz="2000" dirty="0"/>
-              <a:t> </a:t>
-            </a:r>
-            <a:r>
-              <a:rPr lang="de-DE" sz="2000" dirty="0" err="1"/>
-              <a:t>survey</a:t>
-            </a:r>
-            <a:r>
-              <a:rPr lang="de-DE" sz="2000" dirty="0"/>
-              <a:t> </a:t>
-            </a:r>
-            <a:r>
-              <a:rPr lang="de-DE" sz="2000" dirty="0" err="1"/>
-              <a:t>of</a:t>
-            </a:r>
-            <a:r>
-              <a:rPr lang="de-DE" sz="2000" dirty="0"/>
-              <a:t> </a:t>
-            </a:r>
-            <a:r>
-              <a:rPr lang="de-DE" sz="2000" dirty="0" err="1"/>
-              <a:t>the</a:t>
-            </a:r>
-            <a:r>
-              <a:rPr lang="de-DE" sz="2000" dirty="0"/>
-              <a:t> social </a:t>
-            </a:r>
-            <a:r>
-              <a:rPr lang="de-DE" sz="2000" dirty="0" err="1"/>
-              <a:t>sciences</a:t>
-            </a:r>
-            <a:r>
-              <a:rPr lang="de-DE" sz="2000" dirty="0"/>
-              <a:t>“ 	  </a:t>
-            </a:r>
-            <a:r>
-              <a:rPr lang="de-DE" sz="1000" dirty="0"/>
-              <a:t>(Allgemeine Bevölkerungsumfrage der Sozialwissenschaften)</a:t>
-            </a:r>
-          </a:p>
-          <a:p>
-            <a:r>
-              <a:rPr lang="de-DE" sz="2000" b="1" dirty="0"/>
-              <a:t>Response Variable</a:t>
-            </a:r>
-            <a:r>
-              <a:rPr lang="de-DE" sz="2000" dirty="0"/>
-              <a:t>:</a:t>
-            </a:r>
-          </a:p>
-          <a:p>
-            <a:pPr lvl="1"/>
-            <a:r>
-              <a:rPr lang="de-DE" sz="1800" dirty="0"/>
-              <a:t>„Federal </a:t>
-            </a:r>
-            <a:r>
-              <a:rPr lang="de-DE" sz="1800" dirty="0" err="1"/>
-              <a:t>state</a:t>
-            </a:r>
-            <a:r>
-              <a:rPr lang="de-DE" sz="1800" dirty="0"/>
-              <a:t> </a:t>
-            </a:r>
-            <a:r>
-              <a:rPr lang="de-DE" sz="1800" dirty="0" err="1"/>
-              <a:t>where</a:t>
-            </a:r>
-            <a:r>
-              <a:rPr lang="de-DE" sz="1800" dirty="0"/>
-              <a:t> </a:t>
-            </a:r>
-            <a:r>
-              <a:rPr lang="de-DE" sz="1800" dirty="0" err="1"/>
-              <a:t>interviewee</a:t>
-            </a:r>
-            <a:r>
-              <a:rPr lang="de-DE" sz="1800" dirty="0"/>
-              <a:t> </a:t>
-            </a:r>
-            <a:r>
-              <a:rPr lang="de-DE" sz="1800" dirty="0" err="1"/>
-              <a:t>lived</a:t>
-            </a:r>
-            <a:r>
-              <a:rPr lang="de-DE" sz="1800" dirty="0"/>
-              <a:t> in </a:t>
-            </a:r>
-            <a:r>
-              <a:rPr lang="de-DE" sz="1800" dirty="0" err="1"/>
-              <a:t>youth</a:t>
-            </a:r>
-            <a:r>
-              <a:rPr lang="de-DE" sz="1800" dirty="0"/>
-              <a:t>“</a:t>
-            </a:r>
-          </a:p>
-          <a:p>
-            <a:pPr lvl="1"/>
-            <a:r>
-              <a:rPr lang="de-DE" sz="1800" dirty="0" err="1">
-                <a:sym typeface="Wingdings" panose="05000000000000000000" pitchFamily="2" charset="2"/>
-              </a:rPr>
-              <a:t>coded</a:t>
-            </a:r>
-            <a:r>
-              <a:rPr lang="de-DE" sz="1800" dirty="0">
-                <a:sym typeface="Wingdings" panose="05000000000000000000" pitchFamily="2" charset="2"/>
-              </a:rPr>
-              <a:t> </a:t>
-            </a:r>
-            <a:r>
-              <a:rPr lang="de-DE" sz="1800" dirty="0" err="1">
-                <a:sym typeface="Wingdings" panose="05000000000000000000" pitchFamily="2" charset="2"/>
-              </a:rPr>
-              <a:t>to</a:t>
-            </a:r>
-            <a:r>
-              <a:rPr lang="de-DE" sz="1800" dirty="0">
-                <a:sym typeface="Wingdings" panose="05000000000000000000" pitchFamily="2" charset="2"/>
-              </a:rPr>
-              <a:t> „Youth in East/West Germany“</a:t>
-            </a:r>
-            <a:endParaRPr lang="de-DE" sz="1800" dirty="0"/>
-          </a:p>
-          <a:p>
-            <a:r>
-              <a:rPr lang="de-DE" sz="2000" b="1" dirty="0" err="1"/>
-              <a:t>Predictor</a:t>
-            </a:r>
-            <a:r>
-              <a:rPr lang="de-DE" sz="2000" b="1" dirty="0"/>
-              <a:t> Variables</a:t>
-            </a:r>
-            <a:r>
-              <a:rPr lang="de-DE" sz="2000" dirty="0"/>
-              <a:t>:</a:t>
-            </a:r>
-          </a:p>
-          <a:p>
-            <a:pPr lvl="1"/>
-            <a:r>
-              <a:rPr lang="de-DE" sz="1800" dirty="0"/>
-              <a:t>121 variables </a:t>
-            </a:r>
-            <a:r>
-              <a:rPr lang="de-DE" sz="1800" dirty="0" err="1"/>
-              <a:t>concerning</a:t>
-            </a:r>
-            <a:r>
-              <a:rPr lang="de-DE" sz="1800" dirty="0"/>
-              <a:t> </a:t>
-            </a:r>
-            <a:r>
-              <a:rPr lang="de-DE" sz="1800" dirty="0" err="1"/>
-              <a:t>attitudes</a:t>
-            </a:r>
-            <a:r>
-              <a:rPr lang="de-DE" sz="1800" dirty="0"/>
-              <a:t>, </a:t>
-            </a:r>
-            <a:r>
-              <a:rPr lang="de-DE" sz="1800" dirty="0" err="1"/>
-              <a:t>behavior</a:t>
-            </a:r>
-            <a:r>
-              <a:rPr lang="de-DE" sz="1800" dirty="0"/>
-              <a:t> and social </a:t>
-            </a:r>
-            <a:r>
-              <a:rPr lang="de-DE" sz="1800" dirty="0" err="1"/>
-              <a:t>change</a:t>
-            </a:r>
-            <a:endParaRPr lang="de-DE" sz="1800" dirty="0"/>
+            <a:endParaRPr lang="de-DE" sz="2000" dirty="0"/>
           </a:p>
         </p:txBody>
       </p:sp>
     </p:spTree>
     <p:extLst>
       <p:ext uri="{BB962C8B-B14F-4D97-AF65-F5344CB8AC3E}">
-        <p14:creationId xmlns:p14="http://schemas.microsoft.com/office/powerpoint/2010/main" val="2732348097"/>
+        <p14:creationId xmlns:p14="http://schemas.microsoft.com/office/powerpoint/2010/main" val="3746182716"/>
       </p:ext>
     </p:extLst>
   </p:cSld>
@@ -7096,6 +7008,276 @@
           <a:lstStyle/>
           <a:p>
             <a:r>
+              <a:rPr lang="de-DE" sz="2000" dirty="0"/>
+              <a:t>„General </a:t>
+            </a:r>
+            <a:r>
+              <a:rPr lang="de-DE" sz="2000" dirty="0" err="1"/>
+              <a:t>population</a:t>
+            </a:r>
+            <a:r>
+              <a:rPr lang="de-DE" sz="2000" dirty="0"/>
+              <a:t> </a:t>
+            </a:r>
+            <a:r>
+              <a:rPr lang="de-DE" sz="2000" dirty="0" err="1"/>
+              <a:t>survey</a:t>
+            </a:r>
+            <a:r>
+              <a:rPr lang="de-DE" sz="2000" dirty="0"/>
+              <a:t> </a:t>
+            </a:r>
+            <a:r>
+              <a:rPr lang="de-DE" sz="2000" dirty="0" err="1"/>
+              <a:t>of</a:t>
+            </a:r>
+            <a:r>
+              <a:rPr lang="de-DE" sz="2000" dirty="0"/>
+              <a:t> </a:t>
+            </a:r>
+            <a:r>
+              <a:rPr lang="de-DE" sz="2000" dirty="0" err="1"/>
+              <a:t>the</a:t>
+            </a:r>
+            <a:r>
+              <a:rPr lang="de-DE" sz="2000" dirty="0"/>
+              <a:t> social </a:t>
+            </a:r>
+            <a:r>
+              <a:rPr lang="de-DE" sz="2000" dirty="0" err="1"/>
+              <a:t>sciences</a:t>
+            </a:r>
+            <a:r>
+              <a:rPr lang="de-DE" sz="2000" dirty="0"/>
+              <a:t>“ 	  </a:t>
+            </a:r>
+            <a:r>
+              <a:rPr lang="de-DE" sz="1000" dirty="0"/>
+              <a:t>(Allgemeine Bevölkerungsumfrage der Sozialwissenschaften)</a:t>
+            </a:r>
+          </a:p>
+          <a:p>
+            <a:r>
+              <a:rPr lang="de-DE" sz="2000" b="1" dirty="0"/>
+              <a:t>Response Variable</a:t>
+            </a:r>
+            <a:r>
+              <a:rPr lang="de-DE" sz="2000" dirty="0"/>
+              <a:t>:</a:t>
+            </a:r>
+          </a:p>
+          <a:p>
+            <a:pPr lvl="1"/>
+            <a:r>
+              <a:rPr lang="de-DE" sz="1800" dirty="0"/>
+              <a:t>„Federal </a:t>
+            </a:r>
+            <a:r>
+              <a:rPr lang="de-DE" sz="1800" dirty="0" err="1"/>
+              <a:t>state</a:t>
+            </a:r>
+            <a:r>
+              <a:rPr lang="de-DE" sz="1800" dirty="0"/>
+              <a:t> </a:t>
+            </a:r>
+            <a:r>
+              <a:rPr lang="de-DE" sz="1800" dirty="0" err="1"/>
+              <a:t>where</a:t>
+            </a:r>
+            <a:r>
+              <a:rPr lang="de-DE" sz="1800" dirty="0"/>
+              <a:t> </a:t>
+            </a:r>
+            <a:r>
+              <a:rPr lang="de-DE" sz="1800" dirty="0" err="1"/>
+              <a:t>interviewee</a:t>
+            </a:r>
+            <a:r>
+              <a:rPr lang="de-DE" sz="1800" dirty="0"/>
+              <a:t> </a:t>
+            </a:r>
+            <a:r>
+              <a:rPr lang="de-DE" sz="1800" dirty="0" err="1"/>
+              <a:t>lived</a:t>
+            </a:r>
+            <a:r>
+              <a:rPr lang="de-DE" sz="1800" dirty="0"/>
+              <a:t> in </a:t>
+            </a:r>
+            <a:r>
+              <a:rPr lang="de-DE" sz="1800" dirty="0" err="1"/>
+              <a:t>youth</a:t>
+            </a:r>
+            <a:r>
+              <a:rPr lang="de-DE" sz="1800" dirty="0"/>
+              <a:t>“</a:t>
+            </a:r>
+          </a:p>
+          <a:p>
+            <a:pPr lvl="1"/>
+            <a:r>
+              <a:rPr lang="de-DE" sz="1800" dirty="0" err="1">
+                <a:sym typeface="Wingdings" panose="05000000000000000000" pitchFamily="2" charset="2"/>
+              </a:rPr>
+              <a:t>coded</a:t>
+            </a:r>
+            <a:r>
+              <a:rPr lang="de-DE" sz="1800" dirty="0">
+                <a:sym typeface="Wingdings" panose="05000000000000000000" pitchFamily="2" charset="2"/>
+              </a:rPr>
+              <a:t> </a:t>
+            </a:r>
+            <a:r>
+              <a:rPr lang="de-DE" sz="1800" dirty="0" err="1">
+                <a:sym typeface="Wingdings" panose="05000000000000000000" pitchFamily="2" charset="2"/>
+              </a:rPr>
+              <a:t>to</a:t>
+            </a:r>
+            <a:r>
+              <a:rPr lang="de-DE" sz="1800" dirty="0">
+                <a:sym typeface="Wingdings" panose="05000000000000000000" pitchFamily="2" charset="2"/>
+              </a:rPr>
+              <a:t> „Youth in East/West Germany“</a:t>
+            </a:r>
+            <a:endParaRPr lang="de-DE" sz="1800" dirty="0"/>
+          </a:p>
+          <a:p>
+            <a:r>
+              <a:rPr lang="de-DE" sz="2000" b="1" dirty="0" err="1"/>
+              <a:t>Predictor</a:t>
+            </a:r>
+            <a:r>
+              <a:rPr lang="de-DE" sz="2000" b="1" dirty="0"/>
+              <a:t> Variables</a:t>
+            </a:r>
+            <a:r>
+              <a:rPr lang="de-DE" sz="2000" dirty="0"/>
+              <a:t>:</a:t>
+            </a:r>
+          </a:p>
+          <a:p>
+            <a:pPr lvl="1"/>
+            <a:r>
+              <a:rPr lang="de-DE" sz="1800" dirty="0"/>
+              <a:t>121 variables </a:t>
+            </a:r>
+            <a:r>
+              <a:rPr lang="de-DE" sz="1800" dirty="0" err="1"/>
+              <a:t>concerning</a:t>
+            </a:r>
+            <a:r>
+              <a:rPr lang="de-DE" sz="1800" dirty="0"/>
+              <a:t> </a:t>
+            </a:r>
+            <a:r>
+              <a:rPr lang="de-DE" sz="1800" dirty="0" err="1"/>
+              <a:t>attitudes</a:t>
+            </a:r>
+            <a:r>
+              <a:rPr lang="de-DE" sz="1800" dirty="0"/>
+              <a:t>, </a:t>
+            </a:r>
+            <a:r>
+              <a:rPr lang="de-DE" sz="1800" dirty="0" err="1"/>
+              <a:t>behavior</a:t>
+            </a:r>
+            <a:r>
+              <a:rPr lang="de-DE" sz="1800" dirty="0"/>
+              <a:t> and social </a:t>
+            </a:r>
+            <a:r>
+              <a:rPr lang="de-DE" sz="1800" dirty="0" err="1"/>
+              <a:t>change</a:t>
+            </a:r>
+            <a:endParaRPr lang="de-DE" sz="1800" dirty="0"/>
+          </a:p>
+        </p:txBody>
+      </p:sp>
+    </p:spTree>
+    <p:extLst>
+      <p:ext uri="{BB962C8B-B14F-4D97-AF65-F5344CB8AC3E}">
+        <p14:creationId xmlns:p14="http://schemas.microsoft.com/office/powerpoint/2010/main" val="2732348097"/>
+      </p:ext>
+    </p:extLst>
+  </p:cSld>
+  <p:clrMapOvr>
+    <a:masterClrMapping/>
+  </p:clrMapOvr>
+</p:sld>
+</file>
+
+<file path=ppt/slides/slide21.xml><?xml version="1.0" encoding="utf-8"?>
+<p:sld xmlns:a="http://schemas.openxmlformats.org/drawingml/2006/main" xmlns:r="http://schemas.openxmlformats.org/officeDocument/2006/relationships" xmlns:p="http://schemas.openxmlformats.org/presentationml/2006/main">
+  <p:cSld>
+    <p:spTree>
+      <p:nvGrpSpPr>
+        <p:cNvPr id="1" name=""/>
+        <p:cNvGrpSpPr/>
+        <p:nvPr/>
+      </p:nvGrpSpPr>
+      <p:grpSpPr>
+        <a:xfrm>
+          <a:off x="0" y="0"/>
+          <a:ext cx="0" cy="0"/>
+          <a:chOff x="0" y="0"/>
+          <a:chExt cx="0" cy="0"/>
+        </a:xfrm>
+      </p:grpSpPr>
+      <p:sp>
+        <p:nvSpPr>
+          <p:cNvPr id="2" name="Titel 1">
+            <a:extLst>
+              <a:ext uri="{FF2B5EF4-FFF2-40B4-BE49-F238E27FC236}">
+                <a16:creationId xmlns:a16="http://schemas.microsoft.com/office/drawing/2014/main" id="{9C274E31-D4F7-6C4A-D81C-1BC18A1044AE}"/>
+              </a:ext>
+            </a:extLst>
+          </p:cNvPr>
+          <p:cNvSpPr>
+            <a:spLocks noGrp="1"/>
+          </p:cNvSpPr>
+          <p:nvPr>
+            <p:ph type="title"/>
+          </p:nvPr>
+        </p:nvSpPr>
+        <p:spPr/>
+        <p:txBody>
+          <a:bodyPr/>
+          <a:lstStyle/>
+          <a:p>
+            <a:r>
+              <a:rPr lang="de-DE" dirty="0"/>
+              <a:t>Dataset: ALLBUS</a:t>
+            </a:r>
+          </a:p>
+        </p:txBody>
+      </p:sp>
+      <p:sp>
+        <p:nvSpPr>
+          <p:cNvPr id="3" name="Inhaltsplatzhalter 2">
+            <a:extLst>
+              <a:ext uri="{FF2B5EF4-FFF2-40B4-BE49-F238E27FC236}">
+                <a16:creationId xmlns:a16="http://schemas.microsoft.com/office/drawing/2014/main" id="{A6EE175B-F110-2231-4746-FB0A5137CFF3}"/>
+              </a:ext>
+            </a:extLst>
+          </p:cNvPr>
+          <p:cNvSpPr>
+            <a:spLocks noGrp="1"/>
+          </p:cNvSpPr>
+          <p:nvPr>
+            <p:ph idx="1"/>
+          </p:nvPr>
+        </p:nvSpPr>
+        <p:spPr>
+          <a:xfrm>
+            <a:off x="395536" y="1353344"/>
+            <a:ext cx="7344816" cy="3162622"/>
+          </a:xfrm>
+        </p:spPr>
+        <p:txBody>
+          <a:bodyPr/>
+          <a:lstStyle/>
+          <a:p>
+            <a:r>
               <a:rPr lang="de-DE" sz="2000" b="1" dirty="0"/>
               <a:t>Data </a:t>
             </a:r>
@@ -7234,7 +7416,7 @@
 </p:sld>
 </file>
 
-<file path=ppt/slides/slide21.xml><?xml version="1.0" encoding="utf-8"?>
+<file path=ppt/slides/slide22.xml><?xml version="1.0" encoding="utf-8"?>
 <p:sld xmlns:a="http://schemas.openxmlformats.org/drawingml/2006/main" xmlns:r="http://schemas.openxmlformats.org/officeDocument/2006/relationships" xmlns:p="http://schemas.openxmlformats.org/presentationml/2006/main">
   <p:cSld>
     <p:spTree>
@@ -7364,7 +7546,7 @@
 </p:sld>
 </file>
 
-<file path=ppt/slides/slide22.xml><?xml version="1.0" encoding="utf-8"?>
+<file path=ppt/slides/slide23.xml><?xml version="1.0" encoding="utf-8"?>
 <p:sld xmlns:a="http://schemas.openxmlformats.org/drawingml/2006/main" xmlns:r="http://schemas.openxmlformats.org/officeDocument/2006/relationships" xmlns:p="http://schemas.openxmlformats.org/presentationml/2006/main">
   <p:cSld>
     <p:spTree>
@@ -9302,13 +9484,33 @@
 <file path=ppt/tags/tag10.xml><?xml version="1.0" encoding="utf-8"?>
 <p:tagLst xmlns:a="http://schemas.openxmlformats.org/drawingml/2006/main" xmlns:r="http://schemas.openxmlformats.org/officeDocument/2006/relationships" xmlns:p="http://schemas.openxmlformats.org/presentationml/2006/main">
   <p:tag name="OUTPUTDPI" val="1200"/>
-  <p:tag name="ORIGINALHEIGHT" val="636,0887"/>
+  <p:tag name="ORIGINALHEIGHT" val="1946,522"/>
   <p:tag name="ORIGINALWIDTH" val="4256,844"/>
   <p:tag name="OUTPUTTYPE" val="PNG"/>
   <p:tag name="IGUANATEXVERSION" val="161"/>
-  <p:tag name="LATEXADDIN" val="\documentclass[20pt]{article}&#10;\usepackage{amsmath,amsfonts,amssymb,xcolor, mathtools}&#10;\pagestyle{empty}&#10;\usepackage[T1]{fontenc}&#10;\usepackage{fontspec}&#10;\setsansfont{Arial}&#10;\renewcommand\familydefault{\sfdefault}&#10;\begin{document}&#10;\begin{itemize}&#10;\item new Lagrangian to solve\vspace{0.2cm}\newline&#10;$\mathcal{L}(\beta,\beta_0,\alpha,\varepsilon,\lambda)=\frac{1}{2}\beta\cdot \beta + C \sum_{i=1}^{n}\varepsilon_i-\underbrace{\sum \alpha_i[y_i(\beta \cdot \overline{x_i}+\beta_0)-1+\varepsilon_i]}_{\text{ensures }y_i(\beta \cdot \overline{x}_i-\beta_0)&gt;1- \varepsilon_i}-\underbrace{\sum \lambda_i \varepsilon_i }_{\substack{\text{ensures}\\ \varepsilon_i \ge 0}}$&#10;&#10;\end{itemize}&#10;\end{document}"/>
+  <p:tag name="LATEXADDIN" val="\documentclass[20pt]{article}&#10;\usepackage{amsmath,amsfonts,amssymb,xcolor, mathtools}&#10;\pagestyle{empty}&#10;\usepackage[T1]{fontenc}&#10;\usepackage{fontspec}&#10;\setsansfont{Arial}&#10;\renewcommand\familydefault{\sfdefault}&#10;\begin{document}&#10;\begin{itemize}&#10;\item new Lagrangian to solve\vspace{0.2cm}\newline&#10;$\mathcal{L}(\beta,\beta_0,\alpha,\varepsilon,\lambda)=\frac{1}{2}\beta\cdot \beta + C \sum_{i=1}^{n}\varepsilon_i-\underbrace{\sum \alpha_i[y_i(\beta \cdot \overline{x_i}+\beta_0)-1+\varepsilon_i]}_{\text{ensures }y_i(\beta \cdot \overline{x}_i-\beta_0)&gt;1- \varepsilon_i}-\underbrace{\sum \lambda_i \varepsilon_i }_{\substack{\text{ensures}\\ \varepsilon_i \ge 0}}$&#10;\item derive with respect to $\beta$  and set to zero\newline&#10;$\frac{\partial \mathcal{L}}{\partial \beta}=\beta-\sum \alpha_i y_i \overline{x_i}\overset{!}{=}0 \Rightarrow \beta=\sum \alpha_i y_i \overline{x_i} $&#10;\item derive with respect to $\beta_0$ and set to zero&#10;\newline $\frac{\partial \mathcal{L}}{\partial \beta_0}=\sum \alpha_i y_i \overline{x_i}\overset{!}{=}0$&#10;\item derive with respect to $\varepsilon_i$\newline&#10;$\frac{\partial \mathcal{L}}{\partial \varepsilon_i}=C-\alpha_i-\lambda_i\overset{!}{=}0\Leftrightarrow \lambda_i=C-\alpha_i$&#10;\end{itemize}&#10;\end{document}"/>
   <p:tag name="IGUANATEXSIZE" val="18"/>
-  <p:tag name="IGUANATEXCURSOR" val="479"/>
+  <p:tag name="IGUANATEXCURSOR" val="1215"/>
+  <p:tag name="TRANSPARENCY" val="Wahr"/>
+  <p:tag name="LATEXENGINEID" val="2"/>
+  <p:tag name="TEMPFOLDER" val="E:\Dokumente\temp\"/>
+  <p:tag name="LATEXFORMHEIGHT" val="320"/>
+  <p:tag name="LATEXFORMWIDTH" val="385"/>
+  <p:tag name="LATEXFORMWRAP" val="Wahr"/>
+  <p:tag name="BITMAPVECTOR" val="0"/>
+</p:tagLst>
+</file>
+
+<file path=ppt/tags/tag11.xml><?xml version="1.0" encoding="utf-8"?>
+<p:tagLst xmlns:a="http://schemas.openxmlformats.org/drawingml/2006/main" xmlns:r="http://schemas.openxmlformats.org/officeDocument/2006/relationships" xmlns:p="http://schemas.openxmlformats.org/presentationml/2006/main">
+  <p:tag name="OUTPUTDPI" val="1200"/>
+  <p:tag name="ORIGINALHEIGHT" val="1627,727"/>
+  <p:tag name="ORIGINALWIDTH" val="4083,57"/>
+  <p:tag name="OUTPUTTYPE" val="PNG"/>
+  <p:tag name="IGUANATEXVERSION" val="161"/>
+  <p:tag name="LATEXADDIN" val="\documentclass[20pt]{article}&#10;\usepackage{amsmath,amsfonts,amssymb,xcolor, mathtools}&#10;\pagestyle{empty}&#10;\usepackage[T1]{fontenc}&#10;\usepackage{fontspec}&#10;\setsansfont{Arial}&#10;\renewcommand\familydefault{\sfdefault}&#10;\begin{document}&#10;\begin{itemize}&#10;\item imputing the solutions in the original lagrangian and rearranging yields again \newline&#10;$$min(\mathcal{L})=-\frac{1}{2}\sum \sum \alpha_i \alpha_j y_i y_j \overline{x}_i \cdot \overline{x}_j+\sum \alpha_i$$ &#10;but under constraint $0\le \alpha_i \le C$&#10;\item can again be efficiently solved through quadratic programming optimization&#10;\item the decision function works the same way as with the hard margin classifier&#10;\end{itemize}&#10;\end{document}"/>
+  <p:tag name="IGUANATEXSIZE" val="18"/>
+  <p:tag name="IGUANATEXCURSOR" val="663"/>
   <p:tag name="TRANSPARENCY" val="Wahr"/>
   <p:tag name="LATEXENGINEID" val="2"/>
   <p:tag name="TEMPFOLDER" val="E:\Dokumente\temp\"/>

</xml_diff>

<commit_message>
pros and cons + first hypothesis
</commit_message>
<xml_diff>
--- a/Präsentation/Support Vector Machines.pptx
+++ b/Präsentation/Support Vector Machines.pptx
@@ -5,35 +5,33 @@
     <p:sldMasterId id="2147483648" r:id="rId1"/>
   </p:sldMasterIdLst>
   <p:notesMasterIdLst>
-    <p:notesMasterId r:id="rId28"/>
+    <p:notesMasterId r:id="rId26"/>
   </p:notesMasterIdLst>
   <p:sldIdLst>
     <p:sldId id="256" r:id="rId2"/>
     <p:sldId id="257" r:id="rId3"/>
     <p:sldId id="258" r:id="rId4"/>
     <p:sldId id="259" r:id="rId5"/>
-    <p:sldId id="260" r:id="rId6"/>
-    <p:sldId id="268" r:id="rId7"/>
-    <p:sldId id="269" r:id="rId8"/>
-    <p:sldId id="270" r:id="rId9"/>
-    <p:sldId id="271" r:id="rId10"/>
-    <p:sldId id="273" r:id="rId11"/>
-    <p:sldId id="274" r:id="rId12"/>
-    <p:sldId id="275" r:id="rId13"/>
-    <p:sldId id="276" r:id="rId14"/>
-    <p:sldId id="277" r:id="rId15"/>
-    <p:sldId id="278" r:id="rId16"/>
-    <p:sldId id="279" r:id="rId17"/>
-    <p:sldId id="280" r:id="rId18"/>
-    <p:sldId id="281" r:id="rId19"/>
-    <p:sldId id="282" r:id="rId20"/>
-    <p:sldId id="264" r:id="rId21"/>
-    <p:sldId id="265" r:id="rId22"/>
-    <p:sldId id="266" r:id="rId23"/>
-    <p:sldId id="261" r:id="rId24"/>
-    <p:sldId id="267" r:id="rId25"/>
-    <p:sldId id="262" r:id="rId26"/>
-    <p:sldId id="263" r:id="rId27"/>
+    <p:sldId id="268" r:id="rId6"/>
+    <p:sldId id="269" r:id="rId7"/>
+    <p:sldId id="270" r:id="rId8"/>
+    <p:sldId id="271" r:id="rId9"/>
+    <p:sldId id="273" r:id="rId10"/>
+    <p:sldId id="274" r:id="rId11"/>
+    <p:sldId id="275" r:id="rId12"/>
+    <p:sldId id="276" r:id="rId13"/>
+    <p:sldId id="277" r:id="rId14"/>
+    <p:sldId id="278" r:id="rId15"/>
+    <p:sldId id="279" r:id="rId16"/>
+    <p:sldId id="280" r:id="rId17"/>
+    <p:sldId id="281" r:id="rId18"/>
+    <p:sldId id="282" r:id="rId19"/>
+    <p:sldId id="265" r:id="rId20"/>
+    <p:sldId id="283" r:id="rId21"/>
+    <p:sldId id="261" r:id="rId22"/>
+    <p:sldId id="267" r:id="rId23"/>
+    <p:sldId id="262" r:id="rId24"/>
+    <p:sldId id="263" r:id="rId25"/>
   </p:sldIdLst>
   <p:sldSz cx="9144000" cy="5143500" type="screen16x9"/>
   <p:notesSz cx="6797675" cy="9926638"/>
@@ -173,7 +171,7 @@
 <file path=ppt/revisionInfo.xml><?xml version="1.0" encoding="utf-8"?>
 <p1510:revInfo xmlns:a="http://schemas.openxmlformats.org/drawingml/2006/main" xmlns:r="http://schemas.openxmlformats.org/officeDocument/2006/relationships" xmlns:p1510="http://schemas.microsoft.com/office/powerpoint/2015/10/main">
   <p1510:revLst>
-    <p1510:client id="{AB1E0CFC-1C57-4A1E-92D1-DAC8DD9182A6}" v="2557" dt="2024-07-01T14:16:21.863"/>
+    <p1510:client id="{AB1E0CFC-1C57-4A1E-92D1-DAC8DD9182A6}" v="3852" dt="2024-07-01T19:43:26.677"/>
   </p1510:revLst>
 </p1510:revInfo>
 </file>
@@ -183,12 +181,12 @@
   <pc:docChgLst>
     <pc:chgData name="Franz Andersch" userId="88b46490-1a31-494c-af6b-e252cc2a642d" providerId="ADAL" clId="{AB1E0CFC-1C57-4A1E-92D1-DAC8DD9182A6}"/>
     <pc:docChg chg="undo redo custSel addSld delSld modSld sldOrd">
-      <pc:chgData name="Franz Andersch" userId="88b46490-1a31-494c-af6b-e252cc2a642d" providerId="ADAL" clId="{AB1E0CFC-1C57-4A1E-92D1-DAC8DD9182A6}" dt="2024-07-01T14:16:21.863" v="4769" actId="20577"/>
+      <pc:chgData name="Franz Andersch" userId="88b46490-1a31-494c-af6b-e252cc2a642d" providerId="ADAL" clId="{AB1E0CFC-1C57-4A1E-92D1-DAC8DD9182A6}" dt="2024-07-01T19:43:26.677" v="5775" actId="962"/>
       <pc:docMkLst>
         <pc:docMk/>
       </pc:docMkLst>
-      <pc:sldChg chg="modSp mod">
-        <pc:chgData name="Franz Andersch" userId="88b46490-1a31-494c-af6b-e252cc2a642d" providerId="ADAL" clId="{AB1E0CFC-1C57-4A1E-92D1-DAC8DD9182A6}" dt="2024-06-27T18:48:13.389" v="2836" actId="1076"/>
+      <pc:sldChg chg="modSp del mod">
+        <pc:chgData name="Franz Andersch" userId="88b46490-1a31-494c-af6b-e252cc2a642d" providerId="ADAL" clId="{AB1E0CFC-1C57-4A1E-92D1-DAC8DD9182A6}" dt="2024-07-01T14:43:20.223" v="4771" actId="2696"/>
         <pc:sldMkLst>
           <pc:docMk/>
           <pc:sldMk cId="3748176770" sldId="260"/>
@@ -202,8 +200,22 @@
           </ac:spMkLst>
         </pc:spChg>
       </pc:sldChg>
-      <pc:sldChg chg="modSp mod">
-        <pc:chgData name="Franz Andersch" userId="88b46490-1a31-494c-af6b-e252cc2a642d" providerId="ADAL" clId="{AB1E0CFC-1C57-4A1E-92D1-DAC8DD9182A6}" dt="2024-07-01T14:16:21.863" v="4769" actId="20577"/>
+      <pc:sldChg chg="mod modShow">
+        <pc:chgData name="Franz Andersch" userId="88b46490-1a31-494c-af6b-e252cc2a642d" providerId="ADAL" clId="{AB1E0CFC-1C57-4A1E-92D1-DAC8DD9182A6}" dt="2024-07-01T19:43:09.163" v="5745" actId="729"/>
+        <pc:sldMkLst>
+          <pc:docMk/>
+          <pc:sldMk cId="1886016345" sldId="262"/>
+        </pc:sldMkLst>
+      </pc:sldChg>
+      <pc:sldChg chg="del">
+        <pc:chgData name="Franz Andersch" userId="88b46490-1a31-494c-af6b-e252cc2a642d" providerId="ADAL" clId="{AB1E0CFC-1C57-4A1E-92D1-DAC8DD9182A6}" dt="2024-07-01T14:43:13.349" v="4770" actId="2696"/>
+        <pc:sldMkLst>
+          <pc:docMk/>
+          <pc:sldMk cId="695573505" sldId="264"/>
+        </pc:sldMkLst>
+      </pc:sldChg>
+      <pc:sldChg chg="delSp modSp mod">
+        <pc:chgData name="Franz Andersch" userId="88b46490-1a31-494c-af6b-e252cc2a642d" providerId="ADAL" clId="{AB1E0CFC-1C57-4A1E-92D1-DAC8DD9182A6}" dt="2024-07-01T19:43:26.677" v="5775" actId="962"/>
         <pc:sldMkLst>
           <pc:docMk/>
           <pc:sldMk cId="2939723199" sldId="265"/>
@@ -216,9 +228,168 @@
             <ac:spMk id="2" creationId="{388F7BA3-B785-BDE2-BAC6-74C1F53E9285}"/>
           </ac:spMkLst>
         </pc:spChg>
+        <pc:spChg chg="del mod">
+          <ac:chgData name="Franz Andersch" userId="88b46490-1a31-494c-af6b-e252cc2a642d" providerId="ADAL" clId="{AB1E0CFC-1C57-4A1E-92D1-DAC8DD9182A6}" dt="2024-07-01T16:16:47.867" v="5117" actId="478"/>
+          <ac:spMkLst>
+            <pc:docMk/>
+            <pc:sldMk cId="2939723199" sldId="265"/>
+            <ac:spMk id="3" creationId="{B6EBCD5F-A998-E34B-B609-7A4D246D72F7}"/>
+          </ac:spMkLst>
+        </pc:spChg>
+        <pc:picChg chg="del mod replST">
+          <ac:chgData name="Franz Andersch" userId="88b46490-1a31-494c-af6b-e252cc2a642d" providerId="ADAL" clId="{AB1E0CFC-1C57-4A1E-92D1-DAC8DD9182A6}" dt="2024-07-01T16:17:25.155" v="5145" actId="478"/>
+          <ac:picMkLst>
+            <pc:docMk/>
+            <pc:sldMk cId="2939723199" sldId="265"/>
+            <ac:picMk id="5" creationId="{745CB85D-C917-6D4C-3B04-984334A58939}"/>
+          </ac:picMkLst>
+        </pc:picChg>
+        <pc:picChg chg="del mod ord replST">
+          <ac:chgData name="Franz Andersch" userId="88b46490-1a31-494c-af6b-e252cc2a642d" providerId="ADAL" clId="{AB1E0CFC-1C57-4A1E-92D1-DAC8DD9182A6}" dt="2024-07-01T16:17:48.462" v="5175" actId="478"/>
+          <ac:picMkLst>
+            <pc:docMk/>
+            <pc:sldMk cId="2939723199" sldId="265"/>
+            <ac:picMk id="7" creationId="{C0A00ADB-015B-9C2E-9BEE-D5E23B0B6D90}"/>
+          </ac:picMkLst>
+        </pc:picChg>
+        <pc:picChg chg="del mod ord replST">
+          <ac:chgData name="Franz Andersch" userId="88b46490-1a31-494c-af6b-e252cc2a642d" providerId="ADAL" clId="{AB1E0CFC-1C57-4A1E-92D1-DAC8DD9182A6}" dt="2024-07-01T16:18:10.472" v="5205" actId="478"/>
+          <ac:picMkLst>
+            <pc:docMk/>
+            <pc:sldMk cId="2939723199" sldId="265"/>
+            <ac:picMk id="9" creationId="{4BE63213-DF95-8A8A-551F-9DEA3252DC34}"/>
+          </ac:picMkLst>
+        </pc:picChg>
+        <pc:picChg chg="del mod ord replST">
+          <ac:chgData name="Franz Andersch" userId="88b46490-1a31-494c-af6b-e252cc2a642d" providerId="ADAL" clId="{AB1E0CFC-1C57-4A1E-92D1-DAC8DD9182A6}" dt="2024-07-01T16:18:24.256" v="5235" actId="478"/>
+          <ac:picMkLst>
+            <pc:docMk/>
+            <pc:sldMk cId="2939723199" sldId="265"/>
+            <ac:picMk id="11" creationId="{66A07202-3EC4-70CF-2678-64B12DE9A07A}"/>
+          </ac:picMkLst>
+        </pc:picChg>
+        <pc:picChg chg="del mod ord replST">
+          <ac:chgData name="Franz Andersch" userId="88b46490-1a31-494c-af6b-e252cc2a642d" providerId="ADAL" clId="{AB1E0CFC-1C57-4A1E-92D1-DAC8DD9182A6}" dt="2024-07-01T16:39:54.176" v="5267" actId="478"/>
+          <ac:picMkLst>
+            <pc:docMk/>
+            <pc:sldMk cId="2939723199" sldId="265"/>
+            <ac:picMk id="13" creationId="{D80EB926-386B-BA27-28ED-DA1C4563D5D7}"/>
+          </ac:picMkLst>
+        </pc:picChg>
+        <pc:picChg chg="del mod ord replST">
+          <ac:chgData name="Franz Andersch" userId="88b46490-1a31-494c-af6b-e252cc2a642d" providerId="ADAL" clId="{AB1E0CFC-1C57-4A1E-92D1-DAC8DD9182A6}" dt="2024-07-01T16:42:21.860" v="5297" actId="478"/>
+          <ac:picMkLst>
+            <pc:docMk/>
+            <pc:sldMk cId="2939723199" sldId="265"/>
+            <ac:picMk id="15" creationId="{5FE2B4EE-DAEB-6E02-DE9C-1FC419F01F38}"/>
+          </ac:picMkLst>
+        </pc:picChg>
+        <pc:picChg chg="del mod ord replST">
+          <ac:chgData name="Franz Andersch" userId="88b46490-1a31-494c-af6b-e252cc2a642d" providerId="ADAL" clId="{AB1E0CFC-1C57-4A1E-92D1-DAC8DD9182A6}" dt="2024-07-01T16:50:44.745" v="5327" actId="478"/>
+          <ac:picMkLst>
+            <pc:docMk/>
+            <pc:sldMk cId="2939723199" sldId="265"/>
+            <ac:picMk id="17" creationId="{4A1DB441-8502-E35C-740F-98F141289B96}"/>
+          </ac:picMkLst>
+        </pc:picChg>
+        <pc:picChg chg="del mod ord replST">
+          <ac:chgData name="Franz Andersch" userId="88b46490-1a31-494c-af6b-e252cc2a642d" providerId="ADAL" clId="{AB1E0CFC-1C57-4A1E-92D1-DAC8DD9182A6}" dt="2024-07-01T16:50:57.463" v="5357" actId="478"/>
+          <ac:picMkLst>
+            <pc:docMk/>
+            <pc:sldMk cId="2939723199" sldId="265"/>
+            <ac:picMk id="19" creationId="{E569FCD4-9C72-851A-634C-BBD2BB5FAF0E}"/>
+          </ac:picMkLst>
+        </pc:picChg>
+        <pc:picChg chg="del mod ord replST">
+          <ac:chgData name="Franz Andersch" userId="88b46490-1a31-494c-af6b-e252cc2a642d" providerId="ADAL" clId="{AB1E0CFC-1C57-4A1E-92D1-DAC8DD9182A6}" dt="2024-07-01T16:51:10.184" v="5387" actId="478"/>
+          <ac:picMkLst>
+            <pc:docMk/>
+            <pc:sldMk cId="2939723199" sldId="265"/>
+            <ac:picMk id="21" creationId="{243508CB-CAFB-8F80-FA38-31400417EB8D}"/>
+          </ac:picMkLst>
+        </pc:picChg>
+        <pc:picChg chg="del mod ord replST">
+          <ac:chgData name="Franz Andersch" userId="88b46490-1a31-494c-af6b-e252cc2a642d" providerId="ADAL" clId="{AB1E0CFC-1C57-4A1E-92D1-DAC8DD9182A6}" dt="2024-07-01T16:51:36.887" v="5417" actId="478"/>
+          <ac:picMkLst>
+            <pc:docMk/>
+            <pc:sldMk cId="2939723199" sldId="265"/>
+            <ac:picMk id="23" creationId="{593702AE-E79F-6889-23F8-724647015E56}"/>
+          </ac:picMkLst>
+        </pc:picChg>
+        <pc:picChg chg="del mod ord replST">
+          <ac:chgData name="Franz Andersch" userId="88b46490-1a31-494c-af6b-e252cc2a642d" providerId="ADAL" clId="{AB1E0CFC-1C57-4A1E-92D1-DAC8DD9182A6}" dt="2024-07-01T16:51:52.522" v="5447" actId="478"/>
+          <ac:picMkLst>
+            <pc:docMk/>
+            <pc:sldMk cId="2939723199" sldId="265"/>
+            <ac:picMk id="25" creationId="{6DC7E3A2-2E00-80FC-9090-C05A2D137B19}"/>
+          </ac:picMkLst>
+        </pc:picChg>
+        <pc:picChg chg="del mod ord replST">
+          <ac:chgData name="Franz Andersch" userId="88b46490-1a31-494c-af6b-e252cc2a642d" providerId="ADAL" clId="{AB1E0CFC-1C57-4A1E-92D1-DAC8DD9182A6}" dt="2024-07-01T16:52:01.364" v="5477" actId="478"/>
+          <ac:picMkLst>
+            <pc:docMk/>
+            <pc:sldMk cId="2939723199" sldId="265"/>
+            <ac:picMk id="27" creationId="{A245772F-315C-AA9A-1BE5-DC487DADBBFE}"/>
+          </ac:picMkLst>
+        </pc:picChg>
+        <pc:picChg chg="del mod ord replST">
+          <ac:chgData name="Franz Andersch" userId="88b46490-1a31-494c-af6b-e252cc2a642d" providerId="ADAL" clId="{AB1E0CFC-1C57-4A1E-92D1-DAC8DD9182A6}" dt="2024-07-01T16:55:50.766" v="5507" actId="478"/>
+          <ac:picMkLst>
+            <pc:docMk/>
+            <pc:sldMk cId="2939723199" sldId="265"/>
+            <ac:picMk id="29" creationId="{36123940-E6A2-D571-CE28-46034863B853}"/>
+          </ac:picMkLst>
+        </pc:picChg>
+        <pc:picChg chg="del mod ord replST">
+          <ac:chgData name="Franz Andersch" userId="88b46490-1a31-494c-af6b-e252cc2a642d" providerId="ADAL" clId="{AB1E0CFC-1C57-4A1E-92D1-DAC8DD9182A6}" dt="2024-07-01T16:58:22.523" v="5537" actId="478"/>
+          <ac:picMkLst>
+            <pc:docMk/>
+            <pc:sldMk cId="2939723199" sldId="265"/>
+            <ac:picMk id="31" creationId="{1CE366D4-E9BE-0874-4E2D-488024EBC987}"/>
+          </ac:picMkLst>
+        </pc:picChg>
+        <pc:picChg chg="del mod ord replST">
+          <ac:chgData name="Franz Andersch" userId="88b46490-1a31-494c-af6b-e252cc2a642d" providerId="ADAL" clId="{AB1E0CFC-1C57-4A1E-92D1-DAC8DD9182A6}" dt="2024-07-01T19:32:02.642" v="5618" actId="478"/>
+          <ac:picMkLst>
+            <pc:docMk/>
+            <pc:sldMk cId="2939723199" sldId="265"/>
+            <ac:picMk id="33" creationId="{B0A3D373-9581-04FA-10D9-32D18A8F3DF2}"/>
+          </ac:picMkLst>
+        </pc:picChg>
+        <pc:picChg chg="del mod ord replST">
+          <ac:chgData name="Franz Andersch" userId="88b46490-1a31-494c-af6b-e252cc2a642d" providerId="ADAL" clId="{AB1E0CFC-1C57-4A1E-92D1-DAC8DD9182A6}" dt="2024-07-01T19:38:00.479" v="5678" actId="478"/>
+          <ac:picMkLst>
+            <pc:docMk/>
+            <pc:sldMk cId="2939723199" sldId="265"/>
+            <ac:picMk id="35" creationId="{BF1A2107-CDE6-C59F-F934-362F917D0F3D}"/>
+          </ac:picMkLst>
+        </pc:picChg>
+        <pc:picChg chg="del mod ord replST">
+          <ac:chgData name="Franz Andersch" userId="88b46490-1a31-494c-af6b-e252cc2a642d" providerId="ADAL" clId="{AB1E0CFC-1C57-4A1E-92D1-DAC8DD9182A6}" dt="2024-07-01T19:43:26.676" v="5773" actId="478"/>
+          <ac:picMkLst>
+            <pc:docMk/>
+            <pc:sldMk cId="2939723199" sldId="265"/>
+            <ac:picMk id="37" creationId="{9DE8B969-6EFD-7E22-3A82-71C6F3AF64B2}"/>
+          </ac:picMkLst>
+        </pc:picChg>
+        <pc:picChg chg="mod ord replST">
+          <ac:chgData name="Franz Andersch" userId="88b46490-1a31-494c-af6b-e252cc2a642d" providerId="ADAL" clId="{AB1E0CFC-1C57-4A1E-92D1-DAC8DD9182A6}" dt="2024-07-01T19:43:26.677" v="5775" actId="962"/>
+          <ac:picMkLst>
+            <pc:docMk/>
+            <pc:sldMk cId="2939723199" sldId="265"/>
+            <ac:picMk id="39" creationId="{D77E97AA-FE7A-E96E-1BFF-96304AC5176D}"/>
+          </ac:picMkLst>
+        </pc:picChg>
+      </pc:sldChg>
+      <pc:sldChg chg="del">
+        <pc:chgData name="Franz Andersch" userId="88b46490-1a31-494c-af6b-e252cc2a642d" providerId="ADAL" clId="{AB1E0CFC-1C57-4A1E-92D1-DAC8DD9182A6}" dt="2024-07-01T16:20:45.266" v="5239" actId="2696"/>
+        <pc:sldMkLst>
+          <pc:docMk/>
+          <pc:sldMk cId="3746182716" sldId="266"/>
+        </pc:sldMkLst>
       </pc:sldChg>
       <pc:sldChg chg="addSp delSp modSp add mod">
-        <pc:chgData name="Franz Andersch" userId="88b46490-1a31-494c-af6b-e252cc2a642d" providerId="ADAL" clId="{AB1E0CFC-1C57-4A1E-92D1-DAC8DD9182A6}" dt="2024-06-28T07:01:33.204" v="2868" actId="1076"/>
+        <pc:chgData name="Franz Andersch" userId="88b46490-1a31-494c-af6b-e252cc2a642d" providerId="ADAL" clId="{AB1E0CFC-1C57-4A1E-92D1-DAC8DD9182A6}" dt="2024-07-01T15:19:06.866" v="5028" actId="962"/>
         <pc:sldMkLst>
           <pc:docMk/>
           <pc:sldMk cId="1770530705" sldId="268"/>
@@ -255,14 +426,22 @@
             <ac:graphicFrameMk id="23" creationId="{837D24E5-423D-FEBD-6ADF-C50B8EBF4DD6}"/>
           </ac:graphicFrameMkLst>
         </pc:graphicFrameChg>
-        <pc:picChg chg="add mod">
-          <ac:chgData name="Franz Andersch" userId="88b46490-1a31-494c-af6b-e252cc2a642d" providerId="ADAL" clId="{AB1E0CFC-1C57-4A1E-92D1-DAC8DD9182A6}" dt="2024-06-28T07:01:33.204" v="2868" actId="1076"/>
+        <pc:picChg chg="add del mod">
+          <ac:chgData name="Franz Andersch" userId="88b46490-1a31-494c-af6b-e252cc2a642d" providerId="ADAL" clId="{AB1E0CFC-1C57-4A1E-92D1-DAC8DD9182A6}" dt="2024-07-01T15:12:32.798" v="4833" actId="478"/>
           <ac:picMkLst>
             <pc:docMk/>
             <pc:sldMk cId="1770530705" sldId="268"/>
             <ac:picMk id="4" creationId="{46ACD664-B35B-1FDD-FFED-70FE77B7A530}"/>
           </ac:picMkLst>
         </pc:picChg>
+        <pc:picChg chg="add mod">
+          <ac:chgData name="Franz Andersch" userId="88b46490-1a31-494c-af6b-e252cc2a642d" providerId="ADAL" clId="{AB1E0CFC-1C57-4A1E-92D1-DAC8DD9182A6}" dt="2024-07-01T15:12:58.886" v="4841" actId="1076"/>
+          <ac:picMkLst>
+            <pc:docMk/>
+            <pc:sldMk cId="1770530705" sldId="268"/>
+            <ac:picMk id="5" creationId="{2FF4439B-4933-2A0A-9836-8FAFBD29F270}"/>
+          </ac:picMkLst>
+        </pc:picChg>
         <pc:picChg chg="del mod ord replST">
           <ac:chgData name="Franz Andersch" userId="88b46490-1a31-494c-af6b-e252cc2a642d" providerId="ADAL" clId="{AB1E0CFC-1C57-4A1E-92D1-DAC8DD9182A6}" dt="2024-06-26T20:35:29.220" v="620" actId="478"/>
           <ac:picMkLst>
@@ -287,6 +466,14 @@
             <ac:picMk id="7" creationId="{743894CD-D354-D946-F35F-94961A3044E9}"/>
           </ac:picMkLst>
         </pc:picChg>
+        <pc:picChg chg="mod ord replST">
+          <ac:chgData name="Franz Andersch" userId="88b46490-1a31-494c-af6b-e252cc2a642d" providerId="ADAL" clId="{AB1E0CFC-1C57-4A1E-92D1-DAC8DD9182A6}" dt="2024-07-01T15:19:06.866" v="5028" actId="962"/>
+          <ac:picMkLst>
+            <pc:docMk/>
+            <pc:sldMk cId="1770530705" sldId="268"/>
+            <ac:picMk id="7" creationId="{D8E488CC-6A22-58C4-4AEE-4B7530968487}"/>
+          </ac:picMkLst>
+        </pc:picChg>
         <pc:picChg chg="del mod replST">
           <ac:chgData name="Franz Andersch" userId="88b46490-1a31-494c-af6b-e252cc2a642d" providerId="ADAL" clId="{AB1E0CFC-1C57-4A1E-92D1-DAC8DD9182A6}" dt="2024-06-26T16:32:16.571" v="410" actId="478"/>
           <ac:picMkLst>
@@ -391,8 +578,8 @@
             <ac:picMk id="20" creationId="{89897EE8-0500-10FF-5D10-F7FDFA1BC659}"/>
           </ac:picMkLst>
         </pc:picChg>
-        <pc:picChg chg="mod ord replST">
-          <ac:chgData name="Franz Andersch" userId="88b46490-1a31-494c-af6b-e252cc2a642d" providerId="ADAL" clId="{AB1E0CFC-1C57-4A1E-92D1-DAC8DD9182A6}" dt="2024-06-26T20:57:30.064" v="836" actId="962"/>
+        <pc:picChg chg="del mod ord replST">
+          <ac:chgData name="Franz Andersch" userId="88b46490-1a31-494c-af6b-e252cc2a642d" providerId="ADAL" clId="{AB1E0CFC-1C57-4A1E-92D1-DAC8DD9182A6}" dt="2024-07-01T15:19:06.865" v="5026" actId="478"/>
           <ac:picMkLst>
             <pc:docMk/>
             <pc:sldMk cId="1770530705" sldId="268"/>
@@ -417,7 +604,7 @@
         </pc:picChg>
       </pc:sldChg>
       <pc:sldChg chg="addSp delSp modSp add mod">
-        <pc:chgData name="Franz Andersch" userId="88b46490-1a31-494c-af6b-e252cc2a642d" providerId="ADAL" clId="{AB1E0CFC-1C57-4A1E-92D1-DAC8DD9182A6}" dt="2024-06-28T07:02:33.242" v="2880" actId="14100"/>
+        <pc:chgData name="Franz Andersch" userId="88b46490-1a31-494c-af6b-e252cc2a642d" providerId="ADAL" clId="{AB1E0CFC-1C57-4A1E-92D1-DAC8DD9182A6}" dt="2024-07-01T15:19:54.449" v="5059" actId="962"/>
         <pc:sldMkLst>
           <pc:docMk/>
           <pc:sldMk cId="3990756690" sldId="269"/>
@@ -438,14 +625,22 @@
             <ac:picMk id="4" creationId="{3E8FA5A0-2B34-E857-4D07-AF8029BFA920}"/>
           </ac:picMkLst>
         </pc:picChg>
-        <pc:picChg chg="add mod">
-          <ac:chgData name="Franz Andersch" userId="88b46490-1a31-494c-af6b-e252cc2a642d" providerId="ADAL" clId="{AB1E0CFC-1C57-4A1E-92D1-DAC8DD9182A6}" dt="2024-06-28T07:02:33.242" v="2880" actId="14100"/>
+        <pc:picChg chg="add del mod">
+          <ac:chgData name="Franz Andersch" userId="88b46490-1a31-494c-af6b-e252cc2a642d" providerId="ADAL" clId="{AB1E0CFC-1C57-4A1E-92D1-DAC8DD9182A6}" dt="2024-07-01T15:13:02.868" v="4842" actId="478"/>
           <ac:picMkLst>
             <pc:docMk/>
             <pc:sldMk cId="3990756690" sldId="269"/>
             <ac:picMk id="4" creationId="{B2C0436D-5BE1-74F9-9D50-6E433CE2DCCA}"/>
           </ac:picMkLst>
         </pc:picChg>
+        <pc:picChg chg="add mod">
+          <ac:chgData name="Franz Andersch" userId="88b46490-1a31-494c-af6b-e252cc2a642d" providerId="ADAL" clId="{AB1E0CFC-1C57-4A1E-92D1-DAC8DD9182A6}" dt="2024-07-01T15:13:18.430" v="4848" actId="1076"/>
+          <ac:picMkLst>
+            <pc:docMk/>
+            <pc:sldMk cId="3990756690" sldId="269"/>
+            <ac:picMk id="5" creationId="{402170D5-C41B-257C-79F6-AF4EE077D414}"/>
+          </ac:picMkLst>
+        </pc:picChg>
         <pc:picChg chg="del mod ord replST">
           <ac:chgData name="Franz Andersch" userId="88b46490-1a31-494c-af6b-e252cc2a642d" providerId="ADAL" clId="{AB1E0CFC-1C57-4A1E-92D1-DAC8DD9182A6}" dt="2024-06-26T22:17:12.996" v="1289" actId="478"/>
           <ac:picMkLst>
@@ -462,6 +657,14 @@
             <ac:picMk id="6" creationId="{5DA9B7EF-E1CA-0F8A-4E2D-31EADA93DE47}"/>
           </ac:picMkLst>
         </pc:picChg>
+        <pc:picChg chg="mod ord replST">
+          <ac:chgData name="Franz Andersch" userId="88b46490-1a31-494c-af6b-e252cc2a642d" providerId="ADAL" clId="{AB1E0CFC-1C57-4A1E-92D1-DAC8DD9182A6}" dt="2024-07-01T15:19:54.449" v="5059" actId="962"/>
+          <ac:picMkLst>
+            <pc:docMk/>
+            <pc:sldMk cId="3990756690" sldId="269"/>
+            <ac:picMk id="7" creationId="{E57472E7-B1A1-CDB6-DA3F-0FE93658CCF6}"/>
+          </ac:picMkLst>
+        </pc:picChg>
         <pc:picChg chg="del mod ord replST">
           <ac:chgData name="Franz Andersch" userId="88b46490-1a31-494c-af6b-e252cc2a642d" providerId="ADAL" clId="{AB1E0CFC-1C57-4A1E-92D1-DAC8DD9182A6}" dt="2024-06-26T21:19:43.365" v="976" actId="478"/>
           <ac:picMkLst>
@@ -502,8 +705,8 @@
             <ac:picMk id="12" creationId="{E17B3E6E-AB07-81D9-5ECE-4516A7A26B83}"/>
           </ac:picMkLst>
         </pc:picChg>
-        <pc:picChg chg="mod ord replST">
-          <ac:chgData name="Franz Andersch" userId="88b46490-1a31-494c-af6b-e252cc2a642d" providerId="ADAL" clId="{AB1E0CFC-1C57-4A1E-92D1-DAC8DD9182A6}" dt="2024-06-26T22:24:55.836" v="1330" actId="962"/>
+        <pc:picChg chg="del mod ord replST">
+          <ac:chgData name="Franz Andersch" userId="88b46490-1a31-494c-af6b-e252cc2a642d" providerId="ADAL" clId="{AB1E0CFC-1C57-4A1E-92D1-DAC8DD9182A6}" dt="2024-07-01T15:19:54.449" v="5057" actId="478"/>
           <ac:picMkLst>
             <pc:docMk/>
             <pc:sldMk cId="3990756690" sldId="269"/>
@@ -544,13 +747,13 @@
         </pc:picChg>
       </pc:sldChg>
       <pc:sldChg chg="addSp delSp modSp add mod">
-        <pc:chgData name="Franz Andersch" userId="88b46490-1a31-494c-af6b-e252cc2a642d" providerId="ADAL" clId="{AB1E0CFC-1C57-4A1E-92D1-DAC8DD9182A6}" dt="2024-06-29T10:21:21.276" v="4072" actId="14100"/>
+        <pc:chgData name="Franz Andersch" userId="88b46490-1a31-494c-af6b-e252cc2a642d" providerId="ADAL" clId="{AB1E0CFC-1C57-4A1E-92D1-DAC8DD9182A6}" dt="2024-07-01T15:15:42.956" v="4949" actId="962"/>
         <pc:sldMkLst>
           <pc:docMk/>
           <pc:sldMk cId="2902806685" sldId="270"/>
         </pc:sldMkLst>
-        <pc:picChg chg="add mod">
-          <ac:chgData name="Franz Andersch" userId="88b46490-1a31-494c-af6b-e252cc2a642d" providerId="ADAL" clId="{AB1E0CFC-1C57-4A1E-92D1-DAC8DD9182A6}" dt="2024-06-29T10:21:21.276" v="4072" actId="14100"/>
+        <pc:picChg chg="add del mod">
+          <ac:chgData name="Franz Andersch" userId="88b46490-1a31-494c-af6b-e252cc2a642d" providerId="ADAL" clId="{AB1E0CFC-1C57-4A1E-92D1-DAC8DD9182A6}" dt="2024-07-01T15:13:22.933" v="4849" actId="478"/>
           <ac:picMkLst>
             <pc:docMk/>
             <pc:sldMk cId="2902806685" sldId="270"/>
@@ -589,8 +792,16 @@
             <ac:picMk id="4" creationId="{F6935AFB-8A21-043A-0B64-A0DD5D619F6E}"/>
           </ac:picMkLst>
         </pc:picChg>
-        <pc:picChg chg="mod ord replST">
-          <ac:chgData name="Franz Andersch" userId="88b46490-1a31-494c-af6b-e252cc2a642d" providerId="ADAL" clId="{AB1E0CFC-1C57-4A1E-92D1-DAC8DD9182A6}" dt="2024-06-27T17:36:32.374" v="2397" actId="962"/>
+        <pc:picChg chg="add mod">
+          <ac:chgData name="Franz Andersch" userId="88b46490-1a31-494c-af6b-e252cc2a642d" providerId="ADAL" clId="{AB1E0CFC-1C57-4A1E-92D1-DAC8DD9182A6}" dt="2024-07-01T15:13:37.037" v="4856" actId="1076"/>
+          <ac:picMkLst>
+            <pc:docMk/>
+            <pc:sldMk cId="2902806685" sldId="270"/>
+            <ac:picMk id="5" creationId="{892AF73E-6A12-EA96-1923-B8D2A01FAE62}"/>
+          </ac:picMkLst>
+        </pc:picChg>
+        <pc:picChg chg="del mod ord replST">
+          <ac:chgData name="Franz Andersch" userId="88b46490-1a31-494c-af6b-e252cc2a642d" providerId="ADAL" clId="{AB1E0CFC-1C57-4A1E-92D1-DAC8DD9182A6}" dt="2024-07-01T15:13:59.479" v="4885" actId="478"/>
           <ac:picMkLst>
             <pc:docMk/>
             <pc:sldMk cId="2902806685" sldId="270"/>
@@ -629,6 +840,14 @@
             <ac:picMk id="8" creationId="{49020F9B-9C95-8638-AF48-3DD5DF3A6140}"/>
           </ac:picMkLst>
         </pc:picChg>
+        <pc:picChg chg="del mod ord replST">
+          <ac:chgData name="Franz Andersch" userId="88b46490-1a31-494c-af6b-e252cc2a642d" providerId="ADAL" clId="{AB1E0CFC-1C57-4A1E-92D1-DAC8DD9182A6}" dt="2024-07-01T15:15:13.749" v="4916" actId="478"/>
+          <ac:picMkLst>
+            <pc:docMk/>
+            <pc:sldMk cId="2902806685" sldId="270"/>
+            <ac:picMk id="8" creationId="{EF757DDA-6C87-80A9-2153-5E32FCCF31F3}"/>
+          </ac:picMkLst>
+        </pc:picChg>
         <pc:picChg chg="add del mod">
           <ac:chgData name="Franz Andersch" userId="88b46490-1a31-494c-af6b-e252cc2a642d" providerId="ADAL" clId="{AB1E0CFC-1C57-4A1E-92D1-DAC8DD9182A6}" dt="2024-06-28T06:57:03.470" v="2839" actId="478"/>
           <ac:picMkLst>
@@ -637,6 +856,22 @@
             <ac:picMk id="10" creationId="{61AB07FF-8D31-3186-850F-DC65A7D0D908}"/>
           </ac:picMkLst>
         </pc:picChg>
+        <pc:picChg chg="del mod ord replST">
+          <ac:chgData name="Franz Andersch" userId="88b46490-1a31-494c-af6b-e252cc2a642d" providerId="ADAL" clId="{AB1E0CFC-1C57-4A1E-92D1-DAC8DD9182A6}" dt="2024-07-01T15:15:42.955" v="4947" actId="478"/>
+          <ac:picMkLst>
+            <pc:docMk/>
+            <pc:sldMk cId="2902806685" sldId="270"/>
+            <ac:picMk id="10" creationId="{CC95B2A3-E04D-65A6-90C5-D3E7681EAD67}"/>
+          </ac:picMkLst>
+        </pc:picChg>
+        <pc:picChg chg="mod ord replST">
+          <ac:chgData name="Franz Andersch" userId="88b46490-1a31-494c-af6b-e252cc2a642d" providerId="ADAL" clId="{AB1E0CFC-1C57-4A1E-92D1-DAC8DD9182A6}" dt="2024-07-01T15:15:42.956" v="4949" actId="962"/>
+          <ac:picMkLst>
+            <pc:docMk/>
+            <pc:sldMk cId="2902806685" sldId="270"/>
+            <ac:picMk id="12" creationId="{411DB361-60EB-928A-EEE9-0DBE5521E3A5}"/>
+          </ac:picMkLst>
+        </pc:picChg>
         <pc:picChg chg="del mod">
           <ac:chgData name="Franz Andersch" userId="88b46490-1a31-494c-af6b-e252cc2a642d" providerId="ADAL" clId="{AB1E0CFC-1C57-4A1E-92D1-DAC8DD9182A6}" dt="2024-06-26T21:41:11.960" v="1097" actId="478"/>
           <ac:picMkLst>
@@ -647,7 +882,7 @@
         </pc:picChg>
       </pc:sldChg>
       <pc:sldChg chg="delSp modSp add mod">
-        <pc:chgData name="Franz Andersch" userId="88b46490-1a31-494c-af6b-e252cc2a642d" providerId="ADAL" clId="{AB1E0CFC-1C57-4A1E-92D1-DAC8DD9182A6}" dt="2024-06-28T10:51:38.438" v="3366" actId="1076"/>
+        <pc:chgData name="Franz Andersch" userId="88b46490-1a31-494c-af6b-e252cc2a642d" providerId="ADAL" clId="{AB1E0CFC-1C57-4A1E-92D1-DAC8DD9182A6}" dt="2024-07-01T14:47:41.243" v="4801" actId="962"/>
         <pc:sldMkLst>
           <pc:docMk/>
           <pc:sldMk cId="2843438534" sldId="271"/>
@@ -668,6 +903,14 @@
             <ac:picMk id="4" creationId="{728AC3AA-308A-EDE4-7AF9-8D77074AC095}"/>
           </ac:picMkLst>
         </pc:picChg>
+        <pc:picChg chg="mod ord replST">
+          <ac:chgData name="Franz Andersch" userId="88b46490-1a31-494c-af6b-e252cc2a642d" providerId="ADAL" clId="{AB1E0CFC-1C57-4A1E-92D1-DAC8DD9182A6}" dt="2024-07-01T14:47:41.243" v="4801" actId="962"/>
+          <ac:picMkLst>
+            <pc:docMk/>
+            <pc:sldMk cId="2843438534" sldId="271"/>
+            <ac:picMk id="4" creationId="{AFD01AFB-CF26-8A35-EC06-7A2BF9FB7DCC}"/>
+          </ac:picMkLst>
+        </pc:picChg>
         <pc:picChg chg="del mod ord replST">
           <ac:chgData name="Franz Andersch" userId="88b46490-1a31-494c-af6b-e252cc2a642d" providerId="ADAL" clId="{AB1E0CFC-1C57-4A1E-92D1-DAC8DD9182A6}" dt="2024-06-28T10:50:52.984" v="3333" actId="478"/>
           <ac:picMkLst>
@@ -716,8 +959,8 @@
             <ac:picMk id="7" creationId="{3D283D81-158B-6651-36CF-FA138E69BA83}"/>
           </ac:picMkLst>
         </pc:picChg>
-        <pc:picChg chg="mod ord replST">
-          <ac:chgData name="Franz Andersch" userId="88b46490-1a31-494c-af6b-e252cc2a642d" providerId="ADAL" clId="{AB1E0CFC-1C57-4A1E-92D1-DAC8DD9182A6}" dt="2024-06-28T10:51:38.438" v="3366" actId="1076"/>
+        <pc:picChg chg="del mod ord replST">
+          <ac:chgData name="Franz Andersch" userId="88b46490-1a31-494c-af6b-e252cc2a642d" providerId="ADAL" clId="{AB1E0CFC-1C57-4A1E-92D1-DAC8DD9182A6}" dt="2024-07-01T14:47:41.243" v="4799" actId="478"/>
           <ac:picMkLst>
             <pc:docMk/>
             <pc:sldMk cId="2843438534" sldId="271"/>
@@ -813,7 +1056,7 @@
         </pc:picChg>
       </pc:sldChg>
       <pc:sldChg chg="delSp modSp add mod ord">
-        <pc:chgData name="Franz Andersch" userId="88b46490-1a31-494c-af6b-e252cc2a642d" providerId="ADAL" clId="{AB1E0CFC-1C57-4A1E-92D1-DAC8DD9182A6}" dt="2024-06-27T17:50:23.303" v="2624" actId="962"/>
+        <pc:chgData name="Franz Andersch" userId="88b46490-1a31-494c-af6b-e252cc2a642d" providerId="ADAL" clId="{AB1E0CFC-1C57-4A1E-92D1-DAC8DD9182A6}" dt="2024-07-01T15:21:19.799" v="5089" actId="962"/>
         <pc:sldMkLst>
           <pc:docMk/>
           <pc:sldMk cId="3291923032" sldId="273"/>
@@ -826,12 +1069,28 @@
             <ac:picMk id="4" creationId="{8EA2C5C6-6B38-3213-C629-D7D5362FAF15}"/>
           </ac:picMkLst>
         </pc:picChg>
-        <pc:picChg chg="mod ord replST">
-          <ac:chgData name="Franz Andersch" userId="88b46490-1a31-494c-af6b-e252cc2a642d" providerId="ADAL" clId="{AB1E0CFC-1C57-4A1E-92D1-DAC8DD9182A6}" dt="2024-06-27T17:50:23.303" v="2624" actId="962"/>
+        <pc:picChg chg="del mod ord replST">
+          <ac:chgData name="Franz Andersch" userId="88b46490-1a31-494c-af6b-e252cc2a642d" providerId="ADAL" clId="{AB1E0CFC-1C57-4A1E-92D1-DAC8DD9182A6}" dt="2024-07-01T15:21:19.798" v="5087" actId="478"/>
+          <ac:picMkLst>
+            <pc:docMk/>
+            <pc:sldMk cId="3291923032" sldId="273"/>
+            <ac:picMk id="4" creationId="{E5CA14B9-5623-14C3-4B05-E9470D1F0092}"/>
+          </ac:picMkLst>
+        </pc:picChg>
+        <pc:picChg chg="del mod ord replST">
+          <ac:chgData name="Franz Andersch" userId="88b46490-1a31-494c-af6b-e252cc2a642d" providerId="ADAL" clId="{AB1E0CFC-1C57-4A1E-92D1-DAC8DD9182A6}" dt="2024-07-01T15:18:20.080" v="4995" actId="478"/>
           <ac:picMkLst>
             <pc:docMk/>
             <pc:sldMk cId="3291923032" sldId="273"/>
             <ac:picMk id="5" creationId="{3631A129-09AA-DE6B-12C8-59A8EBB5EDBF}"/>
+          </ac:picMkLst>
+        </pc:picChg>
+        <pc:picChg chg="mod ord replST">
+          <ac:chgData name="Franz Andersch" userId="88b46490-1a31-494c-af6b-e252cc2a642d" providerId="ADAL" clId="{AB1E0CFC-1C57-4A1E-92D1-DAC8DD9182A6}" dt="2024-07-01T15:21:19.799" v="5089" actId="962"/>
+          <ac:picMkLst>
+            <pc:docMk/>
+            <pc:sldMk cId="3291923032" sldId="273"/>
+            <ac:picMk id="7" creationId="{4906954A-819A-1E47-B89A-9E4163964583}"/>
           </ac:picMkLst>
         </pc:picChg>
         <pc:picChg chg="del mod">
@@ -1406,7 +1665,7 @@
         </pc:picChg>
       </pc:sldChg>
       <pc:sldChg chg="addSp delSp modSp add mod">
-        <pc:chgData name="Franz Andersch" userId="88b46490-1a31-494c-af6b-e252cc2a642d" providerId="ADAL" clId="{AB1E0CFC-1C57-4A1E-92D1-DAC8DD9182A6}" dt="2024-06-29T15:19:48.057" v="4644" actId="1076"/>
+        <pc:chgData name="Franz Andersch" userId="88b46490-1a31-494c-af6b-e252cc2a642d" providerId="ADAL" clId="{AB1E0CFC-1C57-4A1E-92D1-DAC8DD9182A6}" dt="2024-07-01T15:16:05.090" v="4957" actId="1076"/>
         <pc:sldMkLst>
           <pc:docMk/>
           <pc:sldMk cId="67254046" sldId="280"/>
@@ -1419,8 +1678,8 @@
             <ac:spMk id="2" creationId="{388F7BA3-B785-BDE2-BAC6-74C1F53E9285}"/>
           </ac:spMkLst>
         </pc:spChg>
-        <pc:picChg chg="add mod">
-          <ac:chgData name="Franz Andersch" userId="88b46490-1a31-494c-af6b-e252cc2a642d" providerId="ADAL" clId="{AB1E0CFC-1C57-4A1E-92D1-DAC8DD9182A6}" dt="2024-06-29T10:22:05.171" v="4089" actId="692"/>
+        <pc:picChg chg="add del mod">
+          <ac:chgData name="Franz Andersch" userId="88b46490-1a31-494c-af6b-e252cc2a642d" providerId="ADAL" clId="{AB1E0CFC-1C57-4A1E-92D1-DAC8DD9182A6}" dt="2024-07-01T15:15:50.899" v="4950" actId="478"/>
           <ac:picMkLst>
             <pc:docMk/>
             <pc:sldMk cId="67254046" sldId="280"/>
@@ -1451,6 +1710,14 @@
             <ac:picMk id="6" creationId="{00FB585F-AE25-0F34-F953-2BC8FB6E326B}"/>
           </ac:picMkLst>
         </pc:picChg>
+        <pc:picChg chg="add mod">
+          <ac:chgData name="Franz Andersch" userId="88b46490-1a31-494c-af6b-e252cc2a642d" providerId="ADAL" clId="{AB1E0CFC-1C57-4A1E-92D1-DAC8DD9182A6}" dt="2024-07-01T15:16:05.090" v="4957" actId="1076"/>
+          <ac:picMkLst>
+            <pc:docMk/>
+            <pc:sldMk cId="67254046" sldId="280"/>
+            <ac:picMk id="6" creationId="{BC0AE1B6-2F37-3A3C-D6E5-0EA8BE1C87CF}"/>
+          </ac:picMkLst>
+        </pc:picChg>
         <pc:picChg chg="del mod ord replST">
           <ac:chgData name="Franz Andersch" userId="88b46490-1a31-494c-af6b-e252cc2a642d" providerId="ADAL" clId="{AB1E0CFC-1C57-4A1E-92D1-DAC8DD9182A6}" dt="2024-06-29T15:19:44.877" v="4641" actId="478"/>
           <ac:picMkLst>
@@ -1469,7 +1736,7 @@
         </pc:picChg>
       </pc:sldChg>
       <pc:sldChg chg="addSp delSp modSp add mod">
-        <pc:chgData name="Franz Andersch" userId="88b46490-1a31-494c-af6b-e252cc2a642d" providerId="ADAL" clId="{AB1E0CFC-1C57-4A1E-92D1-DAC8DD9182A6}" dt="2024-06-30T14:30:17.683" v="4725" actId="14100"/>
+        <pc:chgData name="Franz Andersch" userId="88b46490-1a31-494c-af6b-e252cc2a642d" providerId="ADAL" clId="{AB1E0CFC-1C57-4A1E-92D1-DAC8DD9182A6}" dt="2024-07-01T15:17:04.803" v="4967" actId="14100"/>
         <pc:sldMkLst>
           <pc:docMk/>
           <pc:sldMk cId="2769262704" sldId="281"/>
@@ -1482,8 +1749,8 @@
             <ac:spMk id="2" creationId="{388F7BA3-B785-BDE2-BAC6-74C1F53E9285}"/>
           </ac:spMkLst>
         </pc:spChg>
-        <pc:picChg chg="add mod">
-          <ac:chgData name="Franz Andersch" userId="88b46490-1a31-494c-af6b-e252cc2a642d" providerId="ADAL" clId="{AB1E0CFC-1C57-4A1E-92D1-DAC8DD9182A6}" dt="2024-06-30T14:30:17.683" v="4725" actId="14100"/>
+        <pc:picChg chg="add del mod">
+          <ac:chgData name="Franz Andersch" userId="88b46490-1a31-494c-af6b-e252cc2a642d" providerId="ADAL" clId="{AB1E0CFC-1C57-4A1E-92D1-DAC8DD9182A6}" dt="2024-07-01T15:16:41.248" v="4958" actId="478"/>
           <ac:picMkLst>
             <pc:docMk/>
             <pc:sldMk cId="2769262704" sldId="281"/>
@@ -1498,6 +1765,14 @@
             <ac:picMk id="4" creationId="{8EEA629F-03D6-6808-AE13-538CEEE92F91}"/>
           </ac:picMkLst>
         </pc:picChg>
+        <pc:picChg chg="mod ord replST">
+          <ac:chgData name="Franz Andersch" userId="88b46490-1a31-494c-af6b-e252cc2a642d" providerId="ADAL" clId="{AB1E0CFC-1C57-4A1E-92D1-DAC8DD9182A6}" dt="2024-07-01T14:49:54.762" v="4832" actId="962"/>
+          <ac:picMkLst>
+            <pc:docMk/>
+            <pc:sldMk cId="2769262704" sldId="281"/>
+            <ac:picMk id="5" creationId="{53632ED9-737D-E342-0CD4-7FA7217968E4}"/>
+          </ac:picMkLst>
+        </pc:picChg>
         <pc:picChg chg="del mod ord replST">
           <ac:chgData name="Franz Andersch" userId="88b46490-1a31-494c-af6b-e252cc2a642d" providerId="ADAL" clId="{AB1E0CFC-1C57-4A1E-92D1-DAC8DD9182A6}" dt="2024-06-29T10:44:30.061" v="4178" actId="478"/>
           <ac:picMkLst>
@@ -1514,6 +1789,14 @@
             <ac:picMk id="6" creationId="{B8FB4886-366C-1807-83F1-3FD2E6022809}"/>
           </ac:picMkLst>
         </pc:picChg>
+        <pc:picChg chg="add mod">
+          <ac:chgData name="Franz Andersch" userId="88b46490-1a31-494c-af6b-e252cc2a642d" providerId="ADAL" clId="{AB1E0CFC-1C57-4A1E-92D1-DAC8DD9182A6}" dt="2024-07-01T15:17:04.803" v="4967" actId="14100"/>
+          <ac:picMkLst>
+            <pc:docMk/>
+            <pc:sldMk cId="2769262704" sldId="281"/>
+            <ac:picMk id="7" creationId="{1E6B2CA4-8980-84F7-1D03-D54C0EEFB552}"/>
+          </ac:picMkLst>
+        </pc:picChg>
         <pc:picChg chg="del mod ord replST">
           <ac:chgData name="Franz Andersch" userId="88b46490-1a31-494c-af6b-e252cc2a642d" providerId="ADAL" clId="{AB1E0CFC-1C57-4A1E-92D1-DAC8DD9182A6}" dt="2024-06-29T10:46:10.750" v="4209" actId="478"/>
           <ac:picMkLst>
@@ -1530,8 +1813,8 @@
             <ac:picMk id="8" creationId="{597DD17C-7200-A8AE-517A-FBE4D22709E7}"/>
           </ac:picMkLst>
         </pc:picChg>
-        <pc:picChg chg="mod ord replST">
-          <ac:chgData name="Franz Andersch" userId="88b46490-1a31-494c-af6b-e252cc2a642d" providerId="ADAL" clId="{AB1E0CFC-1C57-4A1E-92D1-DAC8DD9182A6}" dt="2024-06-30T14:29:10.096" v="4712" actId="1076"/>
+        <pc:picChg chg="del mod ord replST">
+          <ac:chgData name="Franz Andersch" userId="88b46490-1a31-494c-af6b-e252cc2a642d" providerId="ADAL" clId="{AB1E0CFC-1C57-4A1E-92D1-DAC8DD9182A6}" dt="2024-07-01T14:49:54.761" v="4830" actId="478"/>
           <ac:picMkLst>
             <pc:docMk/>
             <pc:sldMk cId="2769262704" sldId="281"/>
@@ -1671,6 +1954,53 @@
             <pc:docMk/>
             <pc:sldMk cId="1208863920" sldId="282"/>
             <ac:picMk id="26" creationId="{A113E1C0-614E-A3F0-54E6-2D3147FCC690}"/>
+          </ac:picMkLst>
+        </pc:picChg>
+      </pc:sldChg>
+      <pc:sldChg chg="delSp modSp add mod">
+        <pc:chgData name="Franz Andersch" userId="88b46490-1a31-494c-af6b-e252cc2a642d" providerId="ADAL" clId="{AB1E0CFC-1C57-4A1E-92D1-DAC8DD9182A6}" dt="2024-07-01T19:40:22.776" v="5744" actId="962"/>
+        <pc:sldMkLst>
+          <pc:docMk/>
+          <pc:sldMk cId="1604509671" sldId="283"/>
+        </pc:sldMkLst>
+        <pc:spChg chg="mod">
+          <ac:chgData name="Franz Andersch" userId="88b46490-1a31-494c-af6b-e252cc2a642d" providerId="ADAL" clId="{AB1E0CFC-1C57-4A1E-92D1-DAC8DD9182A6}" dt="2024-07-01T17:08:00.287" v="5590" actId="20577"/>
+          <ac:spMkLst>
+            <pc:docMk/>
+            <pc:sldMk cId="1604509671" sldId="283"/>
+            <ac:spMk id="2" creationId="{388F7BA3-B785-BDE2-BAC6-74C1F53E9285}"/>
+          </ac:spMkLst>
+        </pc:spChg>
+        <pc:picChg chg="del mod ord replST">
+          <ac:chgData name="Franz Andersch" userId="88b46490-1a31-494c-af6b-e252cc2a642d" providerId="ADAL" clId="{AB1E0CFC-1C57-4A1E-92D1-DAC8DD9182A6}" dt="2024-07-01T19:39:43.339" v="5709" actId="478"/>
+          <ac:picMkLst>
+            <pc:docMk/>
+            <pc:sldMk cId="1604509671" sldId="283"/>
+            <ac:picMk id="4" creationId="{1E901332-1E39-E164-3414-19BA523DCB94}"/>
+          </ac:picMkLst>
+        </pc:picChg>
+        <pc:picChg chg="del mod ord replST">
+          <ac:chgData name="Franz Andersch" userId="88b46490-1a31-494c-af6b-e252cc2a642d" providerId="ADAL" clId="{AB1E0CFC-1C57-4A1E-92D1-DAC8DD9182A6}" dt="2024-07-01T19:40:22.775" v="5742" actId="478"/>
+          <ac:picMkLst>
+            <pc:docMk/>
+            <pc:sldMk cId="1604509671" sldId="283"/>
+            <ac:picMk id="6" creationId="{C60B553B-7AD7-D1D0-4FBC-153AD649D416}"/>
+          </ac:picMkLst>
+        </pc:picChg>
+        <pc:picChg chg="mod ord replST">
+          <ac:chgData name="Franz Andersch" userId="88b46490-1a31-494c-af6b-e252cc2a642d" providerId="ADAL" clId="{AB1E0CFC-1C57-4A1E-92D1-DAC8DD9182A6}" dt="2024-07-01T19:40:22.776" v="5744" actId="962"/>
+          <ac:picMkLst>
+            <pc:docMk/>
+            <pc:sldMk cId="1604509671" sldId="283"/>
+            <ac:picMk id="8" creationId="{59A35446-63A6-BA9E-7F11-1DBDBA76C36F}"/>
+          </ac:picMkLst>
+        </pc:picChg>
+        <pc:picChg chg="del mod">
+          <ac:chgData name="Franz Andersch" userId="88b46490-1a31-494c-af6b-e252cc2a642d" providerId="ADAL" clId="{AB1E0CFC-1C57-4A1E-92D1-DAC8DD9182A6}" dt="2024-07-01T19:36:57.796" v="5648" actId="478"/>
+          <ac:picMkLst>
+            <pc:docMk/>
+            <pc:sldMk cId="1604509671" sldId="283"/>
+            <ac:picMk id="33" creationId="{B0A3D373-9581-04FA-10D9-32D18A8F3DF2}"/>
           </ac:picMkLst>
         </pc:picChg>
       </pc:sldChg>
@@ -5248,137 +5578,6 @@
             </a:r>
             <a:r>
               <a:rPr lang="de-DE"/>
-              <a:t>: Setting </a:t>
-            </a:r>
-            <a:r>
-              <a:rPr lang="de-DE" err="1"/>
-              <a:t>up</a:t>
-            </a:r>
-            <a:r>
-              <a:rPr lang="de-DE"/>
-              <a:t> </a:t>
-            </a:r>
-            <a:r>
-              <a:rPr lang="de-DE" err="1"/>
-              <a:t>Constraints</a:t>
-            </a:r>
-            <a:endParaRPr lang="de-DE"/>
-          </a:p>
-        </p:txBody>
-      </p:sp>
-      <p:pic>
-        <p:nvPicPr>
-          <p:cNvPr id="5" name="Grafik 4" descr="\documentclass[20pt]{article}&#10;\usepackage{amsmath,amsfonts,amssymb,xcolor, mathtools}&#10;\pagestyle{empty}&#10;\usepackage[T1]{fontenc}&#10;\usepackage{fontspec}&#10;\setsansfont{Arial}&#10;\renewcommand\familydefault{\sfdefault}&#10;\begin{document}&#10;\begin{itemize}&#10;\item for the maximization the constraints that   $\beta \cdot \overline{x}+\beta_0\ge 1$ for \textcolor{red}{positive} \newline and ($\beta \cdot \overline{x}+\beta_0\le -1$) for \textcolor{green}{negative} are still to respect&#10;&#10;\item goal: merge both constraints in one&#10;\item introduce new variable $y$ with $y=1$ for positive samples and $y=-1$ for negative samples&#10;\item leading to constraint $y(\beta x+\beta_0)\ge 1$&#10;\end{itemize}&#10;\end{document}" title="IguanaTex Picture Display">
-            <a:extLst>
-              <a:ext uri="{FF2B5EF4-FFF2-40B4-BE49-F238E27FC236}">
-                <a16:creationId xmlns:a16="http://schemas.microsoft.com/office/drawing/2014/main" id="{3631A129-09AA-DE6B-12C8-59A8EBB5EDBF}"/>
-              </a:ext>
-            </a:extLst>
-          </p:cNvPr>
-          <p:cNvPicPr>
-            <a:picLocks noChangeAspect="1"/>
-          </p:cNvPicPr>
-          <p:nvPr>
-            <p:custDataLst>
-              <p:tags r:id="rId1"/>
-            </p:custDataLst>
-          </p:nvPr>
-        </p:nvPicPr>
-        <p:blipFill>
-          <a:blip r:embed="rId3">
-            <a:extLst>
-              <a:ext uri="{28A0092B-C50C-407E-A947-70E740481C1C}">
-                <a14:useLocalDpi xmlns:a14="http://schemas.microsoft.com/office/drawing/2010/main" val="0"/>
-              </a:ext>
-            </a:extLst>
-          </a:blip>
-          <a:stretch>
-            <a:fillRect/>
-          </a:stretch>
-        </p:blipFill>
-        <p:spPr>
-          <a:xfrm>
-            <a:off x="683568" y="1419622"/>
-            <a:ext cx="7470314" cy="2198317"/>
-          </a:xfrm>
-          <a:prstGeom prst="rect">
-            <a:avLst/>
-          </a:prstGeom>
-        </p:spPr>
-      </p:pic>
-    </p:spTree>
-    <p:extLst>
-      <p:ext uri="{BB962C8B-B14F-4D97-AF65-F5344CB8AC3E}">
-        <p14:creationId xmlns:p14="http://schemas.microsoft.com/office/powerpoint/2010/main" val="3291923032"/>
-      </p:ext>
-    </p:extLst>
-  </p:cSld>
-  <p:clrMapOvr>
-    <a:masterClrMapping/>
-  </p:clrMapOvr>
-</p:sld>
-</file>
-
-<file path=ppt/slides/slide11.xml><?xml version="1.0" encoding="utf-8"?>
-<p:sld xmlns:a="http://schemas.openxmlformats.org/drawingml/2006/main" xmlns:r="http://schemas.openxmlformats.org/officeDocument/2006/relationships" xmlns:p="http://schemas.openxmlformats.org/presentationml/2006/main">
-  <p:cSld>
-    <p:spTree>
-      <p:nvGrpSpPr>
-        <p:cNvPr id="1" name=""/>
-        <p:cNvGrpSpPr/>
-        <p:nvPr/>
-      </p:nvGrpSpPr>
-      <p:grpSpPr>
-        <a:xfrm>
-          <a:off x="0" y="0"/>
-          <a:ext cx="0" cy="0"/>
-          <a:chOff x="0" y="0"/>
-          <a:chExt cx="0" cy="0"/>
-        </a:xfrm>
-      </p:grpSpPr>
-      <p:sp>
-        <p:nvSpPr>
-          <p:cNvPr id="2" name="Titel 1">
-            <a:extLst>
-              <a:ext uri="{FF2B5EF4-FFF2-40B4-BE49-F238E27FC236}">
-                <a16:creationId xmlns:a16="http://schemas.microsoft.com/office/drawing/2014/main" id="{388F7BA3-B785-BDE2-BAC6-74C1F53E9285}"/>
-              </a:ext>
-            </a:extLst>
-          </p:cNvPr>
-          <p:cNvSpPr>
-            <a:spLocks noGrp="1"/>
-          </p:cNvSpPr>
-          <p:nvPr>
-            <p:ph type="title"/>
-          </p:nvPr>
-        </p:nvSpPr>
-        <p:spPr/>
-        <p:txBody>
-          <a:bodyPr/>
-          <a:lstStyle/>
-          <a:p>
-            <a:r>
-              <a:rPr lang="de-DE" err="1"/>
-              <a:t>How</a:t>
-            </a:r>
-            <a:r>
-              <a:rPr lang="de-DE"/>
-              <a:t> </a:t>
-            </a:r>
-            <a:r>
-              <a:rPr lang="de-DE" err="1"/>
-              <a:t>it</a:t>
-            </a:r>
-            <a:r>
-              <a:rPr lang="de-DE"/>
-              <a:t> </a:t>
-            </a:r>
-            <a:r>
-              <a:rPr lang="de-DE" err="1"/>
-              <a:t>works</a:t>
-            </a:r>
-            <a:r>
-              <a:rPr lang="de-DE"/>
               <a:t>: </a:t>
             </a:r>
             <a:r>
@@ -5450,7 +5649,7 @@
 </p:sld>
 </file>
 
-<file path=ppt/slides/slide12.xml><?xml version="1.0" encoding="utf-8"?>
+<file path=ppt/slides/slide11.xml><?xml version="1.0" encoding="utf-8"?>
 <p:sld xmlns:a="http://schemas.openxmlformats.org/drawingml/2006/main" xmlns:r="http://schemas.openxmlformats.org/officeDocument/2006/relationships" xmlns:p="http://schemas.openxmlformats.org/presentationml/2006/main">
   <p:cSld>
     <p:spTree>
@@ -5581,7 +5780,7 @@
 </p:sld>
 </file>
 
-<file path=ppt/slides/slide13.xml><?xml version="1.0" encoding="utf-8"?>
+<file path=ppt/slides/slide12.xml><?xml version="1.0" encoding="utf-8"?>
 <p:sld xmlns:a="http://schemas.openxmlformats.org/drawingml/2006/main" xmlns:r="http://schemas.openxmlformats.org/officeDocument/2006/relationships" xmlns:p="http://schemas.openxmlformats.org/presentationml/2006/main">
   <p:cSld>
     <p:spTree>
@@ -5707,7 +5906,7 @@
 </p:sld>
 </file>
 
-<file path=ppt/slides/slide14.xml><?xml version="1.0" encoding="utf-8"?>
+<file path=ppt/slides/slide13.xml><?xml version="1.0" encoding="utf-8"?>
 <p:sld xmlns:a="http://schemas.openxmlformats.org/drawingml/2006/main" xmlns:r="http://schemas.openxmlformats.org/officeDocument/2006/relationships" xmlns:p="http://schemas.openxmlformats.org/presentationml/2006/main">
   <p:cSld>
     <p:spTree>
@@ -5825,7 +6024,7 @@
 </p:sld>
 </file>
 
-<file path=ppt/slides/slide15.xml><?xml version="1.0" encoding="utf-8"?>
+<file path=ppt/slides/slide14.xml><?xml version="1.0" encoding="utf-8"?>
 <p:sld xmlns:a="http://schemas.openxmlformats.org/drawingml/2006/main" xmlns:r="http://schemas.openxmlformats.org/officeDocument/2006/relationships" xmlns:p="http://schemas.openxmlformats.org/presentationml/2006/main">
   <p:cSld>
     <p:spTree>
@@ -5943,7 +6142,7 @@
 </p:sld>
 </file>
 
-<file path=ppt/slides/slide16.xml><?xml version="1.0" encoding="utf-8"?>
+<file path=ppt/slides/slide15.xml><?xml version="1.0" encoding="utf-8"?>
 <p:sld xmlns:a="http://schemas.openxmlformats.org/drawingml/2006/main" xmlns:r="http://schemas.openxmlformats.org/officeDocument/2006/relationships" xmlns:p="http://schemas.openxmlformats.org/presentationml/2006/main">
   <p:cSld>
     <p:spTree>
@@ -6061,7 +6260,7 @@
 </p:sld>
 </file>
 
-<file path=ppt/slides/slide17.xml><?xml version="1.0" encoding="utf-8"?>
+<file path=ppt/slides/slide16.xml><?xml version="1.0" encoding="utf-8"?>
 <p:sld xmlns:a="http://schemas.openxmlformats.org/drawingml/2006/main" xmlns:r="http://schemas.openxmlformats.org/officeDocument/2006/relationships" xmlns:p="http://schemas.openxmlformats.org/presentationml/2006/main">
   <p:cSld>
     <p:spTree>
@@ -6173,10 +6372,10 @@
       </p:pic>
       <p:pic>
         <p:nvPicPr>
-          <p:cNvPr id="4" name="Grafik 3" descr="Ein Bild, das Reihe, Diagramm, Screenshot, Steigung enthält.&#10;&#10;Automatisch generierte Beschreibung">
+          <p:cNvPr id="6" name="Grafik 5" descr="Ein Bild, das Reihe, Screenshot, Diagramm, parallel enthält.&#10;&#10;Automatisch generierte Beschreibung">
             <a:extLst>
               <a:ext uri="{FF2B5EF4-FFF2-40B4-BE49-F238E27FC236}">
-                <a16:creationId xmlns:a16="http://schemas.microsoft.com/office/drawing/2014/main" id="{8EEA629F-03D6-6808-AE13-538CEEE92F91}"/>
+                <a16:creationId xmlns:a16="http://schemas.microsoft.com/office/drawing/2014/main" id="{BC0AE1B6-2F37-3A3C-D6E5-0EA8BE1C87CF}"/>
               </a:ext>
             </a:extLst>
           </p:cNvPr>
@@ -6199,23 +6398,190 @@
         </p:blipFill>
         <p:spPr>
           <a:xfrm>
-            <a:off x="5148063" y="1188000"/>
-            <a:ext cx="3605704" cy="3074400"/>
+            <a:off x="4997105" y="1239946"/>
+            <a:ext cx="3980567" cy="3378627"/>
           </a:xfrm>
           <a:prstGeom prst="rect">
             <a:avLst/>
           </a:prstGeom>
-          <a:ln w="3175">
-            <a:solidFill>
-              <a:schemeClr val="accent1"/>
-            </a:solidFill>
-          </a:ln>
         </p:spPr>
       </p:pic>
     </p:spTree>
     <p:extLst>
       <p:ext uri="{BB962C8B-B14F-4D97-AF65-F5344CB8AC3E}">
         <p14:creationId xmlns:p14="http://schemas.microsoft.com/office/powerpoint/2010/main" val="67254046"/>
+      </p:ext>
+    </p:extLst>
+  </p:cSld>
+  <p:clrMapOvr>
+    <a:masterClrMapping/>
+  </p:clrMapOvr>
+</p:sld>
+</file>
+
+<file path=ppt/slides/slide17.xml><?xml version="1.0" encoding="utf-8"?>
+<p:sld xmlns:a="http://schemas.openxmlformats.org/drawingml/2006/main" xmlns:r="http://schemas.openxmlformats.org/officeDocument/2006/relationships" xmlns:p="http://schemas.openxmlformats.org/presentationml/2006/main">
+  <p:cSld>
+    <p:spTree>
+      <p:nvGrpSpPr>
+        <p:cNvPr id="1" name=""/>
+        <p:cNvGrpSpPr/>
+        <p:nvPr/>
+      </p:nvGrpSpPr>
+      <p:grpSpPr>
+        <a:xfrm>
+          <a:off x="0" y="0"/>
+          <a:ext cx="0" cy="0"/>
+          <a:chOff x="0" y="0"/>
+          <a:chExt cx="0" cy="0"/>
+        </a:xfrm>
+      </p:grpSpPr>
+      <p:sp>
+        <p:nvSpPr>
+          <p:cNvPr id="2" name="Titel 1">
+            <a:extLst>
+              <a:ext uri="{FF2B5EF4-FFF2-40B4-BE49-F238E27FC236}">
+                <a16:creationId xmlns:a16="http://schemas.microsoft.com/office/drawing/2014/main" id="{388F7BA3-B785-BDE2-BAC6-74C1F53E9285}"/>
+              </a:ext>
+            </a:extLst>
+          </p:cNvPr>
+          <p:cNvSpPr>
+            <a:spLocks noGrp="1"/>
+          </p:cNvSpPr>
+          <p:nvPr>
+            <p:ph type="title"/>
+          </p:nvPr>
+        </p:nvSpPr>
+        <p:spPr/>
+        <p:txBody>
+          <a:bodyPr/>
+          <a:lstStyle/>
+          <a:p>
+            <a:r>
+              <a:rPr lang="de-DE" err="1"/>
+              <a:t>How</a:t>
+            </a:r>
+            <a:r>
+              <a:rPr lang="de-DE"/>
+              <a:t> </a:t>
+            </a:r>
+            <a:r>
+              <a:rPr lang="de-DE" err="1"/>
+              <a:t>it</a:t>
+            </a:r>
+            <a:r>
+              <a:rPr lang="de-DE"/>
+              <a:t> </a:t>
+            </a:r>
+            <a:r>
+              <a:rPr lang="de-DE" err="1"/>
+              <a:t>works</a:t>
+            </a:r>
+            <a:r>
+              <a:rPr lang="de-DE"/>
+              <a:t>: </a:t>
+            </a:r>
+            <a:r>
+              <a:rPr lang="de-DE" err="1"/>
+              <a:t>use</a:t>
+            </a:r>
+            <a:r>
+              <a:rPr lang="de-DE"/>
+              <a:t> </a:t>
+            </a:r>
+            <a:r>
+              <a:rPr lang="de-DE" err="1"/>
+              <a:t>of</a:t>
+            </a:r>
+            <a:r>
+              <a:rPr lang="de-DE"/>
+              <a:t> Kernels</a:t>
+            </a:r>
+          </a:p>
+        </p:txBody>
+      </p:sp>
+      <p:pic>
+        <p:nvPicPr>
+          <p:cNvPr id="5" name="Grafik 4" descr="\documentclass[20pt]{article}&#10;\usepackage{amsmath,amsfonts,amssymb,xcolor, mathtools}&#10;\pagestyle{empty}&#10;\usepackage[T1]{fontenc}&#10;\usepackage{fontspec}&#10;\setsansfont{Arial}&#10;\renewcommand\familydefault{\sfdefault}&#10;\begin{document}&#10;\begin{itemize}&#10;\item apply a transforming function (Kernel)\newline $K(\overline{x}_i \cdot \overline{x}_j)$ to the dot products in the\newline  maximization function &#10;\item some used Kernel functions are &#10;\begin{itemize}&#10;\item the polynomial kernel of order $d$:\newline $K(\overline{x}_i,\overline{x}_j)=(1+ \overline{x}_i^\mathsf{T}\; \overline{x}_j)^d$&#10;\item the radial/gaussian Kernel:\newline$K(\overline{x}_i,\overline{x}_j)=exp(-\gamma||\overline{x}_i- \overline{x}_j||^2)$&#10;\item sigmoid Kernel: $K(\overline{x}_i,\overline{x}_j)= \tanh(\gamma (\overline{x}_i^\mathsf{T}\; \overline{x}_j)+r)$&#10;\end{itemize}&#10;\end{itemize}&#10;\end{document}" title="IguanaTex Picture Display">
+            <a:extLst>
+              <a:ext uri="{FF2B5EF4-FFF2-40B4-BE49-F238E27FC236}">
+                <a16:creationId xmlns:a16="http://schemas.microsoft.com/office/drawing/2014/main" id="{53632ED9-737D-E342-0CD4-7FA7217968E4}"/>
+              </a:ext>
+            </a:extLst>
+          </p:cNvPr>
+          <p:cNvPicPr>
+            <a:picLocks noChangeAspect="1"/>
+          </p:cNvPicPr>
+          <p:nvPr>
+            <p:custDataLst>
+              <p:tags r:id="rId1"/>
+            </p:custDataLst>
+          </p:nvPr>
+        </p:nvPicPr>
+        <p:blipFill>
+          <a:blip r:embed="rId3">
+            <a:extLst>
+              <a:ext uri="{28A0092B-C50C-407E-A947-70E740481C1C}">
+                <a14:useLocalDpi xmlns:a14="http://schemas.microsoft.com/office/drawing/2010/main" val="0"/>
+              </a:ext>
+            </a:extLst>
+          </a:blip>
+          <a:stretch>
+            <a:fillRect/>
+          </a:stretch>
+        </p:blipFill>
+        <p:spPr>
+          <a:xfrm>
+            <a:off x="611560" y="1203598"/>
+            <a:ext cx="5447160" cy="3211321"/>
+          </a:xfrm>
+          <a:prstGeom prst="rect">
+            <a:avLst/>
+          </a:prstGeom>
+        </p:spPr>
+      </p:pic>
+      <p:pic>
+        <p:nvPicPr>
+          <p:cNvPr id="7" name="Grafik 6" descr="Ein Bild, das Diagramm, Reihe, Screenshot, Design enthält.&#10;&#10;Automatisch generierte Beschreibung">
+            <a:extLst>
+              <a:ext uri="{FF2B5EF4-FFF2-40B4-BE49-F238E27FC236}">
+                <a16:creationId xmlns:a16="http://schemas.microsoft.com/office/drawing/2014/main" id="{1E6B2CA4-8980-84F7-1D03-D54C0EEFB552}"/>
+              </a:ext>
+            </a:extLst>
+          </p:cNvPr>
+          <p:cNvPicPr>
+            <a:picLocks noChangeAspect="1"/>
+          </p:cNvPicPr>
+          <p:nvPr/>
+        </p:nvPicPr>
+        <p:blipFill>
+          <a:blip r:embed="rId4">
+            <a:extLst>
+              <a:ext uri="{28A0092B-C50C-407E-A947-70E740481C1C}">
+                <a14:useLocalDpi xmlns:a14="http://schemas.microsoft.com/office/drawing/2010/main" val="0"/>
+              </a:ext>
+            </a:extLst>
+          </a:blip>
+          <a:stretch>
+            <a:fillRect/>
+          </a:stretch>
+        </p:blipFill>
+        <p:spPr>
+          <a:xfrm>
+            <a:off x="4772952" y="927585"/>
+            <a:ext cx="4051139" cy="3118311"/>
+          </a:xfrm>
+          <a:prstGeom prst="round1Rect">
+            <a:avLst>
+              <a:gd name="adj" fmla="val 35408"/>
+            </a:avLst>
+          </a:prstGeom>
+        </p:spPr>
+      </p:pic>
+    </p:spTree>
+    <p:extLst>
+      <p:ext uri="{BB962C8B-B14F-4D97-AF65-F5344CB8AC3E}">
+        <p14:creationId xmlns:p14="http://schemas.microsoft.com/office/powerpoint/2010/main" val="2769262704"/>
       </p:ext>
     </p:extLst>
   </p:cSld>
@@ -6308,10 +6674,10 @@
       </p:sp>
       <p:pic>
         <p:nvPicPr>
-          <p:cNvPr id="8" name="Grafik 7" descr="\documentclass[20pt]{article}&#10;\usepackage{amsmath,amsfonts,amssymb,xcolor, mathtools}&#10;\pagestyle{empty}&#10;\usepackage[T1]{fontenc}&#10;\usepackage{fontspec}&#10;\setsansfont{Arial}&#10;\renewcommand\familydefault{\sfdefault}&#10;\begin{document}&#10;\begin{itemize}&#10;\item apply a transforming function (Kernel)\newline $K(\overline{x}_i \cdot \overline{x}_j)$ to the dot products in the\newline  maximization function &#10;\item some used Kernel functions are &#10;\begin{itemize}&#10;\item the plynomial kernel of order $d$:\newline $K(\overline{x}_i,\overline{x}_j)=(1+ \overline{x}_i^\mathsf{T}\; \overline{x}_j)^d$&#10;\item the radial/gaussian Kernel:\newline$K(\overline{x}_i,\overline{x}_j)=exp(-\gamma||\overline{x}_i- \overline{x}_j||^2)$&#10;\item sigmoid Kernel: $K(\overline{x}_i,\overline{x}_j)= \tanh(\gamma (\overline{x}_i^\mathsf{T}\; \overline{x}_j)+r)$&#10;\end{itemize}&#10;\end{itemize}&#10;\end{document}" title="IguanaTex Picture Display">
+          <p:cNvPr id="4" name="Grafik 3" descr="\documentclass[20pt]{article}&#10;\usepackage{amsmath,amsfonts,amssymb,xcolor, mathtools}&#10;\pagestyle{empty}&#10;\usepackage[T1]{fontenc}&#10;\usepackage{fontspec}&#10;\setsansfont{Arial}&#10;\renewcommand\familydefault{\sfdefault}&#10;\begin{document}&#10;\begin{itemize}&#10;\item the decision function for an unknown vector $\overline{u}$ needs some adjustement\newline&#10;$ f(\overline{u})=\sum_{i=1}^n \alpha_i y_i K(\overline{x}_i,\overline{u})+\beta_0$&#10;\item the decision rule is the same as in the linear case&#10;\end{itemize}&#10;\end{document}" title="IguanaTex Picture Display">
             <a:extLst>
               <a:ext uri="{FF2B5EF4-FFF2-40B4-BE49-F238E27FC236}">
-                <a16:creationId xmlns:a16="http://schemas.microsoft.com/office/drawing/2014/main" id="{7A1DE830-5A11-C260-5125-2CCCA25E99FF}"/>
+                <a16:creationId xmlns:a16="http://schemas.microsoft.com/office/drawing/2014/main" id="{19DFE7B8-4BDE-D9BF-B2D3-C7DCF15E1F81}"/>
               </a:ext>
             </a:extLst>
           </p:cNvPr>
@@ -6338,56 +6704,18 @@
         </p:blipFill>
         <p:spPr>
           <a:xfrm>
-            <a:off x="611560" y="1203598"/>
-            <a:ext cx="5446861" cy="3209390"/>
+            <a:off x="683568" y="1923678"/>
+            <a:ext cx="7441488" cy="981553"/>
           </a:xfrm>
           <a:prstGeom prst="rect">
             <a:avLst/>
           </a:prstGeom>
         </p:spPr>
       </p:pic>
-      <p:pic>
-        <p:nvPicPr>
-          <p:cNvPr id="4" name="Grafik 3" descr="Ein Bild, das Diagramm, Design enthält.&#10;&#10;Automatisch generierte Beschreibung">
-            <a:extLst>
-              <a:ext uri="{FF2B5EF4-FFF2-40B4-BE49-F238E27FC236}">
-                <a16:creationId xmlns:a16="http://schemas.microsoft.com/office/drawing/2014/main" id="{0B7929DF-AAAA-3F3D-F31B-2B252ED91295}"/>
-              </a:ext>
-            </a:extLst>
-          </p:cNvPr>
-          <p:cNvPicPr>
-            <a:picLocks noChangeAspect="1"/>
-          </p:cNvPicPr>
-          <p:nvPr/>
-        </p:nvPicPr>
-        <p:blipFill>
-          <a:blip r:embed="rId4">
-            <a:extLst>
-              <a:ext uri="{28A0092B-C50C-407E-A947-70E740481C1C}">
-                <a14:useLocalDpi xmlns:a14="http://schemas.microsoft.com/office/drawing/2010/main" val="0"/>
-              </a:ext>
-            </a:extLst>
-          </a:blip>
-          <a:stretch>
-            <a:fillRect/>
-          </a:stretch>
-        </p:blipFill>
-        <p:spPr>
-          <a:xfrm>
-            <a:off x="4716016" y="987574"/>
-            <a:ext cx="3928615" cy="3024000"/>
-          </a:xfrm>
-          <a:prstGeom prst="round1Rect">
-            <a:avLst>
-              <a:gd name="adj" fmla="val 28717"/>
-            </a:avLst>
-          </a:prstGeom>
-        </p:spPr>
-      </p:pic>
     </p:spTree>
     <p:extLst>
       <p:ext uri="{BB962C8B-B14F-4D97-AF65-F5344CB8AC3E}">
-        <p14:creationId xmlns:p14="http://schemas.microsoft.com/office/powerpoint/2010/main" val="2769262704"/>
+        <p14:creationId xmlns:p14="http://schemas.microsoft.com/office/powerpoint/2010/main" val="1208863920"/>
       </p:ext>
     </p:extLst>
   </p:cSld>
@@ -6436,54 +6764,23 @@
           <a:lstStyle/>
           <a:p>
             <a:r>
+              <a:rPr lang="de-DE"/>
+              <a:t>Pros and </a:t>
+            </a:r>
+            <a:r>
               <a:rPr lang="de-DE" err="1"/>
-              <a:t>How</a:t>
-            </a:r>
-            <a:r>
-              <a:rPr lang="de-DE"/>
-              <a:t> </a:t>
-            </a:r>
-            <a:r>
-              <a:rPr lang="de-DE" err="1"/>
-              <a:t>it</a:t>
-            </a:r>
-            <a:r>
-              <a:rPr lang="de-DE"/>
-              <a:t> </a:t>
-            </a:r>
-            <a:r>
-              <a:rPr lang="de-DE" err="1"/>
-              <a:t>works</a:t>
-            </a:r>
-            <a:r>
-              <a:rPr lang="de-DE"/>
-              <a:t>: </a:t>
-            </a:r>
-            <a:r>
-              <a:rPr lang="de-DE" err="1"/>
-              <a:t>use</a:t>
-            </a:r>
-            <a:r>
-              <a:rPr lang="de-DE"/>
-              <a:t> </a:t>
-            </a:r>
-            <a:r>
-              <a:rPr lang="de-DE" err="1"/>
-              <a:t>of</a:t>
-            </a:r>
-            <a:r>
-              <a:rPr lang="de-DE"/>
-              <a:t> Kernels</a:t>
-            </a:r>
+              <a:t>Cons</a:t>
+            </a:r>
+            <a:endParaRPr lang="de-DE"/>
           </a:p>
         </p:txBody>
       </p:sp>
       <p:pic>
         <p:nvPicPr>
-          <p:cNvPr id="4" name="Grafik 3" descr="\documentclass[20pt]{article}&#10;\usepackage{amsmath,amsfonts,amssymb,xcolor, mathtools}&#10;\pagestyle{empty}&#10;\usepackage[T1]{fontenc}&#10;\usepackage{fontspec}&#10;\setsansfont{Arial}&#10;\renewcommand\familydefault{\sfdefault}&#10;\begin{document}&#10;\begin{itemize}&#10;\item the decision function for an unknown vector $\overline{u}$ needs some adjustement\newline&#10;$ f(\overline{u})=\sum_{i=1}^n \alpha_i y_i K(\overline{x}_i,\overline{u})+\beta_0$&#10;\item the decision rule is the same as in the linear case&#10;\end{itemize}&#10;\end{document}" title="IguanaTex Picture Display">
+          <p:cNvPr id="39" name="Grafik 38" descr="\documentclass[20pt]{article}&#10;\usepackage{amsmath,amsfonts,amssymb,xcolor, mathtools}&#10;\pagestyle{empty}&#10;\usepackage{booktabs}&#10;\usepackage{enumitem}&#10;\usepackage{parskip}&#10;\usepackage[T1]{fontenc}&#10;\usepackage{fontspec}&#10;\setsansfont{Arial}&#10;\renewcommand\familydefault{\sfdefault}&#10;\begin{document}&#10;\centering&#10;\begin{tabular}{p{5cm}|p{5cm}}&#10;\textbf{Pros}&amp;\textbf{cons}\\&#10;\hline&#10;\begin{itemize}[topsep=0cm,leftmargin=0.3cm]&#10;\item efficiently classifies in a high dimensional setting ($n\ll p$)&#10;\item risk of overfitting is lower&#10;&#10;\end{itemize}&#10;&amp;&#10;\begin{itemize}[topsep=0cm,leftmargin=0.3cm]&#10;\item heavily relies on the choice of hyperparameters/kernels&#10;\item no interpretability of coefficients&#10;\end{itemize}&#10;\end{tabular}&#10;\end{document}" title="IguanaTex Picture Display">
             <a:extLst>
               <a:ext uri="{FF2B5EF4-FFF2-40B4-BE49-F238E27FC236}">
-                <a16:creationId xmlns:a16="http://schemas.microsoft.com/office/drawing/2014/main" id="{19DFE7B8-4BDE-D9BF-B2D3-C7DCF15E1F81}"/>
+                <a16:creationId xmlns:a16="http://schemas.microsoft.com/office/drawing/2014/main" id="{D77E97AA-FE7A-E96E-1BFF-96304AC5176D}"/>
               </a:ext>
             </a:extLst>
           </p:cNvPr>
@@ -6510,8 +6807,8 @@
         </p:blipFill>
         <p:spPr>
           <a:xfrm>
-            <a:off x="683568" y="1923678"/>
-            <a:ext cx="7441488" cy="981553"/>
+            <a:off x="838201" y="1492253"/>
+            <a:ext cx="7057644" cy="1904753"/>
           </a:xfrm>
           <a:prstGeom prst="rect">
             <a:avLst/>
@@ -6521,7 +6818,7 @@
     </p:spTree>
     <p:extLst>
       <p:ext uri="{BB962C8B-B14F-4D97-AF65-F5344CB8AC3E}">
-        <p14:creationId xmlns:p14="http://schemas.microsoft.com/office/powerpoint/2010/main" val="1208863920"/>
+        <p14:creationId xmlns:p14="http://schemas.microsoft.com/office/powerpoint/2010/main" val="2939723199"/>
       </p:ext>
     </p:extLst>
   </p:cSld>
@@ -6717,727 +7014,56 @@
           <a:lstStyle/>
           <a:p>
             <a:r>
-              <a:rPr lang="de-DE" err="1"/>
-              <a:t>How</a:t>
-            </a:r>
-            <a:r>
-              <a:rPr lang="de-DE"/>
-              <a:t> </a:t>
-            </a:r>
-            <a:r>
-              <a:rPr lang="de-DE" err="1"/>
-              <a:t>it</a:t>
-            </a:r>
-            <a:r>
-              <a:rPr lang="de-DE"/>
-              <a:t> </a:t>
-            </a:r>
-            <a:r>
-              <a:rPr lang="de-DE" err="1"/>
-              <a:t>works</a:t>
-            </a:r>
-            <a:r>
-              <a:rPr lang="de-DE"/>
-              <a:t>: Maximal </a:t>
-            </a:r>
-            <a:r>
-              <a:rPr lang="de-DE" err="1"/>
-              <a:t>margin</a:t>
-            </a:r>
-            <a:r>
-              <a:rPr lang="de-DE"/>
-              <a:t> </a:t>
-            </a:r>
-            <a:r>
-              <a:rPr lang="de-DE" err="1"/>
-              <a:t>classifier</a:t>
-            </a:r>
-            <a:endParaRPr lang="de-DE"/>
+              <a:rPr lang="de-DE"/>
+              <a:t>Performance in different Situations</a:t>
+            </a:r>
           </a:p>
         </p:txBody>
       </p:sp>
-      <mc:AlternateContent xmlns:mc="http://schemas.openxmlformats.org/markup-compatibility/2006">
-        <mc:Choice xmlns:a14="http://schemas.microsoft.com/office/drawing/2010/main" Requires="a14">
-          <p:sp>
-            <p:nvSpPr>
-              <p:cNvPr id="3" name="Inhaltsplatzhalter 2">
-                <a:extLst>
-                  <a:ext uri="{FF2B5EF4-FFF2-40B4-BE49-F238E27FC236}">
-                    <a16:creationId xmlns:a16="http://schemas.microsoft.com/office/drawing/2014/main" id="{B6EBCD5F-A998-E34B-B609-7A4D246D72F7}"/>
-                  </a:ext>
-                </a:extLst>
-              </p:cNvPr>
-              <p:cNvSpPr>
-                <a:spLocks noGrp="1"/>
-              </p:cNvSpPr>
-              <p:nvPr>
-                <p:ph idx="1"/>
-              </p:nvPr>
-            </p:nvSpPr>
-            <p:spPr>
-              <a:xfrm>
-                <a:off x="395536" y="1353344"/>
-                <a:ext cx="5472608" cy="2664633"/>
-              </a:xfrm>
-            </p:spPr>
-            <p:txBody>
-              <a:bodyPr/>
-              <a:lstStyle/>
-              <a:p>
-                <a:r>
-                  <a:rPr lang="de-DE" sz="2000"/>
-                  <a:t>Find </a:t>
-                </a:r>
-                <a:r>
-                  <a:rPr lang="de-DE" sz="2000" err="1"/>
-                  <a:t>the</a:t>
-                </a:r>
-                <a:r>
-                  <a:rPr lang="de-DE" sz="2000"/>
-                  <a:t> „</a:t>
-                </a:r>
-                <a:r>
-                  <a:rPr lang="de-DE" sz="2000" err="1"/>
-                  <a:t>best</a:t>
-                </a:r>
-                <a:r>
-                  <a:rPr lang="de-DE" sz="2000"/>
-                  <a:t>“ hyperplane </a:t>
-                </a:r>
-                <a:r>
-                  <a:rPr lang="de-DE" sz="2000" err="1"/>
-                  <a:t>using</a:t>
-                </a:r>
-                <a:r>
-                  <a:rPr lang="de-DE" sz="2000"/>
-                  <a:t> </a:t>
-                </a:r>
-                <a:r>
-                  <a:rPr lang="de-DE" sz="2000" err="1"/>
-                  <a:t>the</a:t>
-                </a:r>
-                <a:r>
-                  <a:rPr lang="de-DE" sz="2000"/>
-                  <a:t> </a:t>
-                </a:r>
-                <a:r>
-                  <a:rPr lang="de-DE" sz="2000" err="1"/>
-                  <a:t>margin</a:t>
-                </a:r>
-                <a:endParaRPr lang="de-DE" sz="2000"/>
-              </a:p>
-              <a:p>
-                <a:r>
-                  <a:rPr lang="de-DE" sz="2000"/>
-                  <a:t>Margin: </a:t>
-                </a:r>
-                <a:r>
-                  <a:rPr lang="de-DE" sz="2000" err="1"/>
-                  <a:t>smallest</a:t>
-                </a:r>
-                <a:r>
-                  <a:rPr lang="de-DE" sz="2000"/>
-                  <a:t> </a:t>
-                </a:r>
-                <a:r>
-                  <a:rPr lang="de-DE" sz="2000" err="1"/>
-                  <a:t>perpendicular</a:t>
-                </a:r>
-                <a:r>
-                  <a:rPr lang="de-DE" sz="2000"/>
-                  <a:t> </a:t>
-                </a:r>
-                <a:r>
-                  <a:rPr lang="de-DE" sz="2000" err="1"/>
-                  <a:t>distance</a:t>
-                </a:r>
-                <a:r>
-                  <a:rPr lang="de-DE" sz="2000"/>
-                  <a:t> </a:t>
-                </a:r>
-                <a:r>
-                  <a:rPr lang="de-DE" sz="2000" err="1"/>
-                  <a:t>from</a:t>
-                </a:r>
-                <a:r>
-                  <a:rPr lang="de-DE" sz="2000"/>
-                  <a:t> </a:t>
-                </a:r>
-                <a:r>
-                  <a:rPr lang="de-DE" sz="2000" err="1"/>
-                  <a:t>any</a:t>
-                </a:r>
-                <a:r>
-                  <a:rPr lang="de-DE" sz="2000"/>
-                  <a:t> </a:t>
-                </a:r>
-                <a:r>
-                  <a:rPr lang="de-DE" sz="2000" err="1"/>
-                  <a:t>observation</a:t>
-                </a:r>
-                <a:r>
-                  <a:rPr lang="de-DE" sz="2000"/>
-                  <a:t> </a:t>
-                </a:r>
-                <a:r>
-                  <a:rPr lang="de-DE" sz="2000" err="1"/>
-                  <a:t>to</a:t>
-                </a:r>
-                <a:r>
-                  <a:rPr lang="de-DE" sz="2000"/>
-                  <a:t> hyperplane</a:t>
-                </a:r>
-              </a:p>
-              <a:p>
-                <a:r>
-                  <a:rPr lang="de-DE" sz="2000" b="1"/>
-                  <a:t>maximal </a:t>
-                </a:r>
-                <a:r>
-                  <a:rPr lang="de-DE" sz="2000" b="1" err="1"/>
-                  <a:t>margin</a:t>
-                </a:r>
-                <a:r>
-                  <a:rPr lang="de-DE" sz="2000" b="1"/>
-                  <a:t> </a:t>
-                </a:r>
-                <a:r>
-                  <a:rPr lang="de-DE" sz="2000" b="1" err="1"/>
-                  <a:t>classifier</a:t>
-                </a:r>
-                <a:r>
-                  <a:rPr lang="de-DE" sz="2000" b="1"/>
-                  <a:t> </a:t>
-                </a:r>
-                <a:r>
-                  <a:rPr lang="de-DE" sz="2000"/>
-                  <a:t>= </a:t>
-                </a:r>
-                <a:r>
-                  <a:rPr lang="de-DE" sz="2000" err="1"/>
-                  <a:t>largest</a:t>
-                </a:r>
-                <a:r>
-                  <a:rPr lang="de-DE" sz="2000"/>
-                  <a:t> </a:t>
-                </a:r>
-                <a:r>
-                  <a:rPr lang="de-DE" sz="2000" err="1"/>
-                  <a:t>margin</a:t>
-                </a:r>
-                <a:r>
-                  <a:rPr lang="de-DE" sz="2000"/>
-                  <a:t> </a:t>
-                </a:r>
-                <a:r>
-                  <a:rPr lang="de-DE" sz="2000" err="1"/>
-                  <a:t>among</a:t>
-                </a:r>
-                <a:r>
-                  <a:rPr lang="de-DE" sz="2000"/>
-                  <a:t> all </a:t>
-                </a:r>
-                <a:r>
-                  <a:rPr lang="de-DE" sz="2000" err="1"/>
-                  <a:t>seperating</a:t>
-                </a:r>
-                <a:r>
-                  <a:rPr lang="de-DE" sz="2000"/>
-                  <a:t> hyperplanes</a:t>
-                </a:r>
-              </a:p>
-              <a:p>
-                <a:pPr lvl="1"/>
-                <a:r>
-                  <a:rPr lang="de-DE" sz="1600" err="1"/>
-                  <a:t>Optimization</a:t>
-                </a:r>
-                <a:r>
-                  <a:rPr lang="de-DE" sz="1600"/>
-                  <a:t> </a:t>
-                </a:r>
-                <a:r>
-                  <a:rPr lang="de-DE" sz="1600" err="1"/>
-                  <a:t>problem</a:t>
-                </a:r>
-                <a:r>
-                  <a:rPr lang="de-DE" sz="1600"/>
-                  <a:t>:</a:t>
-                </a:r>
-              </a:p>
-              <a:p>
-                <a:pPr lvl="2"/>
-                <a14:m>
-                  <m:oMath xmlns:m="http://schemas.openxmlformats.org/officeDocument/2006/math">
-                    <m:r>
-                      <a:rPr lang="de-DE" sz="1600" b="0" i="1" smtClean="0">
-                        <a:latin typeface="Cambria Math" panose="02040503050406030204" pitchFamily="18" charset="0"/>
-                      </a:rPr>
-                      <m:t>𝑆𝑒𝑙𝑒𝑐𝑡</m:t>
-                    </m:r>
-                    <m:r>
-                      <a:rPr lang="de-DE" sz="1600" b="0" i="1" smtClean="0">
-                        <a:latin typeface="Cambria Math" panose="02040503050406030204" pitchFamily="18" charset="0"/>
-                      </a:rPr>
-                      <m:t> </m:t>
-                    </m:r>
-                    <m:r>
-                      <a:rPr lang="de-DE" sz="1600" b="0" i="1" smtClean="0">
-                        <a:latin typeface="Cambria Math" panose="02040503050406030204" pitchFamily="18" charset="0"/>
-                        <a:ea typeface="Cambria Math" panose="02040503050406030204" pitchFamily="18" charset="0"/>
-                      </a:rPr>
-                      <m:t>𝛽</m:t>
-                    </m:r>
-                    <m:r>
-                      <a:rPr lang="de-DE" sz="1600" b="0" i="1" baseline="-25000" smtClean="0">
-                        <a:latin typeface="Cambria Math" panose="02040503050406030204" pitchFamily="18" charset="0"/>
-                        <a:ea typeface="Cambria Math" panose="02040503050406030204" pitchFamily="18" charset="0"/>
-                      </a:rPr>
-                      <m:t>0</m:t>
-                    </m:r>
-                    <m:r>
-                      <a:rPr lang="de-DE" sz="1600" b="0" i="1" smtClean="0">
-                        <a:latin typeface="Cambria Math" panose="02040503050406030204" pitchFamily="18" charset="0"/>
-                        <a:ea typeface="Cambria Math" panose="02040503050406030204" pitchFamily="18" charset="0"/>
-                      </a:rPr>
-                      <m:t>,</m:t>
-                    </m:r>
-                    <m:r>
-                      <a:rPr lang="de-DE" sz="1600" b="0" i="1" smtClean="0">
-                        <a:latin typeface="Cambria Math" panose="02040503050406030204" pitchFamily="18" charset="0"/>
-                        <a:ea typeface="Cambria Math" panose="02040503050406030204" pitchFamily="18" charset="0"/>
-                      </a:rPr>
-                      <m:t>𝛽</m:t>
-                    </m:r>
-                    <m:r>
-                      <a:rPr lang="de-DE" sz="1600" b="0" i="1" baseline="-25000" smtClean="0">
-                        <a:latin typeface="Cambria Math" panose="02040503050406030204" pitchFamily="18" charset="0"/>
-                        <a:ea typeface="Cambria Math" panose="02040503050406030204" pitchFamily="18" charset="0"/>
-                      </a:rPr>
-                      <m:t>1</m:t>
-                    </m:r>
-                    <m:r>
-                      <a:rPr lang="de-DE" sz="1600" b="0" i="1" smtClean="0">
-                        <a:latin typeface="Cambria Math" panose="02040503050406030204" pitchFamily="18" charset="0"/>
-                        <a:ea typeface="Cambria Math" panose="02040503050406030204" pitchFamily="18" charset="0"/>
-                      </a:rPr>
-                      <m:t>,…,</m:t>
-                    </m:r>
-                    <m:r>
-                      <a:rPr lang="de-DE" sz="1600" b="0" i="1" smtClean="0">
-                        <a:latin typeface="Cambria Math" panose="02040503050406030204" pitchFamily="18" charset="0"/>
-                        <a:ea typeface="Cambria Math" panose="02040503050406030204" pitchFamily="18" charset="0"/>
-                      </a:rPr>
-                      <m:t>𝛽</m:t>
-                    </m:r>
-                    <m:r>
-                      <a:rPr lang="de-DE" sz="1600" b="0" i="1" baseline="-25000" smtClean="0">
-                        <a:latin typeface="Cambria Math" panose="02040503050406030204" pitchFamily="18" charset="0"/>
-                        <a:ea typeface="Cambria Math" panose="02040503050406030204" pitchFamily="18" charset="0"/>
-                      </a:rPr>
-                      <m:t>𝑝</m:t>
-                    </m:r>
-                    <m:r>
-                      <a:rPr lang="de-DE" sz="1600" b="0" i="1" baseline="-25000" smtClean="0">
-                        <a:latin typeface="Cambria Math" panose="02040503050406030204" pitchFamily="18" charset="0"/>
-                        <a:ea typeface="Cambria Math" panose="02040503050406030204" pitchFamily="18" charset="0"/>
-                      </a:rPr>
-                      <m:t> </m:t>
-                    </m:r>
-                    <m:r>
-                      <a:rPr lang="de-DE" sz="1600" b="0" i="1" smtClean="0">
-                        <a:latin typeface="Cambria Math" panose="02040503050406030204" pitchFamily="18" charset="0"/>
-                        <a:ea typeface="Cambria Math" panose="02040503050406030204" pitchFamily="18" charset="0"/>
-                      </a:rPr>
-                      <m:t>𝑡h𝑎𝑡</m:t>
-                    </m:r>
-                    <m:r>
-                      <a:rPr lang="de-DE" sz="1600" b="0" i="1" smtClean="0">
-                        <a:latin typeface="Cambria Math" panose="02040503050406030204" pitchFamily="18" charset="0"/>
-                        <a:ea typeface="Cambria Math" panose="02040503050406030204" pitchFamily="18" charset="0"/>
-                      </a:rPr>
-                      <m:t> </m:t>
-                    </m:r>
-                    <m:r>
-                      <a:rPr lang="de-DE" sz="1600" b="0" i="1" smtClean="0">
-                        <a:latin typeface="Cambria Math" panose="02040503050406030204" pitchFamily="18" charset="0"/>
-                        <a:ea typeface="Cambria Math" panose="02040503050406030204" pitchFamily="18" charset="0"/>
-                      </a:rPr>
-                      <m:t>𝑚𝑎𝑥𝑖𝑚𝑖𝑧𝑒</m:t>
-                    </m:r>
-                    <m:r>
-                      <a:rPr lang="de-DE" sz="1600" b="0" i="1" smtClean="0">
-                        <a:latin typeface="Cambria Math" panose="02040503050406030204" pitchFamily="18" charset="0"/>
-                        <a:ea typeface="Cambria Math" panose="02040503050406030204" pitchFamily="18" charset="0"/>
-                      </a:rPr>
-                      <m:t> </m:t>
-                    </m:r>
-                    <m:r>
-                      <a:rPr lang="de-DE" sz="1600" b="0" i="1" smtClean="0">
-                        <a:latin typeface="Cambria Math" panose="02040503050406030204" pitchFamily="18" charset="0"/>
-                        <a:ea typeface="Cambria Math" panose="02040503050406030204" pitchFamily="18" charset="0"/>
-                      </a:rPr>
-                      <m:t>𝑀</m:t>
-                    </m:r>
-                  </m:oMath>
-                </a14:m>
-                <a:endParaRPr lang="de-DE" sz="1600"/>
-              </a:p>
-              <a:p>
-                <a:pPr lvl="2"/>
-                <a14:m>
-                  <m:oMath xmlns:m="http://schemas.openxmlformats.org/officeDocument/2006/math">
-                    <m:r>
-                      <a:rPr lang="de-DE" sz="1600" b="0" i="1" smtClean="0">
-                        <a:latin typeface="Cambria Math" panose="02040503050406030204" pitchFamily="18" charset="0"/>
-                      </a:rPr>
-                      <m:t>𝑠𝑢𝑐h</m:t>
-                    </m:r>
-                    <m:r>
-                      <a:rPr lang="de-DE" sz="1600" b="0" i="1" smtClean="0">
-                        <a:latin typeface="Cambria Math" panose="02040503050406030204" pitchFamily="18" charset="0"/>
-                      </a:rPr>
-                      <m:t> </m:t>
-                    </m:r>
-                    <m:r>
-                      <a:rPr lang="de-DE" sz="1600" b="0" i="1" smtClean="0">
-                        <a:latin typeface="Cambria Math" panose="02040503050406030204" pitchFamily="18" charset="0"/>
-                      </a:rPr>
-                      <m:t>𝑡h𝑎𝑡</m:t>
-                    </m:r>
-                    <m:r>
-                      <a:rPr lang="de-DE" sz="1600" b="0" i="1" smtClean="0">
-                        <a:latin typeface="Cambria Math" panose="02040503050406030204" pitchFamily="18" charset="0"/>
-                      </a:rPr>
-                      <m:t> </m:t>
-                    </m:r>
-                    <m:nary>
-                      <m:naryPr>
-                        <m:chr m:val="∑"/>
-                        <m:ctrlPr>
-                          <a:rPr lang="de-DE" sz="1600" b="0" i="1" smtClean="0">
-                            <a:latin typeface="Cambria Math" panose="02040503050406030204" pitchFamily="18" charset="0"/>
-                          </a:rPr>
-                        </m:ctrlPr>
-                      </m:naryPr>
-                      <m:sub>
-                        <m:r>
-                          <m:rPr>
-                            <m:brk m:alnAt="23"/>
-                          </m:rPr>
-                          <a:rPr lang="de-DE" sz="1600" b="0" i="1" smtClean="0">
-                            <a:latin typeface="Cambria Math" panose="02040503050406030204" pitchFamily="18" charset="0"/>
-                          </a:rPr>
-                          <m:t>𝑘</m:t>
-                        </m:r>
-                        <m:r>
-                          <a:rPr lang="de-DE" sz="1600" b="0" i="1" smtClean="0">
-                            <a:latin typeface="Cambria Math" panose="02040503050406030204" pitchFamily="18" charset="0"/>
-                          </a:rPr>
-                          <m:t>=1</m:t>
-                        </m:r>
-                      </m:sub>
-                      <m:sup>
-                        <m:r>
-                          <a:rPr lang="de-DE" sz="1600" b="0" i="1" smtClean="0">
-                            <a:latin typeface="Cambria Math" panose="02040503050406030204" pitchFamily="18" charset="0"/>
-                          </a:rPr>
-                          <m:t>𝑝</m:t>
-                        </m:r>
-                      </m:sup>
-                      <m:e>
-                        <m:r>
-                          <a:rPr lang="de-DE" sz="1600" b="0" i="1" smtClean="0">
-                            <a:latin typeface="Cambria Math" panose="02040503050406030204" pitchFamily="18" charset="0"/>
-                            <a:ea typeface="Cambria Math" panose="02040503050406030204" pitchFamily="18" charset="0"/>
-                          </a:rPr>
-                          <m:t>𝛽</m:t>
-                        </m:r>
-                        <m:r>
-                          <a:rPr lang="de-DE" sz="1600" b="0" i="1" baseline="-25000" smtClean="0">
-                            <a:latin typeface="Cambria Math" panose="02040503050406030204" pitchFamily="18" charset="0"/>
-                            <a:ea typeface="Cambria Math" panose="02040503050406030204" pitchFamily="18" charset="0"/>
-                          </a:rPr>
-                          <m:t>𝑘</m:t>
-                        </m:r>
-                        <m:r>
-                          <a:rPr lang="de-DE" sz="1600" b="0" i="1" baseline="30000" smtClean="0">
-                            <a:latin typeface="Cambria Math" panose="02040503050406030204" pitchFamily="18" charset="0"/>
-                            <a:ea typeface="Cambria Math" panose="02040503050406030204" pitchFamily="18" charset="0"/>
-                          </a:rPr>
-                          <m:t>2</m:t>
-                        </m:r>
-                        <m:r>
-                          <a:rPr lang="de-DE" sz="1600" b="0" i="1" smtClean="0">
-                            <a:latin typeface="Cambria Math" panose="02040503050406030204" pitchFamily="18" charset="0"/>
-                            <a:ea typeface="Cambria Math" panose="02040503050406030204" pitchFamily="18" charset="0"/>
-                          </a:rPr>
-                          <m:t>=1</m:t>
-                        </m:r>
-                      </m:e>
-                    </m:nary>
-                  </m:oMath>
-                </a14:m>
-                <a:endParaRPr lang="de-DE" sz="1600"/>
-              </a:p>
-              <a:p>
-                <a:pPr lvl="2"/>
-                <a14:m>
-                  <m:oMath xmlns:m="http://schemas.openxmlformats.org/officeDocument/2006/math">
-                    <m:r>
-                      <a:rPr lang="de-DE" sz="1600" b="0" i="1" smtClean="0">
-                        <a:latin typeface="Cambria Math" panose="02040503050406030204" pitchFamily="18" charset="0"/>
-                      </a:rPr>
-                      <m:t>𝑎𝑛𝑑</m:t>
-                    </m:r>
-                    <m:r>
-                      <m:rPr>
-                        <m:nor/>
-                      </m:rPr>
-                      <a:rPr lang="de-DE" sz="1600" b="0" i="0" smtClean="0">
-                        <a:latin typeface="Cambria Math" panose="02040503050406030204" pitchFamily="18" charset="0"/>
-                      </a:rPr>
-                      <m:t> </m:t>
-                    </m:r>
-                    <m:r>
-                      <m:rPr>
-                        <m:nor/>
-                      </m:rPr>
-                      <a:rPr lang="de-DE" sz="1600"/>
-                      <m:t>∀</m:t>
-                    </m:r>
-                    <m:r>
-                      <a:rPr lang="de-DE" sz="1600" b="0" i="1" smtClean="0">
-                        <a:latin typeface="Cambria Math" panose="02040503050406030204" pitchFamily="18" charset="0"/>
-                      </a:rPr>
-                      <m:t>𝑖</m:t>
-                    </m:r>
-                    <m:r>
-                      <a:rPr lang="de-DE" sz="1600" b="0" i="1" smtClean="0">
-                        <a:latin typeface="Cambria Math" panose="02040503050406030204" pitchFamily="18" charset="0"/>
-                      </a:rPr>
-                      <m:t>:</m:t>
-                    </m:r>
-                    <m:r>
-                      <a:rPr lang="de-DE" sz="1600" b="0" i="1" smtClean="0">
-                        <a:latin typeface="Cambria Math" panose="02040503050406030204" pitchFamily="18" charset="0"/>
-                      </a:rPr>
-                      <m:t>𝑦𝑖</m:t>
-                    </m:r>
-                    <m:r>
-                      <a:rPr lang="de-DE" sz="1600" b="0" i="1" smtClean="0">
-                        <a:latin typeface="Cambria Math" panose="02040503050406030204" pitchFamily="18" charset="0"/>
-                      </a:rPr>
-                      <m:t>∗(</m:t>
-                    </m:r>
-                    <m:r>
-                      <a:rPr lang="de-DE" sz="1600" b="0" i="1" smtClean="0">
-                        <a:latin typeface="Cambria Math" panose="02040503050406030204" pitchFamily="18" charset="0"/>
-                        <a:ea typeface="Cambria Math" panose="02040503050406030204" pitchFamily="18" charset="0"/>
-                      </a:rPr>
-                      <m:t>𝛽</m:t>
-                    </m:r>
-                    <m:r>
-                      <a:rPr lang="de-DE" sz="1600" b="0" i="1" baseline="-25000" smtClean="0">
-                        <a:latin typeface="Cambria Math" panose="02040503050406030204" pitchFamily="18" charset="0"/>
-                        <a:ea typeface="Cambria Math" panose="02040503050406030204" pitchFamily="18" charset="0"/>
-                      </a:rPr>
-                      <m:t>0</m:t>
-                    </m:r>
-                    <m:r>
-                      <a:rPr lang="de-DE" sz="1600" b="0" i="1" smtClean="0">
-                        <a:latin typeface="Cambria Math" panose="02040503050406030204" pitchFamily="18" charset="0"/>
-                        <a:ea typeface="Cambria Math" panose="02040503050406030204" pitchFamily="18" charset="0"/>
-                      </a:rPr>
-                      <m:t>+ </m:t>
-                    </m:r>
-                    <m:nary>
-                      <m:naryPr>
-                        <m:chr m:val="∑"/>
-                        <m:ctrlPr>
-                          <a:rPr lang="de-DE" sz="1600" b="0" i="1" smtClean="0">
-                            <a:latin typeface="Cambria Math" panose="02040503050406030204" pitchFamily="18" charset="0"/>
-                            <a:ea typeface="Cambria Math" panose="02040503050406030204" pitchFamily="18" charset="0"/>
-                          </a:rPr>
-                        </m:ctrlPr>
-                      </m:naryPr>
-                      <m:sub>
-                        <m:r>
-                          <m:rPr>
-                            <m:brk m:alnAt="23"/>
-                          </m:rPr>
-                          <a:rPr lang="de-DE" sz="1600" b="0" i="1" smtClean="0">
-                            <a:latin typeface="Cambria Math" panose="02040503050406030204" pitchFamily="18" charset="0"/>
-                            <a:ea typeface="Cambria Math" panose="02040503050406030204" pitchFamily="18" charset="0"/>
-                          </a:rPr>
-                          <m:t>𝑘</m:t>
-                        </m:r>
-                        <m:r>
-                          <a:rPr lang="de-DE" sz="1600" b="0" i="1" smtClean="0">
-                            <a:latin typeface="Cambria Math" panose="02040503050406030204" pitchFamily="18" charset="0"/>
-                            <a:ea typeface="Cambria Math" panose="02040503050406030204" pitchFamily="18" charset="0"/>
-                          </a:rPr>
-                          <m:t>=1</m:t>
-                        </m:r>
-                      </m:sub>
-                      <m:sup>
-                        <m:r>
-                          <a:rPr lang="de-DE" sz="1600" b="0" i="1" smtClean="0">
-                            <a:latin typeface="Cambria Math" panose="02040503050406030204" pitchFamily="18" charset="0"/>
-                            <a:ea typeface="Cambria Math" panose="02040503050406030204" pitchFamily="18" charset="0"/>
-                          </a:rPr>
-                          <m:t>𝑝</m:t>
-                        </m:r>
-                      </m:sup>
-                      <m:e>
-                        <m:r>
-                          <a:rPr lang="de-DE" sz="1600" b="0" i="1" smtClean="0">
-                            <a:latin typeface="Cambria Math" panose="02040503050406030204" pitchFamily="18" charset="0"/>
-                            <a:ea typeface="Cambria Math" panose="02040503050406030204" pitchFamily="18" charset="0"/>
-                          </a:rPr>
-                          <m:t>𝛽</m:t>
-                        </m:r>
-                        <m:r>
-                          <a:rPr lang="de-DE" sz="1600" b="0" i="1" baseline="-25000" smtClean="0">
-                            <a:latin typeface="Cambria Math" panose="02040503050406030204" pitchFamily="18" charset="0"/>
-                            <a:ea typeface="Cambria Math" panose="02040503050406030204" pitchFamily="18" charset="0"/>
-                          </a:rPr>
-                          <m:t>𝑘</m:t>
-                        </m:r>
-                        <m:r>
-                          <a:rPr lang="de-DE" sz="1600" b="0" i="1" smtClean="0">
-                            <a:latin typeface="Cambria Math" panose="02040503050406030204" pitchFamily="18" charset="0"/>
-                            <a:ea typeface="Cambria Math" panose="02040503050406030204" pitchFamily="18" charset="0"/>
-                          </a:rPr>
-                          <m:t>𝑥</m:t>
-                        </m:r>
-                        <m:r>
-                          <a:rPr lang="de-DE" sz="1600" b="0" i="1" baseline="-25000" smtClean="0">
-                            <a:latin typeface="Cambria Math" panose="02040503050406030204" pitchFamily="18" charset="0"/>
-                            <a:ea typeface="Cambria Math" panose="02040503050406030204" pitchFamily="18" charset="0"/>
-                          </a:rPr>
-                          <m:t>𝑖𝑘</m:t>
-                        </m:r>
-                        <m:r>
-                          <a:rPr lang="de-DE" sz="1600" b="0" i="1" smtClean="0">
-                            <a:latin typeface="Cambria Math" panose="02040503050406030204" pitchFamily="18" charset="0"/>
-                            <a:ea typeface="Cambria Math" panose="02040503050406030204" pitchFamily="18" charset="0"/>
-                          </a:rPr>
-                          <m:t>)≥</m:t>
-                        </m:r>
-                        <m:r>
-                          <a:rPr lang="de-DE" sz="1600" b="0" i="1" smtClean="0">
-                            <a:latin typeface="Cambria Math" panose="02040503050406030204" pitchFamily="18" charset="0"/>
-                            <a:ea typeface="Cambria Math" panose="02040503050406030204" pitchFamily="18" charset="0"/>
-                          </a:rPr>
-                          <m:t>𝑀</m:t>
-                        </m:r>
-                      </m:e>
-                    </m:nary>
-                  </m:oMath>
-                </a14:m>
-                <a:endParaRPr lang="de-DE" sz="1600"/>
-              </a:p>
-            </p:txBody>
-          </p:sp>
-        </mc:Choice>
-        <mc:Fallback>
-          <p:sp>
-            <p:nvSpPr>
-              <p:cNvPr id="3" name="Inhaltsplatzhalter 2">
-                <a:extLst>
-                  <a:ext uri="{FF2B5EF4-FFF2-40B4-BE49-F238E27FC236}">
-                    <a16:creationId xmlns:a16="http://schemas.microsoft.com/office/drawing/2014/main" id="{B6EBCD5F-A998-E34B-B609-7A4D246D72F7}"/>
-                  </a:ext>
-                </a:extLst>
-              </p:cNvPr>
-              <p:cNvSpPr>
-                <a:spLocks noGrp="1" noRot="1" noChangeAspect="1" noMove="1" noResize="1" noEditPoints="1" noAdjustHandles="1" noChangeArrowheads="1" noChangeShapeType="1" noTextEdit="1"/>
-              </p:cNvSpPr>
-              <p:nvPr>
-                <p:ph idx="1"/>
-              </p:nvPr>
-            </p:nvSpPr>
-            <p:spPr>
-              <a:xfrm>
-                <a:off x="395536" y="1353344"/>
-                <a:ext cx="5472608" cy="2664633"/>
-              </a:xfrm>
-              <a:blipFill>
-                <a:blip r:embed="rId2"/>
-                <a:stretch>
-                  <a:fillRect l="-1002" t="-915" r="-557" b="-32952"/>
-                </a:stretch>
-              </a:blipFill>
-            </p:spPr>
-            <p:txBody>
-              <a:bodyPr/>
-              <a:lstStyle/>
-              <a:p>
-                <a:r>
-                  <a:rPr lang="en-US">
-                    <a:noFill/>
-                  </a:rPr>
-                  <a:t> </a:t>
-                </a:r>
-              </a:p>
-            </p:txBody>
-          </p:sp>
-        </mc:Fallback>
-      </mc:AlternateContent>
-      <p:sp>
-        <p:nvSpPr>
-          <p:cNvPr id="4" name="Rechteck 3">
+      <p:pic>
+        <p:nvPicPr>
+          <p:cNvPr id="8" name="Grafik 7" descr="\documentclass[20pt]{article}&#10;\usepackage{amsmath,amsfonts,amssymb,xcolor, mathtools}&#10;\pagestyle{empty}&#10;\usepackage{booktabs}&#10;\usepackage{enumitem}&#10; \usepackage{multirow}&#10;\usepackage{longtable}&#10;\usepackage{xcolor}&#10;\definecolor{darkgreen}{RGB}{101,178,56}&#10;\usepackage{graphicx}&#10;\usepackage{parskip}&#10;\usepackage[T1]{fontenc}&#10;\usepackage{fontspec}&#10;\setsansfont{Arial}&#10;\renewcommand\familydefault{\sfdefault}&#10;\begin{document}&#10;\begin{center}&#10;\begin{longtable}{ll|lll|}&#10; \cline{3-5}&#10; &amp;             &amp; \multicolumn{3}{c|}{DGP}                                            \\ \cline{3-5} &#10; \endfirsthead&#10; %&#10; \endhead&#10; %&#10; &amp;             &amp; \multicolumn{1}{l|}{linear} &amp; \multicolumn{1}{l|}{polynomial} &amp; radial \\ \hline&#10; \multicolumn{1}{|l|}{\multirow{3}{*}{\rotatebox{90}{Dimensionality}}} &amp; $p \ll n$  &amp; \multicolumn{1}{l|}{\parbox{4cm}{\begin{itemize}[label=-,topsep=0cm,leftmargin=0.3cm,itemsep=0cm,parsep=0cm]&#10;   \item SVM-Linear \textcolor{darkgreen}{\scalebox{1}{$\uparrow$}}&#10;   \item SVM-Polynomial \textcolor{darkgreen}{\scalebox{0.5}{$\uparrow$}}&#10;   \item SVM-Radial \textcolor{darkgreen}{\scalebox{0.5}{$\uparrow$}}&#10;   \item Logistic Regression \textcolor{red}{\scalebox{0.5}{$\downarrow$}}&#10; \end{itemize}}}  &amp; \multicolumn{1}{l|}{\parbox{4cm}{\begin{itemize}[label=-,topsep=0cm,leftmargin=0.3cm,itemsep=0cm,parsep=0cm]&#10; \item SVM-Linear \textcolor{darkgreen}{\scalebox{0.5}{$\uparrow$}}&#10; \item SVM-Polynomial \textcolor{darkgreen}{\scalebox{1}{$\uparrow$}}&#10; \item SVM-Radial \textcolor{darkgreen}{\scalebox{0.5}{$\uparrow$}}&#10; \item Logistic Regression \textcolor{red}{\scalebox{0.5}{$\downarrow$}}&#10;\end{itemize}}}   &amp; \parbox{4cm}{\begin{itemize}[label=-,topsep=0cm,leftmargin=0.3cm,itemsep=0cm,parsep=0cm]&#10;\item SVM-Linear \textcolor{darkgreen}{\scalebox{0.5}{$\uparrow$}}&#10;\item SVM-Polynomial \textcolor{darkgreen}{\scalebox{0.5}{$\uparrow$}}&#10;\item SVM-Radial \textcolor{darkgreen}{\scalebox{1}{$\uparrow$}}&#10;\item Logistic Regression \textcolor{red}{\scalebox{0.5}{$\downarrow$}}&#10;\end{itemize}}  \\ \cline{2-5} &#10; \multicolumn{1}{|l|}{}                                &amp; $p \approx n$  &amp; \multicolumn{1}{l|}{\parbox{4cm}{\begin{itemize}[label=-,topsep=0cm,leftmargin=0.3cm,itemsep=0cm,parsep=0cm]&#10;    \item SVM-Linear&#10;    \item SVM-Polynomial&#10;    \item SVM-Radial&#10;    \item Logistic Regression&#10; \end{itemize}}}  &amp; \multicolumn{1}{l|}{\parbox{4cm}{\begin{itemize}[label=-,topsep=0cm,leftmargin=0.3cm,itemsep=0cm,parsep=0cm]&#10; \item SVM-Linear&#10; \item SVM-Polynomial&#10; \item SVM-Radial&#10; \item Logistic Regression&#10;\end{itemize}}}   &amp; \parbox{4cm}{\begin{itemize}[label=-,topsep=0cm,leftmargin=0.3cm,itemsep=0cm,parsep=0cm]&#10;\item SVM-Linear&#10;\item SVM-Polynomial&#10;\item SVM-Radial&#10;\item Logistic Regression&#10;\end{itemize}}  \\ \cline{2-5} &#10; \multicolumn{1}{|l|}{}                                &amp; $p \gg n$ &amp; \multicolumn{1}{l|}{\parbox{4cm}{\begin{itemize}[label=-,topsep=0cm,leftmargin=0.3cm,itemsep=0cm,parsep=0cm]&#10;    \item SVM-Linear&#10;    \item SVM-Polynomial&#10;    \item SVM-Radial&#10;    \item Logistic Regression&#10; \end{itemize}}}  &amp; \multicolumn{1}{l|}{\parbox{4cm}{\begin{itemize}[label=-,topsep=0cm,leftmargin=0.3cm,itemsep=0cm,parsep=0cm]&#10; \item SVM-Linear&#10; \item SVM-Polynomial&#10; \item SVM-Radial&#10; \item Logistic Regression&#10;\end{itemize}}}   &amp; \parbox{4cm}{\begin{itemize}[label=-,topsep=0cm,leftmargin=0.3cm,itemsep=0cm,parsep=0cm]&#10;\item SVM-Linear&#10;\item SVM-Polynomial&#10;\item SVM-Radial&#10;\item Logistic Regression&#10;\end{itemize}} \\ \hline&#10;\end{longtable}&#10;\end{center}&#10;\end{document}" title="IguanaTex Picture Display">
             <a:extLst>
               <a:ext uri="{FF2B5EF4-FFF2-40B4-BE49-F238E27FC236}">
-                <a16:creationId xmlns:a16="http://schemas.microsoft.com/office/drawing/2014/main" id="{A562C1B5-281C-3BDC-6412-20057B1E2222}"/>
+                <a16:creationId xmlns:a16="http://schemas.microsoft.com/office/drawing/2014/main" id="{59A35446-63A6-BA9E-7F11-1DBDBA76C36F}"/>
               </a:ext>
             </a:extLst>
           </p:cNvPr>
-          <p:cNvSpPr/>
-          <p:nvPr/>
-        </p:nvSpPr>
+          <p:cNvPicPr>
+            <a:picLocks noChangeAspect="1"/>
+          </p:cNvPicPr>
+          <p:nvPr>
+            <p:custDataLst>
+              <p:tags r:id="rId1"/>
+            </p:custDataLst>
+          </p:nvPr>
+        </p:nvPicPr>
+        <p:blipFill>
+          <a:blip r:embed="rId3">
+            <a:extLst>
+              <a:ext uri="{28A0092B-C50C-407E-A947-70E740481C1C}">
+                <a14:useLocalDpi xmlns:a14="http://schemas.microsoft.com/office/drawing/2010/main" val="0"/>
+              </a:ext>
+            </a:extLst>
+          </a:blip>
+          <a:stretch>
+            <a:fillRect/>
+          </a:stretch>
+        </p:blipFill>
         <p:spPr>
           <a:xfrm>
-            <a:off x="6212485" y="1497528"/>
-            <a:ext cx="2520280" cy="2376264"/>
+            <a:off x="504825" y="1028700"/>
+            <a:ext cx="8045243" cy="3087318"/>
           </a:xfrm>
           <a:prstGeom prst="rect">
             <a:avLst/>
           </a:prstGeom>
         </p:spPr>
-        <p:style>
-          <a:lnRef idx="2">
-            <a:schemeClr val="accent1">
-              <a:shade val="15000"/>
-            </a:schemeClr>
-          </a:lnRef>
-          <a:fillRef idx="1">
-            <a:schemeClr val="accent1"/>
-          </a:fillRef>
-          <a:effectRef idx="0">
-            <a:schemeClr val="accent1"/>
-          </a:effectRef>
-          <a:fontRef idx="minor">
-            <a:schemeClr val="lt1"/>
-          </a:fontRef>
-        </p:style>
-        <p:txBody>
-          <a:bodyPr rtlCol="0" anchor="ctr"/>
-          <a:lstStyle/>
-          <a:p>
-            <a:pPr algn="ctr"/>
-            <a:r>
-              <a:rPr lang="de-DE"/>
-              <a:t>Grafik</a:t>
-            </a:r>
-          </a:p>
-        </p:txBody>
-      </p:sp>
+      </p:pic>
     </p:spTree>
     <p:extLst>
       <p:ext uri="{BB962C8B-B14F-4D97-AF65-F5344CB8AC3E}">
-        <p14:creationId xmlns:p14="http://schemas.microsoft.com/office/powerpoint/2010/main" val="695573505"/>
+        <p14:creationId xmlns:p14="http://schemas.microsoft.com/office/powerpoint/2010/main" val="1604509671"/>
       </p:ext>
     </p:extLst>
   </p:cSld>
@@ -7448,205 +7074,6 @@
 </file>
 
 <file path=ppt/slides/slide21.xml><?xml version="1.0" encoding="utf-8"?>
-<p:sld xmlns:a="http://schemas.openxmlformats.org/drawingml/2006/main" xmlns:r="http://schemas.openxmlformats.org/officeDocument/2006/relationships" xmlns:p="http://schemas.openxmlformats.org/presentationml/2006/main">
-  <p:cSld>
-    <p:spTree>
-      <p:nvGrpSpPr>
-        <p:cNvPr id="1" name=""/>
-        <p:cNvGrpSpPr/>
-        <p:nvPr/>
-      </p:nvGrpSpPr>
-      <p:grpSpPr>
-        <a:xfrm>
-          <a:off x="0" y="0"/>
-          <a:ext cx="0" cy="0"/>
-          <a:chOff x="0" y="0"/>
-          <a:chExt cx="0" cy="0"/>
-        </a:xfrm>
-      </p:grpSpPr>
-      <p:sp>
-        <p:nvSpPr>
-          <p:cNvPr id="2" name="Titel 1">
-            <a:extLst>
-              <a:ext uri="{FF2B5EF4-FFF2-40B4-BE49-F238E27FC236}">
-                <a16:creationId xmlns:a16="http://schemas.microsoft.com/office/drawing/2014/main" id="{388F7BA3-B785-BDE2-BAC6-74C1F53E9285}"/>
-              </a:ext>
-            </a:extLst>
-          </p:cNvPr>
-          <p:cNvSpPr>
-            <a:spLocks noGrp="1"/>
-          </p:cNvSpPr>
-          <p:nvPr>
-            <p:ph type="title"/>
-          </p:nvPr>
-        </p:nvSpPr>
-        <p:spPr/>
-        <p:txBody>
-          <a:bodyPr/>
-          <a:lstStyle/>
-          <a:p>
-            <a:r>
-              <a:rPr lang="de-DE"/>
-              <a:t>Pros and Cons</a:t>
-            </a:r>
-          </a:p>
-        </p:txBody>
-      </p:sp>
-      <p:sp>
-        <p:nvSpPr>
-          <p:cNvPr id="3" name="Inhaltsplatzhalter 2">
-            <a:extLst>
-              <a:ext uri="{FF2B5EF4-FFF2-40B4-BE49-F238E27FC236}">
-                <a16:creationId xmlns:a16="http://schemas.microsoft.com/office/drawing/2014/main" id="{B6EBCD5F-A998-E34B-B609-7A4D246D72F7}"/>
-              </a:ext>
-            </a:extLst>
-          </p:cNvPr>
-          <p:cNvSpPr>
-            <a:spLocks noGrp="1"/>
-          </p:cNvSpPr>
-          <p:nvPr>
-            <p:ph idx="1"/>
-          </p:nvPr>
-        </p:nvSpPr>
-        <p:spPr/>
-        <p:txBody>
-          <a:bodyPr/>
-          <a:lstStyle/>
-          <a:p>
-            <a:endParaRPr lang="de-DE" sz="2000"/>
-          </a:p>
-        </p:txBody>
-      </p:sp>
-    </p:spTree>
-    <p:extLst>
-      <p:ext uri="{BB962C8B-B14F-4D97-AF65-F5344CB8AC3E}">
-        <p14:creationId xmlns:p14="http://schemas.microsoft.com/office/powerpoint/2010/main" val="2939723199"/>
-      </p:ext>
-    </p:extLst>
-  </p:cSld>
-  <p:clrMapOvr>
-    <a:masterClrMapping/>
-  </p:clrMapOvr>
-</p:sld>
-</file>
-
-<file path=ppt/slides/slide22.xml><?xml version="1.0" encoding="utf-8"?>
-<p:sld xmlns:a="http://schemas.openxmlformats.org/drawingml/2006/main" xmlns:r="http://schemas.openxmlformats.org/officeDocument/2006/relationships" xmlns:p="http://schemas.openxmlformats.org/presentationml/2006/main">
-  <p:cSld>
-    <p:spTree>
-      <p:nvGrpSpPr>
-        <p:cNvPr id="1" name=""/>
-        <p:cNvGrpSpPr/>
-        <p:nvPr/>
-      </p:nvGrpSpPr>
-      <p:grpSpPr>
-        <a:xfrm>
-          <a:off x="0" y="0"/>
-          <a:ext cx="0" cy="0"/>
-          <a:chOff x="0" y="0"/>
-          <a:chExt cx="0" cy="0"/>
-        </a:xfrm>
-      </p:grpSpPr>
-      <p:sp>
-        <p:nvSpPr>
-          <p:cNvPr id="2" name="Titel 1">
-            <a:extLst>
-              <a:ext uri="{FF2B5EF4-FFF2-40B4-BE49-F238E27FC236}">
-                <a16:creationId xmlns:a16="http://schemas.microsoft.com/office/drawing/2014/main" id="{388F7BA3-B785-BDE2-BAC6-74C1F53E9285}"/>
-              </a:ext>
-            </a:extLst>
-          </p:cNvPr>
-          <p:cNvSpPr>
-            <a:spLocks noGrp="1"/>
-          </p:cNvSpPr>
-          <p:nvPr>
-            <p:ph type="title"/>
-          </p:nvPr>
-        </p:nvSpPr>
-        <p:spPr/>
-        <p:txBody>
-          <a:bodyPr/>
-          <a:lstStyle/>
-          <a:p>
-            <a:r>
-              <a:rPr lang="de-DE" err="1"/>
-              <a:t>How</a:t>
-            </a:r>
-            <a:r>
-              <a:rPr lang="de-DE"/>
-              <a:t> </a:t>
-            </a:r>
-            <a:r>
-              <a:rPr lang="de-DE" err="1"/>
-              <a:t>it</a:t>
-            </a:r>
-            <a:r>
-              <a:rPr lang="de-DE"/>
-              <a:t> </a:t>
-            </a:r>
-            <a:r>
-              <a:rPr lang="de-DE" err="1"/>
-              <a:t>works</a:t>
-            </a:r>
-            <a:r>
-              <a:rPr lang="de-DE"/>
-              <a:t>: Support </a:t>
-            </a:r>
-            <a:r>
-              <a:rPr lang="de-DE" err="1"/>
-              <a:t>vector</a:t>
-            </a:r>
-            <a:r>
-              <a:rPr lang="de-DE"/>
-              <a:t> </a:t>
-            </a:r>
-            <a:r>
-              <a:rPr lang="de-DE" err="1"/>
-              <a:t>machine</a:t>
-            </a:r>
-            <a:endParaRPr lang="de-DE"/>
-          </a:p>
-        </p:txBody>
-      </p:sp>
-      <p:sp>
-        <p:nvSpPr>
-          <p:cNvPr id="3" name="Inhaltsplatzhalter 2">
-            <a:extLst>
-              <a:ext uri="{FF2B5EF4-FFF2-40B4-BE49-F238E27FC236}">
-                <a16:creationId xmlns:a16="http://schemas.microsoft.com/office/drawing/2014/main" id="{B6EBCD5F-A998-E34B-B609-7A4D246D72F7}"/>
-              </a:ext>
-            </a:extLst>
-          </p:cNvPr>
-          <p:cNvSpPr>
-            <a:spLocks noGrp="1"/>
-          </p:cNvSpPr>
-          <p:nvPr>
-            <p:ph idx="1"/>
-          </p:nvPr>
-        </p:nvSpPr>
-        <p:spPr/>
-        <p:txBody>
-          <a:bodyPr/>
-          <a:lstStyle/>
-          <a:p>
-            <a:endParaRPr lang="de-DE" sz="2000"/>
-          </a:p>
-        </p:txBody>
-      </p:sp>
-    </p:spTree>
-    <p:extLst>
-      <p:ext uri="{BB962C8B-B14F-4D97-AF65-F5344CB8AC3E}">
-        <p14:creationId xmlns:p14="http://schemas.microsoft.com/office/powerpoint/2010/main" val="3746182716"/>
-      </p:ext>
-    </p:extLst>
-  </p:cSld>
-  <p:clrMapOvr>
-    <a:masterClrMapping/>
-  </p:clrMapOvr>
-</p:sld>
-</file>
-
-<file path=ppt/slides/slide23.xml><?xml version="1.0" encoding="utf-8"?>
 <p:sld xmlns:a="http://schemas.openxmlformats.org/drawingml/2006/main" xmlns:r="http://schemas.openxmlformats.org/officeDocument/2006/relationships" xmlns:p="http://schemas.openxmlformats.org/presentationml/2006/main">
   <p:cSld>
     <p:spTree>
@@ -7916,7 +7343,7 @@
 </p:sld>
 </file>
 
-<file path=ppt/slides/slide24.xml><?xml version="1.0" encoding="utf-8"?>
+<file path=ppt/slides/slide22.xml><?xml version="1.0" encoding="utf-8"?>
 <p:sld xmlns:a="http://schemas.openxmlformats.org/drawingml/2006/main" xmlns:r="http://schemas.openxmlformats.org/officeDocument/2006/relationships" xmlns:p="http://schemas.openxmlformats.org/presentationml/2006/main">
   <p:cSld>
     <p:spTree>
@@ -8126,8 +7553,8 @@
 </p:sld>
 </file>
 
-<file path=ppt/slides/slide25.xml><?xml version="1.0" encoding="utf-8"?>
-<p:sld xmlns:a="http://schemas.openxmlformats.org/drawingml/2006/main" xmlns:r="http://schemas.openxmlformats.org/officeDocument/2006/relationships" xmlns:p="http://schemas.openxmlformats.org/presentationml/2006/main">
+<file path=ppt/slides/slide23.xml><?xml version="1.0" encoding="utf-8"?>
+<p:sld xmlns:a="http://schemas.openxmlformats.org/drawingml/2006/main" xmlns:r="http://schemas.openxmlformats.org/officeDocument/2006/relationships" xmlns:p="http://schemas.openxmlformats.org/presentationml/2006/main" show="0">
   <p:cSld>
     <p:spTree>
       <p:nvGrpSpPr>
@@ -8256,7 +7683,7 @@
 </p:sld>
 </file>
 
-<file path=ppt/slides/slide26.xml><?xml version="1.0" encoding="utf-8"?>
+<file path=ppt/slides/slide24.xml><?xml version="1.0" encoding="utf-8"?>
 <p:sld xmlns:a="http://schemas.openxmlformats.org/drawingml/2006/main" xmlns:r="http://schemas.openxmlformats.org/officeDocument/2006/relationships" xmlns:p="http://schemas.openxmlformats.org/presentationml/2006/main">
   <p:cSld>
     <p:spTree>
@@ -8828,693 +8255,104 @@
             </a:r>
             <a:r>
               <a:rPr lang="de-DE"/>
-              <a:t>: </a:t>
+              <a:t>: Setting </a:t>
             </a:r>
             <a:r>
               <a:rPr lang="de-DE" err="1"/>
-              <a:t>Seperating</a:t>
-            </a:r>
-            <a:r>
-              <a:rPr lang="de-DE"/>
-              <a:t> Hyperplane</a:t>
-            </a:r>
+              <a:t>up</a:t>
+            </a:r>
+            <a:r>
+              <a:rPr lang="de-DE"/>
+              <a:t> </a:t>
+            </a:r>
+            <a:r>
+              <a:rPr lang="de-DE" err="1"/>
+              <a:t>Constraints</a:t>
+            </a:r>
+            <a:endParaRPr lang="de-DE"/>
           </a:p>
         </p:txBody>
       </p:sp>
-      <mc:AlternateContent xmlns:mc="http://schemas.openxmlformats.org/markup-compatibility/2006">
-        <mc:Choice xmlns:a14="http://schemas.microsoft.com/office/drawing/2010/main" Requires="a14">
-          <p:sp>
-            <p:nvSpPr>
-              <p:cNvPr id="3" name="Inhaltsplatzhalter 2">
-                <a:extLst>
-                  <a:ext uri="{FF2B5EF4-FFF2-40B4-BE49-F238E27FC236}">
-                    <a16:creationId xmlns:a16="http://schemas.microsoft.com/office/drawing/2014/main" id="{B6EBCD5F-A998-E34B-B609-7A4D246D72F7}"/>
-                  </a:ext>
-                </a:extLst>
-              </p:cNvPr>
-              <p:cNvSpPr>
-                <a:spLocks noGrp="1"/>
-              </p:cNvSpPr>
-              <p:nvPr>
-                <p:ph idx="1"/>
-              </p:nvPr>
-            </p:nvSpPr>
-            <p:spPr>
-              <a:xfrm>
-                <a:off x="467544" y="1458490"/>
-                <a:ext cx="4680520" cy="2664633"/>
-              </a:xfrm>
-            </p:spPr>
-            <p:txBody>
-              <a:bodyPr/>
-              <a:lstStyle/>
-              <a:p>
-                <a:r>
-                  <a:rPr lang="de-DE" sz="2000"/>
-                  <a:t>Subspace </a:t>
-                </a:r>
-                <a:r>
-                  <a:rPr lang="de-DE" sz="2000" err="1"/>
-                  <a:t>of</a:t>
-                </a:r>
-                <a:r>
-                  <a:rPr lang="de-DE" sz="2000"/>
-                  <a:t> </a:t>
-                </a:r>
-                <a:r>
-                  <a:rPr lang="de-DE" sz="2000" err="1"/>
-                  <a:t>dimension</a:t>
-                </a:r>
-                <a:r>
-                  <a:rPr lang="de-DE" sz="2000"/>
-                  <a:t> p-1</a:t>
-                </a:r>
-              </a:p>
-              <a:p>
-                <a:r>
-                  <a:rPr lang="de-DE" sz="2000"/>
-                  <a:t>Linear </a:t>
-                </a:r>
-                <a:r>
-                  <a:rPr lang="de-DE" sz="2000" err="1"/>
-                  <a:t>combination</a:t>
-                </a:r>
-                <a:r>
-                  <a:rPr lang="de-DE" sz="2000"/>
-                  <a:t> </a:t>
-                </a:r>
-                <a:r>
-                  <a:rPr lang="de-DE" sz="2000" err="1"/>
-                  <a:t>of</a:t>
-                </a:r>
-                <a:r>
-                  <a:rPr lang="de-DE" sz="2000"/>
-                  <a:t> </a:t>
-                </a:r>
-                <a:r>
-                  <a:rPr lang="de-DE" sz="2000" err="1"/>
-                  <a:t>input</a:t>
-                </a:r>
-                <a:r>
-                  <a:rPr lang="de-DE" sz="2000"/>
-                  <a:t> </a:t>
-                </a:r>
-                <a:r>
-                  <a:rPr lang="de-DE" sz="2000" err="1"/>
-                  <a:t>features</a:t>
-                </a:r>
-                <a:r>
-                  <a:rPr lang="de-DE" sz="2000"/>
-                  <a:t>:</a:t>
-                </a:r>
-              </a:p>
-              <a:p>
-                <a:pPr lvl="1"/>
-                <a14:m>
-                  <m:oMath xmlns:m="http://schemas.openxmlformats.org/officeDocument/2006/math">
-                    <m:r>
-                      <a:rPr lang="de-DE" sz="1800" b="0" i="1" smtClean="0">
-                        <a:latin typeface="Cambria Math" panose="02040503050406030204" pitchFamily="18" charset="0"/>
-                      </a:rPr>
-                      <m:t>𝑦</m:t>
-                    </m:r>
-                    <m:r>
-                      <a:rPr lang="de-DE" sz="1800" b="0" i="1" smtClean="0">
-                        <a:latin typeface="Cambria Math" panose="02040503050406030204" pitchFamily="18" charset="0"/>
-                      </a:rPr>
-                      <m:t>=</m:t>
-                    </m:r>
-                    <m:r>
-                      <a:rPr lang="de-DE" sz="1800" b="0" i="1" smtClean="0">
-                        <a:latin typeface="Cambria Math" panose="02040503050406030204" pitchFamily="18" charset="0"/>
-                        <a:ea typeface="Cambria Math" panose="02040503050406030204" pitchFamily="18" charset="0"/>
-                      </a:rPr>
-                      <m:t>𝛽</m:t>
-                    </m:r>
-                    <m:r>
-                      <a:rPr lang="de-DE" sz="1800" b="0" i="1" baseline="-25000" smtClean="0">
-                        <a:latin typeface="Cambria Math" panose="02040503050406030204" pitchFamily="18" charset="0"/>
-                        <a:ea typeface="Cambria Math" panose="02040503050406030204" pitchFamily="18" charset="0"/>
-                      </a:rPr>
-                      <m:t>0</m:t>
-                    </m:r>
-                    <m:r>
-                      <a:rPr lang="de-DE" sz="1800" b="0" i="1" smtClean="0">
-                        <a:latin typeface="Cambria Math" panose="02040503050406030204" pitchFamily="18" charset="0"/>
-                        <a:ea typeface="Cambria Math" panose="02040503050406030204" pitchFamily="18" charset="0"/>
-                      </a:rPr>
-                      <m:t>+ </m:t>
-                    </m:r>
-                    <m:nary>
-                      <m:naryPr>
-                        <m:chr m:val="∑"/>
-                        <m:ctrlPr>
-                          <a:rPr lang="de-DE" sz="1800" b="0" i="1" smtClean="0">
-                            <a:latin typeface="Cambria Math" panose="02040503050406030204" pitchFamily="18" charset="0"/>
-                            <a:ea typeface="Cambria Math" panose="02040503050406030204" pitchFamily="18" charset="0"/>
-                          </a:rPr>
-                        </m:ctrlPr>
-                      </m:naryPr>
-                      <m:sub>
-                        <m:r>
-                          <m:rPr>
-                            <m:brk m:alnAt="23"/>
-                          </m:rPr>
-                          <a:rPr lang="de-DE" sz="1800" b="0" i="1" smtClean="0">
-                            <a:latin typeface="Cambria Math" panose="02040503050406030204" pitchFamily="18" charset="0"/>
-                            <a:ea typeface="Cambria Math" panose="02040503050406030204" pitchFamily="18" charset="0"/>
-                          </a:rPr>
-                          <m:t>𝑘</m:t>
-                        </m:r>
-                        <m:r>
-                          <a:rPr lang="de-DE" sz="1800" b="0" i="1" smtClean="0">
-                            <a:latin typeface="Cambria Math" panose="02040503050406030204" pitchFamily="18" charset="0"/>
-                            <a:ea typeface="Cambria Math" panose="02040503050406030204" pitchFamily="18" charset="0"/>
-                          </a:rPr>
-                          <m:t>=1</m:t>
-                        </m:r>
-                      </m:sub>
-                      <m:sup>
-                        <m:r>
-                          <a:rPr lang="de-DE" sz="1800" b="0" i="1" smtClean="0">
-                            <a:latin typeface="Cambria Math" panose="02040503050406030204" pitchFamily="18" charset="0"/>
-                            <a:ea typeface="Cambria Math" panose="02040503050406030204" pitchFamily="18" charset="0"/>
-                          </a:rPr>
-                          <m:t>𝑝</m:t>
-                        </m:r>
-                      </m:sup>
-                      <m:e>
-                        <m:r>
-                          <a:rPr lang="de-DE" sz="1800" b="0" i="1" smtClean="0">
-                            <a:latin typeface="Cambria Math" panose="02040503050406030204" pitchFamily="18" charset="0"/>
-                            <a:ea typeface="Cambria Math" panose="02040503050406030204" pitchFamily="18" charset="0"/>
-                          </a:rPr>
-                          <m:t>𝛽</m:t>
-                        </m:r>
-                        <m:r>
-                          <a:rPr lang="de-DE" sz="1800" b="0" i="1" baseline="-25000" smtClean="0">
-                            <a:latin typeface="Cambria Math" panose="02040503050406030204" pitchFamily="18" charset="0"/>
-                            <a:ea typeface="Cambria Math" panose="02040503050406030204" pitchFamily="18" charset="0"/>
-                          </a:rPr>
-                          <m:t>𝑘</m:t>
-                        </m:r>
-                        <m:r>
-                          <a:rPr lang="de-DE" sz="1800" b="0" i="1" smtClean="0">
-                            <a:latin typeface="Cambria Math" panose="02040503050406030204" pitchFamily="18" charset="0"/>
-                            <a:ea typeface="Cambria Math" panose="02040503050406030204" pitchFamily="18" charset="0"/>
-                          </a:rPr>
-                          <m:t>𝑥</m:t>
-                        </m:r>
-                        <m:r>
-                          <a:rPr lang="de-DE" sz="1800" b="0" i="1" baseline="-25000" smtClean="0">
-                            <a:latin typeface="Cambria Math" panose="02040503050406030204" pitchFamily="18" charset="0"/>
-                            <a:ea typeface="Cambria Math" panose="02040503050406030204" pitchFamily="18" charset="0"/>
-                          </a:rPr>
-                          <m:t>𝑘</m:t>
-                        </m:r>
-                      </m:e>
-                    </m:nary>
-                  </m:oMath>
-                </a14:m>
-                <a:endParaRPr lang="de-DE" sz="1800"/>
-              </a:p>
-              <a:p>
-                <a:r>
-                  <a:rPr lang="de-DE" sz="2000" err="1"/>
-                  <a:t>Seperates</a:t>
-                </a:r>
-                <a:r>
-                  <a:rPr lang="de-DE" sz="2000"/>
-                  <a:t> </a:t>
-                </a:r>
-                <a:r>
-                  <a:rPr lang="de-DE" sz="2000" err="1"/>
-                  <a:t>classes</a:t>
-                </a:r>
-                <a:r>
-                  <a:rPr lang="de-DE" sz="2000"/>
-                  <a:t> in a </a:t>
-                </a:r>
-                <a:r>
-                  <a:rPr lang="de-DE" sz="2000" err="1"/>
-                  <a:t>way</a:t>
-                </a:r>
-                <a:r>
-                  <a:rPr lang="de-DE" sz="2000"/>
-                  <a:t> </a:t>
-                </a:r>
-                <a:r>
-                  <a:rPr lang="de-DE" sz="2000" err="1"/>
-                  <a:t>that</a:t>
-                </a:r>
-                <a:r>
-                  <a:rPr lang="de-DE" sz="2000"/>
-                  <a:t>:</a:t>
-                </a:r>
-              </a:p>
-              <a:p>
-                <a:pPr lvl="1"/>
-                <a14:m>
-                  <m:oMath xmlns:m="http://schemas.openxmlformats.org/officeDocument/2006/math">
-                    <m:r>
-                      <a:rPr lang="de-DE" sz="1800" i="1">
-                        <a:latin typeface="Cambria Math" panose="02040503050406030204" pitchFamily="18" charset="0"/>
-                        <a:ea typeface="Cambria Math" panose="02040503050406030204" pitchFamily="18" charset="0"/>
-                      </a:rPr>
-                      <m:t>𝛽</m:t>
-                    </m:r>
-                    <m:r>
-                      <a:rPr lang="de-DE" sz="1800" i="1" baseline="-25000">
-                        <a:latin typeface="Cambria Math" panose="02040503050406030204" pitchFamily="18" charset="0"/>
-                        <a:ea typeface="Cambria Math" panose="02040503050406030204" pitchFamily="18" charset="0"/>
-                      </a:rPr>
-                      <m:t>0</m:t>
-                    </m:r>
-                    <m:r>
-                      <a:rPr lang="de-DE" sz="1800" i="1">
-                        <a:latin typeface="Cambria Math" panose="02040503050406030204" pitchFamily="18" charset="0"/>
-                        <a:ea typeface="Cambria Math" panose="02040503050406030204" pitchFamily="18" charset="0"/>
-                      </a:rPr>
-                      <m:t>+ </m:t>
-                    </m:r>
-                    <m:nary>
-                      <m:naryPr>
-                        <m:chr m:val="∑"/>
-                        <m:ctrlPr>
-                          <a:rPr lang="de-DE" sz="1800" i="1">
-                            <a:latin typeface="Cambria Math" panose="02040503050406030204" pitchFamily="18" charset="0"/>
-                            <a:ea typeface="Cambria Math" panose="02040503050406030204" pitchFamily="18" charset="0"/>
-                          </a:rPr>
-                        </m:ctrlPr>
-                      </m:naryPr>
-                      <m:sub>
-                        <m:r>
-                          <m:rPr>
-                            <m:brk m:alnAt="23"/>
-                          </m:rPr>
-                          <a:rPr lang="de-DE" sz="1800" i="1">
-                            <a:latin typeface="Cambria Math" panose="02040503050406030204" pitchFamily="18" charset="0"/>
-                            <a:ea typeface="Cambria Math" panose="02040503050406030204" pitchFamily="18" charset="0"/>
-                          </a:rPr>
-                          <m:t>𝑘</m:t>
-                        </m:r>
-                        <m:r>
-                          <a:rPr lang="de-DE" sz="1800" i="1">
-                            <a:latin typeface="Cambria Math" panose="02040503050406030204" pitchFamily="18" charset="0"/>
-                            <a:ea typeface="Cambria Math" panose="02040503050406030204" pitchFamily="18" charset="0"/>
-                          </a:rPr>
-                          <m:t>=1</m:t>
-                        </m:r>
-                      </m:sub>
-                      <m:sup>
-                        <m:r>
-                          <a:rPr lang="de-DE" sz="1800" i="1">
-                            <a:latin typeface="Cambria Math" panose="02040503050406030204" pitchFamily="18" charset="0"/>
-                            <a:ea typeface="Cambria Math" panose="02040503050406030204" pitchFamily="18" charset="0"/>
-                          </a:rPr>
-                          <m:t>𝑝</m:t>
-                        </m:r>
-                      </m:sup>
-                      <m:e>
-                        <m:r>
-                          <a:rPr lang="de-DE" sz="1800" i="1">
-                            <a:latin typeface="Cambria Math" panose="02040503050406030204" pitchFamily="18" charset="0"/>
-                            <a:ea typeface="Cambria Math" panose="02040503050406030204" pitchFamily="18" charset="0"/>
-                          </a:rPr>
-                          <m:t>𝛽</m:t>
-                        </m:r>
-                        <m:r>
-                          <a:rPr lang="de-DE" sz="1800" i="1" baseline="-25000">
-                            <a:latin typeface="Cambria Math" panose="02040503050406030204" pitchFamily="18" charset="0"/>
-                            <a:ea typeface="Cambria Math" panose="02040503050406030204" pitchFamily="18" charset="0"/>
-                          </a:rPr>
-                          <m:t>𝑘</m:t>
-                        </m:r>
-                        <m:r>
-                          <a:rPr lang="de-DE" sz="1800" i="1">
-                            <a:latin typeface="Cambria Math" panose="02040503050406030204" pitchFamily="18" charset="0"/>
-                            <a:ea typeface="Cambria Math" panose="02040503050406030204" pitchFamily="18" charset="0"/>
-                          </a:rPr>
-                          <m:t>𝑥</m:t>
-                        </m:r>
-                        <m:r>
-                          <a:rPr lang="de-DE" sz="1800" b="0" i="1" baseline="-25000" smtClean="0">
-                            <a:latin typeface="Cambria Math" panose="02040503050406030204" pitchFamily="18" charset="0"/>
-                            <a:ea typeface="Cambria Math" panose="02040503050406030204" pitchFamily="18" charset="0"/>
-                          </a:rPr>
-                          <m:t>𝑖𝑘</m:t>
-                        </m:r>
-                      </m:e>
-                    </m:nary>
-                    <m:r>
-                      <a:rPr lang="de-DE" sz="1800" b="0" i="1" smtClean="0">
-                        <a:latin typeface="Cambria Math" panose="02040503050406030204" pitchFamily="18" charset="0"/>
-                        <a:ea typeface="Cambria Math" panose="02040503050406030204" pitchFamily="18" charset="0"/>
-                      </a:rPr>
-                      <m:t>&gt;0 </m:t>
-                    </m:r>
-                    <m:r>
-                      <a:rPr lang="de-DE" sz="1800" b="0" i="1" smtClean="0">
-                        <a:latin typeface="Cambria Math" panose="02040503050406030204" pitchFamily="18" charset="0"/>
-                        <a:ea typeface="Cambria Math" panose="02040503050406030204" pitchFamily="18" charset="0"/>
-                      </a:rPr>
-                      <m:t>𝑖𝑓</m:t>
-                    </m:r>
-                    <m:r>
-                      <a:rPr lang="de-DE" sz="1800" b="0" i="1" smtClean="0">
-                        <a:latin typeface="Cambria Math" panose="02040503050406030204" pitchFamily="18" charset="0"/>
-                        <a:ea typeface="Cambria Math" panose="02040503050406030204" pitchFamily="18" charset="0"/>
-                      </a:rPr>
-                      <m:t> </m:t>
-                    </m:r>
-                    <m:r>
-                      <a:rPr lang="de-DE" sz="1800" b="0" i="1" smtClean="0">
-                        <a:latin typeface="Cambria Math" panose="02040503050406030204" pitchFamily="18" charset="0"/>
-                        <a:ea typeface="Cambria Math" panose="02040503050406030204" pitchFamily="18" charset="0"/>
-                      </a:rPr>
-                      <m:t>𝑦𝑖</m:t>
-                    </m:r>
-                    <m:r>
-                      <a:rPr lang="de-DE" sz="1800" b="0" i="1" smtClean="0">
-                        <a:latin typeface="Cambria Math" panose="02040503050406030204" pitchFamily="18" charset="0"/>
-                        <a:ea typeface="Cambria Math" panose="02040503050406030204" pitchFamily="18" charset="0"/>
-                      </a:rPr>
-                      <m:t>=1</m:t>
-                    </m:r>
-                  </m:oMath>
-                </a14:m>
-                <a:endParaRPr lang="de-DE" sz="1800"/>
-              </a:p>
-              <a:p>
-                <a:pPr lvl="1"/>
-                <a14:m>
-                  <m:oMath xmlns:m="http://schemas.openxmlformats.org/officeDocument/2006/math">
-                    <m:r>
-                      <a:rPr lang="de-DE" sz="1800" i="1" smtClean="0">
-                        <a:latin typeface="Cambria Math" panose="02040503050406030204" pitchFamily="18" charset="0"/>
-                        <a:ea typeface="Cambria Math" panose="02040503050406030204" pitchFamily="18" charset="0"/>
-                      </a:rPr>
-                      <m:t>𝛽</m:t>
-                    </m:r>
-                    <m:r>
-                      <a:rPr lang="de-DE" sz="1800" i="1" baseline="-25000">
-                        <a:latin typeface="Cambria Math" panose="02040503050406030204" pitchFamily="18" charset="0"/>
-                        <a:ea typeface="Cambria Math" panose="02040503050406030204" pitchFamily="18" charset="0"/>
-                      </a:rPr>
-                      <m:t>0</m:t>
-                    </m:r>
-                    <m:r>
-                      <a:rPr lang="de-DE" sz="1800" i="1">
-                        <a:latin typeface="Cambria Math" panose="02040503050406030204" pitchFamily="18" charset="0"/>
-                        <a:ea typeface="Cambria Math" panose="02040503050406030204" pitchFamily="18" charset="0"/>
-                      </a:rPr>
-                      <m:t>+ </m:t>
-                    </m:r>
-                    <m:nary>
-                      <m:naryPr>
-                        <m:chr m:val="∑"/>
-                        <m:ctrlPr>
-                          <a:rPr lang="de-DE" sz="1800" i="1">
-                            <a:latin typeface="Cambria Math" panose="02040503050406030204" pitchFamily="18" charset="0"/>
-                            <a:ea typeface="Cambria Math" panose="02040503050406030204" pitchFamily="18" charset="0"/>
-                          </a:rPr>
-                        </m:ctrlPr>
-                      </m:naryPr>
-                      <m:sub>
-                        <m:r>
-                          <m:rPr>
-                            <m:brk m:alnAt="23"/>
-                          </m:rPr>
-                          <a:rPr lang="de-DE" sz="1800" i="1">
-                            <a:latin typeface="Cambria Math" panose="02040503050406030204" pitchFamily="18" charset="0"/>
-                            <a:ea typeface="Cambria Math" panose="02040503050406030204" pitchFamily="18" charset="0"/>
-                          </a:rPr>
-                          <m:t>𝑘</m:t>
-                        </m:r>
-                        <m:r>
-                          <a:rPr lang="de-DE" sz="1800" i="1">
-                            <a:latin typeface="Cambria Math" panose="02040503050406030204" pitchFamily="18" charset="0"/>
-                            <a:ea typeface="Cambria Math" panose="02040503050406030204" pitchFamily="18" charset="0"/>
-                          </a:rPr>
-                          <m:t>=1</m:t>
-                        </m:r>
-                      </m:sub>
-                      <m:sup>
-                        <m:r>
-                          <a:rPr lang="de-DE" sz="1800" i="1">
-                            <a:latin typeface="Cambria Math" panose="02040503050406030204" pitchFamily="18" charset="0"/>
-                            <a:ea typeface="Cambria Math" panose="02040503050406030204" pitchFamily="18" charset="0"/>
-                          </a:rPr>
-                          <m:t>𝑝</m:t>
-                        </m:r>
-                      </m:sup>
-                      <m:e>
-                        <m:r>
-                          <a:rPr lang="de-DE" sz="1800" i="1">
-                            <a:latin typeface="Cambria Math" panose="02040503050406030204" pitchFamily="18" charset="0"/>
-                            <a:ea typeface="Cambria Math" panose="02040503050406030204" pitchFamily="18" charset="0"/>
-                          </a:rPr>
-                          <m:t>𝛽</m:t>
-                        </m:r>
-                        <m:r>
-                          <a:rPr lang="de-DE" sz="1800" i="1" baseline="-25000">
-                            <a:latin typeface="Cambria Math" panose="02040503050406030204" pitchFamily="18" charset="0"/>
-                            <a:ea typeface="Cambria Math" panose="02040503050406030204" pitchFamily="18" charset="0"/>
-                          </a:rPr>
-                          <m:t>𝑘</m:t>
-                        </m:r>
-                        <m:r>
-                          <a:rPr lang="de-DE" sz="1800" i="1">
-                            <a:latin typeface="Cambria Math" panose="02040503050406030204" pitchFamily="18" charset="0"/>
-                            <a:ea typeface="Cambria Math" panose="02040503050406030204" pitchFamily="18" charset="0"/>
-                          </a:rPr>
-                          <m:t>𝑥</m:t>
-                        </m:r>
-                        <m:r>
-                          <a:rPr lang="de-DE" sz="1800" b="0" i="1" baseline="-25000" smtClean="0">
-                            <a:latin typeface="Cambria Math" panose="02040503050406030204" pitchFamily="18" charset="0"/>
-                            <a:ea typeface="Cambria Math" panose="02040503050406030204" pitchFamily="18" charset="0"/>
-                          </a:rPr>
-                          <m:t>𝑖𝑘</m:t>
-                        </m:r>
-                      </m:e>
-                    </m:nary>
-                    <m:r>
-                      <a:rPr lang="de-DE" sz="1800" b="0" i="1" smtClean="0">
-                        <a:latin typeface="Cambria Math" panose="02040503050406030204" pitchFamily="18" charset="0"/>
-                        <a:ea typeface="Cambria Math" panose="02040503050406030204" pitchFamily="18" charset="0"/>
-                      </a:rPr>
-                      <m:t>&lt;0 </m:t>
-                    </m:r>
-                    <m:r>
-                      <a:rPr lang="de-DE" sz="1800" b="0" i="1" smtClean="0">
-                        <a:latin typeface="Cambria Math" panose="02040503050406030204" pitchFamily="18" charset="0"/>
-                        <a:ea typeface="Cambria Math" panose="02040503050406030204" pitchFamily="18" charset="0"/>
-                      </a:rPr>
-                      <m:t>𝑖𝑓</m:t>
-                    </m:r>
-                    <m:r>
-                      <a:rPr lang="de-DE" sz="1800" b="0" i="1" smtClean="0">
-                        <a:latin typeface="Cambria Math" panose="02040503050406030204" pitchFamily="18" charset="0"/>
-                        <a:ea typeface="Cambria Math" panose="02040503050406030204" pitchFamily="18" charset="0"/>
-                      </a:rPr>
-                      <m:t> </m:t>
-                    </m:r>
-                    <m:r>
-                      <a:rPr lang="de-DE" sz="1800" b="0" i="1" smtClean="0">
-                        <a:latin typeface="Cambria Math" panose="02040503050406030204" pitchFamily="18" charset="0"/>
-                        <a:ea typeface="Cambria Math" panose="02040503050406030204" pitchFamily="18" charset="0"/>
-                      </a:rPr>
-                      <m:t>𝑦𝑖</m:t>
-                    </m:r>
-                    <m:r>
-                      <a:rPr lang="de-DE" sz="1800" b="0" i="1" smtClean="0">
-                        <a:latin typeface="Cambria Math" panose="02040503050406030204" pitchFamily="18" charset="0"/>
-                        <a:ea typeface="Cambria Math" panose="02040503050406030204" pitchFamily="18" charset="0"/>
-                      </a:rPr>
-                      <m:t>=−1</m:t>
-                    </m:r>
-                  </m:oMath>
-                </a14:m>
-                <a:endParaRPr lang="de-DE" sz="1800"/>
-              </a:p>
-              <a:p>
-                <a:r>
-                  <a:rPr lang="de-DE" sz="2000" err="1"/>
-                  <a:t>If</a:t>
-                </a:r>
-                <a:r>
-                  <a:rPr lang="de-DE" sz="2000"/>
-                  <a:t> </a:t>
-                </a:r>
-                <a:r>
-                  <a:rPr lang="de-DE" sz="2000" err="1"/>
-                  <a:t>classes</a:t>
-                </a:r>
-                <a:r>
-                  <a:rPr lang="de-DE" sz="2000"/>
-                  <a:t> </a:t>
-                </a:r>
-                <a:r>
-                  <a:rPr lang="de-DE" sz="2000" err="1"/>
-                  <a:t>are</a:t>
-                </a:r>
-                <a:r>
-                  <a:rPr lang="de-DE" sz="2000"/>
-                  <a:t> </a:t>
-                </a:r>
-                <a:r>
-                  <a:rPr lang="de-DE" sz="2000" err="1"/>
-                  <a:t>seperable</a:t>
-                </a:r>
-                <a:r>
-                  <a:rPr lang="de-DE" sz="2000"/>
-                  <a:t> </a:t>
-                </a:r>
-                <a:r>
-                  <a:rPr lang="de-DE" sz="2000">
-                    <a:sym typeface="Wingdings" panose="05000000000000000000" pitchFamily="2" charset="2"/>
-                  </a:rPr>
-                  <a:t> infinite </a:t>
-                </a:r>
-                <a:r>
-                  <a:rPr lang="de-DE" sz="2000" err="1">
-                    <a:sym typeface="Wingdings" panose="05000000000000000000" pitchFamily="2" charset="2"/>
-                  </a:rPr>
-                  <a:t>number</a:t>
-                </a:r>
-                <a:r>
-                  <a:rPr lang="de-DE" sz="2000">
-                    <a:sym typeface="Wingdings" panose="05000000000000000000" pitchFamily="2" charset="2"/>
-                  </a:rPr>
-                  <a:t> </a:t>
-                </a:r>
-                <a:r>
-                  <a:rPr lang="de-DE" sz="2000" err="1">
-                    <a:sym typeface="Wingdings" panose="05000000000000000000" pitchFamily="2" charset="2"/>
-                  </a:rPr>
-                  <a:t>of</a:t>
-                </a:r>
-                <a:r>
-                  <a:rPr lang="de-DE" sz="2000">
-                    <a:sym typeface="Wingdings" panose="05000000000000000000" pitchFamily="2" charset="2"/>
-                  </a:rPr>
-                  <a:t> </a:t>
-                </a:r>
-                <a:r>
-                  <a:rPr lang="de-DE" sz="2000" err="1">
-                    <a:sym typeface="Wingdings" panose="05000000000000000000" pitchFamily="2" charset="2"/>
-                  </a:rPr>
-                  <a:t>seperating</a:t>
-                </a:r>
-                <a:r>
-                  <a:rPr lang="de-DE" sz="2000">
-                    <a:sym typeface="Wingdings" panose="05000000000000000000" pitchFamily="2" charset="2"/>
-                  </a:rPr>
-                  <a:t> hyperplanes</a:t>
-                </a:r>
-                <a:endParaRPr lang="de-DE" sz="2000"/>
-              </a:p>
-            </p:txBody>
-          </p:sp>
-        </mc:Choice>
-        <mc:Fallback>
-          <p:sp>
-            <p:nvSpPr>
-              <p:cNvPr id="3" name="Inhaltsplatzhalter 2">
-                <a:extLst>
-                  <a:ext uri="{FF2B5EF4-FFF2-40B4-BE49-F238E27FC236}">
-                    <a16:creationId xmlns:a16="http://schemas.microsoft.com/office/drawing/2014/main" id="{B6EBCD5F-A998-E34B-B609-7A4D246D72F7}"/>
-                  </a:ext>
-                </a:extLst>
-              </p:cNvPr>
-              <p:cNvSpPr>
-                <a:spLocks noGrp="1" noRot="1" noChangeAspect="1" noMove="1" noResize="1" noEditPoints="1" noAdjustHandles="1" noChangeArrowheads="1" noChangeShapeType="1" noTextEdit="1"/>
-              </p:cNvSpPr>
-              <p:nvPr>
-                <p:ph idx="1"/>
-              </p:nvPr>
-            </p:nvSpPr>
-            <p:spPr>
-              <a:xfrm>
-                <a:off x="467544" y="1458490"/>
-                <a:ext cx="4680520" cy="2664633"/>
-              </a:xfrm>
-              <a:blipFill>
-                <a:blip r:embed="rId2"/>
-                <a:stretch>
-                  <a:fillRect l="-1173" t="-915" r="-391" b="-13043"/>
-                </a:stretch>
-              </a:blipFill>
-            </p:spPr>
-            <p:txBody>
-              <a:bodyPr/>
-              <a:lstStyle/>
-              <a:p>
-                <a:r>
-                  <a:rPr lang="en-US">
-                    <a:noFill/>
-                  </a:rPr>
-                  <a:t> </a:t>
-                </a:r>
-              </a:p>
-            </p:txBody>
-          </p:sp>
-        </mc:Fallback>
-      </mc:AlternateContent>
-      <p:sp>
-        <p:nvSpPr>
-          <p:cNvPr id="4" name="Rechteck 3">
+      <p:pic>
+        <p:nvPicPr>
+          <p:cNvPr id="7" name="Grafik 6" descr="\documentclass[20pt]{article}&#10;\usepackage{amsmath,amsfonts,amssymb,xcolor, mathtools}&#10;\pagestyle{empty}&#10;\usepackage[T1]{fontenc}&#10;\usepackage{fontspec}&#10;\setsansfont{Arial}&#10;\renewcommand\familydefault{\sfdefault}&#10;\begin{document}&#10;\begin{itemize}&#10;\item \textcolor{green}{$\beta$}$\rightarrow$ a k-dimensional vector\newline perpendicular to the decision boundary&#10;\item all points $x$ for which holds $\frac{\textcolor{green}{\beta}}{||\textcolor{green}{\beta}||}\cdot \overline{x}=\textcolor{magenta}{c}$\newline lie on the hyperplain &#10;\item through some rearrangement we get \newline&#10;$\beta \cdot \overline{x} +\beta_0=0$&#10;&#10;\end{itemize}&#10;&#10;\end{document}" title="IguanaTex Picture Display">
             <a:extLst>
               <a:ext uri="{FF2B5EF4-FFF2-40B4-BE49-F238E27FC236}">
-                <a16:creationId xmlns:a16="http://schemas.microsoft.com/office/drawing/2014/main" id="{B21BA278-5AA0-7413-5DB3-4EB47B444F21}"/>
+                <a16:creationId xmlns:a16="http://schemas.microsoft.com/office/drawing/2014/main" id="{D8E488CC-6A22-58C4-4AEE-4B7530968487}"/>
               </a:ext>
             </a:extLst>
           </p:cNvPr>
-          <p:cNvSpPr/>
-          <p:nvPr/>
-        </p:nvSpPr>
+          <p:cNvPicPr>
+            <a:picLocks noChangeAspect="1"/>
+          </p:cNvPicPr>
+          <p:nvPr>
+            <p:custDataLst>
+              <p:tags r:id="rId1"/>
+            </p:custDataLst>
+          </p:nvPr>
+        </p:nvPicPr>
+        <p:blipFill>
+          <a:blip r:embed="rId3">
+            <a:extLst>
+              <a:ext uri="{28A0092B-C50C-407E-A947-70E740481C1C}">
+                <a14:useLocalDpi xmlns:a14="http://schemas.microsoft.com/office/drawing/2010/main" val="0"/>
+              </a:ext>
+            </a:extLst>
+          </a:blip>
+          <a:stretch>
+            <a:fillRect/>
+          </a:stretch>
+        </p:blipFill>
         <p:spPr>
           <a:xfrm>
-            <a:off x="5436096" y="1563638"/>
-            <a:ext cx="2952328" cy="2454339"/>
+            <a:off x="720858" y="1707655"/>
+            <a:ext cx="4091257" cy="1996269"/>
           </a:xfrm>
           <a:prstGeom prst="rect">
             <a:avLst/>
           </a:prstGeom>
         </p:spPr>
-        <p:style>
-          <a:lnRef idx="2">
-            <a:schemeClr val="accent1">
-              <a:shade val="15000"/>
-            </a:schemeClr>
-          </a:lnRef>
-          <a:fillRef idx="1">
-            <a:schemeClr val="accent1"/>
-          </a:fillRef>
-          <a:effectRef idx="0">
-            <a:schemeClr val="accent1"/>
-          </a:effectRef>
-          <a:fontRef idx="minor">
-            <a:schemeClr val="lt1"/>
-          </a:fontRef>
-        </p:style>
-        <p:txBody>
-          <a:bodyPr rtlCol="0" anchor="ctr"/>
-          <a:lstStyle/>
-          <a:p>
-            <a:pPr algn="ctr"/>
-            <a:r>
-              <a:rPr lang="de-DE"/>
-              <a:t>Grafik</a:t>
-            </a:r>
-          </a:p>
-        </p:txBody>
-      </p:sp>
+      </p:pic>
+      <p:pic>
+        <p:nvPicPr>
+          <p:cNvPr id="5" name="Grafik 4" descr="Ein Bild, das Reihe, Diagramm, parallel enthält.&#10;&#10;Automatisch generierte Beschreibung">
+            <a:extLst>
+              <a:ext uri="{FF2B5EF4-FFF2-40B4-BE49-F238E27FC236}">
+                <a16:creationId xmlns:a16="http://schemas.microsoft.com/office/drawing/2014/main" id="{2FF4439B-4933-2A0A-9836-8FAFBD29F270}"/>
+              </a:ext>
+            </a:extLst>
+          </p:cNvPr>
+          <p:cNvPicPr>
+            <a:picLocks noChangeAspect="1"/>
+          </p:cNvPicPr>
+          <p:nvPr/>
+        </p:nvPicPr>
+        <p:blipFill>
+          <a:blip r:embed="rId4">
+            <a:extLst>
+              <a:ext uri="{28A0092B-C50C-407E-A947-70E740481C1C}">
+                <a14:useLocalDpi xmlns:a14="http://schemas.microsoft.com/office/drawing/2010/main" val="0"/>
+              </a:ext>
+            </a:extLst>
+          </a:blip>
+          <a:stretch>
+            <a:fillRect/>
+          </a:stretch>
+        </p:blipFill>
+        <p:spPr>
+          <a:xfrm>
+            <a:off x="5063456" y="1234748"/>
+            <a:ext cx="3617339" cy="3072824"/>
+          </a:xfrm>
+          <a:prstGeom prst="rect">
+            <a:avLst/>
+          </a:prstGeom>
+        </p:spPr>
+      </p:pic>
     </p:spTree>
     <p:extLst>
       <p:ext uri="{BB962C8B-B14F-4D97-AF65-F5344CB8AC3E}">
-        <p14:creationId xmlns:p14="http://schemas.microsoft.com/office/powerpoint/2010/main" val="3748176770"/>
+        <p14:creationId xmlns:p14="http://schemas.microsoft.com/office/powerpoint/2010/main" val="1770530705"/>
       </p:ext>
     </p:extLst>
   </p:cSld>
@@ -9604,10 +8442,10 @@
       </p:sp>
       <p:pic>
         <p:nvPicPr>
-          <p:cNvPr id="21" name="Grafik 20" descr="\documentclass[20pt]{article}&#10;\usepackage{amsmath,amsfonts,amssymb,xcolor, mathtools}&#10;\pagestyle{empty}&#10;\usepackage[T1]{fontenc}&#10;\usepackage{fontspec}&#10;\setsansfont{Arial}&#10;\renewcommand\familydefault{\sfdefault}&#10;\begin{document}&#10;\begin{itemize}&#10;\item \textcolor{green}{$\beta$}$\rightarrow$ a k-dimensional vector\newline perpendicular to the decision boundary&#10;\item all points $x$ for which holds $\frac{\textcolor{green}{\beta}}{||\textcolor{green}{\beta}||}\cdot x=\textcolor{magenta}{c}$\newline lie on the hyperplain &#10;\item through some rearrangement we get \newline&#10;$\beta \cdot x +\beta_0=0$&#10;&#10;\end{itemize}&#10;&#10;\end{document}" title="IguanaTex Picture Display">
+          <p:cNvPr id="7" name="Grafik 6" descr="\documentclass[20pt]{article}&#10;\usepackage{amsmath,amsfonts,amssymb,xcolor, mathtools}&#10;\pagestyle{empty}&#10;\usepackage[T1]{fontenc}&#10;\usepackage{fontspec}&#10;\setsansfont{Arial}&#10;\renewcommand\familydefault{\sfdefault}&#10;\begin{document}&#10;\begin{itemize}&#10;\item the two gutters around the boundary \newline are defined by $\beta \cdot \overline{x}+\beta_0=1$ and \newline$ \beta \cdot \overline{x}+\beta_0=-1$&#10;&#10;\item seperate \textcolor{red}{positive}($\beta \cdot \overline{x}+\beta_0\ge 1$)\newline from \textcolor{green}{negative} ($\beta \cdot \overline{x}+\beta_0\le -1$) samples&#10;\item distance between the gutters\newline$\rightarrow$ width that is to be maximized&#10;\end{itemize}&#10;&#10;\end{document}" title="IguanaTex Picture Display">
             <a:extLst>
               <a:ext uri="{FF2B5EF4-FFF2-40B4-BE49-F238E27FC236}">
-                <a16:creationId xmlns:a16="http://schemas.microsoft.com/office/drawing/2014/main" id="{10DE1F70-7341-0DAC-810B-5172FAB61B45}"/>
+                <a16:creationId xmlns:a16="http://schemas.microsoft.com/office/drawing/2014/main" id="{E57472E7-B1A1-CDB6-DA3F-0FE93658CCF6}"/>
               </a:ext>
             </a:extLst>
           </p:cNvPr>
@@ -9634,8 +8472,8 @@
         </p:blipFill>
         <p:spPr>
           <a:xfrm>
-            <a:off x="720858" y="1707654"/>
-            <a:ext cx="4090686" cy="1995528"/>
+            <a:off x="683569" y="1707651"/>
+            <a:ext cx="4215930" cy="2217150"/>
           </a:xfrm>
           <a:prstGeom prst="rect">
             <a:avLst/>
@@ -9644,10 +8482,10 @@
       </p:pic>
       <p:pic>
         <p:nvPicPr>
-          <p:cNvPr id="4" name="Grafik 3" descr="Ein Bild, das Reihe, Diagramm, parallel, Steigung enthält.&#10;&#10;Automatisch generierte Beschreibung">
+          <p:cNvPr id="5" name="Grafik 4" descr="Ein Bild, das Reihe, Diagramm, parallel, Steigung enthält.&#10;&#10;Automatisch generierte Beschreibung">
             <a:extLst>
               <a:ext uri="{FF2B5EF4-FFF2-40B4-BE49-F238E27FC236}">
-                <a16:creationId xmlns:a16="http://schemas.microsoft.com/office/drawing/2014/main" id="{46ACD664-B35B-1FDD-FFED-70FE77B7A530}"/>
+                <a16:creationId xmlns:a16="http://schemas.microsoft.com/office/drawing/2014/main" id="{402170D5-C41B-257C-79F6-AF4EE077D414}"/>
               </a:ext>
             </a:extLst>
           </p:cNvPr>
@@ -9670,23 +8508,18 @@
         </p:blipFill>
         <p:spPr>
           <a:xfrm>
-            <a:off x="5148064" y="1188000"/>
-            <a:ext cx="3634198" cy="3072665"/>
+            <a:off x="5067013" y="1124744"/>
+            <a:ext cx="3733061" cy="3168549"/>
           </a:xfrm>
           <a:prstGeom prst="rect">
             <a:avLst/>
           </a:prstGeom>
-          <a:ln w="3175">
-            <a:solidFill>
-              <a:schemeClr val="accent1"/>
-            </a:solidFill>
-          </a:ln>
         </p:spPr>
       </p:pic>
     </p:spTree>
     <p:extLst>
       <p:ext uri="{BB962C8B-B14F-4D97-AF65-F5344CB8AC3E}">
-        <p14:creationId xmlns:p14="http://schemas.microsoft.com/office/powerpoint/2010/main" val="1770530705"/>
+        <p14:creationId xmlns:p14="http://schemas.microsoft.com/office/powerpoint/2010/main" val="3990756690"/>
       </p:ext>
     </p:extLst>
   </p:cSld>
@@ -9776,10 +8609,10 @@
       </p:sp>
       <p:pic>
         <p:nvPicPr>
-          <p:cNvPr id="12" name="Grafik 11" descr="\documentclass[20pt]{article}&#10;\usepackage{amsmath,amsfonts,amssymb,xcolor, mathtools}&#10;\pagestyle{empty}&#10;\usepackage[T1]{fontenc}&#10;\usepackage{fontspec}&#10;\setsansfont{Arial}&#10;\renewcommand\familydefault{\sfdefault}&#10;\begin{document}&#10;\begin{itemize}&#10;\item the two gutters around the boundary \newline are defined by $\beta \cdot x+\beta_0=1$ and \newline$ \beta \cdot x+\beta_0=-1$&#10;&#10;\item seperate \textcolor{red}{positive}($\beta \cdot x+\beta_0\ge 1$)\newline from \textcolor{green}{negative} ($\beta \cdot x+\beta_0\le -1$) samples&#10;\item distance between the gutters\newline$\rightarrow$ width that is to be maximized&#10;\end{itemize}&#10;&#10;\end{document}" title="IguanaTex Picture Display">
+          <p:cNvPr id="12" name="Grafik 11" descr="\documentclass[20pt]{article}&#10;\usepackage{amsmath,amsfonts,amssymb,xcolor, mathtools}&#10;\pagestyle{empty}&#10;\usepackage[T1]{fontenc}&#10;\usepackage{fontspec}&#10;\setsansfont{Arial}&#10;\renewcommand\familydefault{\sfdefault}&#10;\begin{document}&#10;\begin{itemize}&#10;\item consider $\overline{x}^+ \rightarrow$ vector of a  postive\newline sample lying on the gutter \newline&#10;($\overline{x}^- \rightarrow$ negative sample on gutter)\newline&#10;$\Rightarrow$ considered as \textbf{Support Vectors}&#10;\item to measure the \textcolor{magenta}{width} of the margin  \newline&#10;$(\overline{x}^+ -\overline{x}^-)$ is Projected on the unit \newline&#10;vector of $\beta$ &#10;\item $M=(\overline{x}^+ -\overline{x}^-)\cdot \frac{\beta}{||\beta||}=\frac{\beta \overline{x}^+ -\beta \overline{x}^-}{||\beta||}$&#10;&#10;\end{itemize}&#10;&#10;\end{document}" title="IguanaTex Picture Display">
             <a:extLst>
               <a:ext uri="{FF2B5EF4-FFF2-40B4-BE49-F238E27FC236}">
-                <a16:creationId xmlns:a16="http://schemas.microsoft.com/office/drawing/2014/main" id="{F7102BB1-E0EF-F63A-BC98-41E95B40734E}"/>
+                <a16:creationId xmlns:a16="http://schemas.microsoft.com/office/drawing/2014/main" id="{411DB361-60EB-928A-EEE9-0DBE5521E3A5}"/>
               </a:ext>
             </a:extLst>
           </p:cNvPr>
@@ -9806,8 +8639,8 @@
         </p:blipFill>
         <p:spPr>
           <a:xfrm>
-            <a:off x="683569" y="1707652"/>
-            <a:ext cx="4215342" cy="2215442"/>
+            <a:off x="755578" y="1485455"/>
+            <a:ext cx="3701273" cy="2686283"/>
           </a:xfrm>
           <a:prstGeom prst="rect">
             <a:avLst/>
@@ -9816,10 +8649,10 @@
       </p:pic>
       <p:pic>
         <p:nvPicPr>
-          <p:cNvPr id="4" name="Grafik 3" descr="Ein Bild, das Reihe, Diagramm, parallel, Screenshot enthält.&#10;&#10;Automatisch generierte Beschreibung">
+          <p:cNvPr id="5" name="Grafik 4" descr="Ein Bild, das Reihe, Diagramm, parallel, Steigung enthält.&#10;&#10;Automatisch generierte Beschreibung">
             <a:extLst>
               <a:ext uri="{FF2B5EF4-FFF2-40B4-BE49-F238E27FC236}">
-                <a16:creationId xmlns:a16="http://schemas.microsoft.com/office/drawing/2014/main" id="{B2C0436D-5BE1-74F9-9D50-6E433CE2DCCA}"/>
+                <a16:creationId xmlns:a16="http://schemas.microsoft.com/office/drawing/2014/main" id="{892AF73E-6A12-EA96-1923-B8D2A01FAE62}"/>
               </a:ext>
             </a:extLst>
           </p:cNvPr>
@@ -9842,23 +8675,18 @@
         </p:blipFill>
         <p:spPr>
           <a:xfrm>
-            <a:off x="5148000" y="1188000"/>
-            <a:ext cx="3602721" cy="3074400"/>
+            <a:off x="4792006" y="1291546"/>
+            <a:ext cx="3854837" cy="3244624"/>
           </a:xfrm>
           <a:prstGeom prst="rect">
             <a:avLst/>
           </a:prstGeom>
-          <a:ln w="3175">
-            <a:solidFill>
-              <a:schemeClr val="accent1"/>
-            </a:solidFill>
-          </a:ln>
         </p:spPr>
       </p:pic>
     </p:spTree>
     <p:extLst>
       <p:ext uri="{BB962C8B-B14F-4D97-AF65-F5344CB8AC3E}">
-        <p14:creationId xmlns:p14="http://schemas.microsoft.com/office/powerpoint/2010/main" val="3990756690"/>
+        <p14:creationId xmlns:p14="http://schemas.microsoft.com/office/powerpoint/2010/main" val="2902806685"/>
       </p:ext>
     </p:extLst>
   </p:cSld>
@@ -9948,10 +8776,10 @@
       </p:sp>
       <p:pic>
         <p:nvPicPr>
-          <p:cNvPr id="6" name="Grafik 5" descr="\documentclass[20pt]{article}&#10;\usepackage{amsmath,amsfonts,amssymb,xcolor, mathtools}&#10;\pagestyle{empty}&#10;\usepackage[T1]{fontenc}&#10;\usepackage{fontspec}&#10;\setsansfont{Arial}&#10;\renewcommand\familydefault{\sfdefault}&#10;\begin{document}&#10;\begin{itemize}&#10;\item consider $x^+ \rightarrow$ vector to a \newline postive sample lying on the gutter \newline&#10;($x^- \rightarrow$ negative sample on gutter)\newline&#10;$\Rightarrow$ considered as \textbf{Support Vectors}&#10;\item to measure the \textcolor{magenta}{width} of the margin  \newline&#10;$(x^+ -x^-)$ is Projected on the unit \newline&#10;vector of $\beta$ &#10;\item $M=(x^+ -x^-)\cdot \frac{\beta}{||\beta||}=\frac{\beta x^+ -\beta x^-}{||\beta||}$&#10;&#10;\end{itemize}&#10;&#10;\end{document}" title="IguanaTex Picture Display">
+          <p:cNvPr id="4" name="Grafik 3" descr="\documentclass[20pt]{article}&#10;\usepackage{amsmath,amsfonts,amssymb,xcolor, mathtools}&#10;\pagestyle{empty}&#10;\usepackage[T1]{fontenc}&#10;\usepackage{fontspec}&#10;\setsansfont{Arial}&#10;\renewcommand\familydefault{\sfdefault}&#10;\begin{document}&#10;\begin{itemize}&#10;\item for a positive sample laying on the gutter &#10;we know \vspace{0.2cm}\newline $\beta \overline{x}^+ +\beta_0 = 1 \Leftrightarrow \beta \overline{x}^+=1-\beta_0$&#10;\item conversely for a negativ sample on the gutter \vspace{0.2cm}\newline&#10;$\beta \overline{x}^- +\beta_0 = -1 \Leftrightarrow \beta \overline{x}^-=-1-\beta_0$&#10;\item imputed in the derived formula for the width\vspace{0.2cm}\newline&#10;$\rightarrow \frac{1-\beta_0-(-1-\beta_0)}{||\beta||}=\frac{2}{||\beta||}$&#10;\item minimization of $\frac{1}{2} ||\beta||^2=\frac{1}{2} \beta ' \beta$  in order to maximize $\frac{2}{||\beta||}$&#10;\end{itemize}&#10;&#10;\end{document}" title="IguanaTex Picture Display">
             <a:extLst>
               <a:ext uri="{FF2B5EF4-FFF2-40B4-BE49-F238E27FC236}">
-                <a16:creationId xmlns:a16="http://schemas.microsoft.com/office/drawing/2014/main" id="{19F18647-D3FC-29E5-A5FE-9CEA64B812DB}"/>
+                <a16:creationId xmlns:a16="http://schemas.microsoft.com/office/drawing/2014/main" id="{AFD01AFB-CF26-8A35-EC06-7A2BF9FB7DCC}"/>
               </a:ext>
             </a:extLst>
           </p:cNvPr>
@@ -9978,59 +8806,18 @@
         </p:blipFill>
         <p:spPr>
           <a:xfrm>
-            <a:off x="755576" y="1485455"/>
-            <a:ext cx="3698355" cy="2680019"/>
+            <a:off x="611561" y="1124745"/>
+            <a:ext cx="5736643" cy="3030145"/>
           </a:xfrm>
           <a:prstGeom prst="rect">
             <a:avLst/>
           </a:prstGeom>
         </p:spPr>
       </p:pic>
-      <p:pic>
-        <p:nvPicPr>
-          <p:cNvPr id="4" name="Grafik 3" descr="Ein Bild, das Reihe, Diagramm, parallel, Steigung enthält.&#10;&#10;Automatisch generierte Beschreibung">
-            <a:extLst>
-              <a:ext uri="{FF2B5EF4-FFF2-40B4-BE49-F238E27FC236}">
-                <a16:creationId xmlns:a16="http://schemas.microsoft.com/office/drawing/2014/main" id="{57267605-1410-A119-1AFA-DEDF53609828}"/>
-              </a:ext>
-            </a:extLst>
-          </p:cNvPr>
-          <p:cNvPicPr>
-            <a:picLocks noChangeAspect="1"/>
-          </p:cNvPicPr>
-          <p:nvPr/>
-        </p:nvPicPr>
-        <p:blipFill>
-          <a:blip r:embed="rId4">
-            <a:extLst>
-              <a:ext uri="{28A0092B-C50C-407E-A947-70E740481C1C}">
-                <a14:useLocalDpi xmlns:a14="http://schemas.microsoft.com/office/drawing/2010/main" val="0"/>
-              </a:ext>
-            </a:extLst>
-          </a:blip>
-          <a:stretch>
-            <a:fillRect/>
-          </a:stretch>
-        </p:blipFill>
-        <p:spPr>
-          <a:xfrm>
-            <a:off x="5148000" y="1188000"/>
-            <a:ext cx="3636251" cy="3074400"/>
-          </a:xfrm>
-          <a:prstGeom prst="rect">
-            <a:avLst/>
-          </a:prstGeom>
-          <a:ln w="3175">
-            <a:solidFill>
-              <a:schemeClr val="accent1"/>
-            </a:solidFill>
-          </a:ln>
-        </p:spPr>
-      </p:pic>
     </p:spTree>
     <p:extLst>
       <p:ext uri="{BB962C8B-B14F-4D97-AF65-F5344CB8AC3E}">
-        <p14:creationId xmlns:p14="http://schemas.microsoft.com/office/powerpoint/2010/main" val="2902806685"/>
+        <p14:creationId xmlns:p14="http://schemas.microsoft.com/office/powerpoint/2010/main" val="2843438534"/>
       </p:ext>
     </p:extLst>
   </p:cSld>
@@ -10120,10 +8907,10 @@
       </p:sp>
       <p:pic>
         <p:nvPicPr>
-          <p:cNvPr id="8" name="Grafik 7" descr="\documentclass[20pt]{article}&#10;\usepackage{amsmath,amsfonts,amssymb,xcolor, mathtools}&#10;\pagestyle{empty}&#10;\usepackage[T1]{fontenc}&#10;\usepackage{fontspec}&#10;\setsansfont{Arial}&#10;\renewcommand\familydefault{\sfdefault}&#10;\begin{document}&#10;\begin{itemize}&#10;\item for a positive sample laying on the gutter &#10;we know \vspace{0.2cm}\newline $\beta \overline{x}^+ +\beta_0 = 1 \Leftrightarrow \beta \overline{x}^+=1-\beta_0$&#10;\item conversely for a negativ sample on the gutter \vspace{0.2cm}\newline&#10;$\beta \overline{x}^- +\beta_0 = -1 \Leftrightarrow \beta \overline{x}^-=-1-\beta_0$&#10;\item imputed in the derived formula for the width\vspace{0.2cm}\newline&#10;$\rightarrow \frac{1-\beta_0-(-1-\beta_0)}{||\beta||}=\frac{2}{||\beta||}$&#10;\item which is changed to $\frac{1}{2} ||\beta||^2=\frac{1}{2} \beta ' \beta$ to minimize in order to maximize $\frac{2}{||\beta||}$&#10;\end{itemize}&#10;&#10;\end{document}" title="IguanaTex Picture Display">
+          <p:cNvPr id="7" name="Grafik 6" descr="\documentclass[20pt]{article}&#10;\usepackage{amsmath,amsfonts,amssymb,xcolor, mathtools}&#10;\pagestyle{empty}&#10;\usepackage[T1]{fontenc}&#10;\usepackage{fontspec}&#10;\setsansfont{Arial}&#10;\renewcommand\familydefault{\sfdefault}&#10;\begin{document}&#10;\begin{itemize}&#10;\item for the maximization the constraints that   $\beta \cdot \overline{x}+\beta_0\ge 1$ for \textcolor{green}{positive} \newline and ($\beta \cdot \overline{x}+\beta_0\le -1$) for \textcolor{red}{negative} are still to respect&#10;&#10;\item goal: merge both constraints in one&#10;\item introduce new variable $y$ with $y=1$ for positive samples and $y=-1$ for negative samples&#10;\item leading to constraint $y(\beta \overline{x}+\beta_0)\ge 1$&#10;\end{itemize}&#10;\end{document}" title="IguanaTex Picture Display">
             <a:extLst>
               <a:ext uri="{FF2B5EF4-FFF2-40B4-BE49-F238E27FC236}">
-                <a16:creationId xmlns:a16="http://schemas.microsoft.com/office/drawing/2014/main" id="{C6BABD42-AA54-D773-CF47-EBFC11A93BD4}"/>
+                <a16:creationId xmlns:a16="http://schemas.microsoft.com/office/drawing/2014/main" id="{4906954A-819A-1E47-B89A-9E4163964583}"/>
               </a:ext>
             </a:extLst>
           </p:cNvPr>
@@ -10150,8 +8937,8 @@
         </p:blipFill>
         <p:spPr>
           <a:xfrm>
-            <a:off x="611560" y="1124744"/>
-            <a:ext cx="7432051" cy="3028783"/>
+            <a:off x="683569" y="1419621"/>
+            <a:ext cx="7473313" cy="2198931"/>
           </a:xfrm>
           <a:prstGeom prst="rect">
             <a:avLst/>
@@ -10161,7 +8948,7 @@
     </p:spTree>
     <p:extLst>
       <p:ext uri="{BB962C8B-B14F-4D97-AF65-F5344CB8AC3E}">
-        <p14:creationId xmlns:p14="http://schemas.microsoft.com/office/powerpoint/2010/main" val="2843438534"/>
+        <p14:creationId xmlns:p14="http://schemas.microsoft.com/office/powerpoint/2010/main" val="3291923032"/>
       </p:ext>
     </p:extLst>
   </p:cSld>
@@ -10178,9 +8965,9 @@
   <p:tag name="ORIGINALWIDTH" val="2247,314"/>
   <p:tag name="OUTPUTTYPE" val="PNG"/>
   <p:tag name="IGUANATEXVERSION" val="161"/>
-  <p:tag name="LATEXADDIN" val="\documentclass[20pt]{article}&#10;\usepackage{amsmath,amsfonts,amssymb,xcolor, mathtools}&#10;\pagestyle{empty}&#10;\usepackage[T1]{fontenc}&#10;\usepackage{fontspec}&#10;\setsansfont{Arial}&#10;\renewcommand\familydefault{\sfdefault}&#10;\begin{document}&#10;\begin{itemize}&#10;\item \textcolor{green}{$\beta$}$\rightarrow$ a k-dimensional vector\newline perpendicular to the decision boundary&#10;\item all points $x$ for which holds $\frac{\textcolor{green}{\beta}}{||\textcolor{green}{\beta}||}\cdot x=\textcolor{magenta}{c}$\newline lie on the hyperplain &#10;\item through some rearrangement we get \newline&#10;$\beta \cdot x +\beta_0=0$&#10;&#10;\end{itemize}&#10;&#10;\end{document}"/>
+  <p:tag name="LATEXADDIN" val="\documentclass[20pt]{article}&#10;\usepackage{amsmath,amsfonts,amssymb,xcolor, mathtools}&#10;\pagestyle{empty}&#10;\usepackage[T1]{fontenc}&#10;\usepackage{fontspec}&#10;\setsansfont{Arial}&#10;\renewcommand\familydefault{\sfdefault}&#10;\begin{document}&#10;\begin{itemize}&#10;\item \textcolor{green}{$\beta$}$\rightarrow$ a k-dimensional vector\newline perpendicular to the decision boundary&#10;\item all points $x$ for which holds $\frac{\textcolor{green}{\beta}}{||\textcolor{green}{\beta}||}\cdot \overline{x}=\textcolor{magenta}{c}$\newline lie on the hyperplain &#10;\item through some rearrangement we get \newline&#10;$\beta \cdot \overline{x} +\beta_0=0$&#10;&#10;\end{itemize}&#10;&#10;\end{document}"/>
   <p:tag name="IGUANATEXSIZE" val="18"/>
-  <p:tag name="IGUANATEXCURSOR" val="545"/>
+  <p:tag name="IGUANATEXCURSOR" val="607"/>
   <p:tag name="TRANSPARENCY" val="Wahr"/>
   <p:tag name="LATEXENGINEID" val="2"/>
   <p:tag name="TEMPFOLDER" val="E:\Dokumente\temp\"/>
@@ -10258,9 +9045,9 @@
   <p:tag name="ORIGINALWIDTH" val="2953,162"/>
   <p:tag name="OUTPUTTYPE" val="PNG"/>
   <p:tag name="IGUANATEXVERSION" val="161"/>
-  <p:tag name="LATEXADDIN" val="\documentclass[20pt]{article}&#10;\usepackage{amsmath,amsfonts,amssymb,xcolor, mathtools}&#10;\pagestyle{empty}&#10;\usepackage[T1]{fontenc}&#10;\usepackage{fontspec}&#10;\setsansfont{Arial}&#10;\renewcommand\familydefault{\sfdefault}&#10;\begin{document}&#10;\begin{itemize}&#10;\item apply a transforming function (Kernel)\newline $K(\overline{x}_i \cdot \overline{x}_j)$ to the dot products in the\newline  maximization function &#10;\item some used Kernel functions are &#10;\begin{itemize}&#10;\item the plynomial kernel of order $d$:\newline $K(\overline{x}_i,\overline{x}_j)=(1+ \overline{x}_i^\mathsf{T}\; \overline{x}_j)^d$&#10;\item the radial/gaussian Kernel:\newline$K(\overline{x}_i,\overline{x}_j)=exp(-\gamma||\overline{x}_i- \overline{x}_j||^2)$&#10;\item sigmoid Kernel: $K(\overline{x}_i,\overline{x}_j)= \tanh(\gamma (\overline{x}_i^\mathsf{T}\; \overline{x}_j)+r)$&#10;\end{itemize}&#10;\end{itemize}&#10;\end{document}"/>
+  <p:tag name="LATEXADDIN" val="\documentclass[20pt]{article}&#10;\usepackage{amsmath,amsfonts,amssymb,xcolor, mathtools}&#10;\pagestyle{empty}&#10;\usepackage[T1]{fontenc}&#10;\usepackage{fontspec}&#10;\setsansfont{Arial}&#10;\renewcommand\familydefault{\sfdefault}&#10;\begin{document}&#10;\begin{itemize}&#10;\item apply a transforming function (Kernel)\newline $K(\overline{x}_i \cdot \overline{x}_j)$ to the dot products in the\newline  maximization function &#10;\item some used Kernel functions are &#10;\begin{itemize}&#10;\item the polynomial kernel of order $d$:\newline $K(\overline{x}_i,\overline{x}_j)=(1+ \overline{x}_i^\mathsf{T}\; \overline{x}_j)^d$&#10;\item the radial/gaussian Kernel:\newline$K(\overline{x}_i,\overline{x}_j)=exp(-\gamma||\overline{x}_i- \overline{x}_j||^2)$&#10;\item sigmoid Kernel: $K(\overline{x}_i,\overline{x}_j)= \tanh(\gamma (\overline{x}_i^\mathsf{T}\; \overline{x}_j)+r)$&#10;\end{itemize}&#10;\end{itemize}&#10;\end{document}"/>
   <p:tag name="IGUANATEXSIZE" val="18"/>
-  <p:tag name="IGUANATEXCURSOR" val="626"/>
+  <p:tag name="IGUANATEXCURSOR" val="463"/>
   <p:tag name="TRANSPARENCY" val="Wahr"/>
   <p:tag name="LATEXENGINEID" val="2"/>
   <p:tag name="TEMPFOLDER" val="E:\Dokumente\temp\"/>
@@ -10291,6 +9078,46 @@
 </p:tagLst>
 </file>
 
+<file path=ppt/tags/tag15.xml><?xml version="1.0" encoding="utf-8"?>
+<p:tagLst xmlns:a="http://schemas.openxmlformats.org/drawingml/2006/main" xmlns:r="http://schemas.openxmlformats.org/officeDocument/2006/relationships" xmlns:p="http://schemas.openxmlformats.org/presentationml/2006/main">
+  <p:tag name="OUTPUTDPI" val="1200"/>
+  <p:tag name="ORIGINALHEIGHT" val="995,3889"/>
+  <p:tag name="ORIGINALWIDTH" val="3845,787"/>
+  <p:tag name="OUTPUTTYPE" val="PNG"/>
+  <p:tag name="IGUANATEXVERSION" val="161"/>
+  <p:tag name="LATEXADDIN" val="\documentclass[20pt]{article}&#10;\usepackage{amsmath,amsfonts,amssymb,xcolor, mathtools}&#10;\pagestyle{empty}&#10;\usepackage{booktabs}&#10;\usepackage{enumitem}&#10;\usepackage{parskip}&#10;\usepackage[T1]{fontenc}&#10;\usepackage{fontspec}&#10;\setsansfont{Arial}&#10;\renewcommand\familydefault{\sfdefault}&#10;\begin{document}&#10;\centering&#10;\begin{tabular}{p{5cm}|p{5cm}}&#10;\textbf{Pros}&amp;\textbf{cons}\\&#10;\hline&#10;\begin{itemize}[topsep=0cm,leftmargin=0.3cm]&#10;\item efficiently classifies in a high dimensional setting ($n\ll p$)&#10;\item risk of overfitting is lower&#10;&#10;\end{itemize}&#10;&amp;&#10;\begin{itemize}[topsep=0cm,leftmargin=0.3cm]&#10;\item heavily relies on the choice of hyperparameters/kernels&#10;\item no interpretability of coefficients&#10;\end{itemize}&#10;\end{tabular}&#10;\end{document}"/>
+  <p:tag name="IGUANATEXSIZE" val="18"/>
+  <p:tag name="IGUANATEXCURSOR" val="497"/>
+  <p:tag name="TRANSPARENCY" val="Wahr"/>
+  <p:tag name="LATEXENGINEID" val="2"/>
+  <p:tag name="TEMPFOLDER" val="E:\Dokumente\temp\"/>
+  <p:tag name="LATEXFORMHEIGHT" val="320"/>
+  <p:tag name="LATEXFORMWIDTH" val="385"/>
+  <p:tag name="LATEXFORMWRAP" val="Wahr"/>
+  <p:tag name="BITMAPVECTOR" val="0"/>
+</p:tagLst>
+</file>
+
+<file path=ppt/tags/tag16.xml><?xml version="1.0" encoding="utf-8"?>
+<p:tagLst xmlns:a="http://schemas.openxmlformats.org/drawingml/2006/main" xmlns:r="http://schemas.openxmlformats.org/officeDocument/2006/relationships" xmlns:p="http://schemas.openxmlformats.org/presentationml/2006/main">
+  <p:tag name="OUTPUTDPI" val="1200"/>
+  <p:tag name="ORIGINALHEIGHT" val="2007,28"/>
+  <p:tag name="ORIGINALWIDTH" val="5454,011"/>
+  <p:tag name="OUTPUTTYPE" val="PNG"/>
+  <p:tag name="IGUANATEXVERSION" val="161"/>
+  <p:tag name="LATEXADDIN" val="\documentclass[20pt]{article}&#10;\usepackage{amsmath,amsfonts,amssymb,xcolor, mathtools}&#10;\pagestyle{empty}&#10;\usepackage{booktabs}&#10;\usepackage{enumitem}&#10; \usepackage{multirow}&#10;\usepackage{longtable}&#10;\usepackage{xcolor}&#10;\definecolor{darkgreen}{RGB}{101,178,56}&#10;\usepackage{graphicx}&#10;\usepackage{parskip}&#10;\usepackage[T1]{fontenc}&#10;\usepackage{fontspec}&#10;\setsansfont{Arial}&#10;\renewcommand\familydefault{\sfdefault}&#10;\begin{document}&#10;\begin{center}&#10;\begin{longtable}{ll|lll|}&#10; \cline{3-5}&#10; &amp;             &amp; \multicolumn{3}{c|}{DGP}                                            \\ \cline{3-5} &#10; \endfirsthead&#10; %&#10; \endhead&#10; %&#10; &amp;             &amp; \multicolumn{1}{l|}{linear} &amp; \multicolumn{1}{l|}{polynomial} &amp; radial \\ \hline&#10; \multicolumn{1}{|l|}{\multirow{3}{*}{\rotatebox{90}{Dimensionality}}} &amp; $p \ll n$  &amp; \multicolumn{1}{l|}{\parbox{4cm}{\begin{itemize}[label=-,topsep=0cm,leftmargin=0.3cm,itemsep=0cm,parsep=0cm]&#10;   \item SVM-Linear \textcolor{darkgreen}{\scalebox{1}{$\uparrow$}}&#10;   \item SVM-Polynomial \textcolor{darkgreen}{\scalebox{0.5}{$\uparrow$}}&#10;   \item SVM-Radial \textcolor{darkgreen}{\scalebox{0.5}{$\uparrow$}}&#10;   \item Logistic Regression \textcolor{red}{\scalebox{0.5}{$\downarrow$}}&#10; \end{itemize}}}  &amp; \multicolumn{1}{l|}{\parbox{4cm}{\begin{itemize}[label=-,topsep=0cm,leftmargin=0.3cm,itemsep=0cm,parsep=0cm]&#10; \item SVM-Linear \textcolor{darkgreen}{\scalebox{0.5}{$\uparrow$}}&#10; \item SVM-Polynomial \textcolor{darkgreen}{\scalebox{1}{$\uparrow$}}&#10; \item SVM-Radial \textcolor{darkgreen}{\scalebox{0.5}{$\uparrow$}}&#10; \item Logistic Regression \textcolor{red}{\scalebox{0.5}{$\downarrow$}}&#10;\end{itemize}}}   &amp; \parbox{4cm}{\begin{itemize}[label=-,topsep=0cm,leftmargin=0.3cm,itemsep=0cm,parsep=0cm]&#10;\item SVM-Linear \textcolor{darkgreen}{\scalebox{0.5}{$\uparrow$}}&#10;\item SVM-Polynomial \textcolor{darkgreen}{\scalebox{0.5}{$\uparrow$}}&#10;\item SVM-Radial \textcolor{darkgreen}{\scalebox{1}{$\uparrow$}}&#10;\item Logistic Regression \textcolor{red}{\scalebox{0.5}{$\downarrow$}}&#10;\end{itemize}}  \\ \cline{2-5} &#10; \multicolumn{1}{|l|}{}                                &amp; $p \approx n$  &amp; \multicolumn{1}{l|}{\parbox{4cm}{\begin{itemize}[label=-,topsep=0cm,leftmargin=0.3cm,itemsep=0cm,parsep=0cm]&#10;    \item SVM-Linear&#10;    \item SVM-Polynomial&#10;    \item SVM-Radial&#10;    \item Logistic Regression&#10; \end{itemize}}}  &amp; \multicolumn{1}{l|}{\parbox{4cm}{\begin{itemize}[label=-,topsep=0cm,leftmargin=0.3cm,itemsep=0cm,parsep=0cm]&#10; \item SVM-Linear&#10; \item SVM-Polynomial&#10; \item SVM-Radial&#10; \item Logistic Regression&#10;\end{itemize}}}   &amp; \parbox{4cm}{\begin{itemize}[label=-,topsep=0cm,leftmargin=0.3cm,itemsep=0cm,parsep=0cm]&#10;\item SVM-Linear&#10;\item SVM-Polynomial&#10;\item SVM-Radial&#10;\item Logistic Regression&#10;\end{itemize}}  \\ \cline{2-5} &#10; \multicolumn{1}{|l|}{}                                &amp; $p \gg n$ &amp; \multicolumn{1}{l|}{\parbox{4cm}{\begin{itemize}[label=-,topsep=0cm,leftmargin=0.3cm,itemsep=0cm,parsep=0cm]&#10;    \item SVM-Linear&#10;    \item SVM-Polynomial&#10;    \item SVM-Radial&#10;    \item Logistic Regression&#10; \end{itemize}}}  &amp; \multicolumn{1}{l|}{\parbox{4cm}{\begin{itemize}[label=-,topsep=0cm,leftmargin=0.3cm,itemsep=0cm,parsep=0cm]&#10; \item SVM-Linear&#10; \item SVM-Polynomial&#10; \item SVM-Radial&#10; \item Logistic Regression&#10;\end{itemize}}}   &amp; \parbox{4cm}{\begin{itemize}[label=-,topsep=0cm,leftmargin=0.3cm,itemsep=0cm,parsep=0cm]&#10;\item SVM-Linear&#10;\item SVM-Polynomial&#10;\item SVM-Radial&#10;\item Logistic Regression&#10;\end{itemize}} \\ \hline&#10;\end{longtable}&#10;\end{center}&#10;\end{document}"/>
+  <p:tag name="IGUANATEXSIZE" val="18"/>
+  <p:tag name="IGUANATEXCURSOR" val="193"/>
+  <p:tag name="TRANSPARENCY" val="Wahr"/>
+  <p:tag name="LATEXENGINEID" val="3"/>
+  <p:tag name="TEMPFOLDER" val="E:\Dokumente\temp\"/>
+  <p:tag name="LATEXFORMHEIGHT" val="320"/>
+  <p:tag name="LATEXFORMWIDTH" val="385"/>
+  <p:tag name="LATEXFORMWRAP" val="Wahr"/>
+  <p:tag name="BITMAPVECTOR" val="0"/>
+</p:tagLst>
+</file>
+
 <file path=ppt/tags/tag2.xml><?xml version="1.0" encoding="utf-8"?>
 <p:tagLst xmlns:a="http://schemas.openxmlformats.org/drawingml/2006/main" xmlns:r="http://schemas.openxmlformats.org/officeDocument/2006/relationships" xmlns:p="http://schemas.openxmlformats.org/presentationml/2006/main">
   <p:tag name="OUTPUTDPI" val="1200"/>
@@ -10298,9 +9125,9 @@
   <p:tag name="ORIGINALWIDTH" val="2310,323"/>
   <p:tag name="OUTPUTTYPE" val="PNG"/>
   <p:tag name="IGUANATEXVERSION" val="161"/>
-  <p:tag name="LATEXADDIN" val="\documentclass[20pt]{article}&#10;\usepackage{amsmath,amsfonts,amssymb,xcolor, mathtools}&#10;\pagestyle{empty}&#10;\usepackage[T1]{fontenc}&#10;\usepackage{fontspec}&#10;\setsansfont{Arial}&#10;\renewcommand\familydefault{\sfdefault}&#10;\begin{document}&#10;\begin{itemize}&#10;\item the two gutters around the boundary \newline are defined by $\beta \cdot x+\beta_0=1$ and \newline$ \beta \cdot x+\beta_0=-1$&#10;&#10;\item seperate \textcolor{red}{positive}($\beta \cdot x+\beta_0\ge 1$)\newline from \textcolor{green}{negative} ($\beta \cdot x+\beta_0\le -1$) samples&#10;\item distance between the gutters\newline$\rightarrow$ width that is to be maximized&#10;\end{itemize}&#10;&#10;\end{document}"/>
+  <p:tag name="LATEXADDIN" val="\documentclass[20pt]{article}&#10;\usepackage{amsmath,amsfonts,amssymb,xcolor, mathtools}&#10;\pagestyle{empty}&#10;\usepackage[T1]{fontenc}&#10;\usepackage{fontspec}&#10;\setsansfont{Arial}&#10;\renewcommand\familydefault{\sfdefault}&#10;\begin{document}&#10;\begin{itemize}&#10;\item the two gutters around the boundary \newline are defined by $\beta \cdot \overline{x}+\beta_0=1$ and \newline$ \beta \cdot \overline{x}+\beta_0=-1$&#10;&#10;\item seperate \textcolor{red}{positive}($\beta \cdot \overline{x}+\beta_0\ge 1$)\newline from \textcolor{green}{negative} ($\beta \cdot \overline{x}+\beta_0\le -1$) samples&#10;\item distance between the gutters\newline$\rightarrow$ width that is to be maximized&#10;\end{itemize}&#10;&#10;\end{document}"/>
   <p:tag name="IGUANATEXSIZE" val="18"/>
-  <p:tag name="IGUANATEXCURSOR" val="488"/>
+  <p:tag name="IGUANATEXCURSOR" val="465"/>
   <p:tag name="TRANSPARENCY" val="Wahr"/>
   <p:tag name="LATEXENGINEID" val="2"/>
   <p:tag name="TEMPFOLDER" val="E:\Dokumente\temp\"/>
@@ -10314,13 +9141,13 @@
 <file path=ppt/tags/tag3.xml><?xml version="1.0" encoding="utf-8"?>
 <p:tagLst xmlns:a="http://schemas.openxmlformats.org/drawingml/2006/main" xmlns:r="http://schemas.openxmlformats.org/officeDocument/2006/relationships" xmlns:p="http://schemas.openxmlformats.org/presentationml/2006/main">
   <p:tag name="OUTPUTDPI" val="1200"/>
-  <p:tag name="ORIGINALHEIGHT" val="1434,2"/>
+  <p:tag name="ORIGINALHEIGHT" val="1436,45"/>
   <p:tag name="ORIGINALWIDTH" val="2027,533"/>
   <p:tag name="OUTPUTTYPE" val="PNG"/>
   <p:tag name="IGUANATEXVERSION" val="161"/>
-  <p:tag name="LATEXADDIN" val="\documentclass[20pt]{article}&#10;\usepackage{amsmath,amsfonts,amssymb,xcolor, mathtools}&#10;\pagestyle{empty}&#10;\usepackage[T1]{fontenc}&#10;\usepackage{fontspec}&#10;\setsansfont{Arial}&#10;\renewcommand\familydefault{\sfdefault}&#10;\begin{document}&#10;\begin{itemize}&#10;\item consider $x^+ \rightarrow$ vector to a \newline postive sample lying on the gutter \newline&#10;($x^- \rightarrow$ negative sample on gutter)\newline&#10;$\Rightarrow$ considered as \textbf{Support Vectors}&#10;\item to measure the \textcolor{magenta}{width} of the margin  \newline&#10;$(x^+ -x^-)$ is Projected on the unit \newline&#10;vector of $\beta$ &#10;\item $M=(x^+ -x^-)\cdot \frac{\beta}{||\beta||}=\frac{\beta x^+ -\beta x^-}{||\beta||}$&#10;&#10;\end{itemize}&#10;&#10;\end{document}"/>
+  <p:tag name="LATEXADDIN" val="\documentclass[20pt]{article}&#10;\usepackage{amsmath,amsfonts,amssymb,xcolor, mathtools}&#10;\pagestyle{empty}&#10;\usepackage[T1]{fontenc}&#10;\usepackage{fontspec}&#10;\setsansfont{Arial}&#10;\renewcommand\familydefault{\sfdefault}&#10;\begin{document}&#10;\begin{itemize}&#10;\item consider $\overline{x}^+ \rightarrow$ vector of a  postive\newline sample lying on the gutter \newline&#10;($\overline{x}^- \rightarrow$ negative sample on gutter)\newline&#10;$\Rightarrow$ considered as \textbf{Support Vectors}&#10;\item to measure the \textcolor{magenta}{width} of the margin  \newline&#10;$(\overline{x}^+ -\overline{x}^-)$ is Projected on the unit \newline&#10;vector of $\beta$ &#10;\item $M=(\overline{x}^+ -\overline{x}^-)\cdot \frac{\beta}{||\beta||}=\frac{\beta \overline{x}^+ -\beta \overline{x}^-}{||\beta||}$&#10;&#10;\end{itemize}&#10;&#10;\end{document}"/>
   <p:tag name="IGUANATEXSIZE" val="18"/>
-  <p:tag name="IGUANATEXCURSOR" val="399"/>
+  <p:tag name="IGUANATEXCURSOR" val="748"/>
   <p:tag name="TRANSPARENCY" val="Wahr"/>
   <p:tag name="LATEXENGINEID" val="2"/>
   <p:tag name="TEMPFOLDER" val="E:\Dokumente\temp\"/>
@@ -10335,12 +9162,12 @@
 <p:tagLst xmlns:a="http://schemas.openxmlformats.org/drawingml/2006/main" xmlns:r="http://schemas.openxmlformats.org/officeDocument/2006/relationships" xmlns:p="http://schemas.openxmlformats.org/presentationml/2006/main">
   <p:tag name="OUTPUTDPI" val="1200"/>
   <p:tag name="ORIGINALHEIGHT" val="1612,725"/>
-  <p:tag name="ORIGINALWIDTH" val="4065,567"/>
+  <p:tag name="ORIGINALWIDTH" val="3137,688"/>
   <p:tag name="OUTPUTTYPE" val="PNG"/>
   <p:tag name="IGUANATEXVERSION" val="161"/>
-  <p:tag name="LATEXADDIN" val="\documentclass[20pt]{article}&#10;\usepackage{amsmath,amsfonts,amssymb,xcolor, mathtools}&#10;\pagestyle{empty}&#10;\usepackage[T1]{fontenc}&#10;\usepackage{fontspec}&#10;\setsansfont{Arial}&#10;\renewcommand\familydefault{\sfdefault}&#10;\begin{document}&#10;\begin{itemize}&#10;\item for a positive sample laying on the gutter &#10;we know \vspace{0.2cm}\newline $\beta \overline{x}^+ +\beta_0 = 1 \Leftrightarrow \beta \overline{x}^+=1-\beta_0$&#10;\item conversely for a negativ sample on the gutter \vspace{0.2cm}\newline&#10;$\beta \overline{x}^- +\beta_0 = -1 \Leftrightarrow \beta \overline{x}^-=-1-\beta_0$&#10;\item imputed in the derived formula for the width\vspace{0.2cm}\newline&#10;$\rightarrow \frac{1-\beta_0-(-1-\beta_0)}{||\beta||}=\frac{2}{||\beta||}$&#10;\item which is changed to $\frac{1}{2} ||\beta||^2=\frac{1}{2} \beta ' \beta$ to minimize in order to maximize $\frac{2}{||\beta||}$&#10;\end{itemize}&#10;&#10;\end{document}"/>
+  <p:tag name="LATEXADDIN" val="\documentclass[20pt]{article}&#10;\usepackage{amsmath,amsfonts,amssymb,xcolor, mathtools}&#10;\pagestyle{empty}&#10;\usepackage[T1]{fontenc}&#10;\usepackage{fontspec}&#10;\setsansfont{Arial}&#10;\renewcommand\familydefault{\sfdefault}&#10;\begin{document}&#10;\begin{itemize}&#10;\item for a positive sample laying on the gutter &#10;we know \vspace{0.2cm}\newline $\beta \overline{x}^+ +\beta_0 = 1 \Leftrightarrow \beta \overline{x}^+=1-\beta_0$&#10;\item conversely for a negativ sample on the gutter \vspace{0.2cm}\newline&#10;$\beta \overline{x}^- +\beta_0 = -1 \Leftrightarrow \beta \overline{x}^-=-1-\beta_0$&#10;\item imputed in the derived formula for the width\vspace{0.2cm}\newline&#10;$\rightarrow \frac{1-\beta_0-(-1-\beta_0)}{||\beta||}=\frac{2}{||\beta||}$&#10;\item minimization of $\frac{1}{2} ||\beta||^2=\frac{1}{2} \beta ' \beta$  in order to maximize $\frac{2}{||\beta||}$&#10;\end{itemize}&#10;&#10;\end{document}"/>
   <p:tag name="IGUANATEXSIZE" val="18"/>
-  <p:tag name="IGUANATEXCURSOR" val="864"/>
+  <p:tag name="IGUANATEXCURSOR" val="790"/>
   <p:tag name="TRANSPARENCY" val="Wahr"/>
   <p:tag name="LATEXENGINEID" val="2"/>
   <p:tag name="TEMPFOLDER" val="E:\Dokumente\temp\"/>
@@ -10358,9 +9185,9 @@
   <p:tag name="ORIGINALWIDTH" val="4088,821"/>
   <p:tag name="OUTPUTTYPE" val="PNG"/>
   <p:tag name="IGUANATEXVERSION" val="161"/>
-  <p:tag name="LATEXADDIN" val="\documentclass[20pt]{article}&#10;\usepackage{amsmath,amsfonts,amssymb,xcolor, mathtools}&#10;\pagestyle{empty}&#10;\usepackage[T1]{fontenc}&#10;\usepackage{fontspec}&#10;\setsansfont{Arial}&#10;\renewcommand\familydefault{\sfdefault}&#10;\begin{document}&#10;\begin{itemize}&#10;\item for the maximization the constraints that   $\beta \cdot \overline{x}+\beta_0\ge 1$ for \textcolor{red}{positive} \newline and ($\beta \cdot \overline{x}+\beta_0\le -1$) for \textcolor{green}{negative} are still to respect&#10;&#10;\item goal: merge both constraints in one&#10;\item introduce new variable $y$ with $y=1$ for positive samples and $y=-1$ for negative samples&#10;\item leading to constraint $y(\beta x+\beta_0)\ge 1$&#10;\end{itemize}&#10;\end{document}"/>
+  <p:tag name="LATEXADDIN" val="\documentclass[20pt]{article}&#10;\usepackage{amsmath,amsfonts,amssymb,xcolor, mathtools}&#10;\pagestyle{empty}&#10;\usepackage[T1]{fontenc}&#10;\usepackage{fontspec}&#10;\setsansfont{Arial}&#10;\renewcommand\familydefault{\sfdefault}&#10;\begin{document}&#10;\begin{itemize}&#10;\item for the maximization the constraints that   $\beta \cdot \overline{x}+\beta_0\ge 1$ for \textcolor{green}{positive} \newline and ($\beta \cdot \overline{x}+\beta_0\le -1$) for \textcolor{red}{negative} are still to respect&#10;&#10;\item goal: merge both constraints in one&#10;\item introduce new variable $y$ with $y=1$ for positive samples and $y=-1$ for negative samples&#10;\item leading to constraint $y(\beta \overline{x}+\beta_0)\ge 1$&#10;\end{itemize}&#10;\end{document}"/>
   <p:tag name="IGUANATEXSIZE" val="18"/>
-  <p:tag name="IGUANATEXCURSOR" val="681"/>
+  <p:tag name="IGUANATEXCURSOR" val="440"/>
   <p:tag name="TRANSPARENCY" val="Wahr"/>
   <p:tag name="LATEXENGINEID" val="2"/>
   <p:tag name="TEMPFOLDER" val="E:\Dokumente\temp\"/>

</xml_diff>

<commit_message>
form of decision boundary
</commit_message>
<xml_diff>
--- a/Präsentation/Support Vector Machines.pptx
+++ b/Präsentation/Support Vector Machines.pptx
@@ -6198,7 +6198,7 @@
             </a:r>
             <a:r>
               <a:rPr lang="de-DE" sz="1800" dirty="0" err="1"/>
-              <a:t>data</a:t>
+              <a:t>decision</a:t>
             </a:r>
             <a:r>
               <a:rPr lang="de-DE" sz="1800" dirty="0"/>
@@ -6206,15 +6206,7 @@
             </a:r>
             <a:r>
               <a:rPr lang="de-DE" sz="1800" dirty="0" err="1"/>
-              <a:t>generating</a:t>
-            </a:r>
-            <a:r>
-              <a:rPr lang="de-DE" sz="1800" dirty="0"/>
-              <a:t> </a:t>
-            </a:r>
-            <a:r>
-              <a:rPr lang="de-DE" sz="1800" dirty="0" err="1"/>
-              <a:t>processes</a:t>
+              <a:t>boundaries</a:t>
             </a:r>
             <a:r>
               <a:rPr lang="de-DE" sz="1800" dirty="0"/>
@@ -6936,10 +6928,10 @@
       </p:sp>
       <p:pic>
         <p:nvPicPr>
-          <p:cNvPr id="6" name="Grafik 5" descr="\documentclass[20pt]{article}&#10;\usepackage{amsmath,amsfonts,amssymb,xcolor, mathtools}&#10;\pagestyle{empty}&#10;\usepackage{booktabs}&#10;\usepackage{enumitem}&#10; \usepackage{multirow}&#10;\usepackage{longtable}&#10;\usepackage{xcolor}&#10;\definecolor{darkgreen}{RGB}{101,178,56}&#10;\usepackage{graphicx}&#10;\usepackage{parskip}&#10;\usepackage[T1]{fontenc}&#10;\usepackage{fontspec}&#10;\setsansfont{Arial}&#10;\renewcommand\familydefault{\sfdefault}&#10;\begin{document}&#10;\begin{center}&#10;\begin{longtable}{ll|lll|}&#10; \cline{3-5}&#10; &amp;             &amp; \multicolumn{3}{c|}{DGP}                                            \\ \cline{3-5} &#10; \endfirsthead&#10; %&#10; \endhead&#10; %&#10; &amp;             &amp; \multicolumn{1}{l|}{linear} &amp; \multicolumn{1}{l|}{polynomial} &amp; radial \\ \hline&#10; \multicolumn{1}{|l|}{\multirow{3}{*}{\rotatebox{90}{Dimensionality}}} &amp; $p \ll n$  &amp; \multicolumn{1}{l|}{\parbox{4cm}{\begin{itemize}[label=-,topsep=0cm,leftmargin=0.3cm,itemsep=0cm,parsep=0cm]&#10;   \item SVM-Linear&#10;   \item SVM-Polynomial &#10;   \item SVM-Radial &#10;   \item Logistic Regression &#10; \end{itemize}}}  &amp; \multicolumn{1}{l|}{\parbox{4cm}{\begin{itemize}[label=-,topsep=0cm,leftmargin=0.3cm,itemsep=0cm,parsep=0cm]&#10; \item SVM-Linear &#10; \item SVM-Polynomial &#10; \item SVM-Radial &#10; \item Logistic Regression &#10;\end{itemize}}}   &amp; \parbox{4cm}{\begin{itemize}[label=-,topsep=0cm,leftmargin=0.3cm,itemsep=0cm,parsep=0cm]&#10;\item SVM-Linear &#10;\item SVM-Polynomial &#10;\item SVM-Radial &#10;\item Logistic Regression &#10;\end{itemize}}  \\ \cline{2-5} &#10; \multicolumn{1}{|l|}{}                                &amp; $p \approx n$  &amp; \multicolumn{1}{l|}{\parbox{4cm}{\begin{itemize}[label=-,topsep=0cm,leftmargin=0.3cm,itemsep=0cm,parsep=0cm]&#10;    \item SVM-Linear&#10;    \item SVM-Polynomial&#10;    \item SVM-Radial&#10;    \item Logistic Regression&#10; \end{itemize}}}  &amp; \multicolumn{1}{l|}{\parbox{4cm}{\begin{itemize}[label=-,topsep=0cm,leftmargin=0.3cm,itemsep=0cm,parsep=0cm]&#10; \item SVM-Linear&#10; \item SVM-Polynomial&#10; \item SVM-Radial&#10; \item Logistic Regression&#10;\end{itemize}}}   &amp; \parbox{4cm}{\begin{itemize}[label=-,topsep=0cm,leftmargin=0.3cm,itemsep=0cm,parsep=0cm]&#10;\item SVM-Linear&#10;\item SVM-Polynomial&#10;\item SVM-Radial&#10;\item Logistic Regression&#10;\end{itemize}}  \\ \cline{2-5} &#10; \multicolumn{1}{|l|}{}                                &amp; $p \gg n$ &amp; \multicolumn{1}{l|}{\parbox{4cm}{\begin{itemize}[label=-,topsep=0cm,leftmargin=0.3cm,itemsep=0cm,parsep=0cm]&#10;    \item SVM-Linear&#10;    \item SVM-Polynomial&#10;    \item SVM-Radial&#10;    \item Logistic Regression&#10; \end{itemize}}}  &amp; \multicolumn{1}{l|}{\parbox{4cm}{\begin{itemize}[label=-,topsep=0cm,leftmargin=0.3cm,itemsep=0cm,parsep=0cm]&#10; \item SVM-Linear&#10; \item SVM-Polynomial&#10; \item SVM-Radial&#10; \item Logistic Regression&#10;\end{itemize}}}   &amp; \parbox{4cm}{\begin{itemize}[label=-,topsep=0cm,leftmargin=0.3cm,itemsep=0cm,parsep=0cm]&#10;\item SVM-Linear&#10;\item SVM-Polynomial&#10;\item SVM-Radial&#10;\item Logistic Regression&#10;\end{itemize}} \\ \hline&#10;\end{longtable}&#10;\end{center}&#10;\end{document}" title="IguanaTex Picture Display">
+          <p:cNvPr id="5" name="Grafik 4" descr="\documentclass[20pt]{article}&#10;\usepackage{amsmath,amsfonts,amssymb,xcolor, mathtools}&#10;\pagestyle{empty}&#10;\usepackage{booktabs}&#10;\usepackage{enumitem}&#10; \usepackage{multirow}&#10;\usepackage{longtable}&#10;\usepackage{xcolor}&#10;\definecolor{darkgreen}{RGB}{101,178,56}&#10;\usepackage{graphicx}&#10;\usepackage{parskip}&#10;\usepackage[T1]{fontenc}&#10;\usepackage{fontspec}&#10;\setsansfont{Arial}&#10;\renewcommand\familydefault{\sfdefault}&#10;\begin{document}&#10;\begin{center}&#10;\begin{longtable}{ll|lll|}&#10; \cline{3-5}&#10; &amp;             &amp; \multicolumn{3}{c|}{Form of decision boundary}                                            \\ \cline{3-5} &#10; \endfirsthead&#10; %&#10; \endhead&#10; %&#10; &amp;             &amp; \multicolumn{1}{l|}{linear} &amp; \multicolumn{1}{l|}{polynomial} &amp; radial \\ \hline&#10; \multicolumn{1}{|l|}{\multirow{3}{*}{\rotatebox{90}{Dimensionality}}} &amp; $p \ll n$  &amp; \multicolumn{1}{l|}{\parbox{4cm}{\begin{itemize}[label=-,topsep=0cm,leftmargin=0.3cm,itemsep=0cm,parsep=0cm]&#10;   \item SVM-Linear&#10;   \item SVM-Polynomial &#10;   \item SVM-Radial &#10;   \item Logistic Regression &#10; \end{itemize}}}  &amp; \multicolumn{1}{l|}{\parbox{4cm}{\begin{itemize}[label=-,topsep=0cm,leftmargin=0.3cm,itemsep=0cm,parsep=0cm]&#10; \item SVM-Linear &#10; \item SVM-Polynomial &#10; \item SVM-Radial &#10; \item Logistic Regression &#10;\end{itemize}}}   &amp; \parbox{4cm}{\begin{itemize}[label=-,topsep=0cm,leftmargin=0.3cm,itemsep=0cm,parsep=0cm]&#10;\item SVM-Linear &#10;\item SVM-Polynomial &#10;\item SVM-Radial &#10;\item Logistic Regression &#10;\end{itemize}}  \\ \cline{2-5} &#10; \multicolumn{1}{|l|}{}                                &amp; $p \approx n$  &amp; \multicolumn{1}{l|}{\parbox{4cm}{\begin{itemize}[label=-,topsep=0cm,leftmargin=0.3cm,itemsep=0cm,parsep=0cm]&#10;    \item SVM-Linear&#10;    \item SVM-Polynomial&#10;    \item SVM-Radial&#10;    \item Logistic Regression&#10; \end{itemize}}}  &amp; \multicolumn{1}{l|}{\parbox{4cm}{\begin{itemize}[label=-,topsep=0cm,leftmargin=0.3cm,itemsep=0cm,parsep=0cm]&#10; \item SVM-Linear&#10; \item SVM-Polynomial&#10; \item SVM-Radial&#10; \item Logistic Regression&#10;\end{itemize}}}   &amp; \parbox{4cm}{\begin{itemize}[label=-,topsep=0cm,leftmargin=0.3cm,itemsep=0cm,parsep=0cm]&#10;\item SVM-Linear&#10;\item SVM-Polynomial&#10;\item SVM-Radial&#10;\item Logistic Regression&#10;\end{itemize}}  \\ \cline{2-5} &#10; \multicolumn{1}{|l|}{}                                &amp; $p \gg n$ &amp; \multicolumn{1}{l|}{\parbox{4cm}{\begin{itemize}[label=-,topsep=0cm,leftmargin=0.3cm,itemsep=0cm,parsep=0cm]&#10;    \item SVM-Linear&#10;    \item SVM-Polynomial&#10;    \item SVM-Radial&#10;    \item Logistic Regression&#10; \end{itemize}}}  &amp; \multicolumn{1}{l|}{\parbox{4cm}{\begin{itemize}[label=-,topsep=0cm,leftmargin=0.3cm,itemsep=0cm,parsep=0cm]&#10; \item SVM-Linear&#10; \item SVM-Polynomial&#10; \item SVM-Radial&#10; \item Logistic Regression&#10;\end{itemize}}}   &amp; \parbox{4cm}{\begin{itemize}[label=-,topsep=0cm,leftmargin=0.3cm,itemsep=0cm,parsep=0cm]&#10;\item SVM-Linear&#10;\item SVM-Polynomial&#10;\item SVM-Radial&#10;\item Logistic Regression&#10;\end{itemize}} \\ \hline&#10;\end{longtable}&#10;\end{center}&#10;\end{document}" title="IguanaTex Picture Display">
             <a:extLst>
               <a:ext uri="{FF2B5EF4-FFF2-40B4-BE49-F238E27FC236}">
-                <a16:creationId xmlns:a16="http://schemas.microsoft.com/office/drawing/2014/main" id="{687B6E4C-CFD4-6A88-E407-4396AC39431B}"/>
+                <a16:creationId xmlns:a16="http://schemas.microsoft.com/office/drawing/2014/main" id="{299E0B0C-39DF-AA0D-DE4F-4D07A0216045}"/>
               </a:ext>
             </a:extLst>
           </p:cNvPr>
@@ -6966,8 +6958,8 @@
         </p:blipFill>
         <p:spPr>
           <a:xfrm>
-            <a:off x="504825" y="923195"/>
-            <a:ext cx="8045277" cy="3088180"/>
+            <a:off x="504826" y="923196"/>
+            <a:ext cx="8129387" cy="3088611"/>
           </a:xfrm>
           <a:prstGeom prst="rect">
             <a:avLst/>
@@ -9541,12 +9533,12 @@
 <p:tagLst xmlns:a="http://schemas.openxmlformats.org/drawingml/2006/main" xmlns:r="http://schemas.openxmlformats.org/officeDocument/2006/relationships" xmlns:p="http://schemas.openxmlformats.org/presentationml/2006/main">
   <p:tag name="OUTPUTDPI" val="1200"/>
   <p:tag name="ORIGINALHEIGHT" val="2007,28"/>
-  <p:tag name="ORIGINALWIDTH" val="5454,011"/>
+  <p:tag name="ORIGINALWIDTH" val="5511,019"/>
   <p:tag name="OUTPUTTYPE" val="PNG"/>
   <p:tag name="IGUANATEXVERSION" val="161"/>
-  <p:tag name="LATEXADDIN" val="\documentclass[20pt]{article}&#10;\usepackage{amsmath,amsfonts,amssymb,xcolor, mathtools}&#10;\pagestyle{empty}&#10;\usepackage{booktabs}&#10;\usepackage{enumitem}&#10; \usepackage{multirow}&#10;\usepackage{longtable}&#10;\usepackage{xcolor}&#10;\definecolor{darkgreen}{RGB}{101,178,56}&#10;\usepackage{graphicx}&#10;\usepackage{parskip}&#10;\usepackage[T1]{fontenc}&#10;\usepackage{fontspec}&#10;\setsansfont{Arial}&#10;\renewcommand\familydefault{\sfdefault}&#10;\begin{document}&#10;\begin{center}&#10;\begin{longtable}{ll|lll|}&#10; \cline{3-5}&#10; &amp;             &amp; \multicolumn{3}{c|}{DGP}                                            \\ \cline{3-5} &#10; \endfirsthead&#10; %&#10; \endhead&#10; %&#10; &amp;             &amp; \multicolumn{1}{l|}{linear} &amp; \multicolumn{1}{l|}{polynomial} &amp; radial \\ \hline&#10; \multicolumn{1}{|l|}{\multirow{3}{*}{\rotatebox{90}{Dimensionality}}} &amp; $p \ll n$  &amp; \multicolumn{1}{l|}{\parbox{4cm}{\begin{itemize}[label=-,topsep=0cm,leftmargin=0.3cm,itemsep=0cm,parsep=0cm]&#10;   \item SVM-Linear&#10;   \item SVM-Polynomial &#10;   \item SVM-Radial &#10;   \item Logistic Regression &#10; \end{itemize}}}  &amp; \multicolumn{1}{l|}{\parbox{4cm}{\begin{itemize}[label=-,topsep=0cm,leftmargin=0.3cm,itemsep=0cm,parsep=0cm]&#10; \item SVM-Linear &#10; \item SVM-Polynomial &#10; \item SVM-Radial &#10; \item Logistic Regression &#10;\end{itemize}}}   &amp; \parbox{4cm}{\begin{itemize}[label=-,topsep=0cm,leftmargin=0.3cm,itemsep=0cm,parsep=0cm]&#10;\item SVM-Linear &#10;\item SVM-Polynomial &#10;\item SVM-Radial &#10;\item Logistic Regression &#10;\end{itemize}}  \\ \cline{2-5} &#10; \multicolumn{1}{|l|}{}                                &amp; $p \approx n$  &amp; \multicolumn{1}{l|}{\parbox{4cm}{\begin{itemize}[label=-,topsep=0cm,leftmargin=0.3cm,itemsep=0cm,parsep=0cm]&#10;    \item SVM-Linear&#10;    \item SVM-Polynomial&#10;    \item SVM-Radial&#10;    \item Logistic Regression&#10; \end{itemize}}}  &amp; \multicolumn{1}{l|}{\parbox{4cm}{\begin{itemize}[label=-,topsep=0cm,leftmargin=0.3cm,itemsep=0cm,parsep=0cm]&#10; \item SVM-Linear&#10; \item SVM-Polynomial&#10; \item SVM-Radial&#10; \item Logistic Regression&#10;\end{itemize}}}   &amp; \parbox{4cm}{\begin{itemize}[label=-,topsep=0cm,leftmargin=0.3cm,itemsep=0cm,parsep=0cm]&#10;\item SVM-Linear&#10;\item SVM-Polynomial&#10;\item SVM-Radial&#10;\item Logistic Regression&#10;\end{itemize}}  \\ \cline{2-5} &#10; \multicolumn{1}{|l|}{}                                &amp; $p \gg n$ &amp; \multicolumn{1}{l|}{\parbox{4cm}{\begin{itemize}[label=-,topsep=0cm,leftmargin=0.3cm,itemsep=0cm,parsep=0cm]&#10;    \item SVM-Linear&#10;    \item SVM-Polynomial&#10;    \item SVM-Radial&#10;    \item Logistic Regression&#10; \end{itemize}}}  &amp; \multicolumn{1}{l|}{\parbox{4cm}{\begin{itemize}[label=-,topsep=0cm,leftmargin=0.3cm,itemsep=0cm,parsep=0cm]&#10; \item SVM-Linear&#10; \item SVM-Polynomial&#10; \item SVM-Radial&#10; \item Logistic Regression&#10;\end{itemize}}}   &amp; \parbox{4cm}{\begin{itemize}[label=-,topsep=0cm,leftmargin=0.3cm,itemsep=0cm,parsep=0cm]&#10;\item SVM-Linear&#10;\item SVM-Polynomial&#10;\item SVM-Radial&#10;\item Logistic Regression&#10;\end{itemize}} \\ \hline&#10;\end{longtable}&#10;\end{center}&#10;\end{document}"/>
+  <p:tag name="LATEXADDIN" val="\documentclass[20pt]{article}&#10;\usepackage{amsmath,amsfonts,amssymb,xcolor, mathtools}&#10;\pagestyle{empty}&#10;\usepackage{booktabs}&#10;\usepackage{enumitem}&#10; \usepackage{multirow}&#10;\usepackage{longtable}&#10;\usepackage{xcolor}&#10;\definecolor{darkgreen}{RGB}{101,178,56}&#10;\usepackage{graphicx}&#10;\usepackage{parskip}&#10;\usepackage[T1]{fontenc}&#10;\usepackage{fontspec}&#10;\setsansfont{Arial}&#10;\renewcommand\familydefault{\sfdefault}&#10;\begin{document}&#10;\begin{center}&#10;\begin{longtable}{ll|lll|}&#10; \cline{3-5}&#10; &amp;             &amp; \multicolumn{3}{c|}{Form of decision boundary}                                            \\ \cline{3-5} &#10; \endfirsthead&#10; %&#10; \endhead&#10; %&#10; &amp;             &amp; \multicolumn{1}{l|}{linear} &amp; \multicolumn{1}{l|}{polynomial} &amp; radial \\ \hline&#10; \multicolumn{1}{|l|}{\multirow{3}{*}{\rotatebox{90}{Dimensionality}}} &amp; $p \ll n$  &amp; \multicolumn{1}{l|}{\parbox{4cm}{\begin{itemize}[label=-,topsep=0cm,leftmargin=0.3cm,itemsep=0cm,parsep=0cm]&#10;   \item SVM-Linear&#10;   \item SVM-Polynomial &#10;   \item SVM-Radial &#10;   \item Logistic Regression &#10; \end{itemize}}}  &amp; \multicolumn{1}{l|}{\parbox{4cm}{\begin{itemize}[label=-,topsep=0cm,leftmargin=0.3cm,itemsep=0cm,parsep=0cm]&#10; \item SVM-Linear &#10; \item SVM-Polynomial &#10; \item SVM-Radial &#10; \item Logistic Regression &#10;\end{itemize}}}   &amp; \parbox{4cm}{\begin{itemize}[label=-,topsep=0cm,leftmargin=0.3cm,itemsep=0cm,parsep=0cm]&#10;\item SVM-Linear &#10;\item SVM-Polynomial &#10;\item SVM-Radial &#10;\item Logistic Regression &#10;\end{itemize}}  \\ \cline{2-5} &#10; \multicolumn{1}{|l|}{}                                &amp; $p \approx n$  &amp; \multicolumn{1}{l|}{\parbox{4cm}{\begin{itemize}[label=-,topsep=0cm,leftmargin=0.3cm,itemsep=0cm,parsep=0cm]&#10;    \item SVM-Linear&#10;    \item SVM-Polynomial&#10;    \item SVM-Radial&#10;    \item Logistic Regression&#10; \end{itemize}}}  &amp; \multicolumn{1}{l|}{\parbox{4cm}{\begin{itemize}[label=-,topsep=0cm,leftmargin=0.3cm,itemsep=0cm,parsep=0cm]&#10; \item SVM-Linear&#10; \item SVM-Polynomial&#10; \item SVM-Radial&#10; \item Logistic Regression&#10;\end{itemize}}}   &amp; \parbox{4cm}{\begin{itemize}[label=-,topsep=0cm,leftmargin=0.3cm,itemsep=0cm,parsep=0cm]&#10;\item SVM-Linear&#10;\item SVM-Polynomial&#10;\item SVM-Radial&#10;\item Logistic Regression&#10;\end{itemize}}  \\ \cline{2-5} &#10; \multicolumn{1}{|l|}{}                                &amp; $p \gg n$ &amp; \multicolumn{1}{l|}{\parbox{4cm}{\begin{itemize}[label=-,topsep=0cm,leftmargin=0.3cm,itemsep=0cm,parsep=0cm]&#10;    \item SVM-Linear&#10;    \item SVM-Polynomial&#10;    \item SVM-Radial&#10;    \item Logistic Regression&#10; \end{itemize}}}  &amp; \multicolumn{1}{l|}{\parbox{4cm}{\begin{itemize}[label=-,topsep=0cm,leftmargin=0.3cm,itemsep=0cm,parsep=0cm]&#10; \item SVM-Linear&#10; \item SVM-Polynomial&#10; \item SVM-Radial&#10; \item Logistic Regression&#10;\end{itemize}}}   &amp; \parbox{4cm}{\begin{itemize}[label=-,topsep=0cm,leftmargin=0.3cm,itemsep=0cm,parsep=0cm]&#10;\item SVM-Linear&#10;\item SVM-Polynomial&#10;\item SVM-Radial&#10;\item Logistic Regression&#10;\end{itemize}} \\ \hline&#10;\end{longtable}&#10;\end{center}&#10;\end{document}"/>
   <p:tag name="IGUANATEXSIZE" val="18"/>
-  <p:tag name="IGUANATEXCURSOR" val="1821"/>
+  <p:tag name="IGUANATEXCURSOR" val="539"/>
   <p:tag name="TRANSPARENCY" val="Wahr"/>
   <p:tag name="LATEXENGINEID" val="3"/>
   <p:tag name="TEMPFOLDER" val="c:\temp\"/>

</xml_diff>